<commit_message>
added to presentation, normalized in R script too DM
</commit_message>
<xml_diff>
--- a/asparagus.pptx
+++ b/asparagus.pptx
@@ -5,7 +5,7 @@
     <p:sldMasterId id="2147483660" r:id="rId1"/>
   </p:sldMasterIdLst>
   <p:notesMasterIdLst>
-    <p:notesMasterId r:id="rId17"/>
+    <p:notesMasterId r:id="rId21"/>
   </p:notesMasterIdLst>
   <p:sldIdLst>
     <p:sldId id="256" r:id="rId2"/>
@@ -22,7 +22,11 @@
     <p:sldId id="264" r:id="rId13"/>
     <p:sldId id="268" r:id="rId14"/>
     <p:sldId id="270" r:id="rId15"/>
-    <p:sldId id="265" r:id="rId16"/>
+    <p:sldId id="272" r:id="rId16"/>
+    <p:sldId id="273" r:id="rId17"/>
+    <p:sldId id="274" r:id="rId18"/>
+    <p:sldId id="275" r:id="rId19"/>
+    <p:sldId id="265" r:id="rId20"/>
   </p:sldIdLst>
   <p:sldSz cx="9144000" cy="6858000" type="screen4x3"/>
   <p:notesSz cx="6858000" cy="9144000"/>
@@ -2396,16 +2400,12 @@
         <a:lstStyle/>
         <a:p>
           <a:r>
-            <a:rPr lang="en-US" dirty="0" err="1" smtClean="0"/>
+            <a:rPr lang="en-US" dirty="0" err="1"/>
             <a:t>Transcriptome</a:t>
           </a:r>
           <a:r>
-            <a:rPr lang="en-US" dirty="0" smtClean="0"/>
-            <a:t> </a:t>
-          </a:r>
-          <a:r>
             <a:rPr lang="en-US" dirty="0"/>
-            <a:t>profiling </a:t>
+            <a:t> profiling </a:t>
           </a:r>
         </a:p>
       </dgm:t>
@@ -2441,13 +2441,8 @@
         <a:p>
           <a:r>
             <a:rPr lang="en-US" dirty="0"/>
-            <a:t>Differential </a:t>
+            <a:t>Differential Expression analysis</a:t>
           </a:r>
-          <a:r>
-            <a:rPr lang="en-US" dirty="0" smtClean="0"/>
-            <a:t>Expression analysis</a:t>
-          </a:r>
-          <a:endParaRPr lang="en-US" dirty="0"/>
         </a:p>
       </dgm:t>
     </dgm:pt>
@@ -2489,35 +2484,14 @@
         </dgm:presLayoutVars>
       </dgm:prSet>
       <dgm:spPr/>
-      <dgm:t>
-        <a:bodyPr/>
-        <a:lstStyle/>
-        <a:p>
-          <a:endParaRPr lang="en-US"/>
-        </a:p>
-      </dgm:t>
     </dgm:pt>
     <dgm:pt modelId="{88EDF64E-35BB-481B-B11A-F08915958068}" type="pres">
       <dgm:prSet presAssocID="{E892C2B4-4244-468D-917A-E776E4200961}" presName="sibTrans" presStyleLbl="sibTrans2D1" presStyleIdx="0" presStyleCnt="1"/>
       <dgm:spPr/>
-      <dgm:t>
-        <a:bodyPr/>
-        <a:lstStyle/>
-        <a:p>
-          <a:endParaRPr lang="en-US"/>
-        </a:p>
-      </dgm:t>
     </dgm:pt>
     <dgm:pt modelId="{F3C8F6A7-EE57-4CE9-92F3-C5249F31F420}" type="pres">
       <dgm:prSet presAssocID="{E892C2B4-4244-468D-917A-E776E4200961}" presName="connectorText" presStyleLbl="sibTrans2D1" presStyleIdx="0" presStyleCnt="1"/>
       <dgm:spPr/>
-      <dgm:t>
-        <a:bodyPr/>
-        <a:lstStyle/>
-        <a:p>
-          <a:endParaRPr lang="en-US"/>
-        </a:p>
-      </dgm:t>
     </dgm:pt>
     <dgm:pt modelId="{174F3DC6-92D1-46F3-BBD6-C834F6469487}" type="pres">
       <dgm:prSet presAssocID="{3E86D3FA-BD3A-4833-9766-85B4B2E840DF}" presName="node" presStyleLbl="node1" presStyleIdx="1" presStyleCnt="2">
@@ -2526,13 +2500,6 @@
         </dgm:presLayoutVars>
       </dgm:prSet>
       <dgm:spPr/>
-      <dgm:t>
-        <a:bodyPr/>
-        <a:lstStyle/>
-        <a:p>
-          <a:endParaRPr lang="en-US"/>
-        </a:p>
-      </dgm:t>
     </dgm:pt>
   </dgm:ptLst>
   <dgm:cxnLst>
@@ -2573,10 +2540,9 @@
         <a:lstStyle/>
         <a:p>
           <a:r>
-            <a:rPr lang="en-US" sz="2000" noProof="0" dirty="0" smtClean="0"/>
+            <a:rPr lang="en-US" sz="2000" noProof="0" dirty="0"/>
             <a:t>Quality assessment</a:t>
           </a:r>
-          <a:endParaRPr lang="en-US" sz="2000" noProof="0" dirty="0"/>
         </a:p>
       </dgm:t>
     </dgm:pt>
@@ -2610,10 +2576,9 @@
         <a:lstStyle/>
         <a:p>
           <a:r>
-            <a:rPr lang="en-US" sz="2000" noProof="0" dirty="0" smtClean="0"/>
+            <a:rPr lang="en-US" sz="2000" noProof="0" dirty="0"/>
             <a:t>Trimming reads</a:t>
           </a:r>
-          <a:endParaRPr lang="en-US" sz="2000" noProof="0" dirty="0"/>
         </a:p>
       </dgm:t>
     </dgm:pt>
@@ -2647,10 +2612,9 @@
         <a:lstStyle/>
         <a:p>
           <a:r>
-            <a:rPr lang="en-US" sz="2000" noProof="0" dirty="0" smtClean="0"/>
+            <a:rPr lang="en-US" sz="2000" noProof="0" dirty="0"/>
             <a:t>Alignment</a:t>
           </a:r>
-          <a:endParaRPr lang="en-US" sz="2000" noProof="0" dirty="0"/>
         </a:p>
       </dgm:t>
     </dgm:pt>
@@ -2684,18 +2648,17 @@
         <a:lstStyle/>
         <a:p>
           <a:r>
-            <a:rPr lang="en-US" sz="2000" noProof="0" dirty="0" smtClean="0"/>
+            <a:rPr lang="en-US" sz="2000" noProof="0" dirty="0"/>
             <a:t>Expression</a:t>
           </a:r>
           <a:r>
-            <a:rPr lang="es-ES" sz="2000" dirty="0" smtClean="0"/>
+            <a:rPr lang="es-ES" sz="2000" dirty="0"/>
             <a:t> </a:t>
           </a:r>
           <a:r>
-            <a:rPr lang="en-US" sz="2000" noProof="0" dirty="0" smtClean="0"/>
+            <a:rPr lang="en-US" sz="2000" noProof="0" dirty="0"/>
             <a:t>counting calculation</a:t>
           </a:r>
-          <a:endParaRPr lang="en-US" sz="2000" noProof="0" dirty="0"/>
         </a:p>
       </dgm:t>
     </dgm:pt>
@@ -2737,35 +2700,14 @@
         </dgm:presLayoutVars>
       </dgm:prSet>
       <dgm:spPr/>
-      <dgm:t>
-        <a:bodyPr/>
-        <a:lstStyle/>
-        <a:p>
-          <a:endParaRPr lang="en-US"/>
-        </a:p>
-      </dgm:t>
     </dgm:pt>
     <dgm:pt modelId="{F743BBA3-F85A-4955-B22D-74C8A453CDA2}" type="pres">
       <dgm:prSet presAssocID="{652A2CBE-7EEC-43CF-9E13-4590DEBC9582}" presName="sibTrans" presStyleLbl="sibTrans2D1" presStyleIdx="0" presStyleCnt="3"/>
       <dgm:spPr/>
-      <dgm:t>
-        <a:bodyPr/>
-        <a:lstStyle/>
-        <a:p>
-          <a:endParaRPr lang="en-US"/>
-        </a:p>
-      </dgm:t>
     </dgm:pt>
     <dgm:pt modelId="{8B8B4377-0697-45FC-A640-F2CE0A54A7DA}" type="pres">
       <dgm:prSet presAssocID="{652A2CBE-7EEC-43CF-9E13-4590DEBC9582}" presName="connectorText" presStyleLbl="sibTrans2D1" presStyleIdx="0" presStyleCnt="3"/>
       <dgm:spPr/>
-      <dgm:t>
-        <a:bodyPr/>
-        <a:lstStyle/>
-        <a:p>
-          <a:endParaRPr lang="en-US"/>
-        </a:p>
-      </dgm:t>
     </dgm:pt>
     <dgm:pt modelId="{34C7BCB3-04DB-45C7-9A42-320BFF7BC6DD}" type="pres">
       <dgm:prSet presAssocID="{BF1D83B5-B3DF-493F-A256-78F574499C76}" presName="node" presStyleLbl="node1" presStyleIdx="1" presStyleCnt="4">
@@ -2774,35 +2716,14 @@
         </dgm:presLayoutVars>
       </dgm:prSet>
       <dgm:spPr/>
-      <dgm:t>
-        <a:bodyPr/>
-        <a:lstStyle/>
-        <a:p>
-          <a:endParaRPr lang="en-US"/>
-        </a:p>
-      </dgm:t>
     </dgm:pt>
     <dgm:pt modelId="{9C101147-473E-42D2-A0E5-5ABF38B50C73}" type="pres">
       <dgm:prSet presAssocID="{C3C10AC9-1ADB-403C-A703-3E7E7FA57BF8}" presName="sibTrans" presStyleLbl="sibTrans2D1" presStyleIdx="1" presStyleCnt="3"/>
       <dgm:spPr/>
-      <dgm:t>
-        <a:bodyPr/>
-        <a:lstStyle/>
-        <a:p>
-          <a:endParaRPr lang="en-US"/>
-        </a:p>
-      </dgm:t>
     </dgm:pt>
     <dgm:pt modelId="{8DC65580-354A-49B6-A367-B6A9A3244483}" type="pres">
       <dgm:prSet presAssocID="{C3C10AC9-1ADB-403C-A703-3E7E7FA57BF8}" presName="connectorText" presStyleLbl="sibTrans2D1" presStyleIdx="1" presStyleCnt="3"/>
       <dgm:spPr/>
-      <dgm:t>
-        <a:bodyPr/>
-        <a:lstStyle/>
-        <a:p>
-          <a:endParaRPr lang="en-US"/>
-        </a:p>
-      </dgm:t>
     </dgm:pt>
     <dgm:pt modelId="{732646D0-614E-4567-8EB3-FE5BADE041C4}" type="pres">
       <dgm:prSet presAssocID="{9943014D-8C6E-463D-A613-48F23D4519B7}" presName="node" presStyleLbl="node1" presStyleIdx="2" presStyleCnt="4">
@@ -2811,13 +2732,6 @@
         </dgm:presLayoutVars>
       </dgm:prSet>
       <dgm:spPr/>
-      <dgm:t>
-        <a:bodyPr/>
-        <a:lstStyle/>
-        <a:p>
-          <a:endParaRPr lang="en-US"/>
-        </a:p>
-      </dgm:t>
     </dgm:pt>
     <dgm:pt modelId="{C450CEE9-1A94-4A67-8B6D-B4519DBA50F0}" type="pres">
       <dgm:prSet presAssocID="{E1FFF456-3F57-4AA5-801E-995CE96CAF64}" presName="sibTrans" presStyleLbl="sibTrans2D1" presStyleIdx="2" presStyleCnt="3"/>
@@ -2834,31 +2748,24 @@
         </dgm:presLayoutVars>
       </dgm:prSet>
       <dgm:spPr/>
-      <dgm:t>
-        <a:bodyPr/>
-        <a:lstStyle/>
-        <a:p>
-          <a:endParaRPr lang="en-US"/>
-        </a:p>
-      </dgm:t>
     </dgm:pt>
   </dgm:ptLst>
   <dgm:cxnLst>
-    <dgm:cxn modelId="{6E98B86E-EB32-49D1-9D49-04F2D3A1797C}" type="presOf" srcId="{BF9479A6-8E44-468C-865C-A5AF6CB9B728}" destId="{C6C5D930-BF4B-4826-8EF5-9713E075F297}" srcOrd="0" destOrd="0" presId="urn:microsoft.com/office/officeart/2005/8/layout/process1"/>
-    <dgm:cxn modelId="{10710FDA-9FC6-4E26-9650-77012A4ECD69}" type="presOf" srcId="{BF1D83B5-B3DF-493F-A256-78F574499C76}" destId="{34C7BCB3-04DB-45C7-9A42-320BFF7BC6DD}" srcOrd="0" destOrd="0" presId="urn:microsoft.com/office/officeart/2005/8/layout/process1"/>
+    <dgm:cxn modelId="{AB8509D1-5396-4647-92ED-BFC225D3CE5B}" srcId="{B51D5227-CD8A-4A6C-9B8B-B8F90F209FFD}" destId="{9943014D-8C6E-463D-A613-48F23D4519B7}" srcOrd="2" destOrd="0" parTransId="{EA722D84-3D12-4C9F-92C7-287E01409804}" sibTransId="{E1FFF456-3F57-4AA5-801E-995CE96CAF64}"/>
+    <dgm:cxn modelId="{D788F2CE-FCA9-4CE9-854D-0374B10FB1DE}" srcId="{B51D5227-CD8A-4A6C-9B8B-B8F90F209FFD}" destId="{BF9479A6-8E44-468C-865C-A5AF6CB9B728}" srcOrd="0" destOrd="0" parTransId="{7AEB2F86-7C19-4AED-AE42-D9456F73BD75}" sibTransId="{652A2CBE-7EEC-43CF-9E13-4590DEBC9582}"/>
     <dgm:cxn modelId="{4C69A28B-0934-4989-9BBD-73C967167B2D}" type="presOf" srcId="{B51D5227-CD8A-4A6C-9B8B-B8F90F209FFD}" destId="{346A8D5E-6DAC-49DF-B417-A9A1ACDC38CD}" srcOrd="0" destOrd="0" presId="urn:microsoft.com/office/officeart/2005/8/layout/process1"/>
-    <dgm:cxn modelId="{9158C5C2-11FB-43E8-A674-137303ADBD32}" type="presOf" srcId="{E1FFF456-3F57-4AA5-801E-995CE96CAF64}" destId="{C450CEE9-1A94-4A67-8B6D-B4519DBA50F0}" srcOrd="0" destOrd="0" presId="urn:microsoft.com/office/officeart/2005/8/layout/process1"/>
-    <dgm:cxn modelId="{D788F2CE-FCA9-4CE9-854D-0374B10FB1DE}" srcId="{B51D5227-CD8A-4A6C-9B8B-B8F90F209FFD}" destId="{BF9479A6-8E44-468C-865C-A5AF6CB9B728}" srcOrd="0" destOrd="0" parTransId="{7AEB2F86-7C19-4AED-AE42-D9456F73BD75}" sibTransId="{652A2CBE-7EEC-43CF-9E13-4590DEBC9582}"/>
+    <dgm:cxn modelId="{AEC80795-DAB2-4DA3-977F-47AA1CC331C6}" type="presOf" srcId="{E1FFF456-3F57-4AA5-801E-995CE96CAF64}" destId="{42481493-BF49-4D21-914E-E49B566E00C1}" srcOrd="1" destOrd="0" presId="urn:microsoft.com/office/officeart/2005/8/layout/process1"/>
+    <dgm:cxn modelId="{BA6E218F-1B49-40F6-AD3C-A061D2CFEE28}" type="presOf" srcId="{727CD113-AE2A-4DE5-BC4F-9A72EB55259C}" destId="{E1A97CE5-89F8-4DCF-B4DC-A0ABABE32E9B}" srcOrd="0" destOrd="0" presId="urn:microsoft.com/office/officeart/2005/8/layout/process1"/>
     <dgm:cxn modelId="{F7FF024C-B249-443F-AB18-DDD868EF7310}" type="presOf" srcId="{C3C10AC9-1ADB-403C-A703-3E7E7FA57BF8}" destId="{8DC65580-354A-49B6-A367-B6A9A3244483}" srcOrd="1" destOrd="0" presId="urn:microsoft.com/office/officeart/2005/8/layout/process1"/>
     <dgm:cxn modelId="{3BEA7B11-69F6-4F8D-9050-310BE84730BC}" type="presOf" srcId="{652A2CBE-7EEC-43CF-9E13-4590DEBC9582}" destId="{F743BBA3-F85A-4955-B22D-74C8A453CDA2}" srcOrd="0" destOrd="0" presId="urn:microsoft.com/office/officeart/2005/8/layout/process1"/>
+    <dgm:cxn modelId="{9158C5C2-11FB-43E8-A674-137303ADBD32}" type="presOf" srcId="{E1FFF456-3F57-4AA5-801E-995CE96CAF64}" destId="{C450CEE9-1A94-4A67-8B6D-B4519DBA50F0}" srcOrd="0" destOrd="0" presId="urn:microsoft.com/office/officeart/2005/8/layout/process1"/>
+    <dgm:cxn modelId="{D483075D-9C1C-419A-A0B1-69B8E1AB81CE}" srcId="{B51D5227-CD8A-4A6C-9B8B-B8F90F209FFD}" destId="{BF1D83B5-B3DF-493F-A256-78F574499C76}" srcOrd="1" destOrd="0" parTransId="{825F469F-E5E7-4227-AD16-80587CE29A33}" sibTransId="{C3C10AC9-1ADB-403C-A703-3E7E7FA57BF8}"/>
     <dgm:cxn modelId="{7F0E42AB-AC08-4F6B-B175-97515724429D}" type="presOf" srcId="{9943014D-8C6E-463D-A613-48F23D4519B7}" destId="{732646D0-614E-4567-8EB3-FE5BADE041C4}" srcOrd="0" destOrd="0" presId="urn:microsoft.com/office/officeart/2005/8/layout/process1"/>
-    <dgm:cxn modelId="{AB8509D1-5396-4647-92ED-BFC225D3CE5B}" srcId="{B51D5227-CD8A-4A6C-9B8B-B8F90F209FFD}" destId="{9943014D-8C6E-463D-A613-48F23D4519B7}" srcOrd="2" destOrd="0" parTransId="{EA722D84-3D12-4C9F-92C7-287E01409804}" sibTransId="{E1FFF456-3F57-4AA5-801E-995CE96CAF64}"/>
+    <dgm:cxn modelId="{2E0CBE54-9787-40E4-99D7-3F30550F1B91}" srcId="{B51D5227-CD8A-4A6C-9B8B-B8F90F209FFD}" destId="{727CD113-AE2A-4DE5-BC4F-9A72EB55259C}" srcOrd="3" destOrd="0" parTransId="{85FD5930-820A-4ECE-AD41-416B82BCAA08}" sibTransId="{9B988E74-03A2-46F3-9C91-A75E7FE2468F}"/>
+    <dgm:cxn modelId="{6E98B86E-EB32-49D1-9D49-04F2D3A1797C}" type="presOf" srcId="{BF9479A6-8E44-468C-865C-A5AF6CB9B728}" destId="{C6C5D930-BF4B-4826-8EF5-9713E075F297}" srcOrd="0" destOrd="0" presId="urn:microsoft.com/office/officeart/2005/8/layout/process1"/>
+    <dgm:cxn modelId="{63C212A9-7E88-4104-A098-249ADECF52B6}" type="presOf" srcId="{C3C10AC9-1ADB-403C-A703-3E7E7FA57BF8}" destId="{9C101147-473E-42D2-A0E5-5ABF38B50C73}" srcOrd="0" destOrd="0" presId="urn:microsoft.com/office/officeart/2005/8/layout/process1"/>
     <dgm:cxn modelId="{5B953AEF-E5D9-4A2E-B1D5-81A926517769}" type="presOf" srcId="{652A2CBE-7EEC-43CF-9E13-4590DEBC9582}" destId="{8B8B4377-0697-45FC-A640-F2CE0A54A7DA}" srcOrd="1" destOrd="0" presId="urn:microsoft.com/office/officeart/2005/8/layout/process1"/>
-    <dgm:cxn modelId="{D483075D-9C1C-419A-A0B1-69B8E1AB81CE}" srcId="{B51D5227-CD8A-4A6C-9B8B-B8F90F209FFD}" destId="{BF1D83B5-B3DF-493F-A256-78F574499C76}" srcOrd="1" destOrd="0" parTransId="{825F469F-E5E7-4227-AD16-80587CE29A33}" sibTransId="{C3C10AC9-1ADB-403C-A703-3E7E7FA57BF8}"/>
-    <dgm:cxn modelId="{BA6E218F-1B49-40F6-AD3C-A061D2CFEE28}" type="presOf" srcId="{727CD113-AE2A-4DE5-BC4F-9A72EB55259C}" destId="{E1A97CE5-89F8-4DCF-B4DC-A0ABABE32E9B}" srcOrd="0" destOrd="0" presId="urn:microsoft.com/office/officeart/2005/8/layout/process1"/>
-    <dgm:cxn modelId="{63C212A9-7E88-4104-A098-249ADECF52B6}" type="presOf" srcId="{C3C10AC9-1ADB-403C-A703-3E7E7FA57BF8}" destId="{9C101147-473E-42D2-A0E5-5ABF38B50C73}" srcOrd="0" destOrd="0" presId="urn:microsoft.com/office/officeart/2005/8/layout/process1"/>
-    <dgm:cxn modelId="{2E0CBE54-9787-40E4-99D7-3F30550F1B91}" srcId="{B51D5227-CD8A-4A6C-9B8B-B8F90F209FFD}" destId="{727CD113-AE2A-4DE5-BC4F-9A72EB55259C}" srcOrd="3" destOrd="0" parTransId="{85FD5930-820A-4ECE-AD41-416B82BCAA08}" sibTransId="{9B988E74-03A2-46F3-9C91-A75E7FE2468F}"/>
-    <dgm:cxn modelId="{AEC80795-DAB2-4DA3-977F-47AA1CC331C6}" type="presOf" srcId="{E1FFF456-3F57-4AA5-801E-995CE96CAF64}" destId="{42481493-BF49-4D21-914E-E49B566E00C1}" srcOrd="1" destOrd="0" presId="urn:microsoft.com/office/officeart/2005/8/layout/process1"/>
+    <dgm:cxn modelId="{10710FDA-9FC6-4E26-9650-77012A4ECD69}" type="presOf" srcId="{BF1D83B5-B3DF-493F-A256-78F574499C76}" destId="{34C7BCB3-04DB-45C7-9A42-320BFF7BC6DD}" srcOrd="0" destOrd="0" presId="urn:microsoft.com/office/officeart/2005/8/layout/process1"/>
     <dgm:cxn modelId="{F6C77133-5720-4D53-B315-81B807A8088A}" type="presParOf" srcId="{346A8D5E-6DAC-49DF-B417-A9A1ACDC38CD}" destId="{C6C5D930-BF4B-4826-8EF5-9713E075F297}" srcOrd="0" destOrd="0" presId="urn:microsoft.com/office/officeart/2005/8/layout/process1"/>
     <dgm:cxn modelId="{7D1B7CEB-059E-4BEA-8E28-3A384A2DBB98}" type="presParOf" srcId="{346A8D5E-6DAC-49DF-B417-A9A1ACDC38CD}" destId="{F743BBA3-F85A-4955-B22D-74C8A453CDA2}" srcOrd="1" destOrd="0" presId="urn:microsoft.com/office/officeart/2005/8/layout/process1"/>
     <dgm:cxn modelId="{1C4221C7-F568-4A76-A1F9-7E64BC8D7BDF}" type="presParOf" srcId="{F743BBA3-F85A-4955-B22D-74C8A453CDA2}" destId="{8B8B4377-0697-45FC-A640-F2CE0A54A7DA}" srcOrd="0" destOrd="0" presId="urn:microsoft.com/office/officeart/2005/8/layout/process1"/>
@@ -2894,7 +2801,7 @@
         <a:bodyPr/>
         <a:lstStyle/>
         <a:p>
-          <a:endParaRPr lang="en-US"/>
+          <a:endParaRPr lang="en-US" dirty="0"/>
         </a:p>
       </dgm:t>
     </dgm:pt>
@@ -3002,35 +2909,14 @@
         </dgm:presLayoutVars>
       </dgm:prSet>
       <dgm:spPr/>
-      <dgm:t>
-        <a:bodyPr/>
-        <a:lstStyle/>
-        <a:p>
-          <a:endParaRPr lang="en-US"/>
-        </a:p>
-      </dgm:t>
     </dgm:pt>
     <dgm:pt modelId="{9AA0144C-5539-4436-A2D7-D0076484B6A5}" type="pres">
       <dgm:prSet presAssocID="{A6F7AF0B-D6F3-4BB2-BED8-D145641246F0}" presName="sibTrans" presStyleLbl="sibTrans2D1" presStyleIdx="0" presStyleCnt="2"/>
       <dgm:spPr/>
-      <dgm:t>
-        <a:bodyPr/>
-        <a:lstStyle/>
-        <a:p>
-          <a:endParaRPr lang="en-US"/>
-        </a:p>
-      </dgm:t>
     </dgm:pt>
     <dgm:pt modelId="{BA7124CE-A91E-4278-A8B8-483BD1B9EB53}" type="pres">
       <dgm:prSet presAssocID="{A6F7AF0B-D6F3-4BB2-BED8-D145641246F0}" presName="connectorText" presStyleLbl="sibTrans2D1" presStyleIdx="0" presStyleCnt="2"/>
       <dgm:spPr/>
-      <dgm:t>
-        <a:bodyPr/>
-        <a:lstStyle/>
-        <a:p>
-          <a:endParaRPr lang="en-US"/>
-        </a:p>
-      </dgm:t>
     </dgm:pt>
     <dgm:pt modelId="{0144F23B-66FF-470D-9DB2-78780C3993C3}" type="pres">
       <dgm:prSet presAssocID="{8B4163E0-D9A4-4F25-8F85-638ACD032F1C}" presName="node" presStyleLbl="node1" presStyleIdx="1" presStyleCnt="3">
@@ -3039,35 +2925,14 @@
         </dgm:presLayoutVars>
       </dgm:prSet>
       <dgm:spPr/>
-      <dgm:t>
-        <a:bodyPr/>
-        <a:lstStyle/>
-        <a:p>
-          <a:endParaRPr lang="en-US"/>
-        </a:p>
-      </dgm:t>
     </dgm:pt>
     <dgm:pt modelId="{F5AFDAF3-FFE6-4092-BA54-9FDC13D578EC}" type="pres">
       <dgm:prSet presAssocID="{9F45A1D7-F201-46B9-810B-C95E71227969}" presName="sibTrans" presStyleLbl="sibTrans2D1" presStyleIdx="1" presStyleCnt="2"/>
       <dgm:spPr/>
-      <dgm:t>
-        <a:bodyPr/>
-        <a:lstStyle/>
-        <a:p>
-          <a:endParaRPr lang="en-US"/>
-        </a:p>
-      </dgm:t>
     </dgm:pt>
     <dgm:pt modelId="{4C66682C-450F-4FAE-A7DE-B012CE089624}" type="pres">
       <dgm:prSet presAssocID="{9F45A1D7-F201-46B9-810B-C95E71227969}" presName="connectorText" presStyleLbl="sibTrans2D1" presStyleIdx="1" presStyleCnt="2"/>
       <dgm:spPr/>
-      <dgm:t>
-        <a:bodyPr/>
-        <a:lstStyle/>
-        <a:p>
-          <a:endParaRPr lang="en-US"/>
-        </a:p>
-      </dgm:t>
     </dgm:pt>
     <dgm:pt modelId="{3432B14F-3020-44AB-9D24-EA53FC004441}" type="pres">
       <dgm:prSet presAssocID="{15C71DBD-6CA2-4C8D-B38F-1E72A180A62A}" presName="node" presStyleLbl="node1" presStyleIdx="2" presStyleCnt="3">
@@ -3076,13 +2941,6 @@
         </dgm:presLayoutVars>
       </dgm:prSet>
       <dgm:spPr/>
-      <dgm:t>
-        <a:bodyPr/>
-        <a:lstStyle/>
-        <a:p>
-          <a:endParaRPr lang="en-US"/>
-        </a:p>
-      </dgm:t>
     </dgm:pt>
   </dgm:ptLst>
   <dgm:cxnLst>
@@ -3179,7 +3037,7 @@
         </a:bodyPr>
         <a:lstStyle/>
         <a:p>
-          <a:pPr lvl="0" algn="ctr" defTabSz="1511300">
+          <a:pPr marL="0" lvl="0" indent="0" algn="ctr" defTabSz="1511300">
             <a:lnSpc>
               <a:spcPct val="90000"/>
             </a:lnSpc>
@@ -3189,18 +3047,15 @@
             <a:spcAft>
               <a:spcPct val="35000"/>
             </a:spcAft>
+            <a:buNone/>
           </a:pPr>
           <a:r>
-            <a:rPr lang="en-US" sz="3400" kern="1200" dirty="0" err="1" smtClean="0"/>
+            <a:rPr lang="en-US" sz="3400" kern="1200" dirty="0" err="1"/>
             <a:t>Transcriptome</a:t>
           </a:r>
           <a:r>
-            <a:rPr lang="en-US" sz="3400" kern="1200" dirty="0" smtClean="0"/>
-            <a:t> </a:t>
-          </a:r>
-          <a:r>
             <a:rPr lang="en-US" sz="3400" kern="1200" dirty="0"/>
-            <a:t>profiling </a:t>
+            <a:t> profiling </a:t>
           </a:r>
         </a:p>
       </dsp:txBody>
@@ -3259,7 +3114,7 @@
         </a:bodyPr>
         <a:lstStyle/>
         <a:p>
-          <a:pPr lvl="0" algn="ctr" defTabSz="1200150">
+          <a:pPr marL="0" lvl="0" indent="0" algn="ctr" defTabSz="1200150">
             <a:lnSpc>
               <a:spcPct val="90000"/>
             </a:lnSpc>
@@ -3269,6 +3124,7 @@
             <a:spcAft>
               <a:spcPct val="35000"/>
             </a:spcAft>
+            <a:buNone/>
           </a:pPr>
           <a:endParaRPr lang="en-US" sz="2700" kern="1200"/>
         </a:p>
@@ -3334,7 +3190,7 @@
         </a:bodyPr>
         <a:lstStyle/>
         <a:p>
-          <a:pPr lvl="0" algn="ctr" defTabSz="1511300">
+          <a:pPr marL="0" lvl="0" indent="0" algn="ctr" defTabSz="1511300">
             <a:lnSpc>
               <a:spcPct val="90000"/>
             </a:lnSpc>
@@ -3344,16 +3200,12 @@
             <a:spcAft>
               <a:spcPct val="35000"/>
             </a:spcAft>
+            <a:buNone/>
           </a:pPr>
           <a:r>
             <a:rPr lang="en-US" sz="3400" kern="1200" dirty="0"/>
-            <a:t>Differential </a:t>
+            <a:t>Differential Expression analysis</a:t>
           </a:r>
-          <a:r>
-            <a:rPr lang="en-US" sz="3400" kern="1200" dirty="0" smtClean="0"/>
-            <a:t>Expression analysis</a:t>
-          </a:r>
-          <a:endParaRPr lang="en-US" sz="3400" kern="1200" dirty="0"/>
         </a:p>
       </dsp:txBody>
       <dsp:txXfrm>
@@ -3429,7 +3281,7 @@
         </a:bodyPr>
         <a:lstStyle/>
         <a:p>
-          <a:pPr lvl="0" algn="ctr" defTabSz="889000">
+          <a:pPr marL="0" lvl="0" indent="0" algn="ctr" defTabSz="889000">
             <a:lnSpc>
               <a:spcPct val="90000"/>
             </a:lnSpc>
@@ -3439,12 +3291,12 @@
             <a:spcAft>
               <a:spcPct val="35000"/>
             </a:spcAft>
+            <a:buNone/>
           </a:pPr>
           <a:r>
-            <a:rPr lang="en-US" sz="2000" kern="1200" noProof="0" dirty="0" smtClean="0"/>
+            <a:rPr lang="en-US" sz="2000" kern="1200" noProof="0" dirty="0"/>
             <a:t>Quality assessment</a:t>
           </a:r>
-          <a:endParaRPr lang="en-US" sz="2000" kern="1200" noProof="0" dirty="0"/>
         </a:p>
       </dsp:txBody>
       <dsp:txXfrm>
@@ -3502,7 +3354,7 @@
         </a:bodyPr>
         <a:lstStyle/>
         <a:p>
-          <a:pPr lvl="0" algn="ctr" defTabSz="889000">
+          <a:pPr marL="0" lvl="0" indent="0" algn="ctr" defTabSz="889000">
             <a:lnSpc>
               <a:spcPct val="90000"/>
             </a:lnSpc>
@@ -3512,6 +3364,7 @@
             <a:spcAft>
               <a:spcPct val="35000"/>
             </a:spcAft>
+            <a:buNone/>
           </a:pPr>
           <a:endParaRPr lang="en-US" sz="2000" kern="1200"/>
         </a:p>
@@ -3577,7 +3430,7 @@
         </a:bodyPr>
         <a:lstStyle/>
         <a:p>
-          <a:pPr lvl="0" algn="ctr" defTabSz="889000">
+          <a:pPr marL="0" lvl="0" indent="0" algn="ctr" defTabSz="889000">
             <a:lnSpc>
               <a:spcPct val="90000"/>
             </a:lnSpc>
@@ -3587,12 +3440,12 @@
             <a:spcAft>
               <a:spcPct val="35000"/>
             </a:spcAft>
+            <a:buNone/>
           </a:pPr>
           <a:r>
-            <a:rPr lang="en-US" sz="2000" kern="1200" noProof="0" dirty="0" smtClean="0"/>
+            <a:rPr lang="en-US" sz="2000" kern="1200" noProof="0" dirty="0"/>
             <a:t>Trimming reads</a:t>
           </a:r>
-          <a:endParaRPr lang="en-US" sz="2000" kern="1200" noProof="0" dirty="0"/>
         </a:p>
       </dsp:txBody>
       <dsp:txXfrm>
@@ -3650,7 +3503,7 @@
         </a:bodyPr>
         <a:lstStyle/>
         <a:p>
-          <a:pPr lvl="0" algn="ctr" defTabSz="889000">
+          <a:pPr marL="0" lvl="0" indent="0" algn="ctr" defTabSz="889000">
             <a:lnSpc>
               <a:spcPct val="90000"/>
             </a:lnSpc>
@@ -3660,6 +3513,7 @@
             <a:spcAft>
               <a:spcPct val="35000"/>
             </a:spcAft>
+            <a:buNone/>
           </a:pPr>
           <a:endParaRPr lang="en-US" sz="2000" kern="1200"/>
         </a:p>
@@ -3725,7 +3579,7 @@
         </a:bodyPr>
         <a:lstStyle/>
         <a:p>
-          <a:pPr lvl="0" algn="ctr" defTabSz="889000">
+          <a:pPr marL="0" lvl="0" indent="0" algn="ctr" defTabSz="889000">
             <a:lnSpc>
               <a:spcPct val="90000"/>
             </a:lnSpc>
@@ -3735,12 +3589,12 @@
             <a:spcAft>
               <a:spcPct val="35000"/>
             </a:spcAft>
+            <a:buNone/>
           </a:pPr>
           <a:r>
-            <a:rPr lang="en-US" sz="2000" kern="1200" noProof="0" dirty="0" smtClean="0"/>
+            <a:rPr lang="en-US" sz="2000" kern="1200" noProof="0" dirty="0"/>
             <a:t>Alignment</a:t>
           </a:r>
-          <a:endParaRPr lang="en-US" sz="2000" kern="1200" noProof="0" dirty="0"/>
         </a:p>
       </dsp:txBody>
       <dsp:txXfrm>
@@ -3798,7 +3652,7 @@
         </a:bodyPr>
         <a:lstStyle/>
         <a:p>
-          <a:pPr lvl="0" algn="ctr" defTabSz="889000">
+          <a:pPr marL="0" lvl="0" indent="0" algn="ctr" defTabSz="889000">
             <a:lnSpc>
               <a:spcPct val="90000"/>
             </a:lnSpc>
@@ -3808,6 +3662,7 @@
             <a:spcAft>
               <a:spcPct val="35000"/>
             </a:spcAft>
+            <a:buNone/>
           </a:pPr>
           <a:endParaRPr lang="en-US" sz="2000" kern="1200"/>
         </a:p>
@@ -3873,7 +3728,7 @@
         </a:bodyPr>
         <a:lstStyle/>
         <a:p>
-          <a:pPr lvl="0" algn="ctr" defTabSz="889000">
+          <a:pPr marL="0" lvl="0" indent="0" algn="ctr" defTabSz="889000">
             <a:lnSpc>
               <a:spcPct val="90000"/>
             </a:lnSpc>
@@ -3883,20 +3738,20 @@
             <a:spcAft>
               <a:spcPct val="35000"/>
             </a:spcAft>
+            <a:buNone/>
           </a:pPr>
           <a:r>
-            <a:rPr lang="en-US" sz="2000" kern="1200" noProof="0" dirty="0" smtClean="0"/>
+            <a:rPr lang="en-US" sz="2000" kern="1200" noProof="0" dirty="0"/>
             <a:t>Expression</a:t>
           </a:r>
           <a:r>
-            <a:rPr lang="es-ES" sz="2000" kern="1200" dirty="0" smtClean="0"/>
+            <a:rPr lang="es-ES" sz="2000" kern="1200" dirty="0"/>
             <a:t> </a:t>
           </a:r>
           <a:r>
-            <a:rPr lang="en-US" sz="2000" kern="1200" noProof="0" dirty="0" smtClean="0"/>
+            <a:rPr lang="en-US" sz="2000" kern="1200" noProof="0" dirty="0"/>
             <a:t>counting calculation</a:t>
           </a:r>
-          <a:endParaRPr lang="en-US" sz="2000" kern="1200" noProof="0" dirty="0"/>
         </a:p>
       </dsp:txBody>
       <dsp:txXfrm>
@@ -3972,7 +3827,7 @@
         </a:bodyPr>
         <a:lstStyle/>
         <a:p>
-          <a:pPr lvl="0" algn="ctr" defTabSz="2222500">
+          <a:pPr marL="0" lvl="0" indent="0" algn="ctr" defTabSz="2222500">
             <a:lnSpc>
               <a:spcPct val="90000"/>
             </a:lnSpc>
@@ -3982,6 +3837,7 @@
             <a:spcAft>
               <a:spcPct val="35000"/>
             </a:spcAft>
+            <a:buNone/>
           </a:pPr>
           <a:endParaRPr lang="en-US" sz="5000" kern="1200"/>
         </a:p>
@@ -4041,7 +3897,7 @@
         </a:bodyPr>
         <a:lstStyle/>
         <a:p>
-          <a:pPr lvl="0" algn="ctr" defTabSz="933450">
+          <a:pPr marL="0" lvl="0" indent="0" algn="ctr" defTabSz="933450">
             <a:lnSpc>
               <a:spcPct val="90000"/>
             </a:lnSpc>
@@ -4051,6 +3907,7 @@
             <a:spcAft>
               <a:spcPct val="35000"/>
             </a:spcAft>
+            <a:buNone/>
           </a:pPr>
           <a:endParaRPr lang="en-US" sz="2100" kern="1200"/>
         </a:p>
@@ -4116,7 +3973,7 @@
         </a:bodyPr>
         <a:lstStyle/>
         <a:p>
-          <a:pPr lvl="0" algn="ctr" defTabSz="2222500">
+          <a:pPr marL="0" lvl="0" indent="0" algn="ctr" defTabSz="2222500">
             <a:lnSpc>
               <a:spcPct val="90000"/>
             </a:lnSpc>
@@ -4126,6 +3983,7 @@
             <a:spcAft>
               <a:spcPct val="35000"/>
             </a:spcAft>
+            <a:buNone/>
           </a:pPr>
           <a:endParaRPr lang="en-US" sz="5000" kern="1200"/>
         </a:p>
@@ -4185,7 +4043,7 @@
         </a:bodyPr>
         <a:lstStyle/>
         <a:p>
-          <a:pPr lvl="0" algn="ctr" defTabSz="933450">
+          <a:pPr marL="0" lvl="0" indent="0" algn="ctr" defTabSz="933450">
             <a:lnSpc>
               <a:spcPct val="90000"/>
             </a:lnSpc>
@@ -4195,6 +4053,7 @@
             <a:spcAft>
               <a:spcPct val="35000"/>
             </a:spcAft>
+            <a:buNone/>
           </a:pPr>
           <a:endParaRPr lang="en-US" sz="2100" kern="1200"/>
         </a:p>
@@ -4260,7 +4119,7 @@
         </a:bodyPr>
         <a:lstStyle/>
         <a:p>
-          <a:pPr lvl="0" algn="ctr" defTabSz="2222500">
+          <a:pPr marL="0" lvl="0" indent="0" algn="ctr" defTabSz="2222500">
             <a:lnSpc>
               <a:spcPct val="90000"/>
             </a:lnSpc>
@@ -4270,6 +4129,7 @@
             <a:spcAft>
               <a:spcPct val="35000"/>
             </a:spcAft>
+            <a:buNone/>
           </a:pPr>
           <a:endParaRPr lang="en-US" sz="5000" kern="1200"/>
         </a:p>
@@ -7905,7 +7765,7 @@
           <a:p>
             <a:fld id="{146B6C00-59C7-4649-A05A-DC2738C2BE3E}" type="datetimeFigureOut">
               <a:rPr lang="en-US" smtClean="0"/>
-              <a:t>4/24/2017</a:t>
+              <a:t>4/25/2017</a:t>
             </a:fld>
             <a:endParaRPr lang="en-US"/>
           </a:p>
@@ -8063,7 +7923,7 @@
           <a:p>
             <a:fld id="{F2F879E2-5852-44F1-8CAE-5E978482BEF5}" type="slidenum">
               <a:rPr lang="en-US" smtClean="0"/>
-              <a:t>‹Nº›</a:t>
+              <a:t>‹#›</a:t>
             </a:fld>
             <a:endParaRPr lang="en-US"/>
           </a:p>
@@ -8795,7 +8655,7 @@
           <a:p>
             <a:fld id="{AC25CB34-BB08-4399-A2CA-3CAF79EA992F}" type="datetimeFigureOut">
               <a:rPr lang="en-US" smtClean="0"/>
-              <a:t>4/24/2017</a:t>
+              <a:t>4/25/2017</a:t>
             </a:fld>
             <a:endParaRPr lang="en-US"/>
           </a:p>
@@ -8863,7 +8723,7 @@
           <a:p>
             <a:fld id="{B5E014E3-A4EE-484A-A75D-BE16B10F8A2C}" type="slidenum">
               <a:rPr lang="en-US" smtClean="0"/>
-              <a:t>‹Nº›</a:t>
+              <a:t>‹#›</a:t>
             </a:fld>
             <a:endParaRPr lang="en-US"/>
           </a:p>
@@ -9125,7 +8985,7 @@
           <a:p>
             <a:fld id="{AC25CB34-BB08-4399-A2CA-3CAF79EA992F}" type="datetimeFigureOut">
               <a:rPr lang="en-US" smtClean="0"/>
-              <a:t>4/24/2017</a:t>
+              <a:t>4/25/2017</a:t>
             </a:fld>
             <a:endParaRPr lang="en-US"/>
           </a:p>
@@ -9167,7 +9027,7 @@
           <a:p>
             <a:fld id="{B5E014E3-A4EE-484A-A75D-BE16B10F8A2C}" type="slidenum">
               <a:rPr lang="en-US" smtClean="0"/>
-              <a:t>‹Nº›</a:t>
+              <a:t>‹#›</a:t>
             </a:fld>
             <a:endParaRPr lang="en-US"/>
           </a:p>
@@ -9305,7 +9165,7 @@
           <a:p>
             <a:fld id="{AC25CB34-BB08-4399-A2CA-3CAF79EA992F}" type="datetimeFigureOut">
               <a:rPr lang="en-US" smtClean="0"/>
-              <a:t>4/24/2017</a:t>
+              <a:t>4/25/2017</a:t>
             </a:fld>
             <a:endParaRPr lang="en-US"/>
           </a:p>
@@ -9347,7 +9207,7 @@
           <a:p>
             <a:fld id="{B5E014E3-A4EE-484A-A75D-BE16B10F8A2C}" type="slidenum">
               <a:rPr lang="en-US" smtClean="0"/>
-              <a:t>‹Nº›</a:t>
+              <a:t>‹#›</a:t>
             </a:fld>
             <a:endParaRPr lang="en-US"/>
           </a:p>
@@ -9475,7 +9335,7 @@
           <a:p>
             <a:fld id="{AC25CB34-BB08-4399-A2CA-3CAF79EA992F}" type="datetimeFigureOut">
               <a:rPr lang="en-US" smtClean="0"/>
-              <a:t>4/24/2017</a:t>
+              <a:t>4/25/2017</a:t>
             </a:fld>
             <a:endParaRPr lang="en-US"/>
           </a:p>
@@ -9517,7 +9377,7 @@
           <a:p>
             <a:fld id="{B5E014E3-A4EE-484A-A75D-BE16B10F8A2C}" type="slidenum">
               <a:rPr lang="en-US" smtClean="0"/>
-              <a:t>‹Nº›</a:t>
+              <a:t>‹#›</a:t>
             </a:fld>
             <a:endParaRPr lang="en-US"/>
           </a:p>
@@ -9752,7 +9612,7 @@
           <a:p>
             <a:fld id="{AC25CB34-BB08-4399-A2CA-3CAF79EA992F}" type="datetimeFigureOut">
               <a:rPr lang="en-US" smtClean="0"/>
-              <a:t>4/24/2017</a:t>
+              <a:t>4/25/2017</a:t>
             </a:fld>
             <a:endParaRPr lang="en-US"/>
           </a:p>
@@ -9820,7 +9680,7 @@
           <a:p>
             <a:fld id="{B5E014E3-A4EE-484A-A75D-BE16B10F8A2C}" type="slidenum">
               <a:rPr lang="en-US" smtClean="0"/>
-              <a:t>‹Nº›</a:t>
+              <a:t>‹#›</a:t>
             </a:fld>
             <a:endParaRPr lang="en-US"/>
           </a:p>
@@ -10202,7 +10062,7 @@
           <a:p>
             <a:fld id="{AC25CB34-BB08-4399-A2CA-3CAF79EA992F}" type="datetimeFigureOut">
               <a:rPr lang="en-US" smtClean="0"/>
-              <a:t>4/24/2017</a:t>
+              <a:t>4/25/2017</a:t>
             </a:fld>
             <a:endParaRPr lang="en-US"/>
           </a:p>
@@ -10244,7 +10104,7 @@
           <a:p>
             <a:fld id="{B5E014E3-A4EE-484A-A75D-BE16B10F8A2C}" type="slidenum">
               <a:rPr lang="en-US" smtClean="0"/>
-              <a:t>‹Nº›</a:t>
+              <a:t>‹#›</a:t>
             </a:fld>
             <a:endParaRPr lang="en-US"/>
           </a:p>
@@ -10679,7 +10539,7 @@
           <a:p>
             <a:fld id="{AC25CB34-BB08-4399-A2CA-3CAF79EA992F}" type="datetimeFigureOut">
               <a:rPr lang="en-US" smtClean="0"/>
-              <a:t>4/24/2017</a:t>
+              <a:t>4/25/2017</a:t>
             </a:fld>
             <a:endParaRPr lang="en-US"/>
           </a:p>
@@ -10721,7 +10581,7 @@
           <a:p>
             <a:fld id="{B5E014E3-A4EE-484A-A75D-BE16B10F8A2C}" type="slidenum">
               <a:rPr lang="en-US" smtClean="0"/>
-              <a:t>‹Nº›</a:t>
+              <a:t>‹#›</a:t>
             </a:fld>
             <a:endParaRPr lang="en-US"/>
           </a:p>
@@ -10797,7 +10657,7 @@
           <a:p>
             <a:fld id="{AC25CB34-BB08-4399-A2CA-3CAF79EA992F}" type="datetimeFigureOut">
               <a:rPr lang="en-US" smtClean="0"/>
-              <a:t>4/24/2017</a:t>
+              <a:t>4/25/2017</a:t>
             </a:fld>
             <a:endParaRPr lang="en-US"/>
           </a:p>
@@ -10839,7 +10699,7 @@
           <a:p>
             <a:fld id="{B5E014E3-A4EE-484A-A75D-BE16B10F8A2C}" type="slidenum">
               <a:rPr lang="en-US" smtClean="0"/>
-              <a:t>‹Nº›</a:t>
+              <a:t>‹#›</a:t>
             </a:fld>
             <a:endParaRPr lang="en-US"/>
           </a:p>
@@ -10892,7 +10752,7 @@
           <a:p>
             <a:fld id="{AC25CB34-BB08-4399-A2CA-3CAF79EA992F}" type="datetimeFigureOut">
               <a:rPr lang="en-US" smtClean="0"/>
-              <a:t>4/24/2017</a:t>
+              <a:t>4/25/2017</a:t>
             </a:fld>
             <a:endParaRPr lang="en-US"/>
           </a:p>
@@ -10934,7 +10794,7 @@
           <a:p>
             <a:fld id="{B5E014E3-A4EE-484A-A75D-BE16B10F8A2C}" type="slidenum">
               <a:rPr lang="en-US" smtClean="0"/>
-              <a:t>‹Nº›</a:t>
+              <a:t>‹#›</a:t>
             </a:fld>
             <a:endParaRPr lang="en-US"/>
           </a:p>
@@ -11240,7 +11100,7 @@
           <a:p>
             <a:fld id="{AC25CB34-BB08-4399-A2CA-3CAF79EA992F}" type="datetimeFigureOut">
               <a:rPr lang="en-US" smtClean="0"/>
-              <a:t>4/24/2017</a:t>
+              <a:t>4/25/2017</a:t>
             </a:fld>
             <a:endParaRPr lang="en-US"/>
           </a:p>
@@ -11308,7 +11168,7 @@
           <a:p>
             <a:fld id="{B5E014E3-A4EE-484A-A75D-BE16B10F8A2C}" type="slidenum">
               <a:rPr lang="en-US" smtClean="0"/>
-              <a:t>‹Nº›</a:t>
+              <a:t>‹#›</a:t>
             </a:fld>
             <a:endParaRPr lang="en-US"/>
           </a:p>
@@ -11668,7 +11528,7 @@
           <a:p>
             <a:fld id="{AC25CB34-BB08-4399-A2CA-3CAF79EA992F}" type="datetimeFigureOut">
               <a:rPr lang="en-US" smtClean="0"/>
-              <a:t>4/24/2017</a:t>
+              <a:t>4/25/2017</a:t>
             </a:fld>
             <a:endParaRPr lang="en-US"/>
           </a:p>
@@ -11736,7 +11596,7 @@
           <a:p>
             <a:fld id="{B5E014E3-A4EE-484A-A75D-BE16B10F8A2C}" type="slidenum">
               <a:rPr lang="en-US" smtClean="0"/>
-              <a:t>‹Nº›</a:t>
+              <a:t>‹#›</a:t>
             </a:fld>
             <a:endParaRPr lang="en-US"/>
           </a:p>
@@ -11984,7 +11844,7 @@
           <a:p>
             <a:fld id="{AC25CB34-BB08-4399-A2CA-3CAF79EA992F}" type="datetimeFigureOut">
               <a:rPr lang="en-US" smtClean="0"/>
-              <a:t>4/24/2017</a:t>
+              <a:t>4/25/2017</a:t>
             </a:fld>
             <a:endParaRPr lang="en-US"/>
           </a:p>
@@ -12058,7 +11918,7 @@
           <a:p>
             <a:fld id="{B5E014E3-A4EE-484A-A75D-BE16B10F8A2C}" type="slidenum">
               <a:rPr lang="en-US" smtClean="0"/>
-              <a:t>‹Nº›</a:t>
+              <a:t>‹#›</a:t>
             </a:fld>
             <a:endParaRPr lang="en-US"/>
           </a:p>
@@ -12579,10 +12439,6 @@
               <a:rPr lang="en-US" sz="4400" i="1" dirty="0"/>
               <a:t>(Asparagus officinalis)</a:t>
             </a:r>
-            <a:r>
-              <a:rPr lang="en-US" i="1" dirty="0"/>
-              <a:t/>
-            </a:r>
             <a:br>
               <a:rPr lang="en-US" i="1" dirty="0"/>
             </a:br>
@@ -12825,13 +12681,8 @@
           <a:p>
             <a:r>
               <a:rPr lang="en-US" dirty="0"/>
-              <a:t>Differential </a:t>
-            </a:r>
-            <a:r>
-              <a:rPr lang="en-US" dirty="0" smtClean="0"/>
-              <a:t>Expression Analysis</a:t>
-            </a:r>
-            <a:endParaRPr lang="en-US" dirty="0"/>
+              <a:t>Differential Expression Analysis</a:t>
+            </a:r>
           </a:p>
         </p:txBody>
       </p:sp>
@@ -13049,23 +12900,23 @@
           <a:lstStyle/>
           <a:p>
             <a:r>
-              <a:rPr lang="es-ES" dirty="0" err="1" smtClean="0"/>
+              <a:rPr lang="es-ES" dirty="0" err="1"/>
               <a:t>Transcriptome</a:t>
             </a:r>
             <a:r>
-              <a:rPr lang="es-ES" dirty="0" smtClean="0"/>
+              <a:rPr lang="es-ES" dirty="0"/>
               <a:t> </a:t>
             </a:r>
             <a:r>
-              <a:rPr lang="es-ES" dirty="0" err="1" smtClean="0"/>
+              <a:rPr lang="es-ES" dirty="0" err="1"/>
               <a:t>profiling</a:t>
             </a:r>
             <a:r>
-              <a:rPr lang="es-ES" dirty="0" smtClean="0"/>
+              <a:rPr lang="es-ES" dirty="0"/>
               <a:t>: </a:t>
             </a:r>
             <a:r>
-              <a:rPr lang="es-ES" dirty="0" err="1" smtClean="0"/>
+              <a:rPr lang="es-ES" dirty="0" err="1"/>
               <a:t>trimming</a:t>
             </a:r>
             <a:endParaRPr lang="en-US" dirty="0"/>
@@ -13115,15 +12966,7 @@
             </a:r>
             <a:r>
               <a:rPr lang="en-US" dirty="0"/>
-              <a:t> </a:t>
-            </a:r>
-            <a:r>
-              <a:rPr lang="en-US" dirty="0" smtClean="0"/>
-              <a:t>bud (SRR1642915</a:t>
-            </a:r>
-            <a:r>
-              <a:rPr lang="en-US" dirty="0"/>
-              <a:t>)</a:t>
+              <a:t> bud (SRR1642915)</a:t>
             </a:r>
           </a:p>
         </p:txBody>
@@ -13210,10 +13053,9 @@
           <a:lstStyle/>
           <a:p>
             <a:r>
-              <a:rPr lang="en-US" dirty="0" smtClean="0"/>
+              <a:rPr lang="en-US" dirty="0"/>
               <a:t>Removing adapters before align to a reference</a:t>
             </a:r>
-            <a:endParaRPr lang="en-US" dirty="0"/>
           </a:p>
         </p:txBody>
       </p:sp>
@@ -13404,23 +13246,23 @@
           <a:lstStyle/>
           <a:p>
             <a:r>
-              <a:rPr lang="es-ES" dirty="0" err="1" smtClean="0"/>
+              <a:rPr lang="es-ES" dirty="0" err="1"/>
               <a:t>Transcriptome</a:t>
             </a:r>
             <a:r>
-              <a:rPr lang="es-ES" dirty="0" smtClean="0"/>
+              <a:rPr lang="es-ES" dirty="0"/>
               <a:t> </a:t>
             </a:r>
             <a:r>
-              <a:rPr lang="es-ES" dirty="0" err="1" smtClean="0"/>
+              <a:rPr lang="es-ES" dirty="0" err="1"/>
               <a:t>profiling</a:t>
             </a:r>
             <a:r>
-              <a:rPr lang="es-ES" dirty="0" smtClean="0"/>
+              <a:rPr lang="es-ES" dirty="0"/>
               <a:t>: </a:t>
             </a:r>
             <a:r>
-              <a:rPr lang="es-ES" dirty="0" err="1" smtClean="0"/>
+              <a:rPr lang="es-ES" dirty="0" err="1"/>
               <a:t>Trimming</a:t>
             </a:r>
             <a:endParaRPr lang="en-US" dirty="0"/>
@@ -13507,27 +13349,27 @@
           <a:lstStyle/>
           <a:p>
             <a:r>
-              <a:rPr lang="es-ES" dirty="0" err="1" smtClean="0"/>
+              <a:rPr lang="es-ES" dirty="0" err="1"/>
               <a:t>Transcriptome</a:t>
             </a:r>
             <a:r>
-              <a:rPr lang="es-ES" dirty="0" smtClean="0"/>
+              <a:rPr lang="es-ES" dirty="0"/>
               <a:t> </a:t>
             </a:r>
             <a:r>
-              <a:rPr lang="es-ES" dirty="0" err="1" smtClean="0"/>
+              <a:rPr lang="es-ES" dirty="0" err="1"/>
               <a:t>profiling</a:t>
             </a:r>
             <a:r>
-              <a:rPr lang="es-ES" dirty="0" smtClean="0"/>
+              <a:rPr lang="es-ES" dirty="0"/>
               <a:t>: </a:t>
             </a:r>
             <a:r>
-              <a:rPr lang="es-ES" dirty="0" err="1" smtClean="0"/>
+              <a:rPr lang="es-ES" dirty="0" err="1"/>
               <a:t>counting</a:t>
             </a:r>
             <a:r>
-              <a:rPr lang="es-ES" dirty="0" smtClean="0"/>
+              <a:rPr lang="es-ES" dirty="0"/>
               <a:t> data</a:t>
             </a:r>
             <a:endParaRPr lang="en-US" dirty="0"/>
@@ -13604,6 +13446,527 @@
           <a:p>
             <a:r>
               <a:rPr lang="en-US" dirty="0"/>
+              <a:t>Results</a:t>
+            </a:r>
+          </a:p>
+        </p:txBody>
+      </p:sp>
+      <p:sp>
+        <p:nvSpPr>
+          <p:cNvPr id="3" name="Content Placeholder 2"/>
+          <p:cNvSpPr>
+            <a:spLocks noGrp="1"/>
+          </p:cNvSpPr>
+          <p:nvPr>
+            <p:ph idx="1"/>
+          </p:nvPr>
+        </p:nvSpPr>
+        <p:spPr>
+          <a:xfrm>
+            <a:off x="1028700" y="1562928"/>
+            <a:ext cx="7200900" cy="685800"/>
+          </a:xfrm>
+        </p:spPr>
+        <p:txBody>
+          <a:bodyPr/>
+          <a:lstStyle/>
+          <a:p>
+            <a:r>
+              <a:rPr lang="en-US" dirty="0"/>
+              <a:t>Figure 1: Multidimensional scaling (MDS) plot</a:t>
+            </a:r>
+            <a:endParaRPr lang="en-US" dirty="0"/>
+          </a:p>
+        </p:txBody>
+      </p:sp>
+      <p:pic>
+        <p:nvPicPr>
+          <p:cNvPr id="4" name="Picture 3"/>
+          <p:cNvPicPr>
+            <a:picLocks noChangeAspect="1"/>
+          </p:cNvPicPr>
+          <p:nvPr/>
+        </p:nvPicPr>
+        <p:blipFill>
+          <a:blip r:embed="rId2"/>
+          <a:stretch>
+            <a:fillRect/>
+          </a:stretch>
+        </p:blipFill>
+        <p:spPr>
+          <a:xfrm>
+            <a:off x="1028700" y="2141883"/>
+            <a:ext cx="3257550" cy="3638550"/>
+          </a:xfrm>
+          <a:prstGeom prst="rect">
+            <a:avLst/>
+          </a:prstGeom>
+        </p:spPr>
+      </p:pic>
+    </p:spTree>
+    <p:extLst>
+      <p:ext uri="{BB962C8B-B14F-4D97-AF65-F5344CB8AC3E}">
+        <p14:creationId xmlns:p14="http://schemas.microsoft.com/office/powerpoint/2010/main" val="417011282"/>
+      </p:ext>
+    </p:extLst>
+  </p:cSld>
+  <p:clrMapOvr>
+    <a:masterClrMapping/>
+  </p:clrMapOvr>
+</p:sld>
+</file>
+
+<file path=ppt/slides/slide16.xml><?xml version="1.0" encoding="utf-8"?>
+<p:sld xmlns:a="http://schemas.openxmlformats.org/drawingml/2006/main" xmlns:r="http://schemas.openxmlformats.org/officeDocument/2006/relationships" xmlns:p="http://schemas.openxmlformats.org/presentationml/2006/main">
+  <p:cSld>
+    <p:spTree>
+      <p:nvGrpSpPr>
+        <p:cNvPr id="1" name=""/>
+        <p:cNvGrpSpPr/>
+        <p:nvPr/>
+      </p:nvGrpSpPr>
+      <p:grpSpPr>
+        <a:xfrm>
+          <a:off x="0" y="0"/>
+          <a:ext cx="0" cy="0"/>
+          <a:chOff x="0" y="0"/>
+          <a:chExt cx="0" cy="0"/>
+        </a:xfrm>
+      </p:grpSpPr>
+      <p:sp>
+        <p:nvSpPr>
+          <p:cNvPr id="2" name="Title 1"/>
+          <p:cNvSpPr>
+            <a:spLocks noGrp="1"/>
+          </p:cNvSpPr>
+          <p:nvPr>
+            <p:ph type="title"/>
+          </p:nvPr>
+        </p:nvSpPr>
+        <p:spPr>
+          <a:xfrm>
+            <a:off x="1028700" y="685800"/>
+            <a:ext cx="7200900" cy="762000"/>
+          </a:xfrm>
+        </p:spPr>
+        <p:txBody>
+          <a:bodyPr/>
+          <a:lstStyle/>
+          <a:p>
+            <a:r>
+              <a:rPr lang="en-US" dirty="0"/>
+              <a:t>Results</a:t>
+            </a:r>
+          </a:p>
+        </p:txBody>
+      </p:sp>
+      <p:sp>
+        <p:nvSpPr>
+          <p:cNvPr id="3" name="Content Placeholder 2"/>
+          <p:cNvSpPr>
+            <a:spLocks noGrp="1"/>
+          </p:cNvSpPr>
+          <p:nvPr>
+            <p:ph idx="1"/>
+          </p:nvPr>
+        </p:nvSpPr>
+        <p:spPr>
+          <a:xfrm>
+            <a:off x="1028700" y="1447800"/>
+            <a:ext cx="7200900" cy="914400"/>
+          </a:xfrm>
+        </p:spPr>
+        <p:txBody>
+          <a:bodyPr>
+            <a:normAutofit lnSpcReduction="10000"/>
+          </a:bodyPr>
+          <a:lstStyle/>
+          <a:p>
+            <a:r>
+              <a:rPr lang="en-US" dirty="0"/>
+              <a:t>Figure 2: </a:t>
+            </a:r>
+            <a:r>
+              <a:rPr lang="en-US" dirty="0"/>
+              <a:t>Pairwise comparisons of gene expression among female, male and </a:t>
+            </a:r>
+            <a:r>
+              <a:rPr lang="en-US" dirty="0" err="1"/>
+              <a:t>supermale</a:t>
+            </a:r>
+            <a:r>
+              <a:rPr lang="en-US" dirty="0"/>
+              <a:t> garden asparagus (</a:t>
+            </a:r>
+            <a:r>
+              <a:rPr lang="en-US" i="1" dirty="0"/>
+              <a:t>Asparagus officinalis</a:t>
+            </a:r>
+            <a:r>
+              <a:rPr lang="en-US" dirty="0"/>
+              <a:t>) genes across line replicates</a:t>
+            </a:r>
+            <a:endParaRPr lang="en-US" dirty="0"/>
+          </a:p>
+        </p:txBody>
+      </p:sp>
+      <p:pic>
+        <p:nvPicPr>
+          <p:cNvPr id="4" name="Picture 3"/>
+          <p:cNvPicPr>
+            <a:picLocks noChangeAspect="1"/>
+          </p:cNvPicPr>
+          <p:nvPr/>
+        </p:nvPicPr>
+        <p:blipFill>
+          <a:blip r:embed="rId2"/>
+          <a:stretch>
+            <a:fillRect/>
+          </a:stretch>
+        </p:blipFill>
+        <p:spPr>
+          <a:xfrm>
+            <a:off x="1143000" y="2514600"/>
+            <a:ext cx="3276600" cy="1606826"/>
+          </a:xfrm>
+          <a:prstGeom prst="rect">
+            <a:avLst/>
+          </a:prstGeom>
+        </p:spPr>
+      </p:pic>
+    </p:spTree>
+    <p:extLst>
+      <p:ext uri="{BB962C8B-B14F-4D97-AF65-F5344CB8AC3E}">
+        <p14:creationId xmlns:p14="http://schemas.microsoft.com/office/powerpoint/2010/main" val="4229321659"/>
+      </p:ext>
+    </p:extLst>
+  </p:cSld>
+  <p:clrMapOvr>
+    <a:masterClrMapping/>
+  </p:clrMapOvr>
+</p:sld>
+</file>
+
+<file path=ppt/slides/slide17.xml><?xml version="1.0" encoding="utf-8"?>
+<p:sld xmlns:a="http://schemas.openxmlformats.org/drawingml/2006/main" xmlns:r="http://schemas.openxmlformats.org/officeDocument/2006/relationships" xmlns:p="http://schemas.openxmlformats.org/presentationml/2006/main">
+  <p:cSld>
+    <p:spTree>
+      <p:nvGrpSpPr>
+        <p:cNvPr id="1" name=""/>
+        <p:cNvGrpSpPr/>
+        <p:nvPr/>
+      </p:nvGrpSpPr>
+      <p:grpSpPr>
+        <a:xfrm>
+          <a:off x="0" y="0"/>
+          <a:ext cx="0" cy="0"/>
+          <a:chOff x="0" y="0"/>
+          <a:chExt cx="0" cy="0"/>
+        </a:xfrm>
+      </p:grpSpPr>
+      <p:sp>
+        <p:nvSpPr>
+          <p:cNvPr id="2" name="Title 1"/>
+          <p:cNvSpPr>
+            <a:spLocks noGrp="1"/>
+          </p:cNvSpPr>
+          <p:nvPr>
+            <p:ph type="title"/>
+          </p:nvPr>
+        </p:nvSpPr>
+        <p:spPr>
+          <a:xfrm>
+            <a:off x="1028700" y="685800"/>
+            <a:ext cx="7200900" cy="762000"/>
+          </a:xfrm>
+        </p:spPr>
+        <p:txBody>
+          <a:bodyPr/>
+          <a:lstStyle/>
+          <a:p>
+            <a:r>
+              <a:rPr lang="en-US" dirty="0"/>
+              <a:t>Results</a:t>
+            </a:r>
+          </a:p>
+        </p:txBody>
+      </p:sp>
+      <p:sp>
+        <p:nvSpPr>
+          <p:cNvPr id="4" name="Content Placeholder 3"/>
+          <p:cNvSpPr>
+            <a:spLocks noGrp="1"/>
+          </p:cNvSpPr>
+          <p:nvPr>
+            <p:ph idx="1"/>
+          </p:nvPr>
+        </p:nvSpPr>
+        <p:spPr>
+          <a:xfrm>
+            <a:off x="1028700" y="1480930"/>
+            <a:ext cx="7200900" cy="838200"/>
+          </a:xfrm>
+        </p:spPr>
+        <p:txBody>
+          <a:bodyPr>
+            <a:normAutofit fontScale="92500" lnSpcReduction="10000"/>
+          </a:bodyPr>
+          <a:lstStyle/>
+          <a:p>
+            <a:r>
+              <a:rPr lang="en-US" dirty="0"/>
+              <a:t>Figure 3: </a:t>
+            </a:r>
+            <a:r>
+              <a:rPr lang="en-US" dirty="0"/>
+              <a:t>Venn diagram showing the overlap of differentially expressed garden asparagus genes (</a:t>
+            </a:r>
+            <a:r>
+              <a:rPr lang="en-US" i="1" dirty="0"/>
+              <a:t>Asparagus officinalis</a:t>
+            </a:r>
+            <a:r>
+              <a:rPr lang="en-US" dirty="0"/>
+              <a:t>) between the three pairwise comparisons</a:t>
+            </a:r>
+            <a:endParaRPr lang="en-US" dirty="0"/>
+          </a:p>
+        </p:txBody>
+      </p:sp>
+      <p:pic>
+        <p:nvPicPr>
+          <p:cNvPr id="5" name="Picture 4"/>
+          <p:cNvPicPr>
+            <a:picLocks noChangeAspect="1"/>
+          </p:cNvPicPr>
+          <p:nvPr/>
+        </p:nvPicPr>
+        <p:blipFill>
+          <a:blip r:embed="rId2"/>
+          <a:stretch>
+            <a:fillRect/>
+          </a:stretch>
+        </p:blipFill>
+        <p:spPr>
+          <a:xfrm>
+            <a:off x="1295400" y="2319130"/>
+            <a:ext cx="1828800" cy="2407534"/>
+          </a:xfrm>
+          <a:prstGeom prst="rect">
+            <a:avLst/>
+          </a:prstGeom>
+        </p:spPr>
+      </p:pic>
+      <p:pic>
+        <p:nvPicPr>
+          <p:cNvPr id="6" name="Picture 5"/>
+          <p:cNvPicPr>
+            <a:picLocks noChangeAspect="1"/>
+          </p:cNvPicPr>
+          <p:nvPr/>
+        </p:nvPicPr>
+        <p:blipFill>
+          <a:blip r:embed="rId3"/>
+          <a:stretch>
+            <a:fillRect/>
+          </a:stretch>
+        </p:blipFill>
+        <p:spPr>
+          <a:xfrm>
+            <a:off x="3622813" y="3124200"/>
+            <a:ext cx="4606787" cy="3380952"/>
+          </a:xfrm>
+          <a:prstGeom prst="rect">
+            <a:avLst/>
+          </a:prstGeom>
+        </p:spPr>
+      </p:pic>
+    </p:spTree>
+    <p:extLst>
+      <p:ext uri="{BB962C8B-B14F-4D97-AF65-F5344CB8AC3E}">
+        <p14:creationId xmlns:p14="http://schemas.microsoft.com/office/powerpoint/2010/main" val="3252347790"/>
+      </p:ext>
+    </p:extLst>
+  </p:cSld>
+  <p:clrMapOvr>
+    <a:masterClrMapping/>
+  </p:clrMapOvr>
+</p:sld>
+</file>
+
+<file path=ppt/slides/slide18.xml><?xml version="1.0" encoding="utf-8"?>
+<p:sld xmlns:a="http://schemas.openxmlformats.org/drawingml/2006/main" xmlns:r="http://schemas.openxmlformats.org/officeDocument/2006/relationships" xmlns:p="http://schemas.openxmlformats.org/presentationml/2006/main">
+  <p:cSld>
+    <p:spTree>
+      <p:nvGrpSpPr>
+        <p:cNvPr id="1" name=""/>
+        <p:cNvGrpSpPr/>
+        <p:nvPr/>
+      </p:nvGrpSpPr>
+      <p:grpSpPr>
+        <a:xfrm>
+          <a:off x="0" y="0"/>
+          <a:ext cx="0" cy="0"/>
+          <a:chOff x="0" y="0"/>
+          <a:chExt cx="0" cy="0"/>
+        </a:xfrm>
+      </p:grpSpPr>
+      <p:sp>
+        <p:nvSpPr>
+          <p:cNvPr id="2" name="Title 1"/>
+          <p:cNvSpPr>
+            <a:spLocks noGrp="1"/>
+          </p:cNvSpPr>
+          <p:nvPr>
+            <p:ph type="title"/>
+          </p:nvPr>
+        </p:nvSpPr>
+        <p:spPr>
+          <a:xfrm>
+            <a:off x="1028700" y="685800"/>
+            <a:ext cx="7200900" cy="914400"/>
+          </a:xfrm>
+        </p:spPr>
+        <p:txBody>
+          <a:bodyPr/>
+          <a:lstStyle/>
+          <a:p>
+            <a:r>
+              <a:rPr lang="en-US" dirty="0"/>
+              <a:t>Results</a:t>
+            </a:r>
+          </a:p>
+        </p:txBody>
+      </p:sp>
+      <p:sp>
+        <p:nvSpPr>
+          <p:cNvPr id="4" name="AutoShape 2" descr="Figure 4"/>
+          <p:cNvSpPr>
+            <a:spLocks noGrp="1" noChangeAspect="1" noChangeArrowheads="1"/>
+          </p:cNvSpPr>
+          <p:nvPr>
+            <p:ph idx="1"/>
+          </p:nvPr>
+        </p:nvSpPr>
+        <p:spPr bwMode="auto">
+          <a:xfrm>
+            <a:off x="1025387" y="1447800"/>
+            <a:ext cx="7200900" cy="914400"/>
+          </a:xfrm>
+          <a:prstGeom prst="rect">
+            <a:avLst/>
+          </a:prstGeom>
+          <a:noFill/>
+          <a:extLst>
+            <a:ext uri="{909E8E84-426E-40DD-AFC4-6F175D3DCCD1}">
+              <a14:hiddenFill xmlns:a14="http://schemas.microsoft.com/office/drawing/2010/main">
+                <a:solidFill>
+                  <a:srgbClr val="FFFFFF"/>
+                </a:solidFill>
+              </a14:hiddenFill>
+            </a:ext>
+          </a:extLst>
+        </p:spPr>
+        <p:txBody>
+          <a:bodyPr vert="horz" wrap="square" lIns="91440" tIns="45720" rIns="91440" bIns="45720" numCol="1" anchor="t" anchorCtr="0" compatLnSpc="1">
+            <a:prstTxWarp prst="textNoShape">
+              <a:avLst/>
+            </a:prstTxWarp>
+            <a:normAutofit lnSpcReduction="10000"/>
+          </a:bodyPr>
+          <a:lstStyle/>
+          <a:p>
+            <a:r>
+              <a:rPr lang="en-US" dirty="0"/>
+              <a:t>Figure 4:</a:t>
+            </a:r>
+            <a:r>
+              <a:rPr lang="en-US" dirty="0"/>
+              <a:t>Heatmap clustering of the 570 differentially expressed garden asparagus (</a:t>
+            </a:r>
+            <a:r>
+              <a:rPr lang="en-US" i="1" dirty="0"/>
+              <a:t>Asparagus officinalis</a:t>
+            </a:r>
+            <a:r>
+              <a:rPr lang="en-US" dirty="0"/>
+              <a:t>) genes in all spear tip tissues</a:t>
+            </a:r>
+            <a:endParaRPr lang="en-US" dirty="0"/>
+          </a:p>
+        </p:txBody>
+      </p:sp>
+      <p:pic>
+        <p:nvPicPr>
+          <p:cNvPr id="5" name="Picture 4"/>
+          <p:cNvPicPr>
+            <a:picLocks noChangeAspect="1"/>
+          </p:cNvPicPr>
+          <p:nvPr/>
+        </p:nvPicPr>
+        <p:blipFill>
+          <a:blip r:embed="rId2"/>
+          <a:stretch>
+            <a:fillRect/>
+          </a:stretch>
+        </p:blipFill>
+        <p:spPr>
+          <a:xfrm>
+            <a:off x="1143000" y="2362200"/>
+            <a:ext cx="3257550" cy="2390775"/>
+          </a:xfrm>
+          <a:prstGeom prst="rect">
+            <a:avLst/>
+          </a:prstGeom>
+        </p:spPr>
+      </p:pic>
+    </p:spTree>
+    <p:extLst>
+      <p:ext uri="{BB962C8B-B14F-4D97-AF65-F5344CB8AC3E}">
+        <p14:creationId xmlns:p14="http://schemas.microsoft.com/office/powerpoint/2010/main" val="897698656"/>
+      </p:ext>
+    </p:extLst>
+  </p:cSld>
+  <p:clrMapOvr>
+    <a:masterClrMapping/>
+  </p:clrMapOvr>
+</p:sld>
+</file>
+
+<file path=ppt/slides/slide19.xml><?xml version="1.0" encoding="utf-8"?>
+<p:sld xmlns:a="http://schemas.openxmlformats.org/drawingml/2006/main" xmlns:r="http://schemas.openxmlformats.org/officeDocument/2006/relationships" xmlns:p="http://schemas.openxmlformats.org/presentationml/2006/main">
+  <p:cSld>
+    <p:spTree>
+      <p:nvGrpSpPr>
+        <p:cNvPr id="1" name=""/>
+        <p:cNvGrpSpPr/>
+        <p:nvPr/>
+      </p:nvGrpSpPr>
+      <p:grpSpPr>
+        <a:xfrm>
+          <a:off x="0" y="0"/>
+          <a:ext cx="0" cy="0"/>
+          <a:chOff x="0" y="0"/>
+          <a:chExt cx="0" cy="0"/>
+        </a:xfrm>
+      </p:grpSpPr>
+      <p:sp>
+        <p:nvSpPr>
+          <p:cNvPr id="2" name="Title 1"/>
+          <p:cNvSpPr>
+            <a:spLocks noGrp="1"/>
+          </p:cNvSpPr>
+          <p:nvPr>
+            <p:ph type="title"/>
+          </p:nvPr>
+        </p:nvSpPr>
+        <p:spPr/>
+        <p:txBody>
+          <a:bodyPr/>
+          <a:lstStyle/>
+          <a:p>
+            <a:r>
+              <a:rPr lang="en-US" dirty="0"/>
               <a:t>Bibliography</a:t>
             </a:r>
           </a:p>
@@ -13746,19 +14109,7 @@
           <a:p>
             <a:r>
               <a:rPr lang="en-US" dirty="0"/>
-              <a:t>Why </a:t>
-            </a:r>
-            <a:r>
-              <a:rPr lang="en-US" dirty="0" smtClean="0"/>
-              <a:t>studying</a:t>
-            </a:r>
-            <a:r>
-              <a:rPr lang="en-US" dirty="0" smtClean="0"/>
-              <a:t> </a:t>
-            </a:r>
-            <a:r>
-              <a:rPr lang="en-US" dirty="0"/>
-              <a:t>sex determination important?</a:t>
+              <a:t>Why studying sex determination important?</a:t>
             </a:r>
           </a:p>
         </p:txBody>
@@ -13778,114 +14129,114 @@
           <a:bodyPr/>
           <a:lstStyle/>
           <a:p>
-            <a:endParaRPr lang="es-ES" dirty="0" smtClean="0"/>
-          </a:p>
-          <a:p>
-            <a:r>
-              <a:rPr lang="es-ES" dirty="0" err="1" smtClean="0"/>
+            <a:endParaRPr lang="es-ES" dirty="0"/>
+          </a:p>
+          <a:p>
+            <a:r>
+              <a:rPr lang="es-ES" dirty="0" err="1"/>
               <a:t>Understand</a:t>
             </a:r>
             <a:r>
-              <a:rPr lang="es-ES" dirty="0" smtClean="0"/>
+              <a:rPr lang="es-ES" dirty="0"/>
               <a:t> </a:t>
             </a:r>
             <a:r>
-              <a:rPr lang="es-ES" dirty="0" err="1" smtClean="0"/>
+              <a:rPr lang="es-ES" dirty="0" err="1"/>
               <a:t>the</a:t>
             </a:r>
             <a:r>
-              <a:rPr lang="es-ES" dirty="0" smtClean="0"/>
+              <a:rPr lang="es-ES" dirty="0"/>
               <a:t> </a:t>
             </a:r>
             <a:r>
-              <a:rPr lang="es-ES" dirty="0" err="1" smtClean="0"/>
+              <a:rPr lang="es-ES" dirty="0" err="1"/>
               <a:t>evolutionary</a:t>
             </a:r>
             <a:r>
-              <a:rPr lang="es-ES" dirty="0" smtClean="0"/>
+              <a:rPr lang="es-ES" dirty="0"/>
               <a:t> </a:t>
             </a:r>
             <a:r>
-              <a:rPr lang="es-ES" dirty="0" err="1" smtClean="0"/>
+              <a:rPr lang="es-ES" dirty="0" err="1"/>
               <a:t>mechanisms</a:t>
             </a:r>
             <a:r>
-              <a:rPr lang="es-ES" dirty="0" smtClean="0"/>
+              <a:rPr lang="es-ES" dirty="0"/>
               <a:t> </a:t>
             </a:r>
             <a:r>
-              <a:rPr lang="es-ES" dirty="0" err="1" smtClean="0"/>
+              <a:rPr lang="es-ES" dirty="0" err="1"/>
               <a:t>that</a:t>
             </a:r>
             <a:r>
-              <a:rPr lang="es-ES" dirty="0" smtClean="0"/>
+              <a:rPr lang="es-ES" dirty="0"/>
               <a:t> </a:t>
             </a:r>
             <a:r>
-              <a:rPr lang="es-ES" dirty="0" err="1" smtClean="0"/>
+              <a:rPr lang="es-ES" dirty="0" err="1"/>
               <a:t>undelie</a:t>
             </a:r>
             <a:r>
-              <a:rPr lang="es-ES" dirty="0" smtClean="0"/>
+              <a:rPr lang="es-ES" dirty="0"/>
               <a:t> sexual </a:t>
             </a:r>
             <a:r>
-              <a:rPr lang="es-ES" dirty="0" err="1" smtClean="0"/>
+              <a:rPr lang="es-ES" dirty="0" err="1"/>
               <a:t>reproduction</a:t>
             </a:r>
             <a:r>
-              <a:rPr lang="es-ES" dirty="0" smtClean="0"/>
+              <a:rPr lang="es-ES" dirty="0"/>
               <a:t> as </a:t>
             </a:r>
             <a:r>
-              <a:rPr lang="es-ES" dirty="0" err="1" smtClean="0"/>
+              <a:rPr lang="es-ES" dirty="0" err="1"/>
               <a:t>source</a:t>
             </a:r>
             <a:r>
-              <a:rPr lang="es-ES" dirty="0" smtClean="0"/>
+              <a:rPr lang="es-ES" dirty="0"/>
               <a:t> of </a:t>
             </a:r>
             <a:r>
-              <a:rPr lang="es-ES" dirty="0" err="1" smtClean="0"/>
+              <a:rPr lang="es-ES" dirty="0" err="1"/>
               <a:t>genetic</a:t>
             </a:r>
             <a:r>
-              <a:rPr lang="es-ES" dirty="0" smtClean="0"/>
+              <a:rPr lang="es-ES" dirty="0"/>
               <a:t> </a:t>
             </a:r>
             <a:r>
-              <a:rPr lang="es-ES" dirty="0" err="1" smtClean="0"/>
+              <a:rPr lang="es-ES" dirty="0" err="1"/>
               <a:t>diversity</a:t>
             </a:r>
-            <a:endParaRPr lang="es-ES" dirty="0" smtClean="0"/>
-          </a:p>
-          <a:p>
-            <a:r>
-              <a:rPr lang="es-ES" dirty="0" err="1" smtClean="0"/>
+            <a:endParaRPr lang="es-ES" dirty="0"/>
+          </a:p>
+          <a:p>
+            <a:r>
+              <a:rPr lang="es-ES" dirty="0" err="1"/>
               <a:t>Contrary</a:t>
             </a:r>
             <a:r>
-              <a:rPr lang="es-ES" dirty="0" smtClean="0"/>
+              <a:rPr lang="es-ES" dirty="0"/>
               <a:t> </a:t>
             </a:r>
             <a:r>
-              <a:rPr lang="es-ES" dirty="0" err="1" smtClean="0"/>
+              <a:rPr lang="es-ES" dirty="0" err="1"/>
               <a:t>to</a:t>
             </a:r>
             <a:r>
-              <a:rPr lang="es-ES" dirty="0" smtClean="0"/>
+              <a:rPr lang="es-ES" dirty="0"/>
               <a:t> </a:t>
             </a:r>
             <a:r>
-              <a:rPr lang="es-ES" dirty="0" err="1" smtClean="0"/>
+              <a:rPr lang="es-ES" dirty="0" err="1"/>
               <a:t>most</a:t>
             </a:r>
             <a:r>
-              <a:rPr lang="es-ES" dirty="0" smtClean="0"/>
+              <a:rPr lang="es-ES" dirty="0"/>
               <a:t> of </a:t>
             </a:r>
             <a:r>
-              <a:rPr lang="es-ES" dirty="0" err="1" smtClean="0"/>
+              <a:rPr lang="es-ES" dirty="0" err="1"/>
               <a:t>animals</a:t>
             </a:r>
             <a:r>
@@ -13901,106 +14252,106 @@
               <a:t> </a:t>
             </a:r>
             <a:r>
-              <a:rPr lang="es-ES" dirty="0" err="1" smtClean="0"/>
+              <a:rPr lang="es-ES" dirty="0" err="1"/>
               <a:t>plants</a:t>
             </a:r>
             <a:r>
-              <a:rPr lang="es-ES" dirty="0" smtClean="0"/>
+              <a:rPr lang="es-ES" dirty="0"/>
               <a:t> are quite </a:t>
             </a:r>
             <a:r>
-              <a:rPr lang="es-ES" dirty="0" err="1" smtClean="0"/>
+              <a:rPr lang="es-ES" dirty="0" err="1"/>
               <a:t>rare</a:t>
             </a:r>
-            <a:endParaRPr lang="es-ES" dirty="0" smtClean="0"/>
-          </a:p>
-          <a:p>
-            <a:r>
-              <a:rPr lang="es-ES" dirty="0" err="1" smtClean="0"/>
+            <a:endParaRPr lang="es-ES" dirty="0"/>
+          </a:p>
+          <a:p>
+            <a:r>
+              <a:rPr lang="es-ES" dirty="0" err="1"/>
               <a:t>Improve</a:t>
             </a:r>
             <a:r>
-              <a:rPr lang="es-ES" dirty="0" smtClean="0"/>
+              <a:rPr lang="es-ES" dirty="0"/>
               <a:t> </a:t>
             </a:r>
             <a:r>
-              <a:rPr lang="es-ES" dirty="0" err="1" smtClean="0"/>
+              <a:rPr lang="es-ES" dirty="0" err="1"/>
               <a:t>our</a:t>
             </a:r>
             <a:r>
-              <a:rPr lang="es-ES" dirty="0" smtClean="0"/>
+              <a:rPr lang="es-ES" dirty="0"/>
               <a:t> </a:t>
             </a:r>
             <a:r>
-              <a:rPr lang="es-ES" dirty="0" err="1" smtClean="0"/>
+              <a:rPr lang="es-ES" dirty="0" err="1"/>
               <a:t>understanding</a:t>
             </a:r>
             <a:r>
-              <a:rPr lang="es-ES" dirty="0" smtClean="0"/>
+              <a:rPr lang="es-ES" dirty="0"/>
               <a:t> of </a:t>
             </a:r>
             <a:r>
-              <a:rPr lang="es-ES" dirty="0" err="1" smtClean="0"/>
+              <a:rPr lang="es-ES" dirty="0" err="1"/>
               <a:t>the</a:t>
             </a:r>
             <a:r>
-              <a:rPr lang="es-ES" dirty="0" smtClean="0"/>
+              <a:rPr lang="es-ES" dirty="0"/>
               <a:t> molecular </a:t>
             </a:r>
             <a:r>
-              <a:rPr lang="es-ES" dirty="0" err="1" smtClean="0"/>
+              <a:rPr lang="es-ES" dirty="0" err="1"/>
               <a:t>events</a:t>
             </a:r>
             <a:r>
-              <a:rPr lang="es-ES" dirty="0" smtClean="0"/>
+              <a:rPr lang="es-ES" dirty="0"/>
               <a:t> </a:t>
             </a:r>
             <a:r>
-              <a:rPr lang="es-ES" dirty="0" err="1" smtClean="0"/>
+              <a:rPr lang="es-ES" dirty="0" err="1"/>
               <a:t>that</a:t>
             </a:r>
             <a:r>
-              <a:rPr lang="es-ES" dirty="0" smtClean="0"/>
+              <a:rPr lang="es-ES" dirty="0"/>
               <a:t> </a:t>
             </a:r>
             <a:r>
-              <a:rPr lang="es-ES" dirty="0" err="1" smtClean="0"/>
+              <a:rPr lang="es-ES" dirty="0" err="1"/>
               <a:t>give</a:t>
             </a:r>
             <a:r>
-              <a:rPr lang="es-ES" dirty="0" smtClean="0"/>
+              <a:rPr lang="es-ES" dirty="0"/>
               <a:t> </a:t>
             </a:r>
             <a:r>
-              <a:rPr lang="es-ES" dirty="0" err="1" smtClean="0"/>
+              <a:rPr lang="es-ES" dirty="0" err="1"/>
               <a:t>rise</a:t>
             </a:r>
             <a:r>
-              <a:rPr lang="es-ES" dirty="0" smtClean="0"/>
+              <a:rPr lang="es-ES" dirty="0"/>
               <a:t> </a:t>
             </a:r>
             <a:r>
-              <a:rPr lang="es-ES" dirty="0" err="1" smtClean="0"/>
+              <a:rPr lang="es-ES" dirty="0" err="1"/>
               <a:t>to</a:t>
             </a:r>
             <a:r>
-              <a:rPr lang="es-ES" dirty="0" smtClean="0"/>
+              <a:rPr lang="es-ES" dirty="0"/>
               <a:t> </a:t>
             </a:r>
             <a:r>
-              <a:rPr lang="es-ES" dirty="0" err="1" smtClean="0"/>
+              <a:rPr lang="es-ES" dirty="0" err="1"/>
               <a:t>the</a:t>
             </a:r>
             <a:r>
-              <a:rPr lang="es-ES" dirty="0" smtClean="0"/>
+              <a:rPr lang="es-ES" dirty="0"/>
               <a:t> sexual </a:t>
             </a:r>
             <a:r>
-              <a:rPr lang="es-ES" dirty="0" err="1" smtClean="0"/>
+              <a:rPr lang="es-ES" dirty="0" err="1"/>
               <a:t>differentiation</a:t>
             </a:r>
             <a:r>
-              <a:rPr lang="es-ES" dirty="0" smtClean="0"/>
+              <a:rPr lang="es-ES" dirty="0"/>
               <a:t> </a:t>
             </a:r>
             <a:endParaRPr lang="en-US" dirty="0"/>
@@ -14633,46 +14984,42 @@
             <a:pPr lvl="2"/>
             <a:r>
               <a:rPr lang="en-US" dirty="0"/>
-              <a:t>Determine when genes </a:t>
-            </a:r>
-            <a:r>
-              <a:rPr lang="en-US" dirty="0" smtClean="0"/>
-              <a:t>act</a:t>
+              <a:t>Determine when genes act</a:t>
             </a:r>
             <a:endParaRPr lang="es-ES" dirty="0"/>
           </a:p>
           <a:p>
             <a:pPr lvl="2"/>
             <a:r>
-              <a:rPr lang="es-ES" dirty="0" smtClean="0"/>
+              <a:rPr lang="es-ES" dirty="0"/>
               <a:t>Describe experimental </a:t>
             </a:r>
             <a:r>
-              <a:rPr lang="es-ES" dirty="0" err="1" smtClean="0"/>
+              <a:rPr lang="es-ES" dirty="0" err="1"/>
               <a:t>design</a:t>
             </a:r>
             <a:r>
-              <a:rPr lang="es-ES" dirty="0" smtClean="0"/>
+              <a:rPr lang="es-ES" dirty="0"/>
               <a:t> and </a:t>
             </a:r>
             <a:r>
-              <a:rPr lang="es-ES" dirty="0" err="1" smtClean="0"/>
+              <a:rPr lang="es-ES" dirty="0" err="1"/>
               <a:t>procedure</a:t>
             </a:r>
             <a:r>
-              <a:rPr lang="es-ES" dirty="0" smtClean="0"/>
+              <a:rPr lang="es-ES" dirty="0"/>
               <a:t>: </a:t>
             </a:r>
             <a:r>
-              <a:rPr lang="es-ES" dirty="0" err="1" smtClean="0"/>
+              <a:rPr lang="es-ES" dirty="0" err="1"/>
               <a:t>samples</a:t>
             </a:r>
             <a:r>
-              <a:rPr lang="es-ES" dirty="0" smtClean="0"/>
+              <a:rPr lang="es-ES" dirty="0"/>
               <a:t>, </a:t>
             </a:r>
             <a:r>
-              <a:rPr lang="es-ES" dirty="0" err="1" smtClean="0"/>
+              <a:rPr lang="es-ES" dirty="0" err="1"/>
               <a:t>etc</a:t>
             </a:r>
             <a:endParaRPr lang="en-US" dirty="0"/>
@@ -14840,16 +15187,12 @@
           <a:lstStyle/>
           <a:p>
             <a:r>
-              <a:rPr lang="en-US" dirty="0" err="1" smtClean="0"/>
+              <a:rPr lang="en-US" dirty="0" err="1"/>
               <a:t>Transcriptome</a:t>
             </a:r>
             <a:r>
-              <a:rPr lang="en-US" dirty="0" smtClean="0"/>
-              <a:t> </a:t>
-            </a:r>
-            <a:r>
               <a:rPr lang="en-US" dirty="0"/>
-              <a:t>Profiling</a:t>
+              <a:t> Profiling</a:t>
             </a:r>
           </a:p>
         </p:txBody>
@@ -14915,30 +15258,30 @@
           <a:lstStyle/>
           <a:p>
             <a:r>
-              <a:rPr lang="es-ES" sz="1400" dirty="0" err="1" smtClean="0"/>
+              <a:rPr lang="es-ES" sz="1400" dirty="0" err="1"/>
               <a:t>raw</a:t>
             </a:r>
             <a:r>
-              <a:rPr lang="es-ES" sz="1400" dirty="0" smtClean="0"/>
+              <a:rPr lang="es-ES" sz="1400" dirty="0"/>
               <a:t> </a:t>
             </a:r>
             <a:r>
-              <a:rPr lang="es-ES" sz="1400" dirty="0" err="1" smtClean="0"/>
+              <a:rPr lang="es-ES" sz="1400" dirty="0" err="1"/>
               <a:t>reads</a:t>
             </a:r>
-            <a:endParaRPr lang="es-ES" sz="1400" dirty="0" smtClean="0"/>
-          </a:p>
-          <a:p>
-            <a:r>
-              <a:rPr lang="es-ES" sz="1400" dirty="0" err="1" smtClean="0"/>
+            <a:endParaRPr lang="es-ES" sz="1400" dirty="0"/>
+          </a:p>
+          <a:p>
+            <a:r>
+              <a:rPr lang="es-ES" sz="1400" dirty="0" err="1"/>
               <a:t>Source</a:t>
             </a:r>
             <a:r>
-              <a:rPr lang="es-ES" sz="1400" dirty="0" smtClean="0"/>
+              <a:rPr lang="es-ES" sz="1400" dirty="0"/>
               <a:t>: </a:t>
             </a:r>
             <a:r>
-              <a:rPr lang="es-ES" sz="1400" dirty="0" err="1" smtClean="0"/>
+              <a:rPr lang="es-ES" sz="1400" dirty="0" err="1"/>
               <a:t>ncbi</a:t>
             </a:r>
             <a:endParaRPr lang="en-US" sz="1400" dirty="0"/>
@@ -14981,7 +15324,7 @@
           <a:lstStyle/>
           <a:p>
             <a:r>
-              <a:rPr lang="es-ES" sz="1400" dirty="0" smtClean="0"/>
+              <a:rPr lang="es-ES" sz="1400" dirty="0"/>
               <a:t>FASTQC</a:t>
             </a:r>
             <a:endParaRPr lang="en-US" sz="1400" dirty="0"/>
@@ -15090,41 +15433,37 @@
           <a:lstStyle/>
           <a:p>
             <a:r>
-              <a:rPr lang="es-ES" sz="1400" dirty="0" err="1" smtClean="0"/>
+              <a:rPr lang="es-ES" sz="1400" dirty="0" err="1"/>
               <a:t>raw</a:t>
-            </a:r>
-            <a:r>
-              <a:rPr lang="es-ES" sz="1400" dirty="0" smtClean="0"/>
-              <a:t> </a:t>
-            </a:r>
-            <a:r>
-              <a:rPr lang="es-ES" sz="1400" dirty="0" err="1" smtClean="0"/>
-              <a:t>reads</a:t>
             </a:r>
             <a:r>
               <a:rPr lang="es-ES" sz="1400" dirty="0"/>
               <a:t> </a:t>
             </a:r>
             <a:r>
-              <a:rPr lang="es-ES" sz="1400" dirty="0" err="1" smtClean="0"/>
+              <a:rPr lang="es-ES" sz="1400" dirty="0" err="1"/>
+              <a:t>reads</a:t>
+            </a:r>
+            <a:r>
+              <a:rPr lang="es-ES" sz="1400" dirty="0"/>
+              <a:t> </a:t>
+            </a:r>
+            <a:r>
+              <a:rPr lang="es-ES" sz="1400" dirty="0" err="1"/>
               <a:t>Based</a:t>
             </a:r>
             <a:r>
-              <a:rPr lang="es-ES" sz="1400" dirty="0" smtClean="0"/>
+              <a:rPr lang="es-ES" sz="1400" dirty="0"/>
               <a:t> </a:t>
             </a:r>
           </a:p>
           <a:p>
             <a:r>
               <a:rPr lang="es-ES" sz="1400" dirty="0" err="1"/>
-              <a:t>o</a:t>
-            </a:r>
-            <a:r>
-              <a:rPr lang="es-ES" sz="1400" dirty="0" err="1" smtClean="0"/>
-              <a:t>n</a:t>
-            </a:r>
-            <a:r>
-              <a:rPr lang="es-ES" sz="1400" dirty="0" smtClean="0"/>
+              <a:t>on</a:t>
+            </a:r>
+            <a:r>
+              <a:rPr lang="es-ES" sz="1400" dirty="0"/>
               <a:t> FASTQC</a:t>
             </a:r>
             <a:endParaRPr lang="en-US" sz="1400" dirty="0"/>
@@ -15167,7 +15506,7 @@
           <a:lstStyle/>
           <a:p>
             <a:r>
-              <a:rPr lang="es-ES" sz="1400" dirty="0" err="1" smtClean="0"/>
+              <a:rPr lang="es-ES" sz="1400" dirty="0" err="1"/>
               <a:t>cutadapt</a:t>
             </a:r>
             <a:endParaRPr lang="en-US" sz="1400" dirty="0"/>
@@ -15243,7 +15582,7 @@
           <a:lstStyle/>
           <a:p>
             <a:r>
-              <a:rPr lang="es-ES" dirty="0" smtClean="0"/>
+              <a:rPr lang="es-ES" dirty="0"/>
               <a:t>Software</a:t>
             </a:r>
             <a:endParaRPr lang="en-US" dirty="0"/>
@@ -15286,7 +15625,7 @@
           <a:lstStyle/>
           <a:p>
             <a:r>
-              <a:rPr lang="es-ES" dirty="0" smtClean="0"/>
+              <a:rPr lang="es-ES" dirty="0"/>
               <a:t>Input</a:t>
             </a:r>
             <a:endParaRPr lang="en-US" dirty="0"/>
@@ -15362,26 +15701,26 @@
           <a:lstStyle/>
           <a:p>
             <a:r>
-              <a:rPr lang="es-ES" sz="1400" dirty="0" err="1" smtClean="0"/>
+              <a:rPr lang="es-ES" sz="1400" dirty="0" err="1"/>
               <a:t>Trimmed</a:t>
             </a:r>
             <a:r>
-              <a:rPr lang="es-ES" sz="1400" dirty="0" smtClean="0"/>
+              <a:rPr lang="es-ES" sz="1400" dirty="0"/>
               <a:t> </a:t>
             </a:r>
             <a:r>
-              <a:rPr lang="es-ES" sz="1400" dirty="0" err="1" smtClean="0"/>
+              <a:rPr lang="es-ES" sz="1400" dirty="0" err="1"/>
               <a:t>reads</a:t>
             </a:r>
-            <a:endParaRPr lang="es-ES" sz="1400" dirty="0" smtClean="0"/>
-          </a:p>
-          <a:p>
-            <a:r>
-              <a:rPr lang="es-ES" sz="1400" dirty="0" err="1" smtClean="0"/>
+            <a:endParaRPr lang="es-ES" sz="1400" dirty="0"/>
+          </a:p>
+          <a:p>
+            <a:r>
+              <a:rPr lang="es-ES" sz="1400" dirty="0" err="1"/>
               <a:t>Transcriptome</a:t>
             </a:r>
             <a:r>
-              <a:rPr lang="es-ES" sz="1400" dirty="0" smtClean="0"/>
+              <a:rPr lang="es-ES" sz="1400" dirty="0"/>
               <a:t> file</a:t>
             </a:r>
             <a:endParaRPr lang="en-US" sz="1400" dirty="0"/>
@@ -15424,11 +15763,11 @@
           <a:lstStyle/>
           <a:p>
             <a:r>
-              <a:rPr lang="es-ES" sz="1400" dirty="0" smtClean="0"/>
+              <a:rPr lang="es-ES" sz="1400" dirty="0"/>
               <a:t>RSEM, </a:t>
             </a:r>
             <a:r>
-              <a:rPr lang="es-ES" sz="1400" dirty="0" err="1" smtClean="0"/>
+              <a:rPr lang="es-ES" sz="1400" dirty="0" err="1"/>
               <a:t>bowtie</a:t>
             </a:r>
             <a:endParaRPr lang="en-US" sz="1400" dirty="0"/>
@@ -15504,7 +15843,7 @@
           <a:lstStyle/>
           <a:p>
             <a:r>
-              <a:rPr lang="es-ES" sz="1400" dirty="0" smtClean="0"/>
+              <a:rPr lang="es-ES" sz="1400" dirty="0"/>
               <a:t>RSEM</a:t>
             </a:r>
             <a:endParaRPr lang="en-US" sz="1400" dirty="0"/>
@@ -15613,30 +15952,30 @@
           <a:lstStyle/>
           <a:p>
             <a:r>
-              <a:rPr lang="es-ES" sz="1400" dirty="0" err="1" smtClean="0"/>
+              <a:rPr lang="es-ES" sz="1400" dirty="0" err="1"/>
               <a:t>Trimmed</a:t>
             </a:r>
             <a:r>
-              <a:rPr lang="es-ES" sz="1400" dirty="0" smtClean="0"/>
+              <a:rPr lang="es-ES" sz="1400" dirty="0"/>
               <a:t> </a:t>
             </a:r>
             <a:r>
-              <a:rPr lang="es-ES" sz="1400" dirty="0" err="1" smtClean="0"/>
+              <a:rPr lang="es-ES" sz="1400" dirty="0" err="1"/>
               <a:t>reads</a:t>
             </a:r>
-            <a:endParaRPr lang="es-ES" sz="1400" dirty="0" smtClean="0"/>
-          </a:p>
-          <a:p>
-            <a:r>
-              <a:rPr lang="es-ES" sz="1400" dirty="0" err="1" smtClean="0"/>
+            <a:endParaRPr lang="es-ES" sz="1400" dirty="0"/>
+          </a:p>
+          <a:p>
+            <a:r>
+              <a:rPr lang="es-ES" sz="1400" dirty="0" err="1"/>
               <a:t>Transcriptome</a:t>
             </a:r>
             <a:r>
-              <a:rPr lang="es-ES" sz="1400" dirty="0" smtClean="0"/>
+              <a:rPr lang="es-ES" sz="1400" dirty="0"/>
               <a:t> </a:t>
             </a:r>
             <a:r>
-              <a:rPr lang="es-ES" sz="1400" dirty="0" err="1" smtClean="0"/>
+              <a:rPr lang="es-ES" sz="1400" dirty="0" err="1"/>
               <a:t>references</a:t>
             </a:r>
             <a:endParaRPr lang="en-US" sz="1400" dirty="0"/>

</xml_diff>

<commit_message>
update powerpoint and add README for figures 1,2,& 3 DM
</commit_message>
<xml_diff>
--- a/asparagus.pptx
+++ b/asparagus.pptx
@@ -2789,17 +2789,20 @@
 <dgm:dataModel xmlns:dgm="http://schemas.openxmlformats.org/drawingml/2006/diagram" xmlns:a="http://schemas.openxmlformats.org/drawingml/2006/main">
   <dgm:ptLst>
     <dgm:pt modelId="{00957F53-1F0D-445C-BFD5-C49B852980A0}" type="doc">
-      <dgm:prSet loTypeId="urn:microsoft.com/office/officeart/2005/8/layout/process1" loCatId="process" qsTypeId="urn:microsoft.com/office/officeart/2005/8/quickstyle/simple1" qsCatId="simple" csTypeId="urn:microsoft.com/office/officeart/2005/8/colors/accent1_2" csCatId="accent1" phldr="0"/>
+      <dgm:prSet loTypeId="urn:microsoft.com/office/officeart/2005/8/layout/process1" loCatId="process" qsTypeId="urn:microsoft.com/office/officeart/2005/8/quickstyle/simple1" qsCatId="simple" csTypeId="urn:microsoft.com/office/officeart/2005/8/colors/accent1_2" csCatId="accent1" phldr="1"/>
       <dgm:spPr/>
     </dgm:pt>
     <dgm:pt modelId="{84936F8B-A588-4A51-BF05-6584529BCEF1}">
-      <dgm:prSet phldrT="[Text]" phldr="1"/>
+      <dgm:prSet phldrT="[Text]"/>
       <dgm:spPr/>
       <dgm:t>
         <a:bodyPr/>
         <a:lstStyle/>
         <a:p>
-          <a:endParaRPr lang="en-US" dirty="0"/>
+          <a:r>
+            <a:rPr lang="en-US" dirty="0"/>
+            <a:t>Read counts</a:t>
+          </a:r>
         </a:p>
       </dgm:t>
     </dgm:pt>
@@ -2826,13 +2829,16 @@
       </dgm:t>
     </dgm:pt>
     <dgm:pt modelId="{8B4163E0-D9A4-4F25-8F85-638ACD032F1C}">
-      <dgm:prSet phldrT="[Text]" phldr="1"/>
+      <dgm:prSet phldrT="[Text]"/>
       <dgm:spPr/>
       <dgm:t>
         <a:bodyPr/>
         <a:lstStyle/>
         <a:p>
-          <a:endParaRPr lang="en-US"/>
+          <a:r>
+            <a:rPr lang="en-US" dirty="0"/>
+            <a:t>Normalize</a:t>
+          </a:r>
         </a:p>
       </dgm:t>
     </dgm:pt>
@@ -2859,13 +2865,16 @@
       </dgm:t>
     </dgm:pt>
     <dgm:pt modelId="{15C71DBD-6CA2-4C8D-B38F-1E72A180A62A}">
-      <dgm:prSet phldrT="[Text]" phldr="1"/>
+      <dgm:prSet phldrT="[Text]"/>
       <dgm:spPr/>
       <dgm:t>
         <a:bodyPr/>
         <a:lstStyle/>
         <a:p>
-          <a:endParaRPr lang="en-US"/>
+          <a:r>
+            <a:rPr lang="en-US" dirty="0"/>
+            <a:t>Design Matrix</a:t>
+          </a:r>
         </a:p>
       </dgm:t>
     </dgm:pt>
@@ -2891,6 +2900,115 @@
         </a:p>
       </dgm:t>
     </dgm:pt>
+    <dgm:pt modelId="{46A20A1E-9DD2-4B51-AC9C-8BA4572A6EAF}">
+      <dgm:prSet phldrT="[Text]"/>
+      <dgm:spPr/>
+      <dgm:t>
+        <a:bodyPr/>
+        <a:lstStyle/>
+        <a:p>
+          <a:r>
+            <a:rPr lang="en-US" dirty="0"/>
+            <a:t>Pairwise Comparison</a:t>
+          </a:r>
+        </a:p>
+      </dgm:t>
+    </dgm:pt>
+    <dgm:pt modelId="{FCB8C52C-1285-4859-BAB9-8DD4BCFC3357}" type="parTrans" cxnId="{4A77F5B4-A0AC-4B49-9E1F-8C8758B26524}">
+      <dgm:prSet/>
+      <dgm:spPr/>
+      <dgm:t>
+        <a:bodyPr/>
+        <a:lstStyle/>
+        <a:p>
+          <a:endParaRPr lang="en-US"/>
+        </a:p>
+      </dgm:t>
+    </dgm:pt>
+    <dgm:pt modelId="{2F466CDD-ABE3-4712-972F-3B29981A71DD}" type="sibTrans" cxnId="{4A77F5B4-A0AC-4B49-9E1F-8C8758B26524}">
+      <dgm:prSet/>
+      <dgm:spPr/>
+      <dgm:t>
+        <a:bodyPr/>
+        <a:lstStyle/>
+        <a:p>
+          <a:endParaRPr lang="en-US"/>
+        </a:p>
+      </dgm:t>
+    </dgm:pt>
+    <dgm:pt modelId="{B84591AB-9519-4304-996F-916744568229}">
+      <dgm:prSet phldrT="[Text]"/>
+      <dgm:spPr/>
+      <dgm:t>
+        <a:bodyPr/>
+        <a:lstStyle/>
+        <a:p>
+          <a:r>
+            <a:rPr lang="en-US"/>
+            <a:t>Filter</a:t>
+          </a:r>
+          <a:endParaRPr lang="en-US" dirty="0"/>
+        </a:p>
+      </dgm:t>
+    </dgm:pt>
+    <dgm:pt modelId="{1768651F-22AC-4F2C-B9E8-ABC408F7BC05}" type="parTrans" cxnId="{27F32EF1-5F23-46E2-A487-A37D10FF26E9}">
+      <dgm:prSet/>
+      <dgm:spPr/>
+      <dgm:t>
+        <a:bodyPr/>
+        <a:lstStyle/>
+        <a:p>
+          <a:endParaRPr lang="en-US"/>
+        </a:p>
+      </dgm:t>
+    </dgm:pt>
+    <dgm:pt modelId="{38F2AFBE-E679-4017-8CC6-CF72B0C3049D}" type="sibTrans" cxnId="{27F32EF1-5F23-46E2-A487-A37D10FF26E9}">
+      <dgm:prSet/>
+      <dgm:spPr/>
+      <dgm:t>
+        <a:bodyPr/>
+        <a:lstStyle/>
+        <a:p>
+          <a:endParaRPr lang="en-US"/>
+        </a:p>
+      </dgm:t>
+    </dgm:pt>
+    <dgm:pt modelId="{2DC8DA49-2BC0-4150-B267-15B8B7B9F7CB}">
+      <dgm:prSet phldrT="[Text]"/>
+      <dgm:spPr/>
+      <dgm:t>
+        <a:bodyPr/>
+        <a:lstStyle/>
+        <a:p>
+          <a:r>
+            <a:rPr lang="en-US" dirty="0"/>
+            <a:t>MDS</a:t>
+          </a:r>
+        </a:p>
+      </dgm:t>
+    </dgm:pt>
+    <dgm:pt modelId="{A6E04CB9-A844-46ED-979A-DCF8D3DA9793}" type="parTrans" cxnId="{200AB78A-7364-44FA-A7DE-9ED6E80435AD}">
+      <dgm:prSet/>
+      <dgm:spPr/>
+      <dgm:t>
+        <a:bodyPr/>
+        <a:lstStyle/>
+        <a:p>
+          <a:endParaRPr lang="en-US"/>
+        </a:p>
+      </dgm:t>
+    </dgm:pt>
+    <dgm:pt modelId="{16B8E9AB-3555-4375-A9E7-4407372338CE}" type="sibTrans" cxnId="{200AB78A-7364-44FA-A7DE-9ED6E80435AD}">
+      <dgm:prSet/>
+      <dgm:spPr/>
+      <dgm:t>
+        <a:bodyPr/>
+        <a:lstStyle/>
+        <a:p>
+          <a:endParaRPr lang="en-US"/>
+        </a:p>
+      </dgm:t>
+    </dgm:pt>
     <dgm:pt modelId="{C7DA0DEC-49B3-4EFE-9EE9-D662C7357334}" type="pres">
       <dgm:prSet presAssocID="{00957F53-1F0D-445C-BFD5-C49B852980A0}" presName="Name0" presStyleCnt="0">
         <dgm:presLayoutVars>
@@ -2901,7 +3019,7 @@
       <dgm:spPr/>
     </dgm:pt>
     <dgm:pt modelId="{2B4487BF-4BC9-4009-AA01-1957E7F46C56}" type="pres">
-      <dgm:prSet presAssocID="{84936F8B-A588-4A51-BF05-6584529BCEF1}" presName="node" presStyleLbl="node1" presStyleIdx="0" presStyleCnt="3">
+      <dgm:prSet presAssocID="{84936F8B-A588-4A51-BF05-6584529BCEF1}" presName="node" presStyleLbl="node1" presStyleIdx="0" presStyleCnt="6">
         <dgm:presLayoutVars>
           <dgm:bulletEnabled val="1"/>
         </dgm:presLayoutVars>
@@ -2909,15 +3027,31 @@
       <dgm:spPr/>
     </dgm:pt>
     <dgm:pt modelId="{9AA0144C-5539-4436-A2D7-D0076484B6A5}" type="pres">
-      <dgm:prSet presAssocID="{A6F7AF0B-D6F3-4BB2-BED8-D145641246F0}" presName="sibTrans" presStyleLbl="sibTrans2D1" presStyleIdx="0" presStyleCnt="2"/>
+      <dgm:prSet presAssocID="{A6F7AF0B-D6F3-4BB2-BED8-D145641246F0}" presName="sibTrans" presStyleLbl="sibTrans2D1" presStyleIdx="0" presStyleCnt="5"/>
       <dgm:spPr/>
     </dgm:pt>
     <dgm:pt modelId="{BA7124CE-A91E-4278-A8B8-483BD1B9EB53}" type="pres">
-      <dgm:prSet presAssocID="{A6F7AF0B-D6F3-4BB2-BED8-D145641246F0}" presName="connectorText" presStyleLbl="sibTrans2D1" presStyleIdx="0" presStyleCnt="2"/>
+      <dgm:prSet presAssocID="{A6F7AF0B-D6F3-4BB2-BED8-D145641246F0}" presName="connectorText" presStyleLbl="sibTrans2D1" presStyleIdx="0" presStyleCnt="5"/>
+      <dgm:spPr/>
+    </dgm:pt>
+    <dgm:pt modelId="{8AB2B3EC-8390-4B74-A0D2-4BEA626D697A}" type="pres">
+      <dgm:prSet presAssocID="{B84591AB-9519-4304-996F-916744568229}" presName="node" presStyleLbl="node1" presStyleIdx="1" presStyleCnt="6">
+        <dgm:presLayoutVars>
+          <dgm:bulletEnabled val="1"/>
+        </dgm:presLayoutVars>
+      </dgm:prSet>
+      <dgm:spPr/>
+    </dgm:pt>
+    <dgm:pt modelId="{DF50132F-8363-4F0F-AA4C-BD6ED040AC26}" type="pres">
+      <dgm:prSet presAssocID="{38F2AFBE-E679-4017-8CC6-CF72B0C3049D}" presName="sibTrans" presStyleLbl="sibTrans2D1" presStyleIdx="1" presStyleCnt="5"/>
+      <dgm:spPr/>
+    </dgm:pt>
+    <dgm:pt modelId="{CD6192B8-8FEF-4E51-BD90-B7EC0D559404}" type="pres">
+      <dgm:prSet presAssocID="{38F2AFBE-E679-4017-8CC6-CF72B0C3049D}" presName="connectorText" presStyleLbl="sibTrans2D1" presStyleIdx="1" presStyleCnt="5"/>
       <dgm:spPr/>
     </dgm:pt>
     <dgm:pt modelId="{0144F23B-66FF-470D-9DB2-78780C3993C3}" type="pres">
-      <dgm:prSet presAssocID="{8B4163E0-D9A4-4F25-8F85-638ACD032F1C}" presName="node" presStyleLbl="node1" presStyleIdx="1" presStyleCnt="3">
+      <dgm:prSet presAssocID="{8B4163E0-D9A4-4F25-8F85-638ACD032F1C}" presName="node" presStyleLbl="node1" presStyleIdx="2" presStyleCnt="6">
         <dgm:presLayoutVars>
           <dgm:bulletEnabled val="1"/>
         </dgm:presLayoutVars>
@@ -2925,15 +3059,47 @@
       <dgm:spPr/>
     </dgm:pt>
     <dgm:pt modelId="{F5AFDAF3-FFE6-4092-BA54-9FDC13D578EC}" type="pres">
-      <dgm:prSet presAssocID="{9F45A1D7-F201-46B9-810B-C95E71227969}" presName="sibTrans" presStyleLbl="sibTrans2D1" presStyleIdx="1" presStyleCnt="2"/>
+      <dgm:prSet presAssocID="{9F45A1D7-F201-46B9-810B-C95E71227969}" presName="sibTrans" presStyleLbl="sibTrans2D1" presStyleIdx="2" presStyleCnt="5"/>
       <dgm:spPr/>
     </dgm:pt>
     <dgm:pt modelId="{4C66682C-450F-4FAE-A7DE-B012CE089624}" type="pres">
-      <dgm:prSet presAssocID="{9F45A1D7-F201-46B9-810B-C95E71227969}" presName="connectorText" presStyleLbl="sibTrans2D1" presStyleIdx="1" presStyleCnt="2"/>
+      <dgm:prSet presAssocID="{9F45A1D7-F201-46B9-810B-C95E71227969}" presName="connectorText" presStyleLbl="sibTrans2D1" presStyleIdx="2" presStyleCnt="5"/>
+      <dgm:spPr/>
+    </dgm:pt>
+    <dgm:pt modelId="{C526E8A8-73EA-4AD4-827B-5CE57CBDE984}" type="pres">
+      <dgm:prSet presAssocID="{2DC8DA49-2BC0-4150-B267-15B8B7B9F7CB}" presName="node" presStyleLbl="node1" presStyleIdx="3" presStyleCnt="6">
+        <dgm:presLayoutVars>
+          <dgm:bulletEnabled val="1"/>
+        </dgm:presLayoutVars>
+      </dgm:prSet>
+      <dgm:spPr/>
+    </dgm:pt>
+    <dgm:pt modelId="{B723B722-40FF-413D-B17C-B5CBE69C8C75}" type="pres">
+      <dgm:prSet presAssocID="{16B8E9AB-3555-4375-A9E7-4407372338CE}" presName="sibTrans" presStyleLbl="sibTrans2D1" presStyleIdx="3" presStyleCnt="5"/>
+      <dgm:spPr/>
+    </dgm:pt>
+    <dgm:pt modelId="{2A6828CA-99FE-4F2C-A6B0-A17B83634D6A}" type="pres">
+      <dgm:prSet presAssocID="{16B8E9AB-3555-4375-A9E7-4407372338CE}" presName="connectorText" presStyleLbl="sibTrans2D1" presStyleIdx="3" presStyleCnt="5"/>
       <dgm:spPr/>
     </dgm:pt>
     <dgm:pt modelId="{3432B14F-3020-44AB-9D24-EA53FC004441}" type="pres">
-      <dgm:prSet presAssocID="{15C71DBD-6CA2-4C8D-B38F-1E72A180A62A}" presName="node" presStyleLbl="node1" presStyleIdx="2" presStyleCnt="3">
+      <dgm:prSet presAssocID="{15C71DBD-6CA2-4C8D-B38F-1E72A180A62A}" presName="node" presStyleLbl="node1" presStyleIdx="4" presStyleCnt="6">
+        <dgm:presLayoutVars>
+          <dgm:bulletEnabled val="1"/>
+        </dgm:presLayoutVars>
+      </dgm:prSet>
+      <dgm:spPr/>
+    </dgm:pt>
+    <dgm:pt modelId="{E2791A25-CB20-41E8-B35C-B92779CA5C5B}" type="pres">
+      <dgm:prSet presAssocID="{1EB820B4-7178-44A1-9B6F-FE43C5A80BB8}" presName="sibTrans" presStyleLbl="sibTrans2D1" presStyleIdx="4" presStyleCnt="5"/>
+      <dgm:spPr/>
+    </dgm:pt>
+    <dgm:pt modelId="{B8296706-7102-4CC0-B45E-873D5E0435BC}" type="pres">
+      <dgm:prSet presAssocID="{1EB820B4-7178-44A1-9B6F-FE43C5A80BB8}" presName="connectorText" presStyleLbl="sibTrans2D1" presStyleIdx="4" presStyleCnt="5"/>
+      <dgm:spPr/>
+    </dgm:pt>
+    <dgm:pt modelId="{72BFCE95-47A0-4CEE-BA74-CD7783770AE4}" type="pres">
+      <dgm:prSet presAssocID="{46A20A1E-9DD2-4B51-AC9C-8BA4572A6EAF}" presName="node" presStyleLbl="node1" presStyleIdx="5" presStyleCnt="6">
         <dgm:presLayoutVars>
           <dgm:bulletEnabled val="1"/>
         </dgm:presLayoutVars>
@@ -2942,24 +3108,45 @@
     </dgm:pt>
   </dgm:ptLst>
   <dgm:cxnLst>
+    <dgm:cxn modelId="{D45E7A05-3001-4B15-88FC-6F96E09BB5B3}" type="presOf" srcId="{46A20A1E-9DD2-4B51-AC9C-8BA4572A6EAF}" destId="{72BFCE95-47A0-4CEE-BA74-CD7783770AE4}" srcOrd="0" destOrd="0" presId="urn:microsoft.com/office/officeart/2005/8/layout/process1"/>
+    <dgm:cxn modelId="{4E387648-4CE9-4FAB-8000-CBFB61EA1A85}" type="presOf" srcId="{16B8E9AB-3555-4375-A9E7-4407372338CE}" destId="{B723B722-40FF-413D-B17C-B5CBE69C8C75}" srcOrd="0" destOrd="0" presId="urn:microsoft.com/office/officeart/2005/8/layout/process1"/>
+    <dgm:cxn modelId="{52008798-1E82-423C-B095-31E38F34BAF2}" type="presOf" srcId="{84936F8B-A588-4A51-BF05-6584529BCEF1}" destId="{2B4487BF-4BC9-4009-AA01-1957E7F46C56}" srcOrd="0" destOrd="0" presId="urn:microsoft.com/office/officeart/2005/8/layout/process1"/>
+    <dgm:cxn modelId="{9AFD9671-D7C0-4C69-B8D0-AC381A14490D}" srcId="{00957F53-1F0D-445C-BFD5-C49B852980A0}" destId="{8B4163E0-D9A4-4F25-8F85-638ACD032F1C}" srcOrd="2" destOrd="0" parTransId="{46DAF746-7ACC-4723-84D3-403250A6033E}" sibTransId="{9F45A1D7-F201-46B9-810B-C95E71227969}"/>
+    <dgm:cxn modelId="{C16769DF-C7B8-4592-8218-BAA63E002388}" type="presOf" srcId="{15C71DBD-6CA2-4C8D-B38F-1E72A180A62A}" destId="{3432B14F-3020-44AB-9D24-EA53FC004441}" srcOrd="0" destOrd="0" presId="urn:microsoft.com/office/officeart/2005/8/layout/process1"/>
+    <dgm:cxn modelId="{1FFC750F-F13B-42AC-974A-A11F0E6AA698}" type="presOf" srcId="{B84591AB-9519-4304-996F-916744568229}" destId="{8AB2B3EC-8390-4B74-A0D2-4BEA626D697A}" srcOrd="0" destOrd="0" presId="urn:microsoft.com/office/officeart/2005/8/layout/process1"/>
+    <dgm:cxn modelId="{CEA9B49F-1741-4086-BA9A-F433D8053C58}" type="presOf" srcId="{1EB820B4-7178-44A1-9B6F-FE43C5A80BB8}" destId="{E2791A25-CB20-41E8-B35C-B92779CA5C5B}" srcOrd="0" destOrd="0" presId="urn:microsoft.com/office/officeart/2005/8/layout/process1"/>
+    <dgm:cxn modelId="{45C3ACF5-40F6-43EC-A114-3F3AFEF4DE74}" type="presOf" srcId="{38F2AFBE-E679-4017-8CC6-CF72B0C3049D}" destId="{CD6192B8-8FEF-4E51-BD90-B7EC0D559404}" srcOrd="1" destOrd="0" presId="urn:microsoft.com/office/officeart/2005/8/layout/process1"/>
+    <dgm:cxn modelId="{014C0F53-3E91-498D-B065-FAFA852C7FE7}" type="presOf" srcId="{A6F7AF0B-D6F3-4BB2-BED8-D145641246F0}" destId="{9AA0144C-5539-4436-A2D7-D0076484B6A5}" srcOrd="0" destOrd="0" presId="urn:microsoft.com/office/officeart/2005/8/layout/process1"/>
+    <dgm:cxn modelId="{0E28FE6B-DF69-4F6A-88F9-34BA818D9573}" type="presOf" srcId="{9F45A1D7-F201-46B9-810B-C95E71227969}" destId="{F5AFDAF3-FFE6-4092-BA54-9FDC13D578EC}" srcOrd="0" destOrd="0" presId="urn:microsoft.com/office/officeart/2005/8/layout/process1"/>
+    <dgm:cxn modelId="{13714D42-70C7-4831-A1EC-1416C8DA1A19}" type="presOf" srcId="{00957F53-1F0D-445C-BFD5-C49B852980A0}" destId="{C7DA0DEC-49B3-4EFE-9EE9-D662C7357334}" srcOrd="0" destOrd="0" presId="urn:microsoft.com/office/officeart/2005/8/layout/process1"/>
     <dgm:cxn modelId="{9F4246BE-2605-4D90-8D17-7BD00E7A1E6B}" type="presOf" srcId="{9F45A1D7-F201-46B9-810B-C95E71227969}" destId="{4C66682C-450F-4FAE-A7DE-B012CE089624}" srcOrd="1" destOrd="0" presId="urn:microsoft.com/office/officeart/2005/8/layout/process1"/>
-    <dgm:cxn modelId="{0E28FE6B-DF69-4F6A-88F9-34BA818D9573}" type="presOf" srcId="{9F45A1D7-F201-46B9-810B-C95E71227969}" destId="{F5AFDAF3-FFE6-4092-BA54-9FDC13D578EC}" srcOrd="0" destOrd="0" presId="urn:microsoft.com/office/officeart/2005/8/layout/process1"/>
+    <dgm:cxn modelId="{D10A512B-A455-40A4-8FEB-DF069E95B1A0}" type="presOf" srcId="{A6F7AF0B-D6F3-4BB2-BED8-D145641246F0}" destId="{BA7124CE-A91E-4278-A8B8-483BD1B9EB53}" srcOrd="1" destOrd="0" presId="urn:microsoft.com/office/officeart/2005/8/layout/process1"/>
+    <dgm:cxn modelId="{200AB78A-7364-44FA-A7DE-9ED6E80435AD}" srcId="{00957F53-1F0D-445C-BFD5-C49B852980A0}" destId="{2DC8DA49-2BC0-4150-B267-15B8B7B9F7CB}" srcOrd="3" destOrd="0" parTransId="{A6E04CB9-A844-46ED-979A-DCF8D3DA9793}" sibTransId="{16B8E9AB-3555-4375-A9E7-4407372338CE}"/>
+    <dgm:cxn modelId="{27F32EF1-5F23-46E2-A487-A37D10FF26E9}" srcId="{00957F53-1F0D-445C-BFD5-C49B852980A0}" destId="{B84591AB-9519-4304-996F-916744568229}" srcOrd="1" destOrd="0" parTransId="{1768651F-22AC-4F2C-B9E8-ABC408F7BC05}" sibTransId="{38F2AFBE-E679-4017-8CC6-CF72B0C3049D}"/>
+    <dgm:cxn modelId="{0297B5A8-ADFA-41C7-A40A-FB1F06B22435}" type="presOf" srcId="{2DC8DA49-2BC0-4150-B267-15B8B7B9F7CB}" destId="{C526E8A8-73EA-4AD4-827B-5CE57CBDE984}" srcOrd="0" destOrd="0" presId="urn:microsoft.com/office/officeart/2005/8/layout/process1"/>
+    <dgm:cxn modelId="{4A77F5B4-A0AC-4B49-9E1F-8C8758B26524}" srcId="{00957F53-1F0D-445C-BFD5-C49B852980A0}" destId="{46A20A1E-9DD2-4B51-AC9C-8BA4572A6EAF}" srcOrd="5" destOrd="0" parTransId="{FCB8C52C-1285-4859-BAB9-8DD4BCFC3357}" sibTransId="{2F466CDD-ABE3-4712-972F-3B29981A71DD}"/>
+    <dgm:cxn modelId="{6F162D20-4A60-4023-B092-77BFB467C242}" type="presOf" srcId="{38F2AFBE-E679-4017-8CC6-CF72B0C3049D}" destId="{DF50132F-8363-4F0F-AA4C-BD6ED040AC26}" srcOrd="0" destOrd="0" presId="urn:microsoft.com/office/officeart/2005/8/layout/process1"/>
     <dgm:cxn modelId="{0A0465EC-31CB-425D-9369-9A9CA2146C82}" type="presOf" srcId="{8B4163E0-D9A4-4F25-8F85-638ACD032F1C}" destId="{0144F23B-66FF-470D-9DB2-78780C3993C3}" srcOrd="0" destOrd="0" presId="urn:microsoft.com/office/officeart/2005/8/layout/process1"/>
-    <dgm:cxn modelId="{D10A512B-A455-40A4-8FEB-DF069E95B1A0}" type="presOf" srcId="{A6F7AF0B-D6F3-4BB2-BED8-D145641246F0}" destId="{BA7124CE-A91E-4278-A8B8-483BD1B9EB53}" srcOrd="1" destOrd="0" presId="urn:microsoft.com/office/officeart/2005/8/layout/process1"/>
-    <dgm:cxn modelId="{9AFD9671-D7C0-4C69-B8D0-AC381A14490D}" srcId="{00957F53-1F0D-445C-BFD5-C49B852980A0}" destId="{8B4163E0-D9A4-4F25-8F85-638ACD032F1C}" srcOrd="1" destOrd="0" parTransId="{46DAF746-7ACC-4723-84D3-403250A6033E}" sibTransId="{9F45A1D7-F201-46B9-810B-C95E71227969}"/>
+    <dgm:cxn modelId="{FDB7FFEC-8695-427E-8508-686947DF0366}" type="presOf" srcId="{1EB820B4-7178-44A1-9B6F-FE43C5A80BB8}" destId="{B8296706-7102-4CC0-B45E-873D5E0435BC}" srcOrd="1" destOrd="0" presId="urn:microsoft.com/office/officeart/2005/8/layout/process1"/>
     <dgm:cxn modelId="{AB5814CD-3D70-4F39-B122-8112FD37FE9C}" srcId="{00957F53-1F0D-445C-BFD5-C49B852980A0}" destId="{84936F8B-A588-4A51-BF05-6584529BCEF1}" srcOrd="0" destOrd="0" parTransId="{ADEC294F-A759-4A35-BE73-25CDDEC515CF}" sibTransId="{A6F7AF0B-D6F3-4BB2-BED8-D145641246F0}"/>
-    <dgm:cxn modelId="{014C0F53-3E91-498D-B065-FAFA852C7FE7}" type="presOf" srcId="{A6F7AF0B-D6F3-4BB2-BED8-D145641246F0}" destId="{9AA0144C-5539-4436-A2D7-D0076484B6A5}" srcOrd="0" destOrd="0" presId="urn:microsoft.com/office/officeart/2005/8/layout/process1"/>
-    <dgm:cxn modelId="{C16769DF-C7B8-4592-8218-BAA63E002388}" type="presOf" srcId="{15C71DBD-6CA2-4C8D-B38F-1E72A180A62A}" destId="{3432B14F-3020-44AB-9D24-EA53FC004441}" srcOrd="0" destOrd="0" presId="urn:microsoft.com/office/officeart/2005/8/layout/process1"/>
-    <dgm:cxn modelId="{6DBFC9B8-0D58-4344-8598-6C407072F97D}" srcId="{00957F53-1F0D-445C-BFD5-C49B852980A0}" destId="{15C71DBD-6CA2-4C8D-B38F-1E72A180A62A}" srcOrd="2" destOrd="0" parTransId="{58049BC8-B7FA-4046-947D-D2B7D2F8693E}" sibTransId="{1EB820B4-7178-44A1-9B6F-FE43C5A80BB8}"/>
-    <dgm:cxn modelId="{52008798-1E82-423C-B095-31E38F34BAF2}" type="presOf" srcId="{84936F8B-A588-4A51-BF05-6584529BCEF1}" destId="{2B4487BF-4BC9-4009-AA01-1957E7F46C56}" srcOrd="0" destOrd="0" presId="urn:microsoft.com/office/officeart/2005/8/layout/process1"/>
-    <dgm:cxn modelId="{13714D42-70C7-4831-A1EC-1416C8DA1A19}" type="presOf" srcId="{00957F53-1F0D-445C-BFD5-C49B852980A0}" destId="{C7DA0DEC-49B3-4EFE-9EE9-D662C7357334}" srcOrd="0" destOrd="0" presId="urn:microsoft.com/office/officeart/2005/8/layout/process1"/>
+    <dgm:cxn modelId="{0469D19F-F2E2-499A-8039-3DE4F120487C}" type="presOf" srcId="{16B8E9AB-3555-4375-A9E7-4407372338CE}" destId="{2A6828CA-99FE-4F2C-A6B0-A17B83634D6A}" srcOrd="1" destOrd="0" presId="urn:microsoft.com/office/officeart/2005/8/layout/process1"/>
+    <dgm:cxn modelId="{6DBFC9B8-0D58-4344-8598-6C407072F97D}" srcId="{00957F53-1F0D-445C-BFD5-C49B852980A0}" destId="{15C71DBD-6CA2-4C8D-B38F-1E72A180A62A}" srcOrd="4" destOrd="0" parTransId="{58049BC8-B7FA-4046-947D-D2B7D2F8693E}" sibTransId="{1EB820B4-7178-44A1-9B6F-FE43C5A80BB8}"/>
     <dgm:cxn modelId="{CB41F5F5-4F84-4F3E-855F-EE4A2C6110C9}" type="presParOf" srcId="{C7DA0DEC-49B3-4EFE-9EE9-D662C7357334}" destId="{2B4487BF-4BC9-4009-AA01-1957E7F46C56}" srcOrd="0" destOrd="0" presId="urn:microsoft.com/office/officeart/2005/8/layout/process1"/>
     <dgm:cxn modelId="{467173D0-6CD4-411E-91F2-429491DE79ED}" type="presParOf" srcId="{C7DA0DEC-49B3-4EFE-9EE9-D662C7357334}" destId="{9AA0144C-5539-4436-A2D7-D0076484B6A5}" srcOrd="1" destOrd="0" presId="urn:microsoft.com/office/officeart/2005/8/layout/process1"/>
     <dgm:cxn modelId="{E30CBA76-A4B4-42BA-AEC6-80E40E3AFFAE}" type="presParOf" srcId="{9AA0144C-5539-4436-A2D7-D0076484B6A5}" destId="{BA7124CE-A91E-4278-A8B8-483BD1B9EB53}" srcOrd="0" destOrd="0" presId="urn:microsoft.com/office/officeart/2005/8/layout/process1"/>
-    <dgm:cxn modelId="{D47851A6-571F-491F-AEC4-0E5C5C0073DB}" type="presParOf" srcId="{C7DA0DEC-49B3-4EFE-9EE9-D662C7357334}" destId="{0144F23B-66FF-470D-9DB2-78780C3993C3}" srcOrd="2" destOrd="0" presId="urn:microsoft.com/office/officeart/2005/8/layout/process1"/>
-    <dgm:cxn modelId="{49063E77-62E4-4C69-AA88-DDC2C0A6C7F4}" type="presParOf" srcId="{C7DA0DEC-49B3-4EFE-9EE9-D662C7357334}" destId="{F5AFDAF3-FFE6-4092-BA54-9FDC13D578EC}" srcOrd="3" destOrd="0" presId="urn:microsoft.com/office/officeart/2005/8/layout/process1"/>
+    <dgm:cxn modelId="{F81D35A1-19FE-410E-93A0-93E494FC3A14}" type="presParOf" srcId="{C7DA0DEC-49B3-4EFE-9EE9-D662C7357334}" destId="{8AB2B3EC-8390-4B74-A0D2-4BEA626D697A}" srcOrd="2" destOrd="0" presId="urn:microsoft.com/office/officeart/2005/8/layout/process1"/>
+    <dgm:cxn modelId="{9AAE8A73-E513-4237-9DED-132990F9E568}" type="presParOf" srcId="{C7DA0DEC-49B3-4EFE-9EE9-D662C7357334}" destId="{DF50132F-8363-4F0F-AA4C-BD6ED040AC26}" srcOrd="3" destOrd="0" presId="urn:microsoft.com/office/officeart/2005/8/layout/process1"/>
+    <dgm:cxn modelId="{B05933B3-2594-4518-874E-E82FCF10E6B6}" type="presParOf" srcId="{DF50132F-8363-4F0F-AA4C-BD6ED040AC26}" destId="{CD6192B8-8FEF-4E51-BD90-B7EC0D559404}" srcOrd="0" destOrd="0" presId="urn:microsoft.com/office/officeart/2005/8/layout/process1"/>
+    <dgm:cxn modelId="{D47851A6-571F-491F-AEC4-0E5C5C0073DB}" type="presParOf" srcId="{C7DA0DEC-49B3-4EFE-9EE9-D662C7357334}" destId="{0144F23B-66FF-470D-9DB2-78780C3993C3}" srcOrd="4" destOrd="0" presId="urn:microsoft.com/office/officeart/2005/8/layout/process1"/>
+    <dgm:cxn modelId="{49063E77-62E4-4C69-AA88-DDC2C0A6C7F4}" type="presParOf" srcId="{C7DA0DEC-49B3-4EFE-9EE9-D662C7357334}" destId="{F5AFDAF3-FFE6-4092-BA54-9FDC13D578EC}" srcOrd="5" destOrd="0" presId="urn:microsoft.com/office/officeart/2005/8/layout/process1"/>
     <dgm:cxn modelId="{89B46A7F-E762-4951-B65A-82444D74C75D}" type="presParOf" srcId="{F5AFDAF3-FFE6-4092-BA54-9FDC13D578EC}" destId="{4C66682C-450F-4FAE-A7DE-B012CE089624}" srcOrd="0" destOrd="0" presId="urn:microsoft.com/office/officeart/2005/8/layout/process1"/>
-    <dgm:cxn modelId="{377E4ED1-3899-40AF-A400-1F7CD302A355}" type="presParOf" srcId="{C7DA0DEC-49B3-4EFE-9EE9-D662C7357334}" destId="{3432B14F-3020-44AB-9D24-EA53FC004441}" srcOrd="4" destOrd="0" presId="urn:microsoft.com/office/officeart/2005/8/layout/process1"/>
+    <dgm:cxn modelId="{1DE0E330-15C6-4AC3-925E-25272E802665}" type="presParOf" srcId="{C7DA0DEC-49B3-4EFE-9EE9-D662C7357334}" destId="{C526E8A8-73EA-4AD4-827B-5CE57CBDE984}" srcOrd="6" destOrd="0" presId="urn:microsoft.com/office/officeart/2005/8/layout/process1"/>
+    <dgm:cxn modelId="{5A21DC2B-76A9-4EE2-A542-B463AE4281DF}" type="presParOf" srcId="{C7DA0DEC-49B3-4EFE-9EE9-D662C7357334}" destId="{B723B722-40FF-413D-B17C-B5CBE69C8C75}" srcOrd="7" destOrd="0" presId="urn:microsoft.com/office/officeart/2005/8/layout/process1"/>
+    <dgm:cxn modelId="{7CE5F54F-DF61-4554-8A44-9B138516D4AB}" type="presParOf" srcId="{B723B722-40FF-413D-B17C-B5CBE69C8C75}" destId="{2A6828CA-99FE-4F2C-A6B0-A17B83634D6A}" srcOrd="0" destOrd="0" presId="urn:microsoft.com/office/officeart/2005/8/layout/process1"/>
+    <dgm:cxn modelId="{377E4ED1-3899-40AF-A400-1F7CD302A355}" type="presParOf" srcId="{C7DA0DEC-49B3-4EFE-9EE9-D662C7357334}" destId="{3432B14F-3020-44AB-9D24-EA53FC004441}" srcOrd="8" destOrd="0" presId="urn:microsoft.com/office/officeart/2005/8/layout/process1"/>
+    <dgm:cxn modelId="{4E1C1AD5-675B-419B-B092-EF4FE2D13294}" type="presParOf" srcId="{C7DA0DEC-49B3-4EFE-9EE9-D662C7357334}" destId="{E2791A25-CB20-41E8-B35C-B92779CA5C5B}" srcOrd="9" destOrd="0" presId="urn:microsoft.com/office/officeart/2005/8/layout/process1"/>
+    <dgm:cxn modelId="{2DFDB8DC-437F-4D28-AFCD-ECB397BF23E1}" type="presParOf" srcId="{E2791A25-CB20-41E8-B35C-B92779CA5C5B}" destId="{B8296706-7102-4CC0-B45E-873D5E0435BC}" srcOrd="0" destOrd="0" presId="urn:microsoft.com/office/officeart/2005/8/layout/process1"/>
+    <dgm:cxn modelId="{B83614B4-631B-4F20-B2D6-7B7A9E6C5E3C}" type="presParOf" srcId="{C7DA0DEC-49B3-4EFE-9EE9-D662C7357334}" destId="{72BFCE95-47A0-4CEE-BA74-CD7783770AE4}" srcOrd="10" destOrd="0" presId="urn:microsoft.com/office/officeart/2005/8/layout/process1"/>
   </dgm:cxnLst>
   <dgm:bg/>
   <dgm:whole/>
@@ -3772,8 +3959,8 @@
       </dsp:nvSpPr>
       <dsp:spPr>
         <a:xfrm>
-          <a:off x="6328" y="1223207"/>
-          <a:ext cx="1891642" cy="1134985"/>
+          <a:off x="0" y="1520666"/>
+          <a:ext cx="900112" cy="540067"/>
         </a:xfrm>
         <a:prstGeom prst="roundRect">
           <a:avLst>
@@ -3816,12 +4003,12 @@
         </a:fontRef>
       </dsp:style>
       <dsp:txBody>
-        <a:bodyPr spcFirstLastPara="0" vert="horz" wrap="square" lIns="190500" tIns="190500" rIns="190500" bIns="190500" numCol="1" spcCol="1270" anchor="ctr" anchorCtr="0">
+        <a:bodyPr spcFirstLastPara="0" vert="horz" wrap="square" lIns="41910" tIns="41910" rIns="41910" bIns="41910" numCol="1" spcCol="1270" anchor="ctr" anchorCtr="0">
           <a:noAutofit/>
         </a:bodyPr>
         <a:lstStyle/>
         <a:p>
-          <a:pPr marL="0" lvl="0" indent="0" algn="ctr" defTabSz="2222500">
+          <a:pPr marL="0" lvl="0" indent="0" algn="ctr" defTabSz="488950">
             <a:lnSpc>
               <a:spcPct val="90000"/>
             </a:lnSpc>
@@ -3833,12 +4020,15 @@
             </a:spcAft>
             <a:buNone/>
           </a:pPr>
-          <a:endParaRPr lang="en-US" sz="5000" kern="1200"/>
+          <a:r>
+            <a:rPr lang="en-US" sz="1100" kern="1200" dirty="0"/>
+            <a:t>Read counts</a:t>
+          </a:r>
         </a:p>
       </dsp:txBody>
       <dsp:txXfrm>
-        <a:off x="39571" y="1256450"/>
-        <a:ext cx="1825156" cy="1068499"/>
+        <a:off x="15818" y="1536484"/>
+        <a:ext cx="868476" cy="508431"/>
       </dsp:txXfrm>
     </dsp:sp>
     <dsp:sp modelId="{9AA0144C-5539-4436-A2D7-D0076484B6A5}">
@@ -3848,8 +4038,8 @@
       </dsp:nvSpPr>
       <dsp:spPr>
         <a:xfrm>
-          <a:off x="2087135" y="1556136"/>
-          <a:ext cx="401028" cy="469127"/>
+          <a:off x="990123" y="1679086"/>
+          <a:ext cx="190823" cy="223227"/>
         </a:xfrm>
         <a:prstGeom prst="rightArrow">
           <a:avLst>
@@ -3891,7 +4081,7 @@
         </a:bodyPr>
         <a:lstStyle/>
         <a:p>
-          <a:pPr marL="0" lvl="0" indent="0" algn="ctr" defTabSz="933450">
+          <a:pPr marL="0" lvl="0" indent="0" algn="ctr" defTabSz="400050">
             <a:lnSpc>
               <a:spcPct val="90000"/>
             </a:lnSpc>
@@ -3903,23 +4093,23 @@
             </a:spcAft>
             <a:buNone/>
           </a:pPr>
-          <a:endParaRPr lang="en-US" sz="2100" kern="1200"/>
+          <a:endParaRPr lang="en-US" sz="900" kern="1200"/>
         </a:p>
       </dsp:txBody>
       <dsp:txXfrm>
-        <a:off x="2087135" y="1649961"/>
-        <a:ext cx="280720" cy="281477"/>
+        <a:off x="990123" y="1723731"/>
+        <a:ext cx="133576" cy="133937"/>
       </dsp:txXfrm>
     </dsp:sp>
-    <dsp:sp modelId="{0144F23B-66FF-470D-9DB2-78780C3993C3}">
+    <dsp:sp modelId="{8AB2B3EC-8390-4B74-A0D2-4BEA626D697A}">
       <dsp:nvSpPr>
         <dsp:cNvPr id="0" name=""/>
         <dsp:cNvSpPr/>
       </dsp:nvSpPr>
       <dsp:spPr>
         <a:xfrm>
-          <a:off x="2654628" y="1223207"/>
-          <a:ext cx="1891642" cy="1134985"/>
+          <a:off x="1260157" y="1520666"/>
+          <a:ext cx="900112" cy="540067"/>
         </a:xfrm>
         <a:prstGeom prst="roundRect">
           <a:avLst>
@@ -3962,12 +4152,12 @@
         </a:fontRef>
       </dsp:style>
       <dsp:txBody>
-        <a:bodyPr spcFirstLastPara="0" vert="horz" wrap="square" lIns="190500" tIns="190500" rIns="190500" bIns="190500" numCol="1" spcCol="1270" anchor="ctr" anchorCtr="0">
+        <a:bodyPr spcFirstLastPara="0" vert="horz" wrap="square" lIns="41910" tIns="41910" rIns="41910" bIns="41910" numCol="1" spcCol="1270" anchor="ctr" anchorCtr="0">
           <a:noAutofit/>
         </a:bodyPr>
         <a:lstStyle/>
         <a:p>
-          <a:pPr marL="0" lvl="0" indent="0" algn="ctr" defTabSz="2222500">
+          <a:pPr marL="0" lvl="0" indent="0" algn="ctr" defTabSz="488950">
             <a:lnSpc>
               <a:spcPct val="90000"/>
             </a:lnSpc>
@@ -3979,23 +4169,27 @@
             </a:spcAft>
             <a:buNone/>
           </a:pPr>
-          <a:endParaRPr lang="en-US" sz="5000" kern="1200"/>
+          <a:r>
+            <a:rPr lang="en-US" sz="1100" kern="1200"/>
+            <a:t>Filter</a:t>
+          </a:r>
+          <a:endParaRPr lang="en-US" sz="1100" kern="1200" dirty="0"/>
         </a:p>
       </dsp:txBody>
       <dsp:txXfrm>
-        <a:off x="2687871" y="1256450"/>
-        <a:ext cx="1825156" cy="1068499"/>
+        <a:off x="1275975" y="1536484"/>
+        <a:ext cx="868476" cy="508431"/>
       </dsp:txXfrm>
     </dsp:sp>
-    <dsp:sp modelId="{F5AFDAF3-FFE6-4092-BA54-9FDC13D578EC}">
+    <dsp:sp modelId="{DF50132F-8363-4F0F-AA4C-BD6ED040AC26}">
       <dsp:nvSpPr>
         <dsp:cNvPr id="0" name=""/>
         <dsp:cNvSpPr/>
       </dsp:nvSpPr>
       <dsp:spPr>
         <a:xfrm>
-          <a:off x="4735435" y="1556136"/>
-          <a:ext cx="401028" cy="469127"/>
+          <a:off x="2250281" y="1679086"/>
+          <a:ext cx="190823" cy="223227"/>
         </a:xfrm>
         <a:prstGeom prst="rightArrow">
           <a:avLst>
@@ -4037,7 +4231,7 @@
         </a:bodyPr>
         <a:lstStyle/>
         <a:p>
-          <a:pPr marL="0" lvl="0" indent="0" algn="ctr" defTabSz="933450">
+          <a:pPr marL="0" lvl="0" indent="0" algn="ctr" defTabSz="400050">
             <a:lnSpc>
               <a:spcPct val="90000"/>
             </a:lnSpc>
@@ -4049,23 +4243,23 @@
             </a:spcAft>
             <a:buNone/>
           </a:pPr>
-          <a:endParaRPr lang="en-US" sz="2100" kern="1200"/>
+          <a:endParaRPr lang="en-US" sz="900" kern="1200"/>
         </a:p>
       </dsp:txBody>
       <dsp:txXfrm>
-        <a:off x="4735435" y="1649961"/>
-        <a:ext cx="280720" cy="281477"/>
+        <a:off x="2250281" y="1723731"/>
+        <a:ext cx="133576" cy="133937"/>
       </dsp:txXfrm>
     </dsp:sp>
-    <dsp:sp modelId="{3432B14F-3020-44AB-9D24-EA53FC004441}">
+    <dsp:sp modelId="{0144F23B-66FF-470D-9DB2-78780C3993C3}">
       <dsp:nvSpPr>
         <dsp:cNvPr id="0" name=""/>
         <dsp:cNvSpPr/>
       </dsp:nvSpPr>
       <dsp:spPr>
         <a:xfrm>
-          <a:off x="5302928" y="1223207"/>
-          <a:ext cx="1891642" cy="1134985"/>
+          <a:off x="2520315" y="1520666"/>
+          <a:ext cx="900112" cy="540067"/>
         </a:xfrm>
         <a:prstGeom prst="roundRect">
           <a:avLst>
@@ -4108,12 +4302,12 @@
         </a:fontRef>
       </dsp:style>
       <dsp:txBody>
-        <a:bodyPr spcFirstLastPara="0" vert="horz" wrap="square" lIns="190500" tIns="190500" rIns="190500" bIns="190500" numCol="1" spcCol="1270" anchor="ctr" anchorCtr="0">
+        <a:bodyPr spcFirstLastPara="0" vert="horz" wrap="square" lIns="41910" tIns="41910" rIns="41910" bIns="41910" numCol="1" spcCol="1270" anchor="ctr" anchorCtr="0">
           <a:noAutofit/>
         </a:bodyPr>
         <a:lstStyle/>
         <a:p>
-          <a:pPr marL="0" lvl="0" indent="0" algn="ctr" defTabSz="2222500">
+          <a:pPr marL="0" lvl="0" indent="0" algn="ctr" defTabSz="488950">
             <a:lnSpc>
               <a:spcPct val="90000"/>
             </a:lnSpc>
@@ -4125,12 +4319,462 @@
             </a:spcAft>
             <a:buNone/>
           </a:pPr>
-          <a:endParaRPr lang="en-US" sz="5000" kern="1200"/>
+          <a:r>
+            <a:rPr lang="en-US" sz="1100" kern="1200" dirty="0"/>
+            <a:t>Normalize</a:t>
+          </a:r>
         </a:p>
       </dsp:txBody>
       <dsp:txXfrm>
-        <a:off x="5336171" y="1256450"/>
-        <a:ext cx="1825156" cy="1068499"/>
+        <a:off x="2536133" y="1536484"/>
+        <a:ext cx="868476" cy="508431"/>
+      </dsp:txXfrm>
+    </dsp:sp>
+    <dsp:sp modelId="{F5AFDAF3-FFE6-4092-BA54-9FDC13D578EC}">
+      <dsp:nvSpPr>
+        <dsp:cNvPr id="0" name=""/>
+        <dsp:cNvSpPr/>
+      </dsp:nvSpPr>
+      <dsp:spPr>
+        <a:xfrm>
+          <a:off x="3510438" y="1679086"/>
+          <a:ext cx="190823" cy="223227"/>
+        </a:xfrm>
+        <a:prstGeom prst="rightArrow">
+          <a:avLst>
+            <a:gd name="adj1" fmla="val 60000"/>
+            <a:gd name="adj2" fmla="val 50000"/>
+          </a:avLst>
+        </a:prstGeom>
+        <a:solidFill>
+          <a:schemeClr val="accent1">
+            <a:tint val="60000"/>
+            <a:hueOff val="0"/>
+            <a:satOff val="0"/>
+            <a:lumOff val="0"/>
+            <a:alphaOff val="0"/>
+          </a:schemeClr>
+        </a:solidFill>
+        <a:ln>
+          <a:noFill/>
+        </a:ln>
+        <a:effectLst/>
+      </dsp:spPr>
+      <dsp:style>
+        <a:lnRef idx="0">
+          <a:scrgbClr r="0" g="0" b="0"/>
+        </a:lnRef>
+        <a:fillRef idx="1">
+          <a:scrgbClr r="0" g="0" b="0"/>
+        </a:fillRef>
+        <a:effectRef idx="0">
+          <a:scrgbClr r="0" g="0" b="0"/>
+        </a:effectRef>
+        <a:fontRef idx="minor">
+          <a:schemeClr val="lt1"/>
+        </a:fontRef>
+      </dsp:style>
+      <dsp:txBody>
+        <a:bodyPr spcFirstLastPara="0" vert="horz" wrap="square" lIns="0" tIns="0" rIns="0" bIns="0" numCol="1" spcCol="1270" anchor="ctr" anchorCtr="0">
+          <a:noAutofit/>
+        </a:bodyPr>
+        <a:lstStyle/>
+        <a:p>
+          <a:pPr marL="0" lvl="0" indent="0" algn="ctr" defTabSz="400050">
+            <a:lnSpc>
+              <a:spcPct val="90000"/>
+            </a:lnSpc>
+            <a:spcBef>
+              <a:spcPct val="0"/>
+            </a:spcBef>
+            <a:spcAft>
+              <a:spcPct val="35000"/>
+            </a:spcAft>
+            <a:buNone/>
+          </a:pPr>
+          <a:endParaRPr lang="en-US" sz="900" kern="1200"/>
+        </a:p>
+      </dsp:txBody>
+      <dsp:txXfrm>
+        <a:off x="3510438" y="1723731"/>
+        <a:ext cx="133576" cy="133937"/>
+      </dsp:txXfrm>
+    </dsp:sp>
+    <dsp:sp modelId="{C526E8A8-73EA-4AD4-827B-5CE57CBDE984}">
+      <dsp:nvSpPr>
+        <dsp:cNvPr id="0" name=""/>
+        <dsp:cNvSpPr/>
+      </dsp:nvSpPr>
+      <dsp:spPr>
+        <a:xfrm>
+          <a:off x="3780472" y="1520666"/>
+          <a:ext cx="900112" cy="540067"/>
+        </a:xfrm>
+        <a:prstGeom prst="roundRect">
+          <a:avLst>
+            <a:gd name="adj" fmla="val 10000"/>
+          </a:avLst>
+        </a:prstGeom>
+        <a:solidFill>
+          <a:schemeClr val="accent1">
+            <a:hueOff val="0"/>
+            <a:satOff val="0"/>
+            <a:lumOff val="0"/>
+            <a:alphaOff val="0"/>
+          </a:schemeClr>
+        </a:solidFill>
+        <a:ln w="34925" cap="flat" cmpd="sng" algn="in">
+          <a:solidFill>
+            <a:schemeClr val="lt1">
+              <a:hueOff val="0"/>
+              <a:satOff val="0"/>
+              <a:lumOff val="0"/>
+              <a:alphaOff val="0"/>
+            </a:schemeClr>
+          </a:solidFill>
+          <a:prstDash val="solid"/>
+        </a:ln>
+        <a:effectLst/>
+      </dsp:spPr>
+      <dsp:style>
+        <a:lnRef idx="2">
+          <a:scrgbClr r="0" g="0" b="0"/>
+        </a:lnRef>
+        <a:fillRef idx="1">
+          <a:scrgbClr r="0" g="0" b="0"/>
+        </a:fillRef>
+        <a:effectRef idx="0">
+          <a:scrgbClr r="0" g="0" b="0"/>
+        </a:effectRef>
+        <a:fontRef idx="minor">
+          <a:schemeClr val="lt1"/>
+        </a:fontRef>
+      </dsp:style>
+      <dsp:txBody>
+        <a:bodyPr spcFirstLastPara="0" vert="horz" wrap="square" lIns="41910" tIns="41910" rIns="41910" bIns="41910" numCol="1" spcCol="1270" anchor="ctr" anchorCtr="0">
+          <a:noAutofit/>
+        </a:bodyPr>
+        <a:lstStyle/>
+        <a:p>
+          <a:pPr marL="0" lvl="0" indent="0" algn="ctr" defTabSz="488950">
+            <a:lnSpc>
+              <a:spcPct val="90000"/>
+            </a:lnSpc>
+            <a:spcBef>
+              <a:spcPct val="0"/>
+            </a:spcBef>
+            <a:spcAft>
+              <a:spcPct val="35000"/>
+            </a:spcAft>
+            <a:buNone/>
+          </a:pPr>
+          <a:r>
+            <a:rPr lang="en-US" sz="1100" kern="1200" dirty="0"/>
+            <a:t>MDS</a:t>
+          </a:r>
+        </a:p>
+      </dsp:txBody>
+      <dsp:txXfrm>
+        <a:off x="3796290" y="1536484"/>
+        <a:ext cx="868476" cy="508431"/>
+      </dsp:txXfrm>
+    </dsp:sp>
+    <dsp:sp modelId="{B723B722-40FF-413D-B17C-B5CBE69C8C75}">
+      <dsp:nvSpPr>
+        <dsp:cNvPr id="0" name=""/>
+        <dsp:cNvSpPr/>
+      </dsp:nvSpPr>
+      <dsp:spPr>
+        <a:xfrm>
+          <a:off x="4770596" y="1679086"/>
+          <a:ext cx="190823" cy="223227"/>
+        </a:xfrm>
+        <a:prstGeom prst="rightArrow">
+          <a:avLst>
+            <a:gd name="adj1" fmla="val 60000"/>
+            <a:gd name="adj2" fmla="val 50000"/>
+          </a:avLst>
+        </a:prstGeom>
+        <a:solidFill>
+          <a:schemeClr val="accent1">
+            <a:tint val="60000"/>
+            <a:hueOff val="0"/>
+            <a:satOff val="0"/>
+            <a:lumOff val="0"/>
+            <a:alphaOff val="0"/>
+          </a:schemeClr>
+        </a:solidFill>
+        <a:ln>
+          <a:noFill/>
+        </a:ln>
+        <a:effectLst/>
+      </dsp:spPr>
+      <dsp:style>
+        <a:lnRef idx="0">
+          <a:scrgbClr r="0" g="0" b="0"/>
+        </a:lnRef>
+        <a:fillRef idx="1">
+          <a:scrgbClr r="0" g="0" b="0"/>
+        </a:fillRef>
+        <a:effectRef idx="0">
+          <a:scrgbClr r="0" g="0" b="0"/>
+        </a:effectRef>
+        <a:fontRef idx="minor">
+          <a:schemeClr val="lt1"/>
+        </a:fontRef>
+      </dsp:style>
+      <dsp:txBody>
+        <a:bodyPr spcFirstLastPara="0" vert="horz" wrap="square" lIns="0" tIns="0" rIns="0" bIns="0" numCol="1" spcCol="1270" anchor="ctr" anchorCtr="0">
+          <a:noAutofit/>
+        </a:bodyPr>
+        <a:lstStyle/>
+        <a:p>
+          <a:pPr marL="0" lvl="0" indent="0" algn="ctr" defTabSz="400050">
+            <a:lnSpc>
+              <a:spcPct val="90000"/>
+            </a:lnSpc>
+            <a:spcBef>
+              <a:spcPct val="0"/>
+            </a:spcBef>
+            <a:spcAft>
+              <a:spcPct val="35000"/>
+            </a:spcAft>
+            <a:buNone/>
+          </a:pPr>
+          <a:endParaRPr lang="en-US" sz="900" kern="1200"/>
+        </a:p>
+      </dsp:txBody>
+      <dsp:txXfrm>
+        <a:off x="4770596" y="1723731"/>
+        <a:ext cx="133576" cy="133937"/>
+      </dsp:txXfrm>
+    </dsp:sp>
+    <dsp:sp modelId="{3432B14F-3020-44AB-9D24-EA53FC004441}">
+      <dsp:nvSpPr>
+        <dsp:cNvPr id="0" name=""/>
+        <dsp:cNvSpPr/>
+      </dsp:nvSpPr>
+      <dsp:spPr>
+        <a:xfrm>
+          <a:off x="5040629" y="1520666"/>
+          <a:ext cx="900112" cy="540067"/>
+        </a:xfrm>
+        <a:prstGeom prst="roundRect">
+          <a:avLst>
+            <a:gd name="adj" fmla="val 10000"/>
+          </a:avLst>
+        </a:prstGeom>
+        <a:solidFill>
+          <a:schemeClr val="accent1">
+            <a:hueOff val="0"/>
+            <a:satOff val="0"/>
+            <a:lumOff val="0"/>
+            <a:alphaOff val="0"/>
+          </a:schemeClr>
+        </a:solidFill>
+        <a:ln w="34925" cap="flat" cmpd="sng" algn="in">
+          <a:solidFill>
+            <a:schemeClr val="lt1">
+              <a:hueOff val="0"/>
+              <a:satOff val="0"/>
+              <a:lumOff val="0"/>
+              <a:alphaOff val="0"/>
+            </a:schemeClr>
+          </a:solidFill>
+          <a:prstDash val="solid"/>
+        </a:ln>
+        <a:effectLst/>
+      </dsp:spPr>
+      <dsp:style>
+        <a:lnRef idx="2">
+          <a:scrgbClr r="0" g="0" b="0"/>
+        </a:lnRef>
+        <a:fillRef idx="1">
+          <a:scrgbClr r="0" g="0" b="0"/>
+        </a:fillRef>
+        <a:effectRef idx="0">
+          <a:scrgbClr r="0" g="0" b="0"/>
+        </a:effectRef>
+        <a:fontRef idx="minor">
+          <a:schemeClr val="lt1"/>
+        </a:fontRef>
+      </dsp:style>
+      <dsp:txBody>
+        <a:bodyPr spcFirstLastPara="0" vert="horz" wrap="square" lIns="41910" tIns="41910" rIns="41910" bIns="41910" numCol="1" spcCol="1270" anchor="ctr" anchorCtr="0">
+          <a:noAutofit/>
+        </a:bodyPr>
+        <a:lstStyle/>
+        <a:p>
+          <a:pPr marL="0" lvl="0" indent="0" algn="ctr" defTabSz="488950">
+            <a:lnSpc>
+              <a:spcPct val="90000"/>
+            </a:lnSpc>
+            <a:spcBef>
+              <a:spcPct val="0"/>
+            </a:spcBef>
+            <a:spcAft>
+              <a:spcPct val="35000"/>
+            </a:spcAft>
+            <a:buNone/>
+          </a:pPr>
+          <a:r>
+            <a:rPr lang="en-US" sz="1100" kern="1200" dirty="0"/>
+            <a:t>Design Matrix</a:t>
+          </a:r>
+        </a:p>
+      </dsp:txBody>
+      <dsp:txXfrm>
+        <a:off x="5056447" y="1536484"/>
+        <a:ext cx="868476" cy="508431"/>
+      </dsp:txXfrm>
+    </dsp:sp>
+    <dsp:sp modelId="{E2791A25-CB20-41E8-B35C-B92779CA5C5B}">
+      <dsp:nvSpPr>
+        <dsp:cNvPr id="0" name=""/>
+        <dsp:cNvSpPr/>
+      </dsp:nvSpPr>
+      <dsp:spPr>
+        <a:xfrm>
+          <a:off x="6030753" y="1679086"/>
+          <a:ext cx="190823" cy="223227"/>
+        </a:xfrm>
+        <a:prstGeom prst="rightArrow">
+          <a:avLst>
+            <a:gd name="adj1" fmla="val 60000"/>
+            <a:gd name="adj2" fmla="val 50000"/>
+          </a:avLst>
+        </a:prstGeom>
+        <a:solidFill>
+          <a:schemeClr val="accent1">
+            <a:tint val="60000"/>
+            <a:hueOff val="0"/>
+            <a:satOff val="0"/>
+            <a:lumOff val="0"/>
+            <a:alphaOff val="0"/>
+          </a:schemeClr>
+        </a:solidFill>
+        <a:ln>
+          <a:noFill/>
+        </a:ln>
+        <a:effectLst/>
+      </dsp:spPr>
+      <dsp:style>
+        <a:lnRef idx="0">
+          <a:scrgbClr r="0" g="0" b="0"/>
+        </a:lnRef>
+        <a:fillRef idx="1">
+          <a:scrgbClr r="0" g="0" b="0"/>
+        </a:fillRef>
+        <a:effectRef idx="0">
+          <a:scrgbClr r="0" g="0" b="0"/>
+        </a:effectRef>
+        <a:fontRef idx="minor">
+          <a:schemeClr val="lt1"/>
+        </a:fontRef>
+      </dsp:style>
+      <dsp:txBody>
+        <a:bodyPr spcFirstLastPara="0" vert="horz" wrap="square" lIns="0" tIns="0" rIns="0" bIns="0" numCol="1" spcCol="1270" anchor="ctr" anchorCtr="0">
+          <a:noAutofit/>
+        </a:bodyPr>
+        <a:lstStyle/>
+        <a:p>
+          <a:pPr marL="0" lvl="0" indent="0" algn="ctr" defTabSz="400050">
+            <a:lnSpc>
+              <a:spcPct val="90000"/>
+            </a:lnSpc>
+            <a:spcBef>
+              <a:spcPct val="0"/>
+            </a:spcBef>
+            <a:spcAft>
+              <a:spcPct val="35000"/>
+            </a:spcAft>
+            <a:buNone/>
+          </a:pPr>
+          <a:endParaRPr lang="en-US" sz="900" kern="1200"/>
+        </a:p>
+      </dsp:txBody>
+      <dsp:txXfrm>
+        <a:off x="6030753" y="1723731"/>
+        <a:ext cx="133576" cy="133937"/>
+      </dsp:txXfrm>
+    </dsp:sp>
+    <dsp:sp modelId="{72BFCE95-47A0-4CEE-BA74-CD7783770AE4}">
+      <dsp:nvSpPr>
+        <dsp:cNvPr id="0" name=""/>
+        <dsp:cNvSpPr/>
+      </dsp:nvSpPr>
+      <dsp:spPr>
+        <a:xfrm>
+          <a:off x="6300787" y="1520666"/>
+          <a:ext cx="900112" cy="540067"/>
+        </a:xfrm>
+        <a:prstGeom prst="roundRect">
+          <a:avLst>
+            <a:gd name="adj" fmla="val 10000"/>
+          </a:avLst>
+        </a:prstGeom>
+        <a:solidFill>
+          <a:schemeClr val="accent1">
+            <a:hueOff val="0"/>
+            <a:satOff val="0"/>
+            <a:lumOff val="0"/>
+            <a:alphaOff val="0"/>
+          </a:schemeClr>
+        </a:solidFill>
+        <a:ln w="34925" cap="flat" cmpd="sng" algn="in">
+          <a:solidFill>
+            <a:schemeClr val="lt1">
+              <a:hueOff val="0"/>
+              <a:satOff val="0"/>
+              <a:lumOff val="0"/>
+              <a:alphaOff val="0"/>
+            </a:schemeClr>
+          </a:solidFill>
+          <a:prstDash val="solid"/>
+        </a:ln>
+        <a:effectLst/>
+      </dsp:spPr>
+      <dsp:style>
+        <a:lnRef idx="2">
+          <a:scrgbClr r="0" g="0" b="0"/>
+        </a:lnRef>
+        <a:fillRef idx="1">
+          <a:scrgbClr r="0" g="0" b="0"/>
+        </a:fillRef>
+        <a:effectRef idx="0">
+          <a:scrgbClr r="0" g="0" b="0"/>
+        </a:effectRef>
+        <a:fontRef idx="minor">
+          <a:schemeClr val="lt1"/>
+        </a:fontRef>
+      </dsp:style>
+      <dsp:txBody>
+        <a:bodyPr spcFirstLastPara="0" vert="horz" wrap="square" lIns="41910" tIns="41910" rIns="41910" bIns="41910" numCol="1" spcCol="1270" anchor="ctr" anchorCtr="0">
+          <a:noAutofit/>
+        </a:bodyPr>
+        <a:lstStyle/>
+        <a:p>
+          <a:pPr marL="0" lvl="0" indent="0" algn="ctr" defTabSz="488950">
+            <a:lnSpc>
+              <a:spcPct val="90000"/>
+            </a:lnSpc>
+            <a:spcBef>
+              <a:spcPct val="0"/>
+            </a:spcBef>
+            <a:spcAft>
+              <a:spcPct val="35000"/>
+            </a:spcAft>
+            <a:buNone/>
+          </a:pPr>
+          <a:r>
+            <a:rPr lang="en-US" sz="1100" kern="1200" dirty="0"/>
+            <a:t>Pairwise Comparison</a:t>
+          </a:r>
+        </a:p>
+      </dsp:txBody>
+      <dsp:txXfrm>
+        <a:off x="6316605" y="1536484"/>
+        <a:ext cx="868476" cy="508431"/>
       </dsp:txXfrm>
     </dsp:sp>
   </dsp:spTree>
@@ -13454,7 +14098,7 @@
             <p:ph idx="1"/>
             <p:extLst>
               <p:ext uri="{D42A27DB-BD31-4B8C-83A1-F6EECF244321}">
-                <p14:modId xmlns:p14="http://schemas.microsoft.com/office/powerpoint/2010/main" val="2280023539"/>
+                <p14:modId xmlns:p14="http://schemas.microsoft.com/office/powerpoint/2010/main" val="3695653038"/>
               </p:ext>
             </p:extLst>
           </p:nvPr>

</xml_diff>

<commit_message>
edited presentation, Kat script
</commit_message>
<xml_diff>
--- a/asparagus.pptx
+++ b/asparagus.pptx
@@ -5,7 +5,7 @@
     <p:sldMasterId id="2147483696" r:id="rId1"/>
   </p:sldMasterIdLst>
   <p:notesMasterIdLst>
-    <p:notesMasterId r:id="rId32"/>
+    <p:notesMasterId r:id="rId30"/>
   </p:notesMasterIdLst>
   <p:sldIdLst>
     <p:sldId id="256" r:id="rId2"/>
@@ -33,11 +33,9 @@
     <p:sldId id="274" r:id="rId24"/>
     <p:sldId id="292" r:id="rId25"/>
     <p:sldId id="293" r:id="rId26"/>
-    <p:sldId id="275" r:id="rId27"/>
-    <p:sldId id="283" r:id="rId28"/>
-    <p:sldId id="276" r:id="rId29"/>
-    <p:sldId id="265" r:id="rId30"/>
-    <p:sldId id="284" r:id="rId31"/>
+    <p:sldId id="276" r:id="rId27"/>
+    <p:sldId id="265" r:id="rId28"/>
+    <p:sldId id="284" r:id="rId29"/>
   </p:sldIdLst>
   <p:sldSz cx="9144000" cy="6858000" type="screen4x3"/>
   <p:notesSz cx="6858000" cy="9144000"/>
@@ -15838,36 +15836,6 @@
           </a:p>
         </p:txBody>
       </p:sp>
-      <p:pic>
-        <p:nvPicPr>
-          <p:cNvPr id="5" name="Picture 4"/>
-          <p:cNvPicPr>
-            <a:picLocks noChangeAspect="1"/>
-          </p:cNvPicPr>
-          <p:nvPr/>
-        </p:nvPicPr>
-        <p:blipFill>
-          <a:blip r:embed="rId2" cstate="print">
-            <a:extLst>
-              <a:ext uri="{28A0092B-C50C-407E-A947-70E740481C1C}">
-                <a14:useLocalDpi xmlns:a14="http://schemas.microsoft.com/office/drawing/2010/main" val="0"/>
-              </a:ext>
-            </a:extLst>
-          </a:blip>
-          <a:stretch>
-            <a:fillRect/>
-          </a:stretch>
-        </p:blipFill>
-        <p:spPr>
-          <a:xfrm>
-            <a:off x="3048000" y="1447800"/>
-            <a:ext cx="6095297" cy="4071928"/>
-          </a:xfrm>
-          <a:prstGeom prst="rect">
-            <a:avLst/>
-          </a:prstGeom>
-        </p:spPr>
-      </p:pic>
       <p:grpSp>
         <p:nvGrpSpPr>
           <p:cNvPr id="13" name="Group 12"/>
@@ -15891,7 +15859,7 @@
             <p:nvPr/>
           </p:nvPicPr>
           <p:blipFill rotWithShape="1">
-            <a:blip r:embed="rId3">
+            <a:blip r:embed="rId2">
               <a:extLst>
                 <a:ext uri="{28A0092B-C50C-407E-A947-70E740481C1C}">
                   <a14:useLocalDpi xmlns:a14="http://schemas.microsoft.com/office/drawing/2010/main" val="0"/>
@@ -15943,7 +15911,7 @@
             <p:nvPr/>
           </p:nvPicPr>
           <p:blipFill rotWithShape="1">
-            <a:blip r:embed="rId3">
+            <a:blip r:embed="rId2">
               <a:extLst>
                 <a:ext uri="{28A0092B-C50C-407E-A947-70E740481C1C}">
                   <a14:useLocalDpi xmlns:a14="http://schemas.microsoft.com/office/drawing/2010/main" val="0"/>
@@ -15987,6 +15955,36 @@
           </p:spPr>
         </p:pic>
       </p:grpSp>
+      <p:pic>
+        <p:nvPicPr>
+          <p:cNvPr id="17" name="Picture 16"/>
+          <p:cNvPicPr>
+            <a:picLocks noChangeAspect="1"/>
+          </p:cNvPicPr>
+          <p:nvPr/>
+        </p:nvPicPr>
+        <p:blipFill>
+          <a:blip r:embed="rId3">
+            <a:extLst>
+              <a:ext uri="{28A0092B-C50C-407E-A947-70E740481C1C}">
+                <a14:useLocalDpi xmlns:a14="http://schemas.microsoft.com/office/drawing/2010/main" val="0"/>
+              </a:ext>
+            </a:extLst>
+          </a:blip>
+          <a:stretch>
+            <a:fillRect/>
+          </a:stretch>
+        </p:blipFill>
+        <p:spPr>
+          <a:xfrm>
+            <a:off x="3018820" y="1828800"/>
+            <a:ext cx="6125180" cy="3582272"/>
+          </a:xfrm>
+          <a:prstGeom prst="rect">
+            <a:avLst/>
+          </a:prstGeom>
+        </p:spPr>
+      </p:pic>
     </p:spTree>
     <p:extLst>
       <p:ext uri="{BB962C8B-B14F-4D97-AF65-F5344CB8AC3E}">
@@ -16695,36 +16693,6 @@
           </a:p>
         </p:txBody>
       </p:sp>
-      <p:pic>
-        <p:nvPicPr>
-          <p:cNvPr id="8" name="Picture 7"/>
-          <p:cNvPicPr>
-            <a:picLocks noChangeAspect="1"/>
-          </p:cNvPicPr>
-          <p:nvPr/>
-        </p:nvPicPr>
-        <p:blipFill>
-          <a:blip r:embed="rId2">
-            <a:extLst>
-              <a:ext uri="{28A0092B-C50C-407E-A947-70E740481C1C}">
-                <a14:useLocalDpi xmlns:a14="http://schemas.microsoft.com/office/drawing/2010/main" val="0"/>
-              </a:ext>
-            </a:extLst>
-          </a:blip>
-          <a:stretch>
-            <a:fillRect/>
-          </a:stretch>
-        </p:blipFill>
-        <p:spPr>
-          <a:xfrm>
-            <a:off x="3505200" y="1752600"/>
-            <a:ext cx="5715000" cy="3817872"/>
-          </a:xfrm>
-          <a:prstGeom prst="rect">
-            <a:avLst/>
-          </a:prstGeom>
-        </p:spPr>
-      </p:pic>
       <p:grpSp>
         <p:nvGrpSpPr>
           <p:cNvPr id="3" name="Group 2"/>
@@ -16748,7 +16716,7 @@
             <p:nvPr/>
           </p:nvPicPr>
           <p:blipFill rotWithShape="1">
-            <a:blip r:embed="rId3">
+            <a:blip r:embed="rId2">
               <a:extLst>
                 <a:ext uri="{28A0092B-C50C-407E-A947-70E740481C1C}">
                   <a14:useLocalDpi xmlns:a14="http://schemas.microsoft.com/office/drawing/2010/main" val="0"/>
@@ -16800,7 +16768,7 @@
             <p:nvPr/>
           </p:nvPicPr>
           <p:blipFill rotWithShape="1">
-            <a:blip r:embed="rId3">
+            <a:blip r:embed="rId2">
               <a:extLst>
                 <a:ext uri="{28A0092B-C50C-407E-A947-70E740481C1C}">
                   <a14:useLocalDpi xmlns:a14="http://schemas.microsoft.com/office/drawing/2010/main" val="0"/>
@@ -16844,6 +16812,36 @@
           </p:spPr>
         </p:pic>
       </p:grpSp>
+      <p:pic>
+        <p:nvPicPr>
+          <p:cNvPr id="4" name="Picture 3"/>
+          <p:cNvPicPr>
+            <a:picLocks noChangeAspect="1"/>
+          </p:cNvPicPr>
+          <p:nvPr/>
+        </p:nvPicPr>
+        <p:blipFill>
+          <a:blip r:embed="rId3">
+            <a:extLst>
+              <a:ext uri="{28A0092B-C50C-407E-A947-70E740481C1C}">
+                <a14:useLocalDpi xmlns:a14="http://schemas.microsoft.com/office/drawing/2010/main" val="0"/>
+              </a:ext>
+            </a:extLst>
+          </a:blip>
+          <a:stretch>
+            <a:fillRect/>
+          </a:stretch>
+        </p:blipFill>
+        <p:spPr>
+          <a:xfrm>
+            <a:off x="3438525" y="2133600"/>
+            <a:ext cx="5781675" cy="3381375"/>
+          </a:xfrm>
+          <a:prstGeom prst="rect">
+            <a:avLst/>
+          </a:prstGeom>
+        </p:spPr>
+      </p:pic>
     </p:spTree>
     <p:extLst>
       <p:ext uri="{BB962C8B-B14F-4D97-AF65-F5344CB8AC3E}">
@@ -16919,36 +16917,6 @@
           </a:p>
         </p:txBody>
       </p:sp>
-      <p:pic>
-        <p:nvPicPr>
-          <p:cNvPr id="9" name="Picture 8"/>
-          <p:cNvPicPr>
-            <a:picLocks noChangeAspect="1"/>
-          </p:cNvPicPr>
-          <p:nvPr/>
-        </p:nvPicPr>
-        <p:blipFill>
-          <a:blip r:embed="rId2">
-            <a:extLst>
-              <a:ext uri="{28A0092B-C50C-407E-A947-70E740481C1C}">
-                <a14:useLocalDpi xmlns:a14="http://schemas.microsoft.com/office/drawing/2010/main" val="0"/>
-              </a:ext>
-            </a:extLst>
-          </a:blip>
-          <a:stretch>
-            <a:fillRect/>
-          </a:stretch>
-        </p:blipFill>
-        <p:spPr>
-          <a:xfrm>
-            <a:off x="3276600" y="2286000"/>
-            <a:ext cx="6019800" cy="4021491"/>
-          </a:xfrm>
-          <a:prstGeom prst="rect">
-            <a:avLst/>
-          </a:prstGeom>
-        </p:spPr>
-      </p:pic>
       <p:grpSp>
         <p:nvGrpSpPr>
           <p:cNvPr id="3" name="Group 2"/>
@@ -16972,7 +16940,7 @@
             <p:nvPr/>
           </p:nvPicPr>
           <p:blipFill rotWithShape="1">
-            <a:blip r:embed="rId3">
+            <a:blip r:embed="rId2">
               <a:extLst>
                 <a:ext uri="{28A0092B-C50C-407E-A947-70E740481C1C}">
                   <a14:useLocalDpi xmlns:a14="http://schemas.microsoft.com/office/drawing/2010/main" val="0"/>
@@ -17024,7 +16992,7 @@
             <p:nvPr/>
           </p:nvPicPr>
           <p:blipFill rotWithShape="1">
-            <a:blip r:embed="rId3">
+            <a:blip r:embed="rId2">
               <a:extLst>
                 <a:ext uri="{28A0092B-C50C-407E-A947-70E740481C1C}">
                   <a14:useLocalDpi xmlns:a14="http://schemas.microsoft.com/office/drawing/2010/main" val="0"/>
@@ -17076,7 +17044,7 @@
             <p:nvPr/>
           </p:nvPicPr>
           <p:blipFill rotWithShape="1">
-            <a:blip r:embed="rId3">
+            <a:blip r:embed="rId2">
               <a:extLst>
                 <a:ext uri="{28A0092B-C50C-407E-A947-70E740481C1C}">
                   <a14:useLocalDpi xmlns:a14="http://schemas.microsoft.com/office/drawing/2010/main" val="0"/>
@@ -17120,6 +17088,36 @@
           </p:spPr>
         </p:pic>
       </p:grpSp>
+      <p:pic>
+        <p:nvPicPr>
+          <p:cNvPr id="4" name="Picture 3"/>
+          <p:cNvPicPr>
+            <a:picLocks noChangeAspect="1"/>
+          </p:cNvPicPr>
+          <p:nvPr/>
+        </p:nvPicPr>
+        <p:blipFill>
+          <a:blip r:embed="rId3">
+            <a:extLst>
+              <a:ext uri="{28A0092B-C50C-407E-A947-70E740481C1C}">
+                <a14:useLocalDpi xmlns:a14="http://schemas.microsoft.com/office/drawing/2010/main" val="0"/>
+              </a:ext>
+            </a:extLst>
+          </a:blip>
+          <a:stretch>
+            <a:fillRect/>
+          </a:stretch>
+        </p:blipFill>
+        <p:spPr>
+          <a:xfrm>
+            <a:off x="3352800" y="2638425"/>
+            <a:ext cx="5781675" cy="3381375"/>
+          </a:xfrm>
+          <a:prstGeom prst="rect">
+            <a:avLst/>
+          </a:prstGeom>
+        </p:spPr>
+      </p:pic>
     </p:spTree>
     <p:extLst>
       <p:ext uri="{BB962C8B-B14F-4D97-AF65-F5344CB8AC3E}">
@@ -17923,93 +17921,99 @@
             <p:ph type="title"/>
           </p:nvPr>
         </p:nvSpPr>
-        <p:spPr>
-          <a:xfrm>
-            <a:off x="1028700" y="685800"/>
-            <a:ext cx="7200900" cy="914400"/>
-          </a:xfrm>
-        </p:spPr>
+        <p:spPr/>
         <p:txBody>
           <a:bodyPr/>
           <a:lstStyle/>
           <a:p>
             <a:r>
-              <a:rPr lang="en-US" dirty="0"/>
-              <a:t>Results</a:t>
-            </a:r>
+              <a:rPr lang="en-US" dirty="0" smtClean="0"/>
+              <a:t>Conclusions</a:t>
+            </a:r>
+            <a:endParaRPr lang="en-US" dirty="0"/>
           </a:p>
         </p:txBody>
       </p:sp>
       <p:sp>
         <p:nvSpPr>
-          <p:cNvPr id="4" name="AutoShape 2" descr="Figure 4"/>
+          <p:cNvPr id="3" name="Content Placeholder 2"/>
           <p:cNvSpPr>
-            <a:spLocks noGrp="1" noChangeAspect="1" noChangeArrowheads="1"/>
+            <a:spLocks noGrp="1"/>
           </p:cNvSpPr>
           <p:nvPr>
             <p:ph idx="1"/>
           </p:nvPr>
         </p:nvSpPr>
-        <p:spPr bwMode="auto">
-          <a:xfrm>
-            <a:off x="1025387" y="1447800"/>
-            <a:ext cx="7200900" cy="914400"/>
-          </a:xfrm>
-          <a:prstGeom prst="rect">
-            <a:avLst/>
-          </a:prstGeom>
-          <a:noFill/>
-          <a:extLst>
-            <a:ext uri="{909E8E84-426E-40DD-AFC4-6F175D3DCCD1}">
-              <a14:hiddenFill xmlns:a14="http://schemas.microsoft.com/office/drawing/2010/main">
-                <a:solidFill>
-                  <a:srgbClr val="FFFFFF"/>
-                </a:solidFill>
-              </a14:hiddenFill>
-            </a:ext>
-          </a:extLst>
-        </p:spPr>
+        <p:spPr/>
         <p:txBody>
-          <a:bodyPr vert="horz" wrap="square" lIns="91440" tIns="45720" rIns="91440" bIns="45720" numCol="1" anchor="t" anchorCtr="0" compatLnSpc="1">
-            <a:prstTxWarp prst="textNoShape">
-              <a:avLst/>
-            </a:prstTxWarp>
-            <a:normAutofit fontScale="92500" lnSpcReduction="20000"/>
-          </a:bodyPr>
+          <a:bodyPr/>
           <a:lstStyle/>
           <a:p>
             <a:r>
-              <a:rPr lang="en-US" dirty="0"/>
-              <a:t>Figure 4:Heatmap clustering of the 570 differentially expressed garden asparagus (</a:t>
-            </a:r>
-            <a:r>
-              <a:rPr lang="en-US" i="1" dirty="0"/>
-              <a:t>Asparagus officinalis</a:t>
-            </a:r>
-            <a:r>
-              <a:rPr lang="en-US" dirty="0"/>
-              <a:t>) genes in all spear tip tissues</a:t>
-            </a:r>
+              <a:rPr lang="en-US" dirty="0" smtClean="0"/>
+              <a:t>Understand the </a:t>
+            </a:r>
+            <a:r>
+              <a:rPr lang="en-US" dirty="0" smtClean="0"/>
+              <a:t>experimental design and </a:t>
+            </a:r>
+            <a:r>
+              <a:rPr lang="en-US" dirty="0" smtClean="0"/>
+              <a:t>methods before </a:t>
+            </a:r>
+            <a:r>
+              <a:rPr lang="en-US" dirty="0" smtClean="0"/>
+              <a:t>starting any data analysis.</a:t>
+            </a:r>
+          </a:p>
+          <a:p>
+            <a:r>
+              <a:rPr lang="en-US" dirty="0" smtClean="0"/>
+              <a:t>Documentation should be sufficient enough to allow that any other person can be able to understand the analysis workflow and replicate the </a:t>
+            </a:r>
+            <a:r>
+              <a:rPr lang="en-US" dirty="0" smtClean="0"/>
+              <a:t>pipeline</a:t>
+            </a:r>
+          </a:p>
+          <a:p>
+            <a:pPr lvl="1"/>
+            <a:r>
+              <a:rPr lang="en-US" dirty="0" smtClean="0"/>
+              <a:t>Include parameters, not just package names!</a:t>
+            </a:r>
+          </a:p>
+          <a:p>
+            <a:pPr lvl="1"/>
+            <a:r>
+              <a:rPr lang="en-US" dirty="0" smtClean="0"/>
+              <a:t>Include intermediate data files, not just raw data</a:t>
+            </a:r>
+          </a:p>
+          <a:p>
+            <a:pPr lvl="1"/>
+            <a:r>
+              <a:rPr lang="en-US" dirty="0" smtClean="0"/>
+              <a:t>Include versions </a:t>
+            </a:r>
+            <a:r>
+              <a:rPr lang="en-US" smtClean="0"/>
+              <a:t>of packages</a:t>
+            </a:r>
+            <a:endParaRPr lang="en-US" dirty="0"/>
           </a:p>
         </p:txBody>
       </p:sp>
     </p:spTree>
     <p:extLst>
       <p:ext uri="{BB962C8B-B14F-4D97-AF65-F5344CB8AC3E}">
-        <p14:creationId xmlns:p14="http://schemas.microsoft.com/office/powerpoint/2010/main" val="897698656"/>
+        <p14:creationId xmlns:p14="http://schemas.microsoft.com/office/powerpoint/2010/main" val="1757100119"/>
       </p:ext>
     </p:extLst>
   </p:cSld>
   <p:clrMapOvr>
     <a:masterClrMapping/>
   </p:clrMapOvr>
-  <p:timing>
-    <p:tnLst>
-      <p:par>
-        <p:cTn id="1" dur="indefinite" restart="never" nodeType="tmRoot"/>
-      </p:par>
-    </p:tnLst>
-  </p:timing>
 </p:sld>
 </file>
 
@@ -18046,10 +18050,9 @@
           <a:lstStyle/>
           <a:p>
             <a:r>
-              <a:rPr lang="en-US" dirty="0" err="1" smtClean="0"/>
-              <a:t>heatmap</a:t>
-            </a:r>
-            <a:endParaRPr lang="en-US" dirty="0"/>
+              <a:rPr lang="en-US" dirty="0"/>
+              <a:t>Bibliography</a:t>
+            </a:r>
           </a:p>
         </p:txBody>
       </p:sp>
@@ -18068,14 +18071,83 @@
           <a:bodyPr/>
           <a:lstStyle/>
           <a:p>
-            <a:endParaRPr lang="en-US"/>
+            <a:r>
+              <a:rPr lang="en-US" dirty="0"/>
+              <a:t>Deng C-L, Qin R-Y, Wang N-N, Cao Y, Gao J, Gao W-J, Lu L-D. 2012. Karyotype of asparagus by physical mapping of 45S and 5S rDNA by FISH. </a:t>
+            </a:r>
+            <a:r>
+              <a:rPr lang="en-US" i="1" dirty="0"/>
+              <a:t>Journal of Genetics</a:t>
+            </a:r>
+            <a:r>
+              <a:rPr lang="en-US" dirty="0"/>
+              <a:t> </a:t>
+            </a:r>
+            <a:r>
+              <a:rPr lang="en-US" b="1" dirty="0"/>
+              <a:t>91</a:t>
+            </a:r>
+            <a:r>
+              <a:rPr lang="en-US" dirty="0"/>
+              <a:t>: 209–212.</a:t>
+            </a:r>
+          </a:p>
+          <a:p>
+            <a:r>
+              <a:rPr lang="en-US" dirty="0" err="1"/>
+              <a:t>Harkess</a:t>
+            </a:r>
+            <a:r>
+              <a:rPr lang="en-US" dirty="0"/>
+              <a:t>, A., </a:t>
+            </a:r>
+            <a:r>
+              <a:rPr lang="en-US" dirty="0" err="1"/>
+              <a:t>Mercati</a:t>
+            </a:r>
+            <a:r>
+              <a:rPr lang="en-US" dirty="0"/>
+              <a:t>, F., Shan, H.-Y., </a:t>
+            </a:r>
+            <a:r>
+              <a:rPr lang="en-US" dirty="0" err="1"/>
+              <a:t>Sunseri</a:t>
+            </a:r>
+            <a:r>
+              <a:rPr lang="en-US" dirty="0"/>
+              <a:t>, F., </a:t>
+            </a:r>
+            <a:r>
+              <a:rPr lang="en-US" dirty="0" err="1"/>
+              <a:t>Falavigna</a:t>
+            </a:r>
+            <a:r>
+              <a:rPr lang="en-US" dirty="0"/>
+              <a:t>, A. and </a:t>
+            </a:r>
+            <a:r>
+              <a:rPr lang="en-US" dirty="0" err="1"/>
+              <a:t>Leebens</a:t>
+            </a:r>
+            <a:r>
+              <a:rPr lang="en-US" dirty="0"/>
+              <a:t>-Mack, J. (2015), Sex-biased gene expression in dioecious garden asparagus (</a:t>
+            </a:r>
+            <a:r>
+              <a:rPr lang="en-US" i="1" dirty="0"/>
+              <a:t>Asparagus officinalis</a:t>
+            </a:r>
+            <a:r>
+              <a:rPr lang="en-US" dirty="0"/>
+              <a:t>). New Phytol, 207: 883–892. doi:10.1111/nph.13389</a:t>
+            </a:r>
           </a:p>
         </p:txBody>
       </p:sp>
     </p:spTree>
     <p:extLst>
       <p:ext uri="{BB962C8B-B14F-4D97-AF65-F5344CB8AC3E}">
-        <p14:creationId xmlns:p14="http://schemas.microsoft.com/office/powerpoint/2010/main" val="3319733076"/>
+        <p14:creationId xmlns:p14="http://schemas.microsoft.com/office/powerpoint/2010/main" val="1642219891"/>
       </p:ext>
     </p:extLst>
   </p:cSld>
@@ -18104,7 +18176,7 @@
       </p:grpSpPr>
       <p:sp>
         <p:nvSpPr>
-          <p:cNvPr id="2" name="Title 1"/>
+          <p:cNvPr id="4" name="Title 3"/>
           <p:cNvSpPr>
             <a:spLocks noGrp="1"/>
           </p:cNvSpPr>
@@ -18112,192 +18184,31 @@
             <p:ph type="title"/>
           </p:nvPr>
         </p:nvSpPr>
-        <p:spPr/>
+        <p:spPr>
+          <a:xfrm>
+            <a:off x="457200" y="2819400"/>
+            <a:ext cx="8229600" cy="990600"/>
+          </a:xfrm>
+        </p:spPr>
         <p:txBody>
-          <a:bodyPr/>
+          <a:bodyPr>
+            <a:noAutofit/>
+          </a:bodyPr>
           <a:lstStyle/>
           <a:p>
-            <a:r>
-              <a:rPr lang="en-US" dirty="0" smtClean="0"/>
-              <a:t>Conclusions</a:t>
-            </a:r>
-            <a:endParaRPr lang="en-US" dirty="0"/>
-          </a:p>
-        </p:txBody>
-      </p:sp>
-      <p:sp>
-        <p:nvSpPr>
-          <p:cNvPr id="3" name="Content Placeholder 2"/>
-          <p:cNvSpPr>
-            <a:spLocks noGrp="1"/>
-          </p:cNvSpPr>
-          <p:nvPr>
-            <p:ph idx="1"/>
-          </p:nvPr>
-        </p:nvSpPr>
-        <p:spPr/>
-        <p:txBody>
-          <a:bodyPr/>
-          <a:lstStyle/>
-          <a:p>
-            <a:r>
-              <a:rPr lang="en-US" dirty="0" smtClean="0"/>
-              <a:t>It is very important to understand the experimental design and method selection before starting any data analysis.</a:t>
-            </a:r>
-          </a:p>
-          <a:p>
-            <a:r>
-              <a:rPr lang="en-US" dirty="0" smtClean="0"/>
-              <a:t>Documentation should be sufficient enough to allow that any other person can be able to understand the analysis workflow and replicate the pipeline</a:t>
-            </a:r>
-            <a:endParaRPr lang="en-US" dirty="0"/>
+            <a:pPr algn="ctr"/>
+            <a:r>
+              <a:rPr lang="en-US" sz="6600" dirty="0" smtClean="0"/>
+              <a:t>Questions?</a:t>
+            </a:r>
+            <a:endParaRPr lang="en-US" sz="6600" dirty="0"/>
           </a:p>
         </p:txBody>
       </p:sp>
     </p:spTree>
     <p:extLst>
       <p:ext uri="{BB962C8B-B14F-4D97-AF65-F5344CB8AC3E}">
-        <p14:creationId xmlns:p14="http://schemas.microsoft.com/office/powerpoint/2010/main" val="1757100119"/>
-      </p:ext>
-    </p:extLst>
-  </p:cSld>
-  <p:clrMapOvr>
-    <a:masterClrMapping/>
-  </p:clrMapOvr>
-</p:sld>
-</file>
-
-<file path=ppt/slides/slide29.xml><?xml version="1.0" encoding="utf-8"?>
-<p:sld xmlns:a="http://schemas.openxmlformats.org/drawingml/2006/main" xmlns:r="http://schemas.openxmlformats.org/officeDocument/2006/relationships" xmlns:p="http://schemas.openxmlformats.org/presentationml/2006/main">
-  <p:cSld>
-    <p:spTree>
-      <p:nvGrpSpPr>
-        <p:cNvPr id="1" name=""/>
-        <p:cNvGrpSpPr/>
-        <p:nvPr/>
-      </p:nvGrpSpPr>
-      <p:grpSpPr>
-        <a:xfrm>
-          <a:off x="0" y="0"/>
-          <a:ext cx="0" cy="0"/>
-          <a:chOff x="0" y="0"/>
-          <a:chExt cx="0" cy="0"/>
-        </a:xfrm>
-      </p:grpSpPr>
-      <p:sp>
-        <p:nvSpPr>
-          <p:cNvPr id="2" name="Title 1"/>
-          <p:cNvSpPr>
-            <a:spLocks noGrp="1"/>
-          </p:cNvSpPr>
-          <p:nvPr>
-            <p:ph type="title"/>
-          </p:nvPr>
-        </p:nvSpPr>
-        <p:spPr/>
-        <p:txBody>
-          <a:bodyPr/>
-          <a:lstStyle/>
-          <a:p>
-            <a:r>
-              <a:rPr lang="en-US" dirty="0"/>
-              <a:t>Bibliography</a:t>
-            </a:r>
-          </a:p>
-        </p:txBody>
-      </p:sp>
-      <p:sp>
-        <p:nvSpPr>
-          <p:cNvPr id="3" name="Content Placeholder 2"/>
-          <p:cNvSpPr>
-            <a:spLocks noGrp="1"/>
-          </p:cNvSpPr>
-          <p:nvPr>
-            <p:ph idx="1"/>
-          </p:nvPr>
-        </p:nvSpPr>
-        <p:spPr/>
-        <p:txBody>
-          <a:bodyPr/>
-          <a:lstStyle/>
-          <a:p>
-            <a:r>
-              <a:rPr lang="en-US" dirty="0"/>
-              <a:t>Deng C-L, Qin R-Y, Wang N-N, Cao Y, Gao J, Gao W-J, Lu L-D. 2012. Karyotype of asparagus by physical mapping of 45S and 5S rDNA by FISH. </a:t>
-            </a:r>
-            <a:r>
-              <a:rPr lang="en-US" i="1" dirty="0"/>
-              <a:t>Journal of Genetics</a:t>
-            </a:r>
-            <a:r>
-              <a:rPr lang="en-US" dirty="0"/>
-              <a:t> </a:t>
-            </a:r>
-            <a:r>
-              <a:rPr lang="en-US" b="1" dirty="0"/>
-              <a:t>91</a:t>
-            </a:r>
-            <a:r>
-              <a:rPr lang="en-US" dirty="0"/>
-              <a:t>: 209–212.</a:t>
-            </a:r>
-          </a:p>
-          <a:p>
-            <a:r>
-              <a:rPr lang="en-US" dirty="0" err="1"/>
-              <a:t>Harkess</a:t>
-            </a:r>
-            <a:r>
-              <a:rPr lang="en-US" dirty="0"/>
-              <a:t>, A., </a:t>
-            </a:r>
-            <a:r>
-              <a:rPr lang="en-US" dirty="0" err="1"/>
-              <a:t>Mercati</a:t>
-            </a:r>
-            <a:r>
-              <a:rPr lang="en-US" dirty="0"/>
-              <a:t>, F., Shan, H.-Y., </a:t>
-            </a:r>
-            <a:r>
-              <a:rPr lang="en-US" dirty="0" err="1"/>
-              <a:t>Sunseri</a:t>
-            </a:r>
-            <a:r>
-              <a:rPr lang="en-US" dirty="0"/>
-              <a:t>, F., </a:t>
-            </a:r>
-            <a:r>
-              <a:rPr lang="en-US" dirty="0" err="1"/>
-              <a:t>Falavigna</a:t>
-            </a:r>
-            <a:r>
-              <a:rPr lang="en-US" dirty="0"/>
-              <a:t>, A. and </a:t>
-            </a:r>
-            <a:r>
-              <a:rPr lang="en-US" dirty="0" err="1"/>
-              <a:t>Leebens</a:t>
-            </a:r>
-            <a:r>
-              <a:rPr lang="en-US" dirty="0"/>
-              <a:t>-Mack, J. (2015), Sex-biased gene expression in dioecious garden asparagus (</a:t>
-            </a:r>
-            <a:r>
-              <a:rPr lang="en-US" i="1" dirty="0"/>
-              <a:t>Asparagus officinalis</a:t>
-            </a:r>
-            <a:r>
-              <a:rPr lang="en-US" dirty="0"/>
-              <a:t>). New Phytol, 207: 883–892. doi:10.1111/nph.13389</a:t>
-            </a:r>
-          </a:p>
-        </p:txBody>
-      </p:sp>
-    </p:spTree>
-    <p:extLst>
-      <p:ext uri="{BB962C8B-B14F-4D97-AF65-F5344CB8AC3E}">
-        <p14:creationId xmlns:p14="http://schemas.microsoft.com/office/powerpoint/2010/main" val="1642219891"/>
+        <p14:creationId xmlns:p14="http://schemas.microsoft.com/office/powerpoint/2010/main" val="1115857917"/>
       </p:ext>
     </p:extLst>
   </p:cSld>
@@ -18463,67 +18374,6 @@
     <p:extLst>
       <p:ext uri="{BB962C8B-B14F-4D97-AF65-F5344CB8AC3E}">
         <p14:creationId xmlns:p14="http://schemas.microsoft.com/office/powerpoint/2010/main" val="1501002260"/>
-      </p:ext>
-    </p:extLst>
-  </p:cSld>
-  <p:clrMapOvr>
-    <a:masterClrMapping/>
-  </p:clrMapOvr>
-</p:sld>
-</file>
-
-<file path=ppt/slides/slide30.xml><?xml version="1.0" encoding="utf-8"?>
-<p:sld xmlns:a="http://schemas.openxmlformats.org/drawingml/2006/main" xmlns:r="http://schemas.openxmlformats.org/officeDocument/2006/relationships" xmlns:p="http://schemas.openxmlformats.org/presentationml/2006/main">
-  <p:cSld>
-    <p:spTree>
-      <p:nvGrpSpPr>
-        <p:cNvPr id="1" name=""/>
-        <p:cNvGrpSpPr/>
-        <p:nvPr/>
-      </p:nvGrpSpPr>
-      <p:grpSpPr>
-        <a:xfrm>
-          <a:off x="0" y="0"/>
-          <a:ext cx="0" cy="0"/>
-          <a:chOff x="0" y="0"/>
-          <a:chExt cx="0" cy="0"/>
-        </a:xfrm>
-      </p:grpSpPr>
-      <p:sp>
-        <p:nvSpPr>
-          <p:cNvPr id="4" name="Title 3"/>
-          <p:cNvSpPr>
-            <a:spLocks noGrp="1"/>
-          </p:cNvSpPr>
-          <p:nvPr>
-            <p:ph type="title"/>
-          </p:nvPr>
-        </p:nvSpPr>
-        <p:spPr>
-          <a:xfrm>
-            <a:off x="457200" y="2819400"/>
-            <a:ext cx="8229600" cy="990600"/>
-          </a:xfrm>
-        </p:spPr>
-        <p:txBody>
-          <a:bodyPr>
-            <a:noAutofit/>
-          </a:bodyPr>
-          <a:lstStyle/>
-          <a:p>
-            <a:pPr algn="ctr"/>
-            <a:r>
-              <a:rPr lang="en-US" sz="6600" dirty="0" smtClean="0"/>
-              <a:t>Questions?</a:t>
-            </a:r>
-            <a:endParaRPr lang="en-US" sz="6600" dirty="0"/>
-          </a:p>
-        </p:txBody>
-      </p:sp>
-    </p:spTree>
-    <p:extLst>
-      <p:ext uri="{BB962C8B-B14F-4D97-AF65-F5344CB8AC3E}">
-        <p14:creationId xmlns:p14="http://schemas.microsoft.com/office/powerpoint/2010/main" val="1115857917"/>
       </p:ext>
     </p:extLst>
   </p:cSld>

</xml_diff>

<commit_message>
small changes to powerpoint, added heatmap workflow to expression analysis R notebook
</commit_message>
<xml_diff>
--- a/asparagus.pptx
+++ b/asparagus.pptx
@@ -5,7 +5,7 @@
     <p:sldMasterId id="2147483696" r:id="rId1"/>
   </p:sldMasterIdLst>
   <p:notesMasterIdLst>
-    <p:notesMasterId r:id="rId30"/>
+    <p:notesMasterId r:id="rId31"/>
   </p:notesMasterIdLst>
   <p:sldIdLst>
     <p:sldId id="256" r:id="rId2"/>
@@ -34,8 +34,9 @@
     <p:sldId id="274" r:id="rId25"/>
     <p:sldId id="292" r:id="rId26"/>
     <p:sldId id="293" r:id="rId27"/>
-    <p:sldId id="276" r:id="rId28"/>
-    <p:sldId id="284" r:id="rId29"/>
+    <p:sldId id="295" r:id="rId28"/>
+    <p:sldId id="276" r:id="rId29"/>
+    <p:sldId id="284" r:id="rId30"/>
   </p:sldIdLst>
   <p:sldSz cx="9144000" cy="6858000" type="screen4x3"/>
   <p:notesSz cx="6858000" cy="9144000"/>
@@ -136,7 +137,7 @@
   </p:defaultTextStyle>
   <p:extLst>
     <p:ext uri="{EFAFB233-063F-42B5-8137-9DF3F51BA10A}">
-      <p15:sldGuideLst xmlns:p15="http://schemas.microsoft.com/office/powerpoint/2012/main">
+      <p15:sldGuideLst xmlns:p15="http://schemas.microsoft.com/office/powerpoint/2012/main" xmlns="">
         <p15:guide id="1" orient="horz" pos="2160">
           <p15:clr>
             <a:srgbClr val="A4A3A4"/>
@@ -3703,6 +3704,10 @@
             <a:rPr lang="en-US" sz="1600" b="0" i="0" dirty="0"/>
             <a:t> 259909</a:t>
           </a:r>
+          <a:r>
+            <a:rPr lang="en-US" sz="1600" dirty="0"/>
+            <a:t/>
+          </a:r>
           <a:br>
             <a:rPr lang="en-US" sz="1600" dirty="0"/>
           </a:br>
@@ -3883,6 +3888,13 @@
         </dgm:presLayoutVars>
       </dgm:prSet>
       <dgm:spPr/>
+      <dgm:t>
+        <a:bodyPr/>
+        <a:lstStyle/>
+        <a:p>
+          <a:endParaRPr lang="en-US"/>
+        </a:p>
+      </dgm:t>
     </dgm:pt>
     <dgm:pt modelId="{BDAA6788-3D12-47BC-9E42-7D38FDE7F399}" type="pres">
       <dgm:prSet presAssocID="{0446C03C-E073-45AB-A9C8-06443FEA1350}" presName="node" presStyleLbl="node1" presStyleIdx="0" presStyleCnt="3">
@@ -3891,14 +3903,35 @@
         </dgm:presLayoutVars>
       </dgm:prSet>
       <dgm:spPr/>
+      <dgm:t>
+        <a:bodyPr/>
+        <a:lstStyle/>
+        <a:p>
+          <a:endParaRPr lang="en-US"/>
+        </a:p>
+      </dgm:t>
     </dgm:pt>
     <dgm:pt modelId="{1F338E8C-445B-4795-9DFA-DDBCD4CD0223}" type="pres">
       <dgm:prSet presAssocID="{DD3773AC-ED19-47CD-9A5C-21D0582A545B}" presName="sibTrans" presStyleLbl="sibTrans2D1" presStyleIdx="0" presStyleCnt="2"/>
       <dgm:spPr/>
+      <dgm:t>
+        <a:bodyPr/>
+        <a:lstStyle/>
+        <a:p>
+          <a:endParaRPr lang="en-US"/>
+        </a:p>
+      </dgm:t>
     </dgm:pt>
     <dgm:pt modelId="{34DEC8FB-8A5E-47CA-96DE-B987907461FF}" type="pres">
       <dgm:prSet presAssocID="{DD3773AC-ED19-47CD-9A5C-21D0582A545B}" presName="connectorText" presStyleLbl="sibTrans2D1" presStyleIdx="0" presStyleCnt="2"/>
       <dgm:spPr/>
+      <dgm:t>
+        <a:bodyPr/>
+        <a:lstStyle/>
+        <a:p>
+          <a:endParaRPr lang="en-US"/>
+        </a:p>
+      </dgm:t>
     </dgm:pt>
     <dgm:pt modelId="{E1C175A5-344B-46C4-A31A-B19B85FB8577}" type="pres">
       <dgm:prSet presAssocID="{DD9D1A19-C042-4241-AC1E-CBC58119E3B1}" presName="node" presStyleLbl="node1" presStyleIdx="1" presStyleCnt="3">
@@ -3907,14 +3940,35 @@
         </dgm:presLayoutVars>
       </dgm:prSet>
       <dgm:spPr/>
+      <dgm:t>
+        <a:bodyPr/>
+        <a:lstStyle/>
+        <a:p>
+          <a:endParaRPr lang="en-US"/>
+        </a:p>
+      </dgm:t>
     </dgm:pt>
     <dgm:pt modelId="{F461BE5B-401D-414A-9175-B95B6C23DC9D}" type="pres">
       <dgm:prSet presAssocID="{2F1FB023-A283-4CF2-AD92-547252EFD921}" presName="sibTrans" presStyleLbl="sibTrans2D1" presStyleIdx="1" presStyleCnt="2"/>
       <dgm:spPr/>
+      <dgm:t>
+        <a:bodyPr/>
+        <a:lstStyle/>
+        <a:p>
+          <a:endParaRPr lang="en-US"/>
+        </a:p>
+      </dgm:t>
     </dgm:pt>
     <dgm:pt modelId="{82CB2603-4A55-4B49-A6E8-B125ED9C9E48}" type="pres">
       <dgm:prSet presAssocID="{2F1FB023-A283-4CF2-AD92-547252EFD921}" presName="connectorText" presStyleLbl="sibTrans2D1" presStyleIdx="1" presStyleCnt="2"/>
       <dgm:spPr/>
+      <dgm:t>
+        <a:bodyPr/>
+        <a:lstStyle/>
+        <a:p>
+          <a:endParaRPr lang="en-US"/>
+        </a:p>
+      </dgm:t>
     </dgm:pt>
     <dgm:pt modelId="{1886C3BF-2DFE-4372-93A8-70DF5AE5B7BB}" type="pres">
       <dgm:prSet presAssocID="{91A65AEF-6A15-4A27-BEF4-E1F29341CAE7}" presName="node" presStyleLbl="node1" presStyleIdx="2" presStyleCnt="3">
@@ -3923,40 +3977,47 @@
         </dgm:presLayoutVars>
       </dgm:prSet>
       <dgm:spPr/>
+      <dgm:t>
+        <a:bodyPr/>
+        <a:lstStyle/>
+        <a:p>
+          <a:endParaRPr lang="en-US"/>
+        </a:p>
+      </dgm:t>
     </dgm:pt>
   </dgm:ptLst>
   <dgm:cxnLst>
+    <dgm:cxn modelId="{E4780FAE-1D30-42E7-AC51-8BA88C8C3936}" srcId="{0446C03C-E073-45AB-A9C8-06443FEA1350}" destId="{C466413A-A54D-4592-9067-4A7632047ADD}" srcOrd="0" destOrd="0" parTransId="{168F6043-1350-4D89-84A3-126F1B46C4D8}" sibTransId="{BBEBD048-CE75-4AEB-8E49-5458336C8650}"/>
+    <dgm:cxn modelId="{79EC4E32-DBFE-4EC9-87D3-E83007DEB976}" srcId="{7F00E8CE-6E56-4F4D-88C9-C0473C61FC8D}" destId="{91A65AEF-6A15-4A27-BEF4-E1F29341CAE7}" srcOrd="2" destOrd="0" parTransId="{73FB7926-F3DC-4072-892E-5CDBC32AC16D}" sibTransId="{26F79743-5592-4A48-AD2F-903A4A3C64B0}"/>
+    <dgm:cxn modelId="{274EF8EA-833F-4500-9EC7-213330933E55}" srcId="{91A65AEF-6A15-4A27-BEF4-E1F29341CAE7}" destId="{5E3E51B3-C034-40DA-8D6B-12A51F79F84F}" srcOrd="1" destOrd="0" parTransId="{655E7F96-779F-49AD-864A-E6F2A6C31883}" sibTransId="{D2A9912C-C23B-4036-9067-0181019705BF}"/>
+    <dgm:cxn modelId="{79AE3E36-3F6D-4B29-A511-5D0B9A6434B9}" type="presOf" srcId="{C466413A-A54D-4592-9067-4A7632047ADD}" destId="{BDAA6788-3D12-47BC-9E42-7D38FDE7F399}" srcOrd="0" destOrd="1" presId="urn:microsoft.com/office/officeart/2005/8/layout/process1"/>
+    <dgm:cxn modelId="{E52E4512-9B52-4829-8292-891CD1605CFA}" type="presOf" srcId="{DD9D1A19-C042-4241-AC1E-CBC58119E3B1}" destId="{E1C175A5-344B-46C4-A31A-B19B85FB8577}" srcOrd="0" destOrd="0" presId="urn:microsoft.com/office/officeart/2005/8/layout/process1"/>
+    <dgm:cxn modelId="{2B471167-3011-4249-B4E4-797FE711F9F1}" srcId="{DD9D1A19-C042-4241-AC1E-CBC58119E3B1}" destId="{169D612B-DA50-42B2-A089-0CD33404C833}" srcOrd="1" destOrd="0" parTransId="{3DBDD095-BAC6-4E38-BFDA-31C50CC1291F}" sibTransId="{D8E076AF-17A9-4432-91BD-D6211BC0EA7C}"/>
+    <dgm:cxn modelId="{089EAF4D-0718-4A95-82BC-C9DC79A61562}" srcId="{DD9D1A19-C042-4241-AC1E-CBC58119E3B1}" destId="{81A854F5-D3EB-49EB-AF5F-B56F6C8F5EC5}" srcOrd="0" destOrd="0" parTransId="{56C0F259-9B7E-421E-8F8E-530B0F5CE873}" sibTransId="{9F016FBE-B21A-4F9E-B770-AF7EB9058F08}"/>
+    <dgm:cxn modelId="{22FC1ECA-E709-46D6-9263-3055451A2D92}" srcId="{DD9D1A19-C042-4241-AC1E-CBC58119E3B1}" destId="{942CFC1C-AA12-4264-A826-2D247FC95085}" srcOrd="2" destOrd="0" parTransId="{7CB0AD2C-A735-4A10-B9FB-A1061338BA5B}" sibTransId="{F0159CE7-914F-482D-8628-34B12113E511}"/>
+    <dgm:cxn modelId="{00CE3C1E-BC5E-4AEE-B410-7750B957FC84}" type="presOf" srcId="{F5351295-5A7B-4686-BA6C-AAD51831210B}" destId="{BDAA6788-3D12-47BC-9E42-7D38FDE7F399}" srcOrd="0" destOrd="2" presId="urn:microsoft.com/office/officeart/2005/8/layout/process1"/>
+    <dgm:cxn modelId="{2E825B25-6EA5-4063-A79B-66B8818EDD05}" type="presOf" srcId="{7F00E8CE-6E56-4F4D-88C9-C0473C61FC8D}" destId="{962DDC3C-372C-41E5-98AF-1BC41210AB0A}" srcOrd="0" destOrd="0" presId="urn:microsoft.com/office/officeart/2005/8/layout/process1"/>
+    <dgm:cxn modelId="{C21346BE-6B39-4AD3-9F67-10CFC4398D3C}" type="presOf" srcId="{91A65AEF-6A15-4A27-BEF4-E1F29341CAE7}" destId="{1886C3BF-2DFE-4372-93A8-70DF5AE5B7BB}" srcOrd="0" destOrd="0" presId="urn:microsoft.com/office/officeart/2005/8/layout/process1"/>
+    <dgm:cxn modelId="{DC9946B6-D564-4A8F-8A08-9E5A6CD74436}" srcId="{91A65AEF-6A15-4A27-BEF4-E1F29341CAE7}" destId="{F1C2D6F1-7C50-4518-AF30-C62830E34870}" srcOrd="0" destOrd="0" parTransId="{00864D43-7BE9-45DA-BAE4-E75E36C45913}" sibTransId="{7AA76297-BF81-4187-8BAD-57F1348D4BB5}"/>
+    <dgm:cxn modelId="{0B7C5417-96E9-4D4D-89AC-6F8D69992060}" type="presOf" srcId="{99DDACEB-7AC2-405D-8C03-62809185729F}" destId="{BDAA6788-3D12-47BC-9E42-7D38FDE7F399}" srcOrd="0" destOrd="3" presId="urn:microsoft.com/office/officeart/2005/8/layout/process1"/>
+    <dgm:cxn modelId="{C1D70DC3-BB6F-4772-8D52-C73C49E18F26}" type="presOf" srcId="{2F1FB023-A283-4CF2-AD92-547252EFD921}" destId="{82CB2603-4A55-4B49-A6E8-B125ED9C9E48}" srcOrd="1" destOrd="0" presId="urn:microsoft.com/office/officeart/2005/8/layout/process1"/>
+    <dgm:cxn modelId="{1C94B997-07FB-4D8B-B2E8-FF341A774F9B}" type="presOf" srcId="{169D612B-DA50-42B2-A089-0CD33404C833}" destId="{E1C175A5-344B-46C4-A31A-B19B85FB8577}" srcOrd="0" destOrd="2" presId="urn:microsoft.com/office/officeart/2005/8/layout/process1"/>
     <dgm:cxn modelId="{B4F95DF4-F8F0-49E1-8506-908FAFE11139}" srcId="{7F00E8CE-6E56-4F4D-88C9-C0473C61FC8D}" destId="{DD9D1A19-C042-4241-AC1E-CBC58119E3B1}" srcOrd="1" destOrd="0" parTransId="{777BD4C7-AAA8-4A81-829D-A0D2FF6AA15F}" sibTransId="{2F1FB023-A283-4CF2-AD92-547252EFD921}"/>
-    <dgm:cxn modelId="{C1D70DC3-BB6F-4772-8D52-C73C49E18F26}" type="presOf" srcId="{2F1FB023-A283-4CF2-AD92-547252EFD921}" destId="{82CB2603-4A55-4B49-A6E8-B125ED9C9E48}" srcOrd="1" destOrd="0" presId="urn:microsoft.com/office/officeart/2005/8/layout/process1"/>
-    <dgm:cxn modelId="{79AE3E36-3F6D-4B29-A511-5D0B9A6434B9}" type="presOf" srcId="{C466413A-A54D-4592-9067-4A7632047ADD}" destId="{BDAA6788-3D12-47BC-9E42-7D38FDE7F399}" srcOrd="0" destOrd="1" presId="urn:microsoft.com/office/officeart/2005/8/layout/process1"/>
-    <dgm:cxn modelId="{00CE3C1E-BC5E-4AEE-B410-7750B957FC84}" type="presOf" srcId="{F5351295-5A7B-4686-BA6C-AAD51831210B}" destId="{BDAA6788-3D12-47BC-9E42-7D38FDE7F399}" srcOrd="0" destOrd="2" presId="urn:microsoft.com/office/officeart/2005/8/layout/process1"/>
-    <dgm:cxn modelId="{E4780FAE-1D30-42E7-AC51-8BA88C8C3936}" srcId="{0446C03C-E073-45AB-A9C8-06443FEA1350}" destId="{C466413A-A54D-4592-9067-4A7632047ADD}" srcOrd="0" destOrd="0" parTransId="{168F6043-1350-4D89-84A3-126F1B46C4D8}" sibTransId="{BBEBD048-CE75-4AEB-8E49-5458336C8650}"/>
     <dgm:cxn modelId="{64F483B0-D56E-4E51-A12A-C615B4470DED}" srcId="{0446C03C-E073-45AB-A9C8-06443FEA1350}" destId="{99DDACEB-7AC2-405D-8C03-62809185729F}" srcOrd="2" destOrd="0" parTransId="{FE885667-BCFC-4070-85A3-7E7661061007}" sibTransId="{3060AE7B-8CF2-467E-AFA3-68FF2185B41A}"/>
-    <dgm:cxn modelId="{0B7C5417-96E9-4D4D-89AC-6F8D69992060}" type="presOf" srcId="{99DDACEB-7AC2-405D-8C03-62809185729F}" destId="{BDAA6788-3D12-47BC-9E42-7D38FDE7F399}" srcOrd="0" destOrd="3" presId="urn:microsoft.com/office/officeart/2005/8/layout/process1"/>
+    <dgm:cxn modelId="{7D477BAE-EA9F-4D3C-AE9E-B69332CB574A}" type="presOf" srcId="{DD3773AC-ED19-47CD-9A5C-21D0582A545B}" destId="{1F338E8C-445B-4795-9DFA-DDBCD4CD0223}" srcOrd="0" destOrd="0" presId="urn:microsoft.com/office/officeart/2005/8/layout/process1"/>
+    <dgm:cxn modelId="{00F6D34C-34A9-4267-BA6D-2341A482C667}" type="presOf" srcId="{DD3773AC-ED19-47CD-9A5C-21D0582A545B}" destId="{34DEC8FB-8A5E-47CA-96DE-B987907461FF}" srcOrd="1" destOrd="0" presId="urn:microsoft.com/office/officeart/2005/8/layout/process1"/>
+    <dgm:cxn modelId="{6CA895F7-DC0B-4666-938A-B116866643B2}" type="presOf" srcId="{7305E311-BA18-4725-86B1-D9DF66556862}" destId="{1886C3BF-2DFE-4372-93A8-70DF5AE5B7BB}" srcOrd="0" destOrd="3" presId="urn:microsoft.com/office/officeart/2005/8/layout/process1"/>
+    <dgm:cxn modelId="{7F065C32-943E-4B45-992C-FEEA645ADE92}" type="presOf" srcId="{0446C03C-E073-45AB-A9C8-06443FEA1350}" destId="{BDAA6788-3D12-47BC-9E42-7D38FDE7F399}" srcOrd="0" destOrd="0" presId="urn:microsoft.com/office/officeart/2005/8/layout/process1"/>
+    <dgm:cxn modelId="{932179C8-46BB-4EBA-B01E-CFBCCFA4DC21}" type="presOf" srcId="{AE78AC46-7E52-44F4-B2B2-7CE10099D6ED}" destId="{E1C175A5-344B-46C4-A31A-B19B85FB8577}" srcOrd="0" destOrd="4" presId="urn:microsoft.com/office/officeart/2005/8/layout/process1"/>
+    <dgm:cxn modelId="{46EEA246-DA9F-4BBB-89F1-BFFE8CD15378}" srcId="{7F00E8CE-6E56-4F4D-88C9-C0473C61FC8D}" destId="{0446C03C-E073-45AB-A9C8-06443FEA1350}" srcOrd="0" destOrd="0" parTransId="{166EBAF9-EA67-41C7-9543-4E7B353618A0}" sibTransId="{DD3773AC-ED19-47CD-9A5C-21D0582A545B}"/>
     <dgm:cxn modelId="{BCA9A3D5-D437-4983-9C4A-142C813CBF20}" srcId="{DD9D1A19-C042-4241-AC1E-CBC58119E3B1}" destId="{AE78AC46-7E52-44F4-B2B2-7CE10099D6ED}" srcOrd="3" destOrd="0" parTransId="{F3154323-2D0F-4AA8-BDA6-3039AF34A32D}" sibTransId="{38B06FD4-3BA9-4425-90CA-E27CB0EB86EA}"/>
-    <dgm:cxn modelId="{2E825B25-6EA5-4063-A79B-66B8818EDD05}" type="presOf" srcId="{7F00E8CE-6E56-4F4D-88C9-C0473C61FC8D}" destId="{962DDC3C-372C-41E5-98AF-1BC41210AB0A}" srcOrd="0" destOrd="0" presId="urn:microsoft.com/office/officeart/2005/8/layout/process1"/>
+    <dgm:cxn modelId="{97963869-47A2-410C-957F-FA9E0ABBA8EA}" type="presOf" srcId="{81A854F5-D3EB-49EB-AF5F-B56F6C8F5EC5}" destId="{E1C175A5-344B-46C4-A31A-B19B85FB8577}" srcOrd="0" destOrd="1" presId="urn:microsoft.com/office/officeart/2005/8/layout/process1"/>
+    <dgm:cxn modelId="{FEE8B482-E279-4E5C-BE13-C7106536C100}" srcId="{0446C03C-E073-45AB-A9C8-06443FEA1350}" destId="{F5351295-5A7B-4686-BA6C-AAD51831210B}" srcOrd="1" destOrd="0" parTransId="{8DB328E6-5015-4445-94EC-9C99E54FD70D}" sibTransId="{C5A711CA-AA1A-4629-BB87-67B93CCD2D61}"/>
+    <dgm:cxn modelId="{70398382-2953-4312-9820-0DB9982CAEDB}" type="presOf" srcId="{2F1FB023-A283-4CF2-AD92-547252EFD921}" destId="{F461BE5B-401D-414A-9175-B95B6C23DC9D}" srcOrd="0" destOrd="0" presId="urn:microsoft.com/office/officeart/2005/8/layout/process1"/>
+    <dgm:cxn modelId="{57DFCDEE-5952-43CC-BCE2-536517B17C25}" type="presOf" srcId="{5E3E51B3-C034-40DA-8D6B-12A51F79F84F}" destId="{1886C3BF-2DFE-4372-93A8-70DF5AE5B7BB}" srcOrd="0" destOrd="2" presId="urn:microsoft.com/office/officeart/2005/8/layout/process1"/>
     <dgm:cxn modelId="{8F4B5199-D290-4C54-BFDB-FAFDE984C92C}" type="presOf" srcId="{942CFC1C-AA12-4264-A826-2D247FC95085}" destId="{E1C175A5-344B-46C4-A31A-B19B85FB8577}" srcOrd="0" destOrd="3" presId="urn:microsoft.com/office/officeart/2005/8/layout/process1"/>
-    <dgm:cxn modelId="{2B471167-3011-4249-B4E4-797FE711F9F1}" srcId="{DD9D1A19-C042-4241-AC1E-CBC58119E3B1}" destId="{169D612B-DA50-42B2-A089-0CD33404C833}" srcOrd="1" destOrd="0" parTransId="{3DBDD095-BAC6-4E38-BFDA-31C50CC1291F}" sibTransId="{D8E076AF-17A9-4432-91BD-D6211BC0EA7C}"/>
-    <dgm:cxn modelId="{46EEA246-DA9F-4BBB-89F1-BFFE8CD15378}" srcId="{7F00E8CE-6E56-4F4D-88C9-C0473C61FC8D}" destId="{0446C03C-E073-45AB-A9C8-06443FEA1350}" srcOrd="0" destOrd="0" parTransId="{166EBAF9-EA67-41C7-9543-4E7B353618A0}" sibTransId="{DD3773AC-ED19-47CD-9A5C-21D0582A545B}"/>
-    <dgm:cxn modelId="{DC9946B6-D564-4A8F-8A08-9E5A6CD74436}" srcId="{91A65AEF-6A15-4A27-BEF4-E1F29341CAE7}" destId="{F1C2D6F1-7C50-4518-AF30-C62830E34870}" srcOrd="0" destOrd="0" parTransId="{00864D43-7BE9-45DA-BAE4-E75E36C45913}" sibTransId="{7AA76297-BF81-4187-8BAD-57F1348D4BB5}"/>
-    <dgm:cxn modelId="{6CA895F7-DC0B-4666-938A-B116866643B2}" type="presOf" srcId="{7305E311-BA18-4725-86B1-D9DF66556862}" destId="{1886C3BF-2DFE-4372-93A8-70DF5AE5B7BB}" srcOrd="0" destOrd="3" presId="urn:microsoft.com/office/officeart/2005/8/layout/process1"/>
-    <dgm:cxn modelId="{70398382-2953-4312-9820-0DB9982CAEDB}" type="presOf" srcId="{2F1FB023-A283-4CF2-AD92-547252EFD921}" destId="{F461BE5B-401D-414A-9175-B95B6C23DC9D}" srcOrd="0" destOrd="0" presId="urn:microsoft.com/office/officeart/2005/8/layout/process1"/>
-    <dgm:cxn modelId="{22FC1ECA-E709-46D6-9263-3055451A2D92}" srcId="{DD9D1A19-C042-4241-AC1E-CBC58119E3B1}" destId="{942CFC1C-AA12-4264-A826-2D247FC95085}" srcOrd="2" destOrd="0" parTransId="{7CB0AD2C-A735-4A10-B9FB-A1061338BA5B}" sibTransId="{F0159CE7-914F-482D-8628-34B12113E511}"/>
-    <dgm:cxn modelId="{1C94B997-07FB-4D8B-B2E8-FF341A774F9B}" type="presOf" srcId="{169D612B-DA50-42B2-A089-0CD33404C833}" destId="{E1C175A5-344B-46C4-A31A-B19B85FB8577}" srcOrd="0" destOrd="2" presId="urn:microsoft.com/office/officeart/2005/8/layout/process1"/>
-    <dgm:cxn modelId="{57DFCDEE-5952-43CC-BCE2-536517B17C25}" type="presOf" srcId="{5E3E51B3-C034-40DA-8D6B-12A51F79F84F}" destId="{1886C3BF-2DFE-4372-93A8-70DF5AE5B7BB}" srcOrd="0" destOrd="2" presId="urn:microsoft.com/office/officeart/2005/8/layout/process1"/>
-    <dgm:cxn modelId="{7D477BAE-EA9F-4D3C-AE9E-B69332CB574A}" type="presOf" srcId="{DD3773AC-ED19-47CD-9A5C-21D0582A545B}" destId="{1F338E8C-445B-4795-9DFA-DDBCD4CD0223}" srcOrd="0" destOrd="0" presId="urn:microsoft.com/office/officeart/2005/8/layout/process1"/>
-    <dgm:cxn modelId="{97963869-47A2-410C-957F-FA9E0ABBA8EA}" type="presOf" srcId="{81A854F5-D3EB-49EB-AF5F-B56F6C8F5EC5}" destId="{E1C175A5-344B-46C4-A31A-B19B85FB8577}" srcOrd="0" destOrd="1" presId="urn:microsoft.com/office/officeart/2005/8/layout/process1"/>
-    <dgm:cxn modelId="{932179C8-46BB-4EBA-B01E-CFBCCFA4DC21}" type="presOf" srcId="{AE78AC46-7E52-44F4-B2B2-7CE10099D6ED}" destId="{E1C175A5-344B-46C4-A31A-B19B85FB8577}" srcOrd="0" destOrd="4" presId="urn:microsoft.com/office/officeart/2005/8/layout/process1"/>
-    <dgm:cxn modelId="{7F065C32-943E-4B45-992C-FEEA645ADE92}" type="presOf" srcId="{0446C03C-E073-45AB-A9C8-06443FEA1350}" destId="{BDAA6788-3D12-47BC-9E42-7D38FDE7F399}" srcOrd="0" destOrd="0" presId="urn:microsoft.com/office/officeart/2005/8/layout/process1"/>
+    <dgm:cxn modelId="{AC0F4E34-1EE9-4B66-99B0-32ECCF3AFCEA}" srcId="{91A65AEF-6A15-4A27-BEF4-E1F29341CAE7}" destId="{7305E311-BA18-4725-86B1-D9DF66556862}" srcOrd="2" destOrd="0" parTransId="{35EE8319-C046-48CC-965F-761964A1A1D8}" sibTransId="{BAA32ABE-2C94-4499-B5F5-1BE81733AACE}"/>
     <dgm:cxn modelId="{A35BA005-231A-4DF5-ACF3-C891B914081F}" type="presOf" srcId="{F1C2D6F1-7C50-4518-AF30-C62830E34870}" destId="{1886C3BF-2DFE-4372-93A8-70DF5AE5B7BB}" srcOrd="0" destOrd="1" presId="urn:microsoft.com/office/officeart/2005/8/layout/process1"/>
-    <dgm:cxn modelId="{C21346BE-6B39-4AD3-9F67-10CFC4398D3C}" type="presOf" srcId="{91A65AEF-6A15-4A27-BEF4-E1F29341CAE7}" destId="{1886C3BF-2DFE-4372-93A8-70DF5AE5B7BB}" srcOrd="0" destOrd="0" presId="urn:microsoft.com/office/officeart/2005/8/layout/process1"/>
-    <dgm:cxn modelId="{00F6D34C-34A9-4267-BA6D-2341A482C667}" type="presOf" srcId="{DD3773AC-ED19-47CD-9A5C-21D0582A545B}" destId="{34DEC8FB-8A5E-47CA-96DE-B987907461FF}" srcOrd="1" destOrd="0" presId="urn:microsoft.com/office/officeart/2005/8/layout/process1"/>
-    <dgm:cxn modelId="{089EAF4D-0718-4A95-82BC-C9DC79A61562}" srcId="{DD9D1A19-C042-4241-AC1E-CBC58119E3B1}" destId="{81A854F5-D3EB-49EB-AF5F-B56F6C8F5EC5}" srcOrd="0" destOrd="0" parTransId="{56C0F259-9B7E-421E-8F8E-530B0F5CE873}" sibTransId="{9F016FBE-B21A-4F9E-B770-AF7EB9058F08}"/>
-    <dgm:cxn modelId="{E52E4512-9B52-4829-8292-891CD1605CFA}" type="presOf" srcId="{DD9D1A19-C042-4241-AC1E-CBC58119E3B1}" destId="{E1C175A5-344B-46C4-A31A-B19B85FB8577}" srcOrd="0" destOrd="0" presId="urn:microsoft.com/office/officeart/2005/8/layout/process1"/>
-    <dgm:cxn modelId="{274EF8EA-833F-4500-9EC7-213330933E55}" srcId="{91A65AEF-6A15-4A27-BEF4-E1F29341CAE7}" destId="{5E3E51B3-C034-40DA-8D6B-12A51F79F84F}" srcOrd="1" destOrd="0" parTransId="{655E7F96-779F-49AD-864A-E6F2A6C31883}" sibTransId="{D2A9912C-C23B-4036-9067-0181019705BF}"/>
-    <dgm:cxn modelId="{79EC4E32-DBFE-4EC9-87D3-E83007DEB976}" srcId="{7F00E8CE-6E56-4F4D-88C9-C0473C61FC8D}" destId="{91A65AEF-6A15-4A27-BEF4-E1F29341CAE7}" srcOrd="2" destOrd="0" parTransId="{73FB7926-F3DC-4072-892E-5CDBC32AC16D}" sibTransId="{26F79743-5592-4A48-AD2F-903A4A3C64B0}"/>
-    <dgm:cxn modelId="{AC0F4E34-1EE9-4B66-99B0-32ECCF3AFCEA}" srcId="{91A65AEF-6A15-4A27-BEF4-E1F29341CAE7}" destId="{7305E311-BA18-4725-86B1-D9DF66556862}" srcOrd="2" destOrd="0" parTransId="{35EE8319-C046-48CC-965F-761964A1A1D8}" sibTransId="{BAA32ABE-2C94-4499-B5F5-1BE81733AACE}"/>
-    <dgm:cxn modelId="{FEE8B482-E279-4E5C-BE13-C7106536C100}" srcId="{0446C03C-E073-45AB-A9C8-06443FEA1350}" destId="{F5351295-5A7B-4686-BA6C-AAD51831210B}" srcOrd="1" destOrd="0" parTransId="{8DB328E6-5015-4445-94EC-9C99E54FD70D}" sibTransId="{C5A711CA-AA1A-4629-BB87-67B93CCD2D61}"/>
     <dgm:cxn modelId="{1384C4A0-1E04-4060-89DC-38ACFD604295}" type="presParOf" srcId="{962DDC3C-372C-41E5-98AF-1BC41210AB0A}" destId="{BDAA6788-3D12-47BC-9E42-7D38FDE7F399}" srcOrd="0" destOrd="0" presId="urn:microsoft.com/office/officeart/2005/8/layout/process1"/>
     <dgm:cxn modelId="{6914B89C-996B-4428-B6D6-4F300640B65E}" type="presParOf" srcId="{962DDC3C-372C-41E5-98AF-1BC41210AB0A}" destId="{1F338E8C-445B-4795-9DFA-DDBCD4CD0223}" srcOrd="1" destOrd="0" presId="urn:microsoft.com/office/officeart/2005/8/layout/process1"/>
     <dgm:cxn modelId="{09391D10-8263-4063-ACCB-80C26E2DCE68}" type="presParOf" srcId="{1F338E8C-445B-4795-9DFA-DDBCD4CD0223}" destId="{34DEC8FB-8A5E-47CA-96DE-B987907461FF}" srcOrd="0" destOrd="0" presId="urn:microsoft.com/office/officeart/2005/8/layout/process1"/>
@@ -4070,14 +4131,35 @@
         </dgm:presLayoutVars>
       </dgm:prSet>
       <dgm:spPr/>
+      <dgm:t>
+        <a:bodyPr/>
+        <a:lstStyle/>
+        <a:p>
+          <a:endParaRPr lang="en-US"/>
+        </a:p>
+      </dgm:t>
     </dgm:pt>
     <dgm:pt modelId="{88EDF64E-35BB-481B-B11A-F08915958068}" type="pres">
       <dgm:prSet presAssocID="{E892C2B4-4244-468D-917A-E776E4200961}" presName="sibTrans" presStyleLbl="sibTrans2D1" presStyleIdx="0" presStyleCnt="1"/>
       <dgm:spPr/>
+      <dgm:t>
+        <a:bodyPr/>
+        <a:lstStyle/>
+        <a:p>
+          <a:endParaRPr lang="en-US"/>
+        </a:p>
+      </dgm:t>
     </dgm:pt>
     <dgm:pt modelId="{F3C8F6A7-EE57-4CE9-92F3-C5249F31F420}" type="pres">
       <dgm:prSet presAssocID="{E892C2B4-4244-468D-917A-E776E4200961}" presName="connectorText" presStyleLbl="sibTrans2D1" presStyleIdx="0" presStyleCnt="1"/>
       <dgm:spPr/>
+      <dgm:t>
+        <a:bodyPr/>
+        <a:lstStyle/>
+        <a:p>
+          <a:endParaRPr lang="en-US"/>
+        </a:p>
+      </dgm:t>
     </dgm:pt>
     <dgm:pt modelId="{174F3DC6-92D1-46F3-BBD6-C834F6469487}" type="pres">
       <dgm:prSet presAssocID="{3E86D3FA-BD3A-4833-9766-85B4B2E840DF}" presName="node" presStyleLbl="node1" presStyleIdx="1" presStyleCnt="2">
@@ -4086,6 +4168,13 @@
         </dgm:presLayoutVars>
       </dgm:prSet>
       <dgm:spPr/>
+      <dgm:t>
+        <a:bodyPr/>
+        <a:lstStyle/>
+        <a:p>
+          <a:endParaRPr lang="en-US"/>
+        </a:p>
+      </dgm:t>
     </dgm:pt>
   </dgm:ptLst>
   <dgm:cxnLst>
@@ -4286,14 +4375,35 @@
         </dgm:presLayoutVars>
       </dgm:prSet>
       <dgm:spPr/>
+      <dgm:t>
+        <a:bodyPr/>
+        <a:lstStyle/>
+        <a:p>
+          <a:endParaRPr lang="en-US"/>
+        </a:p>
+      </dgm:t>
     </dgm:pt>
     <dgm:pt modelId="{F743BBA3-F85A-4955-B22D-74C8A453CDA2}" type="pres">
       <dgm:prSet presAssocID="{652A2CBE-7EEC-43CF-9E13-4590DEBC9582}" presName="sibTrans" presStyleLbl="sibTrans2D1" presStyleIdx="0" presStyleCnt="3"/>
       <dgm:spPr/>
+      <dgm:t>
+        <a:bodyPr/>
+        <a:lstStyle/>
+        <a:p>
+          <a:endParaRPr lang="en-US"/>
+        </a:p>
+      </dgm:t>
     </dgm:pt>
     <dgm:pt modelId="{8B8B4377-0697-45FC-A640-F2CE0A54A7DA}" type="pres">
       <dgm:prSet presAssocID="{652A2CBE-7EEC-43CF-9E13-4590DEBC9582}" presName="connectorText" presStyleLbl="sibTrans2D1" presStyleIdx="0" presStyleCnt="3"/>
       <dgm:spPr/>
+      <dgm:t>
+        <a:bodyPr/>
+        <a:lstStyle/>
+        <a:p>
+          <a:endParaRPr lang="en-US"/>
+        </a:p>
+      </dgm:t>
     </dgm:pt>
     <dgm:pt modelId="{34C7BCB3-04DB-45C7-9A42-320BFF7BC6DD}" type="pres">
       <dgm:prSet presAssocID="{BF1D83B5-B3DF-493F-A256-78F574499C76}" presName="node" presStyleLbl="node1" presStyleIdx="1" presStyleCnt="4">
@@ -4302,14 +4412,35 @@
         </dgm:presLayoutVars>
       </dgm:prSet>
       <dgm:spPr/>
+      <dgm:t>
+        <a:bodyPr/>
+        <a:lstStyle/>
+        <a:p>
+          <a:endParaRPr lang="en-US"/>
+        </a:p>
+      </dgm:t>
     </dgm:pt>
     <dgm:pt modelId="{9C101147-473E-42D2-A0E5-5ABF38B50C73}" type="pres">
       <dgm:prSet presAssocID="{C3C10AC9-1ADB-403C-A703-3E7E7FA57BF8}" presName="sibTrans" presStyleLbl="sibTrans2D1" presStyleIdx="1" presStyleCnt="3"/>
       <dgm:spPr/>
+      <dgm:t>
+        <a:bodyPr/>
+        <a:lstStyle/>
+        <a:p>
+          <a:endParaRPr lang="en-US"/>
+        </a:p>
+      </dgm:t>
     </dgm:pt>
     <dgm:pt modelId="{8DC65580-354A-49B6-A367-B6A9A3244483}" type="pres">
       <dgm:prSet presAssocID="{C3C10AC9-1ADB-403C-A703-3E7E7FA57BF8}" presName="connectorText" presStyleLbl="sibTrans2D1" presStyleIdx="1" presStyleCnt="3"/>
       <dgm:spPr/>
+      <dgm:t>
+        <a:bodyPr/>
+        <a:lstStyle/>
+        <a:p>
+          <a:endParaRPr lang="en-US"/>
+        </a:p>
+      </dgm:t>
     </dgm:pt>
     <dgm:pt modelId="{732646D0-614E-4567-8EB3-FE5BADE041C4}" type="pres">
       <dgm:prSet presAssocID="{9943014D-8C6E-463D-A613-48F23D4519B7}" presName="node" presStyleLbl="node1" presStyleIdx="2" presStyleCnt="4">
@@ -4318,14 +4449,35 @@
         </dgm:presLayoutVars>
       </dgm:prSet>
       <dgm:spPr/>
+      <dgm:t>
+        <a:bodyPr/>
+        <a:lstStyle/>
+        <a:p>
+          <a:endParaRPr lang="en-US"/>
+        </a:p>
+      </dgm:t>
     </dgm:pt>
     <dgm:pt modelId="{C450CEE9-1A94-4A67-8B6D-B4519DBA50F0}" type="pres">
       <dgm:prSet presAssocID="{E1FFF456-3F57-4AA5-801E-995CE96CAF64}" presName="sibTrans" presStyleLbl="sibTrans2D1" presStyleIdx="2" presStyleCnt="3"/>
       <dgm:spPr/>
+      <dgm:t>
+        <a:bodyPr/>
+        <a:lstStyle/>
+        <a:p>
+          <a:endParaRPr lang="en-US"/>
+        </a:p>
+      </dgm:t>
     </dgm:pt>
     <dgm:pt modelId="{42481493-BF49-4D21-914E-E49B566E00C1}" type="pres">
       <dgm:prSet presAssocID="{E1FFF456-3F57-4AA5-801E-995CE96CAF64}" presName="connectorText" presStyleLbl="sibTrans2D1" presStyleIdx="2" presStyleCnt="3"/>
       <dgm:spPr/>
+      <dgm:t>
+        <a:bodyPr/>
+        <a:lstStyle/>
+        <a:p>
+          <a:endParaRPr lang="en-US"/>
+        </a:p>
+      </dgm:t>
     </dgm:pt>
     <dgm:pt modelId="{E1A97CE5-89F8-4DCF-B4DC-A0ABABE32E9B}" type="pres">
       <dgm:prSet presAssocID="{727CD113-AE2A-4DE5-BC4F-9A72EB55259C}" presName="node" presStyleLbl="node1" presStyleIdx="3" presStyleCnt="4">
@@ -4334,6 +4486,13 @@
         </dgm:presLayoutVars>
       </dgm:prSet>
       <dgm:spPr/>
+      <dgm:t>
+        <a:bodyPr/>
+        <a:lstStyle/>
+        <a:p>
+          <a:endParaRPr lang="en-US"/>
+        </a:p>
+      </dgm:t>
     </dgm:pt>
   </dgm:ptLst>
   <dgm:cxnLst>
@@ -4811,6 +4970,13 @@
         </dgm:presLayoutVars>
       </dgm:prSet>
       <dgm:spPr/>
+      <dgm:t>
+        <a:bodyPr/>
+        <a:lstStyle/>
+        <a:p>
+          <a:endParaRPr lang="en-US"/>
+        </a:p>
+      </dgm:t>
     </dgm:pt>
     <dgm:pt modelId="{AB8C601B-4365-4E3A-9CA6-9D06E9BCDD70}" type="pres">
       <dgm:prSet presAssocID="{EC62BD84-3ADA-4D62-A238-5C25F36574A7}" presName="composite" presStyleCnt="0"/>
@@ -4829,6 +4995,13 @@
         </dgm:presLayoutVars>
       </dgm:prSet>
       <dgm:spPr/>
+      <dgm:t>
+        <a:bodyPr/>
+        <a:lstStyle/>
+        <a:p>
+          <a:endParaRPr lang="en-US"/>
+        </a:p>
+      </dgm:t>
     </dgm:pt>
     <dgm:pt modelId="{2B70D009-F13D-44C0-A7BC-54C205FE77FB}" type="pres">
       <dgm:prSet presAssocID="{EC62BD84-3ADA-4D62-A238-5C25F36574A7}" presName="ChildText" presStyleLbl="revTx" presStyleIdx="0" presStyleCnt="6">
@@ -4839,6 +5012,13 @@
         </dgm:presLayoutVars>
       </dgm:prSet>
       <dgm:spPr/>
+      <dgm:t>
+        <a:bodyPr/>
+        <a:lstStyle/>
+        <a:p>
+          <a:endParaRPr lang="en-US"/>
+        </a:p>
+      </dgm:t>
     </dgm:pt>
     <dgm:pt modelId="{281CFAFE-56FC-43A9-BB74-764EA455F547}" type="pres">
       <dgm:prSet presAssocID="{950750D0-60DF-4E9F-A820-AFB7EBB48E58}" presName="sibTrans" presStyleCnt="0"/>
@@ -4861,6 +5041,13 @@
         </dgm:presLayoutVars>
       </dgm:prSet>
       <dgm:spPr/>
+      <dgm:t>
+        <a:bodyPr/>
+        <a:lstStyle/>
+        <a:p>
+          <a:endParaRPr lang="en-US"/>
+        </a:p>
+      </dgm:t>
     </dgm:pt>
     <dgm:pt modelId="{2AAE7345-B9D4-4662-AC19-BCF06F8C49FD}" type="pres">
       <dgm:prSet presAssocID="{67594A18-8BF6-496C-A000-0D9DD1029B4F}" presName="ChildText" presStyleLbl="revTx" presStyleIdx="1" presStyleCnt="6">
@@ -4871,6 +5058,13 @@
         </dgm:presLayoutVars>
       </dgm:prSet>
       <dgm:spPr/>
+      <dgm:t>
+        <a:bodyPr/>
+        <a:lstStyle/>
+        <a:p>
+          <a:endParaRPr lang="en-US"/>
+        </a:p>
+      </dgm:t>
     </dgm:pt>
     <dgm:pt modelId="{77FB48DC-542B-47DA-8F3D-07CABFEA80C6}" type="pres">
       <dgm:prSet presAssocID="{84DB37C6-42F4-416A-B64E-7607627251ED}" presName="sibTrans" presStyleCnt="0"/>
@@ -4893,6 +5087,13 @@
         </dgm:presLayoutVars>
       </dgm:prSet>
       <dgm:spPr/>
+      <dgm:t>
+        <a:bodyPr/>
+        <a:lstStyle/>
+        <a:p>
+          <a:endParaRPr lang="en-US"/>
+        </a:p>
+      </dgm:t>
     </dgm:pt>
     <dgm:pt modelId="{1065B556-C4C5-451F-9E11-5643BF244E6D}" type="pres">
       <dgm:prSet presAssocID="{CB4D03F2-A463-483F-B6E9-E0DF88327D26}" presName="ChildText" presStyleLbl="revTx" presStyleIdx="2" presStyleCnt="6">
@@ -4903,6 +5104,13 @@
         </dgm:presLayoutVars>
       </dgm:prSet>
       <dgm:spPr/>
+      <dgm:t>
+        <a:bodyPr/>
+        <a:lstStyle/>
+        <a:p>
+          <a:endParaRPr lang="en-US"/>
+        </a:p>
+      </dgm:t>
     </dgm:pt>
     <dgm:pt modelId="{FE91066B-826B-4E8F-8F89-65D97E96FD3E}" type="pres">
       <dgm:prSet presAssocID="{45EA78CC-ED60-44A4-B35A-4F4D41AD9074}" presName="sibTrans" presStyleCnt="0"/>
@@ -4925,6 +5133,13 @@
         </dgm:presLayoutVars>
       </dgm:prSet>
       <dgm:spPr/>
+      <dgm:t>
+        <a:bodyPr/>
+        <a:lstStyle/>
+        <a:p>
+          <a:endParaRPr lang="en-US"/>
+        </a:p>
+      </dgm:t>
     </dgm:pt>
     <dgm:pt modelId="{87A88EA6-ADD6-41C7-99DF-6D5B6FCF6A5F}" type="pres">
       <dgm:prSet presAssocID="{92513214-5084-4272-9D93-357D7B9D089E}" presName="ChildText" presStyleLbl="revTx" presStyleIdx="3" presStyleCnt="6">
@@ -4957,6 +5172,13 @@
         </dgm:presLayoutVars>
       </dgm:prSet>
       <dgm:spPr/>
+      <dgm:t>
+        <a:bodyPr/>
+        <a:lstStyle/>
+        <a:p>
+          <a:endParaRPr lang="en-US"/>
+        </a:p>
+      </dgm:t>
     </dgm:pt>
     <dgm:pt modelId="{3B7E9670-7370-4317-AD00-E6DF1B3CDE86}" type="pres">
       <dgm:prSet presAssocID="{74F98B7C-30AE-4741-94A0-EDC036253585}" presName="ChildText" presStyleLbl="revTx" presStyleIdx="4" presStyleCnt="6">
@@ -4967,6 +5189,13 @@
         </dgm:presLayoutVars>
       </dgm:prSet>
       <dgm:spPr/>
+      <dgm:t>
+        <a:bodyPr/>
+        <a:lstStyle/>
+        <a:p>
+          <a:endParaRPr lang="en-US"/>
+        </a:p>
+      </dgm:t>
     </dgm:pt>
     <dgm:pt modelId="{B6AE8FF3-C372-4990-A87E-690E0742B0A0}" type="pres">
       <dgm:prSet presAssocID="{86E1F1B4-C851-4BFE-8C51-011F9845B2E8}" presName="sibTrans" presStyleCnt="0"/>
@@ -4989,6 +5218,13 @@
         </dgm:presLayoutVars>
       </dgm:prSet>
       <dgm:spPr/>
+      <dgm:t>
+        <a:bodyPr/>
+        <a:lstStyle/>
+        <a:p>
+          <a:endParaRPr lang="en-US"/>
+        </a:p>
+      </dgm:t>
     </dgm:pt>
     <dgm:pt modelId="{C428768A-2A30-487B-B09F-FE8B44DAB860}" type="pres">
       <dgm:prSet presAssocID="{B4C33871-7DA1-44A1-BE5E-9A939EA109E0}" presName="ChildText" presStyleLbl="revTx" presStyleIdx="5" presStyleCnt="6">
@@ -4999,6 +5235,13 @@
         </dgm:presLayoutVars>
       </dgm:prSet>
       <dgm:spPr/>
+      <dgm:t>
+        <a:bodyPr/>
+        <a:lstStyle/>
+        <a:p>
+          <a:endParaRPr lang="en-US"/>
+        </a:p>
+      </dgm:t>
     </dgm:pt>
     <dgm:pt modelId="{326EB8E6-AE2C-4F27-B35E-7CA6903149B3}" type="pres">
       <dgm:prSet presAssocID="{D37605B2-7AA9-4548-BD9D-1B13587547B0}" presName="sibTrans" presStyleCnt="0"/>
@@ -5017,34 +5260,41 @@
         </dgm:presLayoutVars>
       </dgm:prSet>
       <dgm:spPr/>
+      <dgm:t>
+        <a:bodyPr/>
+        <a:lstStyle/>
+        <a:p>
+          <a:endParaRPr lang="en-US"/>
+        </a:p>
+      </dgm:t>
     </dgm:pt>
   </dgm:ptLst>
   <dgm:cxnLst>
+    <dgm:cxn modelId="{B3447EB8-51B5-4B58-B80D-EC312FB5D208}" type="presOf" srcId="{BEEE7082-E0E7-40EB-A40B-33E6BC64CCC8}" destId="{039BB48C-F966-4AB5-8439-B89E0B0A360C}" srcOrd="0" destOrd="0" presId="urn:microsoft.com/office/officeart/2005/8/layout/StepDownProcess"/>
+    <dgm:cxn modelId="{C9D6D2B8-257D-43B8-8678-F6A0E41E7134}" srcId="{BEEE7082-E0E7-40EB-A40B-33E6BC64CCC8}" destId="{92513214-5084-4272-9D93-357D7B9D089E}" srcOrd="3" destOrd="0" parTransId="{E2896F5A-8AC9-4E9F-88ED-06C2103DC8EB}" sibTransId="{01819F79-1668-4A37-91DE-3BD5691D58FA}"/>
+    <dgm:cxn modelId="{6F8C65A0-1A1B-474C-9CE2-00F61D9DA842}" type="presOf" srcId="{74F98B7C-30AE-4741-94A0-EDC036253585}" destId="{049C392A-3EDC-49F8-A09C-1DAAF2A97E16}" srcOrd="0" destOrd="0" presId="urn:microsoft.com/office/officeart/2005/8/layout/StepDownProcess"/>
+    <dgm:cxn modelId="{8847C9E2-6AED-4B7F-8B49-F6EBD615DED7}" srcId="{CB4D03F2-A463-483F-B6E9-E0DF88327D26}" destId="{9EE104D1-5DA8-49BF-B7BC-C172B136828F}" srcOrd="0" destOrd="0" parTransId="{C0052ED8-D696-4E7A-BA2D-2CE3DFFE55EA}" sibTransId="{02B471FA-85AB-4CDC-BA43-6E43C34E3FC3}"/>
+    <dgm:cxn modelId="{22CC8098-0925-42CD-9C1D-24887F6D8C85}" srcId="{BEEE7082-E0E7-40EB-A40B-33E6BC64CCC8}" destId="{B4C33871-7DA1-44A1-BE5E-9A939EA109E0}" srcOrd="5" destOrd="0" parTransId="{19FBC463-9349-4F98-911F-EF6F975460F0}" sibTransId="{D37605B2-7AA9-4548-BD9D-1B13587547B0}"/>
+    <dgm:cxn modelId="{0FDEE153-56F9-4E6A-BA60-75A1CF5668E7}" srcId="{67594A18-8BF6-496C-A000-0D9DD1029B4F}" destId="{20A68923-1C47-4CC6-A19F-58CD6B9A8FB1}" srcOrd="0" destOrd="0" parTransId="{436202B4-BB46-4799-8079-780489874E72}" sibTransId="{498DD8B1-DA82-468B-8905-BA9E617BE3B5}"/>
+    <dgm:cxn modelId="{4141A36B-3CEF-4F27-B76B-60A5EB50843E}" srcId="{EC62BD84-3ADA-4D62-A238-5C25F36574A7}" destId="{6F0B59D3-5BB7-480F-A125-289A3626EC6A}" srcOrd="0" destOrd="0" parTransId="{5CED9AA4-78BF-410A-8110-879A5671AFEA}" sibTransId="{E4DFCDFB-CC6D-412D-B9CC-65AFB735C5F8}"/>
+    <dgm:cxn modelId="{310A1EF9-F197-405E-8369-7BE4F64F5A7C}" srcId="{B4C33871-7DA1-44A1-BE5E-9A939EA109E0}" destId="{BF109C1A-D6D2-4A9D-BDE6-C66F4C4884E5}" srcOrd="0" destOrd="0" parTransId="{56C68A0C-AEF5-4BF6-BA1D-544D8918025D}" sibTransId="{FA105F86-8CCD-48E1-AB0A-3B4E4CBFC30C}"/>
+    <dgm:cxn modelId="{68324F57-17F6-4C65-8BE6-9D310FB85F9B}" srcId="{BEEE7082-E0E7-40EB-A40B-33E6BC64CCC8}" destId="{CB4D03F2-A463-483F-B6E9-E0DF88327D26}" srcOrd="2" destOrd="0" parTransId="{748FBDB0-DFBF-4C9C-8486-DB0FE0ED7631}" sibTransId="{45EA78CC-ED60-44A4-B35A-4F4D41AD9074}"/>
+    <dgm:cxn modelId="{391691CA-7162-4A61-B0EC-682A4B213FEB}" type="presOf" srcId="{20A68923-1C47-4CC6-A19F-58CD6B9A8FB1}" destId="{2AAE7345-B9D4-4662-AC19-BCF06F8C49FD}" srcOrd="0" destOrd="0" presId="urn:microsoft.com/office/officeart/2005/8/layout/StepDownProcess"/>
     <dgm:cxn modelId="{68BB09CE-FF81-410D-A3A1-0BB887ADA665}" srcId="{BEEE7082-E0E7-40EB-A40B-33E6BC64CCC8}" destId="{74F98B7C-30AE-4741-94A0-EDC036253585}" srcOrd="4" destOrd="0" parTransId="{01CE2219-8A66-461E-ADF3-A1505FD2746B}" sibTransId="{86E1F1B4-C851-4BFE-8C51-011F9845B2E8}"/>
-    <dgm:cxn modelId="{310A1EF9-F197-405E-8369-7BE4F64F5A7C}" srcId="{B4C33871-7DA1-44A1-BE5E-9A939EA109E0}" destId="{BF109C1A-D6D2-4A9D-BDE6-C66F4C4884E5}" srcOrd="0" destOrd="0" parTransId="{56C68A0C-AEF5-4BF6-BA1D-544D8918025D}" sibTransId="{FA105F86-8CCD-48E1-AB0A-3B4E4CBFC30C}"/>
-    <dgm:cxn modelId="{0FDEE153-56F9-4E6A-BA60-75A1CF5668E7}" srcId="{67594A18-8BF6-496C-A000-0D9DD1029B4F}" destId="{20A68923-1C47-4CC6-A19F-58CD6B9A8FB1}" srcOrd="0" destOrd="0" parTransId="{436202B4-BB46-4799-8079-780489874E72}" sibTransId="{498DD8B1-DA82-468B-8905-BA9E617BE3B5}"/>
+    <dgm:cxn modelId="{CF12E151-27F0-47A7-8845-04C2E9A9B2E7}" type="presOf" srcId="{6F0B59D3-5BB7-480F-A125-289A3626EC6A}" destId="{2B70D009-F13D-44C0-A7BC-54C205FE77FB}" srcOrd="0" destOrd="0" presId="urn:microsoft.com/office/officeart/2005/8/layout/StepDownProcess"/>
+    <dgm:cxn modelId="{0D463458-6C80-4B28-9E7D-92D5E0BA1577}" type="presOf" srcId="{67594A18-8BF6-496C-A000-0D9DD1029B4F}" destId="{D0281AEB-9781-4CF5-A68B-140193D8FB11}" srcOrd="0" destOrd="0" presId="urn:microsoft.com/office/officeart/2005/8/layout/StepDownProcess"/>
+    <dgm:cxn modelId="{50DC6956-8F37-47C6-B9A8-95B2B6755809}" type="presOf" srcId="{B4C33871-7DA1-44A1-BE5E-9A939EA109E0}" destId="{0491FAC1-CACD-4454-93EB-D9DDC44CF63F}" srcOrd="0" destOrd="0" presId="urn:microsoft.com/office/officeart/2005/8/layout/StepDownProcess"/>
+    <dgm:cxn modelId="{C25BD6B6-8260-4605-916A-3E4E176A9B6B}" type="presOf" srcId="{4A4A4B22-2473-41AC-AC6B-02DF09448837}" destId="{3B7E9670-7370-4317-AD00-E6DF1B3CDE86}" srcOrd="0" destOrd="0" presId="urn:microsoft.com/office/officeart/2005/8/layout/StepDownProcess"/>
+    <dgm:cxn modelId="{4471234C-0321-410C-924A-291C497D2A75}" type="presOf" srcId="{2EE1CE90-E28E-4EF8-A0B4-7814672DAF61}" destId="{E809E57C-A1B9-423E-A763-0C6C0464958C}" srcOrd="0" destOrd="0" presId="urn:microsoft.com/office/officeart/2005/8/layout/StepDownProcess"/>
+    <dgm:cxn modelId="{45311948-ECF7-4ADE-BDB0-F3799E3A4807}" srcId="{BEEE7082-E0E7-40EB-A40B-33E6BC64CCC8}" destId="{EC62BD84-3ADA-4D62-A238-5C25F36574A7}" srcOrd="0" destOrd="0" parTransId="{A0C4FF4B-F472-439F-9DBC-2921C156DAF5}" sibTransId="{950750D0-60DF-4E9F-A820-AFB7EBB48E58}"/>
     <dgm:cxn modelId="{31F42AD0-1F6B-43D0-A992-54F09FD0DB93}" type="presOf" srcId="{9EE104D1-5DA8-49BF-B7BC-C172B136828F}" destId="{1065B556-C4C5-451F-9E11-5643BF244E6D}" srcOrd="0" destOrd="0" presId="urn:microsoft.com/office/officeart/2005/8/layout/StepDownProcess"/>
-    <dgm:cxn modelId="{4141A36B-3CEF-4F27-B76B-60A5EB50843E}" srcId="{EC62BD84-3ADA-4D62-A238-5C25F36574A7}" destId="{6F0B59D3-5BB7-480F-A125-289A3626EC6A}" srcOrd="0" destOrd="0" parTransId="{5CED9AA4-78BF-410A-8110-879A5671AFEA}" sibTransId="{E4DFCDFB-CC6D-412D-B9CC-65AFB735C5F8}"/>
-    <dgm:cxn modelId="{4471234C-0321-410C-924A-291C497D2A75}" type="presOf" srcId="{2EE1CE90-E28E-4EF8-A0B4-7814672DAF61}" destId="{E809E57C-A1B9-423E-A763-0C6C0464958C}" srcOrd="0" destOrd="0" presId="urn:microsoft.com/office/officeart/2005/8/layout/StepDownProcess"/>
-    <dgm:cxn modelId="{8847C9E2-6AED-4B7F-8B49-F6EBD615DED7}" srcId="{CB4D03F2-A463-483F-B6E9-E0DF88327D26}" destId="{9EE104D1-5DA8-49BF-B7BC-C172B136828F}" srcOrd="0" destOrd="0" parTransId="{C0052ED8-D696-4E7A-BA2D-2CE3DFFE55EA}" sibTransId="{02B471FA-85AB-4CDC-BA43-6E43C34E3FC3}"/>
+    <dgm:cxn modelId="{4ACA1434-5613-4559-A527-5FF131A7A715}" srcId="{74F98B7C-30AE-4741-94A0-EDC036253585}" destId="{4A4A4B22-2473-41AC-AC6B-02DF09448837}" srcOrd="0" destOrd="0" parTransId="{E2E687BD-6AB7-4903-B22F-D79E4C2F0694}" sibTransId="{4F4FB59D-1B17-4854-B926-F1AFC86A7723}"/>
+    <dgm:cxn modelId="{148A0C63-E93E-4B15-9ABA-D575D138BB72}" type="presOf" srcId="{92513214-5084-4272-9D93-357D7B9D089E}" destId="{B40BB39A-B64D-459C-A098-A4DF6294FF45}" srcOrd="0" destOrd="0" presId="urn:microsoft.com/office/officeart/2005/8/layout/StepDownProcess"/>
+    <dgm:cxn modelId="{43E349EC-368F-446B-A7C1-57C7E0D5C91B}" srcId="{BEEE7082-E0E7-40EB-A40B-33E6BC64CCC8}" destId="{67594A18-8BF6-496C-A000-0D9DD1029B4F}" srcOrd="1" destOrd="0" parTransId="{FEEDBEA9-2BB5-4AD6-BDFF-84995CADACAC}" sibTransId="{84DB37C6-42F4-416A-B64E-7607627251ED}"/>
     <dgm:cxn modelId="{26BEE479-F230-426E-A034-0D052EC45416}" type="presOf" srcId="{CB4D03F2-A463-483F-B6E9-E0DF88327D26}" destId="{7B248748-EE7B-40BE-A4A3-9E8C356278DD}" srcOrd="0" destOrd="0" presId="urn:microsoft.com/office/officeart/2005/8/layout/StepDownProcess"/>
-    <dgm:cxn modelId="{0D463458-6C80-4B28-9E7D-92D5E0BA1577}" type="presOf" srcId="{67594A18-8BF6-496C-A000-0D9DD1029B4F}" destId="{D0281AEB-9781-4CF5-A68B-140193D8FB11}" srcOrd="0" destOrd="0" presId="urn:microsoft.com/office/officeart/2005/8/layout/StepDownProcess"/>
-    <dgm:cxn modelId="{45311948-ECF7-4ADE-BDB0-F3799E3A4807}" srcId="{BEEE7082-E0E7-40EB-A40B-33E6BC64CCC8}" destId="{EC62BD84-3ADA-4D62-A238-5C25F36574A7}" srcOrd="0" destOrd="0" parTransId="{A0C4FF4B-F472-439F-9DBC-2921C156DAF5}" sibTransId="{950750D0-60DF-4E9F-A820-AFB7EBB48E58}"/>
-    <dgm:cxn modelId="{C25BD6B6-8260-4605-916A-3E4E176A9B6B}" type="presOf" srcId="{4A4A4B22-2473-41AC-AC6B-02DF09448837}" destId="{3B7E9670-7370-4317-AD00-E6DF1B3CDE86}" srcOrd="0" destOrd="0" presId="urn:microsoft.com/office/officeart/2005/8/layout/StepDownProcess"/>
-    <dgm:cxn modelId="{43E349EC-368F-446B-A7C1-57C7E0D5C91B}" srcId="{BEEE7082-E0E7-40EB-A40B-33E6BC64CCC8}" destId="{67594A18-8BF6-496C-A000-0D9DD1029B4F}" srcOrd="1" destOrd="0" parTransId="{FEEDBEA9-2BB5-4AD6-BDFF-84995CADACAC}" sibTransId="{84DB37C6-42F4-416A-B64E-7607627251ED}"/>
-    <dgm:cxn modelId="{22CC8098-0925-42CD-9C1D-24887F6D8C85}" srcId="{BEEE7082-E0E7-40EB-A40B-33E6BC64CCC8}" destId="{B4C33871-7DA1-44A1-BE5E-9A939EA109E0}" srcOrd="5" destOrd="0" parTransId="{19FBC463-9349-4F98-911F-EF6F975460F0}" sibTransId="{D37605B2-7AA9-4548-BD9D-1B13587547B0}"/>
+    <dgm:cxn modelId="{46E31681-64D7-436A-A2E9-CAC1CAEA7921}" type="presOf" srcId="{EC62BD84-3ADA-4D62-A238-5C25F36574A7}" destId="{B3D5E33F-A884-4A6B-BA8B-AC7F2E2F3CD9}" srcOrd="0" destOrd="0" presId="urn:microsoft.com/office/officeart/2005/8/layout/StepDownProcess"/>
+    <dgm:cxn modelId="{7A875975-7333-48C4-AA6B-0DB62D763095}" type="presOf" srcId="{BF109C1A-D6D2-4A9D-BDE6-C66F4C4884E5}" destId="{C428768A-2A30-487B-B09F-FE8B44DAB860}" srcOrd="0" destOrd="0" presId="urn:microsoft.com/office/officeart/2005/8/layout/StepDownProcess"/>
     <dgm:cxn modelId="{FC267412-9A2D-4CAE-8519-23FC942C39BA}" srcId="{BEEE7082-E0E7-40EB-A40B-33E6BC64CCC8}" destId="{2EE1CE90-E28E-4EF8-A0B4-7814672DAF61}" srcOrd="6" destOrd="0" parTransId="{68A56683-A6EE-4422-816F-CF2AB43BE4B0}" sibTransId="{9A0C1107-39F3-4C78-89AA-C14D06FA0482}"/>
-    <dgm:cxn modelId="{C9D6D2B8-257D-43B8-8678-F6A0E41E7134}" srcId="{BEEE7082-E0E7-40EB-A40B-33E6BC64CCC8}" destId="{92513214-5084-4272-9D93-357D7B9D089E}" srcOrd="3" destOrd="0" parTransId="{E2896F5A-8AC9-4E9F-88ED-06C2103DC8EB}" sibTransId="{01819F79-1668-4A37-91DE-3BD5691D58FA}"/>
-    <dgm:cxn modelId="{7A875975-7333-48C4-AA6B-0DB62D763095}" type="presOf" srcId="{BF109C1A-D6D2-4A9D-BDE6-C66F4C4884E5}" destId="{C428768A-2A30-487B-B09F-FE8B44DAB860}" srcOrd="0" destOrd="0" presId="urn:microsoft.com/office/officeart/2005/8/layout/StepDownProcess"/>
-    <dgm:cxn modelId="{6F8C65A0-1A1B-474C-9CE2-00F61D9DA842}" type="presOf" srcId="{74F98B7C-30AE-4741-94A0-EDC036253585}" destId="{049C392A-3EDC-49F8-A09C-1DAAF2A97E16}" srcOrd="0" destOrd="0" presId="urn:microsoft.com/office/officeart/2005/8/layout/StepDownProcess"/>
-    <dgm:cxn modelId="{B3447EB8-51B5-4B58-B80D-EC312FB5D208}" type="presOf" srcId="{BEEE7082-E0E7-40EB-A40B-33E6BC64CCC8}" destId="{039BB48C-F966-4AB5-8439-B89E0B0A360C}" srcOrd="0" destOrd="0" presId="urn:microsoft.com/office/officeart/2005/8/layout/StepDownProcess"/>
-    <dgm:cxn modelId="{50DC6956-8F37-47C6-B9A8-95B2B6755809}" type="presOf" srcId="{B4C33871-7DA1-44A1-BE5E-9A939EA109E0}" destId="{0491FAC1-CACD-4454-93EB-D9DDC44CF63F}" srcOrd="0" destOrd="0" presId="urn:microsoft.com/office/officeart/2005/8/layout/StepDownProcess"/>
-    <dgm:cxn modelId="{68324F57-17F6-4C65-8BE6-9D310FB85F9B}" srcId="{BEEE7082-E0E7-40EB-A40B-33E6BC64CCC8}" destId="{CB4D03F2-A463-483F-B6E9-E0DF88327D26}" srcOrd="2" destOrd="0" parTransId="{748FBDB0-DFBF-4C9C-8486-DB0FE0ED7631}" sibTransId="{45EA78CC-ED60-44A4-B35A-4F4D41AD9074}"/>
-    <dgm:cxn modelId="{148A0C63-E93E-4B15-9ABA-D575D138BB72}" type="presOf" srcId="{92513214-5084-4272-9D93-357D7B9D089E}" destId="{B40BB39A-B64D-459C-A098-A4DF6294FF45}" srcOrd="0" destOrd="0" presId="urn:microsoft.com/office/officeart/2005/8/layout/StepDownProcess"/>
-    <dgm:cxn modelId="{391691CA-7162-4A61-B0EC-682A4B213FEB}" type="presOf" srcId="{20A68923-1C47-4CC6-A19F-58CD6B9A8FB1}" destId="{2AAE7345-B9D4-4662-AC19-BCF06F8C49FD}" srcOrd="0" destOrd="0" presId="urn:microsoft.com/office/officeart/2005/8/layout/StepDownProcess"/>
-    <dgm:cxn modelId="{4ACA1434-5613-4559-A527-5FF131A7A715}" srcId="{74F98B7C-30AE-4741-94A0-EDC036253585}" destId="{4A4A4B22-2473-41AC-AC6B-02DF09448837}" srcOrd="0" destOrd="0" parTransId="{E2E687BD-6AB7-4903-B22F-D79E4C2F0694}" sibTransId="{4F4FB59D-1B17-4854-B926-F1AFC86A7723}"/>
-    <dgm:cxn modelId="{CF12E151-27F0-47A7-8845-04C2E9A9B2E7}" type="presOf" srcId="{6F0B59D3-5BB7-480F-A125-289A3626EC6A}" destId="{2B70D009-F13D-44C0-A7BC-54C205FE77FB}" srcOrd="0" destOrd="0" presId="urn:microsoft.com/office/officeart/2005/8/layout/StepDownProcess"/>
-    <dgm:cxn modelId="{46E31681-64D7-436A-A2E9-CAC1CAEA7921}" type="presOf" srcId="{EC62BD84-3ADA-4D62-A238-5C25F36574A7}" destId="{B3D5E33F-A884-4A6B-BA8B-AC7F2E2F3CD9}" srcOrd="0" destOrd="0" presId="urn:microsoft.com/office/officeart/2005/8/layout/StepDownProcess"/>
     <dgm:cxn modelId="{8C5E9E96-61C5-447D-A9EF-067B8155BCC5}" type="presParOf" srcId="{039BB48C-F966-4AB5-8439-B89E0B0A360C}" destId="{AB8C601B-4365-4E3A-9CA6-9D06E9BCDD70}" srcOrd="0" destOrd="0" presId="urn:microsoft.com/office/officeart/2005/8/layout/StepDownProcess"/>
     <dgm:cxn modelId="{183A1C15-1DF0-4883-9696-BADF592B1614}" type="presParOf" srcId="{AB8C601B-4365-4E3A-9CA6-9D06E9BCDD70}" destId="{695C06EB-3839-4851-AAE1-21648D935AE8}" srcOrd="0" destOrd="0" presId="urn:microsoft.com/office/officeart/2005/8/layout/StepDownProcess"/>
     <dgm:cxn modelId="{B6BCC5BE-DE91-43A0-A0B3-988900E02EA4}" type="presParOf" srcId="{AB8C601B-4365-4E3A-9CA6-9D06E9BCDD70}" destId="{B3D5E33F-A884-4A6B-BA8B-AC7F2E2F3CD9}" srcOrd="1" destOrd="0" presId="urn:microsoft.com/office/officeart/2005/8/layout/StepDownProcess"/>
@@ -5153,7 +5403,7 @@
         </a:bodyPr>
         <a:lstStyle/>
         <a:p>
-          <a:pPr marL="0" lvl="0" indent="0" algn="l" defTabSz="889000">
+          <a:pPr lvl="0" algn="l" defTabSz="889000">
             <a:lnSpc>
               <a:spcPct val="90000"/>
             </a:lnSpc>
@@ -5163,7 +5413,6 @@
             <a:spcAft>
               <a:spcPct val="35000"/>
             </a:spcAft>
-            <a:buNone/>
           </a:pPr>
           <a:r>
             <a:rPr lang="es-ES" sz="2000" kern="1200" dirty="0"/>
@@ -5182,7 +5431,7 @@
             <a:spcAft>
               <a:spcPct val="15000"/>
             </a:spcAft>
-            <a:buChar char="•"/>
+            <a:buChar char="••"/>
           </a:pPr>
           <a:r>
             <a:rPr lang="es-ES" sz="1600" kern="1200" dirty="0"/>
@@ -5201,7 +5450,7 @@
             <a:spcAft>
               <a:spcPct val="15000"/>
             </a:spcAft>
-            <a:buChar char="•"/>
+            <a:buChar char="••"/>
           </a:pPr>
           <a:r>
             <a:rPr lang="es-ES" sz="1600" kern="1200" dirty="0"/>
@@ -5236,7 +5485,7 @@
             <a:spcAft>
               <a:spcPct val="15000"/>
             </a:spcAft>
-            <a:buChar char="•"/>
+            <a:buChar char="••"/>
           </a:pPr>
           <a:r>
             <a:rPr lang="en-US" sz="1600" b="0" i="0" kern="1200" dirty="0"/>
@@ -5249,6 +5498,10 @@
           <a:r>
             <a:rPr lang="en-US" sz="1600" b="0" i="0" kern="1200" dirty="0"/>
             <a:t> 259909</a:t>
+          </a:r>
+          <a:r>
+            <a:rPr lang="en-US" sz="1600" kern="1200" dirty="0"/>
+            <a:t/>
           </a:r>
           <a:br>
             <a:rPr lang="en-US" sz="1600" kern="1200" dirty="0"/>
@@ -5311,7 +5564,7 @@
         </a:bodyPr>
         <a:lstStyle/>
         <a:p>
-          <a:pPr marL="0" lvl="0" indent="0" algn="ctr" defTabSz="711200">
+          <a:pPr lvl="0" algn="ctr" defTabSz="711200">
             <a:lnSpc>
               <a:spcPct val="90000"/>
             </a:lnSpc>
@@ -5321,7 +5574,6 @@
             <a:spcAft>
               <a:spcPct val="35000"/>
             </a:spcAft>
-            <a:buNone/>
           </a:pPr>
           <a:endParaRPr lang="en-US" sz="1600" kern="1200"/>
         </a:p>
@@ -5388,7 +5640,7 @@
         </a:bodyPr>
         <a:lstStyle/>
         <a:p>
-          <a:pPr marL="0" lvl="0" indent="0" algn="l" defTabSz="889000">
+          <a:pPr lvl="0" algn="l" defTabSz="889000">
             <a:lnSpc>
               <a:spcPct val="90000"/>
             </a:lnSpc>
@@ -5398,7 +5650,6 @@
             <a:spcAft>
               <a:spcPct val="35000"/>
             </a:spcAft>
-            <a:buNone/>
           </a:pPr>
           <a:r>
             <a:rPr lang="es-ES" sz="2000" i="1" kern="1200" dirty="0"/>
@@ -5433,7 +5684,7 @@
             <a:spcAft>
               <a:spcPct val="15000"/>
             </a:spcAft>
-            <a:buChar char="•"/>
+            <a:buChar char="••"/>
           </a:pPr>
           <a:r>
             <a:rPr lang="es-ES" sz="1600" kern="1200" dirty="0" err="1"/>
@@ -5456,7 +5707,7 @@
             <a:spcAft>
               <a:spcPct val="15000"/>
             </a:spcAft>
-            <a:buChar char="•"/>
+            <a:buChar char="••"/>
           </a:pPr>
           <a:r>
             <a:rPr lang="es-ES" sz="1600" kern="1200" dirty="0" err="1"/>
@@ -5475,7 +5726,7 @@
             <a:spcAft>
               <a:spcPct val="15000"/>
             </a:spcAft>
-            <a:buChar char="•"/>
+            <a:buChar char="••"/>
           </a:pPr>
           <a:r>
             <a:rPr lang="es-ES" sz="1600" kern="1200" dirty="0" err="1"/>
@@ -5502,7 +5753,7 @@
             <a:spcAft>
               <a:spcPct val="15000"/>
             </a:spcAft>
-            <a:buChar char="•"/>
+            <a:buChar char="••"/>
           </a:pPr>
           <a:r>
             <a:rPr lang="es-ES" sz="1600" kern="1200" dirty="0" err="1"/>
@@ -5535,7 +5786,7 @@
         <a:solidFill>
           <a:schemeClr val="accent1">
             <a:shade val="90000"/>
-            <a:hueOff val="-31026"/>
+            <a:hueOff val="-31025"/>
             <a:satOff val="-361"/>
             <a:lumOff val="17617"/>
             <a:alphaOff val="0"/>
@@ -5566,7 +5817,7 @@
         </a:bodyPr>
         <a:lstStyle/>
         <a:p>
-          <a:pPr marL="0" lvl="0" indent="0" algn="ctr" defTabSz="711200">
+          <a:pPr lvl="0" algn="ctr" defTabSz="711200">
             <a:lnSpc>
               <a:spcPct val="90000"/>
             </a:lnSpc>
@@ -5576,7 +5827,6 @@
             <a:spcAft>
               <a:spcPct val="35000"/>
             </a:spcAft>
-            <a:buNone/>
           </a:pPr>
           <a:endParaRPr lang="en-US" sz="1600" kern="1200"/>
         </a:p>
@@ -5643,7 +5893,7 @@
         </a:bodyPr>
         <a:lstStyle/>
         <a:p>
-          <a:pPr marL="0" lvl="0" indent="0" algn="l" defTabSz="889000">
+          <a:pPr lvl="0" algn="l" defTabSz="889000">
             <a:lnSpc>
               <a:spcPct val="90000"/>
             </a:lnSpc>
@@ -5653,7 +5903,6 @@
             <a:spcAft>
               <a:spcPct val="35000"/>
             </a:spcAft>
-            <a:buNone/>
           </a:pPr>
           <a:r>
             <a:rPr lang="es-ES" sz="2000" kern="1200" dirty="0" err="1"/>
@@ -5688,7 +5937,7 @@
             <a:spcAft>
               <a:spcPct val="15000"/>
             </a:spcAft>
-            <a:buChar char="•"/>
+            <a:buChar char="••"/>
           </a:pPr>
           <a:r>
             <a:rPr lang="es-ES" sz="1600" kern="1200" dirty="0" err="1"/>
@@ -5707,7 +5956,7 @@
             <a:spcAft>
               <a:spcPct val="15000"/>
             </a:spcAft>
-            <a:buChar char="•"/>
+            <a:buChar char="••"/>
           </a:pPr>
           <a:r>
             <a:rPr lang="es-ES" sz="1600" kern="1200" dirty="0" err="1"/>
@@ -5742,7 +5991,7 @@
             <a:spcAft>
               <a:spcPct val="15000"/>
             </a:spcAft>
-            <a:buChar char="•"/>
+            <a:buChar char="••"/>
           </a:pPr>
           <a:r>
             <a:rPr lang="es-ES" sz="1600" kern="1200" dirty="0" err="1"/>
@@ -5848,7 +6097,7 @@
         </a:bodyPr>
         <a:lstStyle/>
         <a:p>
-          <a:pPr marL="0" lvl="0" indent="0" algn="ctr" defTabSz="1644650">
+          <a:pPr lvl="0" algn="ctr" defTabSz="1644650">
             <a:lnSpc>
               <a:spcPct val="90000"/>
             </a:lnSpc>
@@ -5858,7 +6107,6 @@
             <a:spcAft>
               <a:spcPct val="35000"/>
             </a:spcAft>
-            <a:buNone/>
           </a:pPr>
           <a:r>
             <a:rPr lang="en-US" sz="3700" kern="1200" dirty="0"/>
@@ -5921,7 +6169,7 @@
         </a:bodyPr>
         <a:lstStyle/>
         <a:p>
-          <a:pPr marL="0" lvl="0" indent="0" algn="ctr" defTabSz="1333500">
+          <a:pPr lvl="0" algn="ctr" defTabSz="1333500">
             <a:lnSpc>
               <a:spcPct val="90000"/>
             </a:lnSpc>
@@ -5931,7 +6179,6 @@
             <a:spcAft>
               <a:spcPct val="35000"/>
             </a:spcAft>
-            <a:buNone/>
           </a:pPr>
           <a:endParaRPr lang="en-US" sz="3000" kern="1200"/>
         </a:p>
@@ -5997,7 +6244,7 @@
         </a:bodyPr>
         <a:lstStyle/>
         <a:p>
-          <a:pPr marL="0" lvl="0" indent="0" algn="ctr" defTabSz="1644650">
+          <a:pPr lvl="0" algn="ctr" defTabSz="1644650">
             <a:lnSpc>
               <a:spcPct val="90000"/>
             </a:lnSpc>
@@ -6007,7 +6254,6 @@
             <a:spcAft>
               <a:spcPct val="35000"/>
             </a:spcAft>
-            <a:buNone/>
           </a:pPr>
           <a:r>
             <a:rPr lang="en-US" sz="3700" kern="1200" dirty="0"/>
@@ -6088,7 +6334,7 @@
         </a:bodyPr>
         <a:lstStyle/>
         <a:p>
-          <a:pPr marL="0" lvl="0" indent="0" algn="ctr" defTabSz="889000">
+          <a:pPr lvl="0" algn="ctr" defTabSz="889000">
             <a:lnSpc>
               <a:spcPct val="90000"/>
             </a:lnSpc>
@@ -6098,7 +6344,6 @@
             <a:spcAft>
               <a:spcPct val="35000"/>
             </a:spcAft>
-            <a:buNone/>
           </a:pPr>
           <a:r>
             <a:rPr lang="en-US" sz="2000" kern="1200" noProof="0" dirty="0"/>
@@ -6161,7 +6406,7 @@
         </a:bodyPr>
         <a:lstStyle/>
         <a:p>
-          <a:pPr marL="0" lvl="0" indent="0" algn="ctr" defTabSz="889000">
+          <a:pPr lvl="0" algn="ctr" defTabSz="889000">
             <a:lnSpc>
               <a:spcPct val="90000"/>
             </a:lnSpc>
@@ -6171,7 +6416,6 @@
             <a:spcAft>
               <a:spcPct val="35000"/>
             </a:spcAft>
-            <a:buNone/>
           </a:pPr>
           <a:endParaRPr lang="en-US" sz="2000" kern="1200" dirty="0"/>
         </a:p>
@@ -6237,7 +6481,7 @@
         </a:bodyPr>
         <a:lstStyle/>
         <a:p>
-          <a:pPr marL="0" lvl="0" indent="0" algn="ctr" defTabSz="889000">
+          <a:pPr lvl="0" algn="ctr" defTabSz="889000">
             <a:lnSpc>
               <a:spcPct val="90000"/>
             </a:lnSpc>
@@ -6247,7 +6491,6 @@
             <a:spcAft>
               <a:spcPct val="35000"/>
             </a:spcAft>
-            <a:buNone/>
           </a:pPr>
           <a:r>
             <a:rPr lang="en-US" sz="2000" kern="1200" noProof="0" dirty="0"/>
@@ -6310,7 +6553,7 @@
         </a:bodyPr>
         <a:lstStyle/>
         <a:p>
-          <a:pPr marL="0" lvl="0" indent="0" algn="ctr" defTabSz="889000">
+          <a:pPr lvl="0" algn="ctr" defTabSz="889000">
             <a:lnSpc>
               <a:spcPct val="90000"/>
             </a:lnSpc>
@@ -6320,7 +6563,6 @@
             <a:spcAft>
               <a:spcPct val="35000"/>
             </a:spcAft>
-            <a:buNone/>
           </a:pPr>
           <a:endParaRPr lang="en-US" sz="2000" kern="1200" dirty="0"/>
         </a:p>
@@ -6386,7 +6628,7 @@
         </a:bodyPr>
         <a:lstStyle/>
         <a:p>
-          <a:pPr marL="0" lvl="0" indent="0" algn="ctr" defTabSz="889000">
+          <a:pPr lvl="0" algn="ctr" defTabSz="889000">
             <a:lnSpc>
               <a:spcPct val="90000"/>
             </a:lnSpc>
@@ -6396,7 +6638,6 @@
             <a:spcAft>
               <a:spcPct val="35000"/>
             </a:spcAft>
-            <a:buNone/>
           </a:pPr>
           <a:r>
             <a:rPr lang="en-US" sz="2000" kern="1200" noProof="0" dirty="0"/>
@@ -6459,7 +6700,7 @@
         </a:bodyPr>
         <a:lstStyle/>
         <a:p>
-          <a:pPr marL="0" lvl="0" indent="0" algn="ctr" defTabSz="889000">
+          <a:pPr lvl="0" algn="ctr" defTabSz="889000">
             <a:lnSpc>
               <a:spcPct val="90000"/>
             </a:lnSpc>
@@ -6469,7 +6710,6 @@
             <a:spcAft>
               <a:spcPct val="35000"/>
             </a:spcAft>
-            <a:buNone/>
           </a:pPr>
           <a:endParaRPr lang="en-US" sz="2000" kern="1200" dirty="0"/>
         </a:p>
@@ -6535,7 +6775,7 @@
         </a:bodyPr>
         <a:lstStyle/>
         <a:p>
-          <a:pPr marL="0" lvl="0" indent="0" algn="ctr" defTabSz="889000">
+          <a:pPr lvl="0" algn="ctr" defTabSz="889000">
             <a:lnSpc>
               <a:spcPct val="90000"/>
             </a:lnSpc>
@@ -6545,7 +6785,6 @@
             <a:spcAft>
               <a:spcPct val="35000"/>
             </a:spcAft>
-            <a:buNone/>
           </a:pPr>
           <a:r>
             <a:rPr lang="en-US" sz="2000" kern="1200" noProof="0" dirty="0"/>
@@ -6686,7 +6925,7 @@
         </a:bodyPr>
         <a:lstStyle/>
         <a:p>
-          <a:pPr marL="0" lvl="0" indent="0" algn="ctr" defTabSz="488950">
+          <a:pPr lvl="0" algn="ctr" defTabSz="488950">
             <a:lnSpc>
               <a:spcPct val="90000"/>
             </a:lnSpc>
@@ -6696,7 +6935,6 @@
             <a:spcAft>
               <a:spcPct val="35000"/>
             </a:spcAft>
-            <a:buNone/>
           </a:pPr>
           <a:r>
             <a:rPr lang="en-US" sz="1100" kern="1200" dirty="0"/>
@@ -6756,7 +6994,7 @@
             <a:spcAft>
               <a:spcPct val="15000"/>
             </a:spcAft>
-            <a:buChar char="•"/>
+            <a:buChar char="••"/>
           </a:pPr>
           <a:r>
             <a:rPr lang="en-US" sz="800" kern="1200" dirty="0" err="1"/>
@@ -6878,7 +7116,7 @@
         </a:bodyPr>
         <a:lstStyle/>
         <a:p>
-          <a:pPr marL="0" lvl="0" indent="0" algn="ctr" defTabSz="488950">
+          <a:pPr lvl="0" algn="ctr" defTabSz="488950">
             <a:lnSpc>
               <a:spcPct val="90000"/>
             </a:lnSpc>
@@ -6888,7 +7126,6 @@
             <a:spcAft>
               <a:spcPct val="35000"/>
             </a:spcAft>
-            <a:buNone/>
           </a:pPr>
           <a:r>
             <a:rPr lang="en-US" sz="1100" kern="1200" dirty="0"/>
@@ -6948,7 +7185,7 @@
             <a:spcAft>
               <a:spcPct val="15000"/>
             </a:spcAft>
-            <a:buChar char="•"/>
+            <a:buChar char="••"/>
           </a:pPr>
           <a:endParaRPr lang="en-US" sz="800" kern="1200" dirty="0"/>
         </a:p>
@@ -7066,7 +7303,7 @@
         </a:bodyPr>
         <a:lstStyle/>
         <a:p>
-          <a:pPr marL="0" lvl="0" indent="0" algn="ctr" defTabSz="488950">
+          <a:pPr lvl="0" algn="ctr" defTabSz="488950">
             <a:lnSpc>
               <a:spcPct val="90000"/>
             </a:lnSpc>
@@ -7076,7 +7313,6 @@
             <a:spcAft>
               <a:spcPct val="35000"/>
             </a:spcAft>
-            <a:buNone/>
           </a:pPr>
           <a:r>
             <a:rPr lang="en-US" sz="1100" kern="1200" dirty="0"/>
@@ -7136,7 +7372,7 @@
             <a:spcAft>
               <a:spcPct val="15000"/>
             </a:spcAft>
-            <a:buChar char="•"/>
+            <a:buChar char="••"/>
           </a:pPr>
           <a:r>
             <a:rPr lang="en-US" sz="800" kern="1200" dirty="0"/>
@@ -7257,7 +7493,7 @@
         </a:bodyPr>
         <a:lstStyle/>
         <a:p>
-          <a:pPr marL="0" lvl="0" indent="0" algn="ctr" defTabSz="488950">
+          <a:pPr lvl="0" algn="ctr" defTabSz="488950">
             <a:lnSpc>
               <a:spcPct val="90000"/>
             </a:lnSpc>
@@ -7267,7 +7503,6 @@
             <a:spcAft>
               <a:spcPct val="35000"/>
             </a:spcAft>
-            <a:buNone/>
           </a:pPr>
           <a:r>
             <a:rPr lang="en-US" sz="1100" kern="1200" dirty="0"/>
@@ -7420,7 +7655,7 @@
         </a:bodyPr>
         <a:lstStyle/>
         <a:p>
-          <a:pPr marL="0" lvl="0" indent="0" algn="ctr" defTabSz="488950">
+          <a:pPr lvl="0" algn="ctr" defTabSz="488950">
             <a:lnSpc>
               <a:spcPct val="90000"/>
             </a:lnSpc>
@@ -7430,7 +7665,6 @@
             <a:spcAft>
               <a:spcPct val="35000"/>
             </a:spcAft>
-            <a:buNone/>
           </a:pPr>
           <a:r>
             <a:rPr lang="en-US" sz="1100" kern="1200" dirty="0"/>
@@ -7490,7 +7724,7 @@
             <a:spcAft>
               <a:spcPct val="15000"/>
             </a:spcAft>
-            <a:buChar char="•"/>
+            <a:buChar char="••"/>
           </a:pPr>
           <a:r>
             <a:rPr lang="en-US" sz="800" kern="1200" dirty="0"/>
@@ -7619,7 +7853,7 @@
         </a:bodyPr>
         <a:lstStyle/>
         <a:p>
-          <a:pPr marL="0" lvl="0" indent="0" algn="ctr" defTabSz="488950">
+          <a:pPr lvl="0" algn="ctr" defTabSz="488950">
             <a:lnSpc>
               <a:spcPct val="90000"/>
             </a:lnSpc>
@@ -7629,7 +7863,6 @@
             <a:spcAft>
               <a:spcPct val="35000"/>
             </a:spcAft>
-            <a:buNone/>
           </a:pPr>
           <a:r>
             <a:rPr lang="en-US" sz="1100" kern="1200" dirty="0"/>
@@ -7689,7 +7922,7 @@
             <a:spcAft>
               <a:spcPct val="15000"/>
             </a:spcAft>
-            <a:buChar char="•"/>
+            <a:buChar char="••"/>
           </a:pPr>
           <a:r>
             <a:rPr lang="en-US" sz="800" kern="1200" dirty="0" err="1"/>
@@ -7762,7 +7995,7 @@
         </a:bodyPr>
         <a:lstStyle/>
         <a:p>
-          <a:pPr marL="0" lvl="0" indent="0" algn="ctr" defTabSz="488950">
+          <a:pPr lvl="0" algn="ctr" defTabSz="488950">
             <a:lnSpc>
               <a:spcPct val="90000"/>
             </a:lnSpc>
@@ -7772,7 +8005,6 @@
             <a:spcAft>
               <a:spcPct val="35000"/>
             </a:spcAft>
-            <a:buNone/>
           </a:pPr>
           <a:r>
             <a:rPr lang="en-US" sz="1100" kern="1200" dirty="0"/>
@@ -21432,35 +21664,35 @@
                 <a:gridCol w="1645920">
                   <a:extLst>
                     <a:ext uri="{9D8B030D-6E8A-4147-A177-3AD203B41FA5}">
-                      <a16:colId xmlns:a16="http://schemas.microsoft.com/office/drawing/2014/main" val="20000"/>
+                      <a16:colId xmlns:a16="http://schemas.microsoft.com/office/drawing/2014/main" xmlns="" val="20000"/>
                     </a:ext>
                   </a:extLst>
                 </a:gridCol>
                 <a:gridCol w="1645920">
                   <a:extLst>
                     <a:ext uri="{9D8B030D-6E8A-4147-A177-3AD203B41FA5}">
-                      <a16:colId xmlns:a16="http://schemas.microsoft.com/office/drawing/2014/main" val="20001"/>
+                      <a16:colId xmlns:a16="http://schemas.microsoft.com/office/drawing/2014/main" xmlns="" val="20001"/>
                     </a:ext>
                   </a:extLst>
                 </a:gridCol>
                 <a:gridCol w="1645920">
                   <a:extLst>
                     <a:ext uri="{9D8B030D-6E8A-4147-A177-3AD203B41FA5}">
-                      <a16:colId xmlns:a16="http://schemas.microsoft.com/office/drawing/2014/main" val="20002"/>
+                      <a16:colId xmlns:a16="http://schemas.microsoft.com/office/drawing/2014/main" xmlns="" val="20002"/>
                     </a:ext>
                   </a:extLst>
                 </a:gridCol>
                 <a:gridCol w="1645920">
                   <a:extLst>
                     <a:ext uri="{9D8B030D-6E8A-4147-A177-3AD203B41FA5}">
-                      <a16:colId xmlns:a16="http://schemas.microsoft.com/office/drawing/2014/main" val="20003"/>
+                      <a16:colId xmlns:a16="http://schemas.microsoft.com/office/drawing/2014/main" xmlns="" val="20003"/>
                     </a:ext>
                   </a:extLst>
                 </a:gridCol>
                 <a:gridCol w="1645920">
                   <a:extLst>
                     <a:ext uri="{9D8B030D-6E8A-4147-A177-3AD203B41FA5}">
-                      <a16:colId xmlns:a16="http://schemas.microsoft.com/office/drawing/2014/main" val="20004"/>
+                      <a16:colId xmlns:a16="http://schemas.microsoft.com/office/drawing/2014/main" xmlns="" val="20004"/>
                     </a:ext>
                   </a:extLst>
                 </a:gridCol>
@@ -21535,7 +21767,7 @@
                 </a:tc>
                 <a:extLst>
                   <a:ext uri="{0D108BD9-81ED-4DB2-BD59-A6C34878D82A}">
-                    <a16:rowId xmlns:a16="http://schemas.microsoft.com/office/drawing/2014/main" val="10000"/>
+                    <a16:rowId xmlns:a16="http://schemas.microsoft.com/office/drawing/2014/main" xmlns="" val="10000"/>
                   </a:ext>
                 </a:extLst>
               </a:tr>
@@ -21607,7 +21839,7 @@
                 </a:tc>
                 <a:extLst>
                   <a:ext uri="{0D108BD9-81ED-4DB2-BD59-A6C34878D82A}">
-                    <a16:rowId xmlns:a16="http://schemas.microsoft.com/office/drawing/2014/main" val="10001"/>
+                    <a16:rowId xmlns:a16="http://schemas.microsoft.com/office/drawing/2014/main" xmlns="" val="10001"/>
                   </a:ext>
                 </a:extLst>
               </a:tr>
@@ -21679,7 +21911,7 @@
                 </a:tc>
                 <a:extLst>
                   <a:ext uri="{0D108BD9-81ED-4DB2-BD59-A6C34878D82A}">
-                    <a16:rowId xmlns:a16="http://schemas.microsoft.com/office/drawing/2014/main" val="10002"/>
+                    <a16:rowId xmlns:a16="http://schemas.microsoft.com/office/drawing/2014/main" xmlns="" val="10002"/>
                   </a:ext>
                 </a:extLst>
               </a:tr>
@@ -21751,7 +21983,7 @@
                 </a:tc>
                 <a:extLst>
                   <a:ext uri="{0D108BD9-81ED-4DB2-BD59-A6C34878D82A}">
-                    <a16:rowId xmlns:a16="http://schemas.microsoft.com/office/drawing/2014/main" val="10003"/>
+                    <a16:rowId xmlns:a16="http://schemas.microsoft.com/office/drawing/2014/main" xmlns="" val="10003"/>
                   </a:ext>
                 </a:extLst>
               </a:tr>
@@ -22220,6 +22452,88 @@
           <a:lstStyle/>
           <a:p>
             <a:r>
+              <a:rPr lang="en-US" dirty="0" smtClean="0"/>
+              <a:t>Figure 4</a:t>
+            </a:r>
+            <a:endParaRPr lang="en-US" dirty="0"/>
+          </a:p>
+        </p:txBody>
+      </p:sp>
+      <p:pic>
+        <p:nvPicPr>
+          <p:cNvPr id="4" name="Content Placeholder 3"/>
+          <p:cNvPicPr>
+            <a:picLocks noGrp="1" noChangeAspect="1"/>
+          </p:cNvPicPr>
+          <p:nvPr>
+            <p:ph idx="1"/>
+          </p:nvPr>
+        </p:nvPicPr>
+        <p:blipFill>
+          <a:blip r:embed="rId2">
+            <a:extLst>
+              <a:ext uri="{28A0092B-C50C-407E-A947-70E740481C1C}">
+                <a14:useLocalDpi xmlns:a14="http://schemas.microsoft.com/office/drawing/2010/main" val="0"/>
+              </a:ext>
+            </a:extLst>
+          </a:blip>
+          <a:stretch>
+            <a:fillRect/>
+          </a:stretch>
+        </p:blipFill>
+        <p:spPr>
+          <a:xfrm>
+            <a:off x="2114550" y="1728787"/>
+            <a:ext cx="4914900" cy="4619625"/>
+          </a:xfrm>
+        </p:spPr>
+      </p:pic>
+    </p:spTree>
+    <p:extLst>
+      <p:ext uri="{BB962C8B-B14F-4D97-AF65-F5344CB8AC3E}">
+        <p14:creationId xmlns:p14="http://schemas.microsoft.com/office/powerpoint/2010/main" val="954718525"/>
+      </p:ext>
+    </p:extLst>
+  </p:cSld>
+  <p:clrMapOvr>
+    <a:masterClrMapping/>
+  </p:clrMapOvr>
+</p:sld>
+</file>
+
+<file path=ppt/slides/slide28.xml><?xml version="1.0" encoding="utf-8"?>
+<p:sld xmlns:a="http://schemas.openxmlformats.org/drawingml/2006/main" xmlns:r="http://schemas.openxmlformats.org/officeDocument/2006/relationships" xmlns:p="http://schemas.openxmlformats.org/presentationml/2006/main">
+  <p:cSld>
+    <p:spTree>
+      <p:nvGrpSpPr>
+        <p:cNvPr id="1" name=""/>
+        <p:cNvGrpSpPr/>
+        <p:nvPr/>
+      </p:nvGrpSpPr>
+      <p:grpSpPr>
+        <a:xfrm>
+          <a:off x="0" y="0"/>
+          <a:ext cx="0" cy="0"/>
+          <a:chOff x="0" y="0"/>
+          <a:chExt cx="0" cy="0"/>
+        </a:xfrm>
+      </p:grpSpPr>
+      <p:sp>
+        <p:nvSpPr>
+          <p:cNvPr id="2" name="Title 1"/>
+          <p:cNvSpPr>
+            <a:spLocks noGrp="1"/>
+          </p:cNvSpPr>
+          <p:nvPr>
+            <p:ph type="title"/>
+          </p:nvPr>
+        </p:nvSpPr>
+        <p:spPr/>
+        <p:txBody>
+          <a:bodyPr/>
+          <a:lstStyle/>
+          <a:p>
+            <a:r>
               <a:rPr lang="en-US" dirty="0"/>
               <a:t>Conclusions</a:t>
             </a:r>
@@ -22288,7 +22602,7 @@
 </p:sld>
 </file>
 
-<file path=ppt/slides/slide28.xml><?xml version="1.0" encoding="utf-8"?>
+<file path=ppt/slides/slide29.xml><?xml version="1.0" encoding="utf-8"?>
 <p:sld xmlns:a="http://schemas.openxmlformats.org/drawingml/2006/main" xmlns:r="http://schemas.openxmlformats.org/officeDocument/2006/relationships" xmlns:p="http://schemas.openxmlformats.org/presentationml/2006/main">
   <p:cSld>
     <p:spTree>
@@ -24133,7 +24447,7 @@
   <a:extraClrSchemeLst/>
   <a:extLst>
     <a:ext uri="{05A4C25C-085E-4340-85A3-A5531E510DB2}">
-      <thm15:themeFamily xmlns:thm15="http://schemas.microsoft.com/office/thememl/2012/main" name="Office Theme" id="{62F939B6-93AF-4DB8-9C6B-D6C7DFDC589F}" vid="{4A3C46E8-61CC-4603-A589-7422A47A8E4A}"/>
+      <thm15:themeFamily xmlns:thm15="http://schemas.microsoft.com/office/thememl/2012/main" xmlns="" name="Office Theme" id="{62F939B6-93AF-4DB8-9C6B-D6C7DFDC589F}" vid="{4A3C46E8-61CC-4603-A589-7422A47A8E4A}"/>
     </a:ext>
   </a:extLst>
 </a:theme>

</xml_diff>

<commit_message>
finished powerpoint, expression stuff
</commit_message>
<xml_diff>
--- a/asparagus.pptx
+++ b/asparagus.pptx
@@ -4583,17 +4583,17 @@
       </dgm:t>
     </dgm:pt>
     <dgm:pt modelId="{6F0B59D3-5BB7-480F-A125-289A3626EC6A}">
-      <dgm:prSet phldrT="[Text]"/>
+      <dgm:prSet phldrT="[Text]" custT="1"/>
       <dgm:spPr/>
       <dgm:t>
         <a:bodyPr/>
         <a:lstStyle/>
         <a:p>
           <a:r>
-            <a:rPr lang="en-US" dirty="0" err="1"/>
+            <a:rPr lang="en-US" sz="1200" dirty="0" err="1"/>
             <a:t>edgeR</a:t>
           </a:r>
-          <a:endParaRPr lang="en-US" dirty="0"/>
+          <a:endParaRPr lang="en-US" sz="1200" dirty="0"/>
         </a:p>
       </dgm:t>
     </dgm:pt>
@@ -4761,14 +4761,14 @@
       </dgm:t>
     </dgm:pt>
     <dgm:pt modelId="{9EE104D1-5DA8-49BF-B7BC-C172B136828F}">
-      <dgm:prSet phldrT="[Text]"/>
+      <dgm:prSet phldrT="[Text]" custT="1"/>
       <dgm:spPr/>
       <dgm:t>
         <a:bodyPr/>
         <a:lstStyle/>
         <a:p>
           <a:r>
-            <a:rPr lang="en-US" dirty="0"/>
+            <a:rPr lang="en-US" sz="1200" dirty="0"/>
             <a:t>TMM</a:t>
           </a:r>
         </a:p>
@@ -4905,22 +4905,22 @@
       </dgm:t>
     </dgm:pt>
     <dgm:pt modelId="{4A4A4B22-2473-41AC-AC6B-02DF09448837}">
-      <dgm:prSet phldrT="[Text]"/>
+      <dgm:prSet phldrT="[Text]" custT="1"/>
       <dgm:spPr/>
       <dgm:t>
         <a:bodyPr/>
         <a:lstStyle/>
         <a:p>
           <a:r>
-            <a:rPr lang="en-US" dirty="0"/>
+            <a:rPr lang="en-US" sz="1200" dirty="0"/>
             <a:t>(~</a:t>
           </a:r>
           <a:r>
-            <a:rPr lang="en-US" dirty="0" err="1"/>
+            <a:rPr lang="en-US" sz="1200" dirty="0" err="1"/>
             <a:t>line+sex</a:t>
           </a:r>
           <a:r>
-            <a:rPr lang="en-US" dirty="0"/>
+            <a:rPr lang="en-US" sz="1200" dirty="0"/>
             <a:t>)</a:t>
           </a:r>
         </a:p>
@@ -4929,24 +4929,38 @@
     <dgm:pt modelId="{E2E687BD-6AB7-4903-B22F-D79E4C2F0694}" type="parTrans" cxnId="{4ACA1434-5613-4559-A527-5FF131A7A715}">
       <dgm:prSet/>
       <dgm:spPr/>
+      <dgm:t>
+        <a:bodyPr/>
+        <a:lstStyle/>
+        <a:p>
+          <a:endParaRPr lang="en-US"/>
+        </a:p>
+      </dgm:t>
     </dgm:pt>
     <dgm:pt modelId="{4F4FB59D-1B17-4854-B926-F1AFC86A7723}" type="sibTrans" cxnId="{4ACA1434-5613-4559-A527-5FF131A7A715}">
       <dgm:prSet/>
       <dgm:spPr/>
+      <dgm:t>
+        <a:bodyPr/>
+        <a:lstStyle/>
+        <a:p>
+          <a:endParaRPr lang="en-US"/>
+        </a:p>
+      </dgm:t>
     </dgm:pt>
     <dgm:pt modelId="{BF109C1A-D6D2-4A9D-BDE6-C66F4C4884E5}">
-      <dgm:prSet phldrT="[Text]"/>
+      <dgm:prSet phldrT="[Text]" custT="1"/>
       <dgm:spPr/>
       <dgm:t>
         <a:bodyPr/>
         <a:lstStyle/>
         <a:p>
           <a:r>
-            <a:rPr lang="en-US" dirty="0" err="1"/>
+            <a:rPr lang="en-US" sz="1200" dirty="0" err="1"/>
             <a:t>glmLTR</a:t>
           </a:r>
           <a:r>
-            <a:rPr lang="en-US" dirty="0"/>
+            <a:rPr lang="en-US" sz="1200" dirty="0"/>
             <a:t>()</a:t>
           </a:r>
         </a:p>
@@ -4955,10 +4969,24 @@
     <dgm:pt modelId="{56C68A0C-AEF5-4BF6-BA1D-544D8918025D}" type="parTrans" cxnId="{310A1EF9-F197-405E-8369-7BE4F64F5A7C}">
       <dgm:prSet/>
       <dgm:spPr/>
+      <dgm:t>
+        <a:bodyPr/>
+        <a:lstStyle/>
+        <a:p>
+          <a:endParaRPr lang="en-US"/>
+        </a:p>
+      </dgm:t>
     </dgm:pt>
     <dgm:pt modelId="{FA105F86-8CCD-48E1-AB0A-3B4E4CBFC30C}" type="sibTrans" cxnId="{310A1EF9-F197-405E-8369-7BE4F64F5A7C}">
       <dgm:prSet/>
       <dgm:spPr/>
+      <dgm:t>
+        <a:bodyPr/>
+        <a:lstStyle/>
+        <a:p>
+          <a:endParaRPr lang="en-US"/>
+        </a:p>
+      </dgm:t>
     </dgm:pt>
     <dgm:pt modelId="{039BB48C-F966-4AB5-8439-B89E0B0A360C}" type="pres">
       <dgm:prSet presAssocID="{BEEE7082-E0E7-40EB-A40B-33E6BC64CCC8}" presName="rootnode" presStyleCnt="0">
@@ -6979,12 +7007,12 @@
         <a:fontRef idx="minor"/>
       </dsp:style>
       <dsp:txBody>
-        <a:bodyPr spcFirstLastPara="0" vert="horz" wrap="square" lIns="38100" tIns="38100" rIns="38100" bIns="38100" numCol="1" spcCol="1270" anchor="ctr" anchorCtr="0">
+        <a:bodyPr spcFirstLastPara="0" vert="horz" wrap="square" lIns="45720" tIns="45720" rIns="45720" bIns="45720" numCol="1" spcCol="1270" anchor="ctr" anchorCtr="0">
           <a:noAutofit/>
         </a:bodyPr>
         <a:lstStyle/>
         <a:p>
-          <a:pPr marL="57150" lvl="1" indent="-57150" algn="l" defTabSz="355600">
+          <a:pPr marL="114300" lvl="1" indent="-114300" algn="l" defTabSz="533400">
             <a:lnSpc>
               <a:spcPct val="90000"/>
             </a:lnSpc>
@@ -6997,10 +7025,10 @@
             <a:buChar char="••"/>
           </a:pPr>
           <a:r>
-            <a:rPr lang="en-US" sz="800" kern="1200" dirty="0" err="1"/>
+            <a:rPr lang="en-US" sz="1200" kern="1200" dirty="0" err="1"/>
             <a:t>edgeR</a:t>
           </a:r>
-          <a:endParaRPr lang="en-US" sz="800" kern="1200" dirty="0"/>
+          <a:endParaRPr lang="en-US" sz="1200" kern="1200" dirty="0"/>
         </a:p>
       </dsp:txBody>
       <dsp:txXfrm>
@@ -7170,12 +7198,12 @@
         <a:fontRef idx="minor"/>
       </dsp:style>
       <dsp:txBody>
-        <a:bodyPr spcFirstLastPara="0" vert="horz" wrap="square" lIns="38100" tIns="38100" rIns="38100" bIns="38100" numCol="1" spcCol="1270" anchor="ctr" anchorCtr="0">
+        <a:bodyPr spcFirstLastPara="0" vert="horz" wrap="square" lIns="41910" tIns="41910" rIns="41910" bIns="41910" numCol="1" spcCol="1270" anchor="ctr" anchorCtr="0">
           <a:noAutofit/>
         </a:bodyPr>
         <a:lstStyle/>
         <a:p>
-          <a:pPr marL="57150" lvl="1" indent="-57150" algn="l" defTabSz="355600">
+          <a:pPr marL="57150" lvl="1" indent="-57150" algn="l" defTabSz="400050">
             <a:lnSpc>
               <a:spcPct val="90000"/>
             </a:lnSpc>
@@ -7187,7 +7215,7 @@
             </a:spcAft>
             <a:buChar char="••"/>
           </a:pPr>
-          <a:endParaRPr lang="en-US" sz="800" kern="1200" dirty="0"/>
+          <a:endParaRPr lang="en-US" sz="900" kern="1200" dirty="0"/>
         </a:p>
       </dsp:txBody>
       <dsp:txXfrm>
@@ -7357,12 +7385,12 @@
         <a:fontRef idx="minor"/>
       </dsp:style>
       <dsp:txBody>
-        <a:bodyPr spcFirstLastPara="0" vert="horz" wrap="square" lIns="38100" tIns="38100" rIns="38100" bIns="38100" numCol="1" spcCol="1270" anchor="ctr" anchorCtr="0">
+        <a:bodyPr spcFirstLastPara="0" vert="horz" wrap="square" lIns="45720" tIns="45720" rIns="45720" bIns="45720" numCol="1" spcCol="1270" anchor="ctr" anchorCtr="0">
           <a:noAutofit/>
         </a:bodyPr>
         <a:lstStyle/>
         <a:p>
-          <a:pPr marL="57150" lvl="1" indent="-57150" algn="l" defTabSz="355600">
+          <a:pPr marL="114300" lvl="1" indent="-114300" algn="l" defTabSz="533400">
             <a:lnSpc>
               <a:spcPct val="90000"/>
             </a:lnSpc>
@@ -7375,7 +7403,7 @@
             <a:buChar char="••"/>
           </a:pPr>
           <a:r>
-            <a:rPr lang="en-US" sz="800" kern="1200" dirty="0"/>
+            <a:rPr lang="en-US" sz="1200" kern="1200" dirty="0"/>
             <a:t>TMM</a:t>
           </a:r>
         </a:p>
@@ -7709,12 +7737,12 @@
         <a:fontRef idx="minor"/>
       </dsp:style>
       <dsp:txBody>
-        <a:bodyPr spcFirstLastPara="0" vert="horz" wrap="square" lIns="38100" tIns="38100" rIns="38100" bIns="38100" numCol="1" spcCol="1270" anchor="ctr" anchorCtr="0">
+        <a:bodyPr spcFirstLastPara="0" vert="horz" wrap="square" lIns="45720" tIns="45720" rIns="45720" bIns="45720" numCol="1" spcCol="1270" anchor="ctr" anchorCtr="0">
           <a:noAutofit/>
         </a:bodyPr>
         <a:lstStyle/>
         <a:p>
-          <a:pPr marL="57150" lvl="1" indent="-57150" algn="l" defTabSz="355600">
+          <a:pPr marL="114300" lvl="1" indent="-114300" algn="l" defTabSz="533400">
             <a:lnSpc>
               <a:spcPct val="90000"/>
             </a:lnSpc>
@@ -7727,15 +7755,15 @@
             <a:buChar char="••"/>
           </a:pPr>
           <a:r>
-            <a:rPr lang="en-US" sz="800" kern="1200" dirty="0"/>
+            <a:rPr lang="en-US" sz="1200" kern="1200" dirty="0"/>
             <a:t>(~</a:t>
           </a:r>
           <a:r>
-            <a:rPr lang="en-US" sz="800" kern="1200" dirty="0" err="1"/>
+            <a:rPr lang="en-US" sz="1200" kern="1200" dirty="0" err="1"/>
             <a:t>line+sex</a:t>
           </a:r>
           <a:r>
-            <a:rPr lang="en-US" sz="800" kern="1200" dirty="0"/>
+            <a:rPr lang="en-US" sz="1200" kern="1200" dirty="0"/>
             <a:t>)</a:t>
           </a:r>
         </a:p>
@@ -7907,12 +7935,12 @@
         <a:fontRef idx="minor"/>
       </dsp:style>
       <dsp:txBody>
-        <a:bodyPr spcFirstLastPara="0" vert="horz" wrap="square" lIns="38100" tIns="38100" rIns="38100" bIns="38100" numCol="1" spcCol="1270" anchor="ctr" anchorCtr="0">
+        <a:bodyPr spcFirstLastPara="0" vert="horz" wrap="square" lIns="45720" tIns="45720" rIns="45720" bIns="45720" numCol="1" spcCol="1270" anchor="ctr" anchorCtr="0">
           <a:noAutofit/>
         </a:bodyPr>
         <a:lstStyle/>
         <a:p>
-          <a:pPr marL="57150" lvl="1" indent="-57150" algn="l" defTabSz="355600">
+          <a:pPr marL="114300" lvl="1" indent="-114300" algn="l" defTabSz="533400">
             <a:lnSpc>
               <a:spcPct val="90000"/>
             </a:lnSpc>
@@ -7925,11 +7953,11 @@
             <a:buChar char="••"/>
           </a:pPr>
           <a:r>
-            <a:rPr lang="en-US" sz="800" kern="1200" dirty="0" err="1"/>
+            <a:rPr lang="en-US" sz="1200" kern="1200" dirty="0" err="1"/>
             <a:t>glmLTR</a:t>
           </a:r>
           <a:r>
-            <a:rPr lang="en-US" sz="800" kern="1200" dirty="0"/>
+            <a:rPr lang="en-US" sz="1200" kern="1200" dirty="0"/>
             <a:t>()</a:t>
           </a:r>
         </a:p>
@@ -19147,7 +19175,7 @@
           <p:nvPr>
             <p:extLst>
               <p:ext uri="{D42A27DB-BD31-4B8C-83A1-F6EECF244321}">
-                <p14:modId xmlns:p14="http://schemas.microsoft.com/office/powerpoint/2010/main" val="3275152963"/>
+                <p14:modId xmlns:p14="http://schemas.microsoft.com/office/powerpoint/2010/main" val="1272676777"/>
               </p:ext>
             </p:extLst>
           </p:nvPr>
@@ -19328,7 +19356,7 @@
         </p:blipFill>
         <p:spPr>
           <a:xfrm>
-            <a:off x="4724400" y="2667000"/>
+            <a:off x="4724400" y="2739687"/>
             <a:ext cx="4343400" cy="3661113"/>
           </a:xfrm>
           <a:prstGeom prst="rect">
@@ -22085,12 +22113,12 @@
         <p:spPr>
           <a:xfrm>
             <a:off x="457200" y="1295400"/>
-            <a:ext cx="8229600" cy="4876800"/>
+            <a:ext cx="8229600" cy="1295400"/>
           </a:xfrm>
         </p:spPr>
         <p:txBody>
           <a:bodyPr>
-            <a:normAutofit lnSpcReduction="10000"/>
+            <a:noAutofit/>
           </a:bodyPr>
           <a:lstStyle/>
           <a:p>
@@ -22103,7 +22131,39 @@
             </a:r>
             <a:r>
               <a:rPr lang="en-US" dirty="0"/>
-              <a:t> clustering of the 570 differentially expressed garden asparagus (</a:t>
+              <a:t> clustering of the </a:t>
+            </a:r>
+            <a:r>
+              <a:rPr lang="en-US" dirty="0" smtClean="0"/>
+              <a:t>fragments per </a:t>
+            </a:r>
+            <a:r>
+              <a:rPr lang="en-US" dirty="0" err="1" smtClean="0"/>
+              <a:t>kilobase</a:t>
+            </a:r>
+            <a:r>
+              <a:rPr lang="en-US" dirty="0"/>
+              <a:t> </a:t>
+            </a:r>
+            <a:r>
+              <a:rPr lang="en-US" dirty="0" smtClean="0"/>
+              <a:t>of transcript per million mapped reads (FPKM)values of the </a:t>
+            </a:r>
+            <a:r>
+              <a:rPr lang="en-US" dirty="0" smtClean="0"/>
+              <a:t>570 </a:t>
+            </a:r>
+            <a:r>
+              <a:rPr lang="en-US" dirty="0"/>
+              <a:t>differentially expressed </a:t>
+            </a:r>
+            <a:r>
+              <a:rPr lang="en-US" dirty="0" smtClean="0"/>
+              <a:t>(DE) garden </a:t>
+            </a:r>
+            <a:r>
+              <a:rPr lang="en-US" dirty="0"/>
+              <a:t>asparagus (</a:t>
             </a:r>
             <a:r>
               <a:rPr lang="en-US" i="1" dirty="0"/>
@@ -22119,78 +22179,6 @@
               <a:buNone/>
             </a:pPr>
             <a:endParaRPr lang="en-US" dirty="0"/>
-          </a:p>
-          <a:p>
-            <a:pPr marL="0" indent="0">
-              <a:buNone/>
-            </a:pPr>
-            <a:r>
-              <a:rPr lang="en-US" dirty="0"/>
-              <a:t>Don’t mention what was used as the reference level</a:t>
-            </a:r>
-          </a:p>
-          <a:p>
-            <a:pPr marL="0" indent="0">
-              <a:buNone/>
-            </a:pPr>
-            <a:r>
-              <a:rPr lang="en-US" dirty="0"/>
-              <a:t>Used FPKM values, not TMM normalized counts</a:t>
-            </a:r>
-          </a:p>
-          <a:p>
-            <a:pPr marL="0" indent="0">
-              <a:buNone/>
-            </a:pPr>
-            <a:endParaRPr lang="en-US" dirty="0"/>
-          </a:p>
-          <a:p>
-            <a:pPr marL="0" indent="0">
-              <a:buNone/>
-            </a:pPr>
-            <a:r>
-              <a:rPr lang="en-US" dirty="0"/>
-              <a:t>Can just talk about my </a:t>
-            </a:r>
-            <a:r>
-              <a:rPr lang="en-US" dirty="0" err="1"/>
-              <a:t>heatmap</a:t>
-            </a:r>
-            <a:r>
-              <a:rPr lang="en-US" dirty="0"/>
-              <a:t>, not necessarily make a comparison</a:t>
-            </a:r>
-          </a:p>
-          <a:p>
-            <a:pPr marL="0" indent="0">
-              <a:buNone/>
-            </a:pPr>
-            <a:endParaRPr lang="en-US" dirty="0"/>
-          </a:p>
-          <a:p>
-            <a:pPr marL="0" indent="0">
-              <a:buNone/>
-            </a:pPr>
-            <a:r>
-              <a:rPr lang="en-US" dirty="0"/>
-              <a:t>Discrepancy between </a:t>
-            </a:r>
-            <a:r>
-              <a:rPr lang="en-US" dirty="0" err="1"/>
-              <a:t>heatmap</a:t>
-            </a:r>
-            <a:r>
-              <a:rPr lang="en-US" dirty="0"/>
-              <a:t> in paper and </a:t>
-            </a:r>
-            <a:r>
-              <a:rPr lang="en-US" dirty="0" err="1"/>
-              <a:t>heatmap</a:t>
-            </a:r>
-            <a:r>
-              <a:rPr lang="en-US" dirty="0"/>
-              <a:t> in tutorial that used the same data</a:t>
-            </a:r>
           </a:p>
         </p:txBody>
       </p:sp>
@@ -22210,8 +22198,8 @@
         </p:blipFill>
         <p:spPr>
           <a:xfrm>
-            <a:off x="7444525" y="381000"/>
-            <a:ext cx="5562600" cy="4082493"/>
+            <a:off x="1981200" y="2826530"/>
+            <a:ext cx="5181600" cy="3802870"/>
           </a:xfrm>
           <a:prstGeom prst="rect">
             <a:avLst/>
@@ -22228,6 +22216,13 @@
   <p:clrMapOvr>
     <a:masterClrMapping/>
   </p:clrMapOvr>
+  <p:timing>
+    <p:tnLst>
+      <p:par>
+        <p:cTn id="1" dur="indefinite" restart="never" nodeType="tmRoot"/>
+      </p:par>
+    </p:tnLst>
+  </p:timing>
 </p:sld>
 </file>
 
@@ -22270,39 +22265,74 @@
           </a:p>
         </p:txBody>
       </p:sp>
+      <p:sp>
+        <p:nvSpPr>
+          <p:cNvPr id="5" name="Content Placeholder 4"/>
+          <p:cNvSpPr>
+            <a:spLocks noGrp="1"/>
+          </p:cNvSpPr>
+          <p:nvPr>
+            <p:ph idx="1"/>
+          </p:nvPr>
+        </p:nvSpPr>
+        <p:spPr>
+          <a:xfrm>
+            <a:off x="457200" y="1600200"/>
+            <a:ext cx="2895600" cy="4876800"/>
+          </a:xfrm>
+        </p:spPr>
+        <p:txBody>
+          <a:bodyPr/>
+          <a:lstStyle/>
+          <a:p>
+            <a:r>
+              <a:rPr lang="en-US" dirty="0" smtClean="0"/>
+              <a:t>A </a:t>
+            </a:r>
+            <a:r>
+              <a:rPr lang="en-US" dirty="0" err="1" smtClean="0"/>
+              <a:t>heatmap</a:t>
+            </a:r>
+            <a:r>
+              <a:rPr lang="en-US" dirty="0" smtClean="0"/>
+              <a:t> tutorial for the 570 DE genes found in the paper is posted </a:t>
+            </a:r>
+            <a:r>
+              <a:rPr lang="en-US" dirty="0" smtClean="0">
+                <a:hlinkClick r:id="rId2"/>
+              </a:rPr>
+              <a:t>here</a:t>
+            </a:r>
+            <a:r>
+              <a:rPr lang="en-US" dirty="0" smtClean="0"/>
+              <a:t>.</a:t>
+            </a:r>
+          </a:p>
+          <a:p>
+            <a:pPr lvl="1"/>
+            <a:r>
+              <a:rPr lang="en-US" dirty="0" smtClean="0"/>
+              <a:t>Only used 9 of the 11 lines</a:t>
+            </a:r>
+          </a:p>
+          <a:p>
+            <a:pPr lvl="1"/>
+            <a:r>
+              <a:rPr lang="en-US" dirty="0" smtClean="0"/>
+              <a:t>Clustering of libraries and genes similar to those in paper</a:t>
+            </a:r>
+          </a:p>
+        </p:txBody>
+      </p:sp>
       <p:pic>
         <p:nvPicPr>
-          <p:cNvPr id="7" name="Picture 6"/>
+          <p:cNvPr id="3" name="Picture 2"/>
           <p:cNvPicPr>
             <a:picLocks noChangeAspect="1"/>
           </p:cNvPicPr>
           <p:nvPr/>
         </p:nvPicPr>
-        <p:blipFill>
-          <a:blip r:embed="rId2"/>
-          <a:stretch>
-            <a:fillRect/>
-          </a:stretch>
-        </p:blipFill>
-        <p:spPr>
-          <a:xfrm>
-            <a:off x="228600" y="1883053"/>
-            <a:ext cx="5562600" cy="4082493"/>
-          </a:xfrm>
-          <a:prstGeom prst="rect">
-            <a:avLst/>
-          </a:prstGeom>
-        </p:spPr>
-      </p:pic>
-      <p:pic>
-        <p:nvPicPr>
-          <p:cNvPr id="8" name="Picture 7"/>
-          <p:cNvPicPr>
-            <a:picLocks noChangeAspect="1"/>
-          </p:cNvPicPr>
-          <p:nvPr/>
-        </p:nvPicPr>
-        <p:blipFill>
+        <p:blipFill rotWithShape="1">
           <a:blip r:embed="rId3">
             <a:extLst>
               <a:ext uri="{28A0092B-C50C-407E-A947-70E740481C1C}">
@@ -22310,14 +22340,13 @@
               </a:ext>
             </a:extLst>
           </a:blip>
-          <a:stretch>
-            <a:fillRect/>
-          </a:stretch>
+          <a:srcRect l="6026" r="8969"/>
+          <a:stretch/>
         </p:blipFill>
         <p:spPr>
           <a:xfrm>
-            <a:off x="5795493" y="2286000"/>
-            <a:ext cx="5256431" cy="3511296"/>
+            <a:off x="3734336" y="1752600"/>
+            <a:ext cx="5333464" cy="3896338"/>
           </a:xfrm>
           <a:prstGeom prst="rect">
             <a:avLst/>
@@ -22334,6 +22363,13 @@
   <p:clrMapOvr>
     <a:masterClrMapping/>
   </p:clrMapOvr>
+  <p:timing>
+    <p:tnLst>
+      <p:par>
+        <p:cTn id="1" dur="indefinite" restart="never" nodeType="tmRoot"/>
+      </p:par>
+    </p:tnLst>
+  </p:timing>
 </p:sld>
 </file>
 
@@ -22376,6 +22412,38 @@
           </a:p>
         </p:txBody>
       </p:sp>
+      <p:sp>
+        <p:nvSpPr>
+          <p:cNvPr id="3" name="Content Placeholder 2"/>
+          <p:cNvSpPr>
+            <a:spLocks noGrp="1"/>
+          </p:cNvSpPr>
+          <p:nvPr>
+            <p:ph idx="1"/>
+          </p:nvPr>
+        </p:nvSpPr>
+        <p:spPr>
+          <a:xfrm>
+            <a:off x="457200" y="1600200"/>
+            <a:ext cx="8305800" cy="990600"/>
+          </a:xfrm>
+        </p:spPr>
+        <p:txBody>
+          <a:bodyPr/>
+          <a:lstStyle/>
+          <a:p>
+            <a:r>
+              <a:rPr lang="en-US" dirty="0" err="1" smtClean="0"/>
+              <a:t>Heatmap</a:t>
+            </a:r>
+            <a:r>
+              <a:rPr lang="en-US" dirty="0" smtClean="0"/>
+              <a:t> of TMM-normalized counts data for the 480 genes we found to be DE</a:t>
+            </a:r>
+            <a:endParaRPr lang="en-US" dirty="0"/>
+          </a:p>
+        </p:txBody>
+      </p:sp>
       <p:pic>
         <p:nvPicPr>
           <p:cNvPr id="4" name="Picture 3"/>
@@ -22384,7 +22452,7 @@
           </p:cNvPicPr>
           <p:nvPr/>
         </p:nvPicPr>
-        <p:blipFill>
+        <p:blipFill rotWithShape="1">
           <a:blip r:embed="rId2">
             <a:extLst>
               <a:ext uri="{28A0092B-C50C-407E-A947-70E740481C1C}">
@@ -22392,14 +22460,13 @@
               </a:ext>
             </a:extLst>
           </a:blip>
-          <a:stretch>
-            <a:fillRect/>
-          </a:stretch>
+          <a:srcRect r="6705"/>
+          <a:stretch/>
         </p:blipFill>
         <p:spPr>
           <a:xfrm>
-            <a:off x="-1832810" y="1752600"/>
-            <a:ext cx="6054934" cy="4044696"/>
+            <a:off x="1752600" y="2438400"/>
+            <a:ext cx="6114245" cy="4377852"/>
           </a:xfrm>
           <a:prstGeom prst="rect">
             <a:avLst/>
@@ -22416,6 +22483,13 @@
   <p:clrMapOvr>
     <a:masterClrMapping/>
   </p:clrMapOvr>
+  <p:timing>
+    <p:tnLst>
+      <p:par>
+        <p:cTn id="1" dur="indefinite" restart="never" nodeType="tmRoot"/>
+      </p:par>
+    </p:tnLst>
+  </p:timing>
 </p:sld>
 </file>
 
@@ -22459,9 +22533,43 @@
           </a:p>
         </p:txBody>
       </p:sp>
+      <p:sp>
+        <p:nvSpPr>
+          <p:cNvPr id="9" name="TextBox 8"/>
+          <p:cNvSpPr txBox="1"/>
+          <p:nvPr/>
+        </p:nvSpPr>
+        <p:spPr>
+          <a:xfrm>
+            <a:off x="609600" y="1524000"/>
+            <a:ext cx="2514600" cy="2677656"/>
+          </a:xfrm>
+          <a:prstGeom prst="rect">
+            <a:avLst/>
+          </a:prstGeom>
+          <a:noFill/>
+        </p:spPr>
+        <p:txBody>
+          <a:bodyPr wrap="square" rtlCol="0">
+            <a:spAutoFit/>
+          </a:bodyPr>
+          <a:lstStyle/>
+          <a:p>
+            <a:r>
+              <a:rPr lang="en-US" sz="2400" dirty="0" err="1" smtClean="0"/>
+              <a:t>Heatmap</a:t>
+            </a:r>
+            <a:r>
+              <a:rPr lang="en-US" sz="2400" dirty="0" smtClean="0"/>
+              <a:t> of the FPKM values from the 2 samples that went through the transcriptome profiling pipeline.</a:t>
+            </a:r>
+            <a:endParaRPr lang="en-US" sz="2400" dirty="0"/>
+          </a:p>
+        </p:txBody>
+      </p:sp>
       <p:pic>
         <p:nvPicPr>
-          <p:cNvPr id="4" name="Content Placeholder 3"/>
+          <p:cNvPr id="11" name="Content Placeholder 10"/>
           <p:cNvPicPr>
             <a:picLocks noGrp="1" noChangeAspect="1"/>
           </p:cNvPicPr>
@@ -22469,7 +22577,7 @@
             <p:ph idx="1"/>
           </p:nvPr>
         </p:nvPicPr>
-        <p:blipFill>
+        <p:blipFill rotWithShape="1">
           <a:blip r:embed="rId2">
             <a:extLst>
               <a:ext uri="{28A0092B-C50C-407E-A947-70E740481C1C}">
@@ -22477,14 +22585,13 @@
               </a:ext>
             </a:extLst>
           </a:blip>
-          <a:stretch>
-            <a:fillRect/>
-          </a:stretch>
+          <a:srcRect r="8869"/>
+          <a:stretch/>
         </p:blipFill>
         <p:spPr>
           <a:xfrm>
-            <a:off x="2114550" y="1728787"/>
-            <a:ext cx="4914900" cy="4619625"/>
+            <a:off x="3350558" y="914400"/>
+            <a:ext cx="5793442" cy="5562600"/>
           </a:xfrm>
         </p:spPr>
       </p:pic>
@@ -22498,6 +22605,13 @@
   <p:clrMapOvr>
     <a:masterClrMapping/>
   </p:clrMapOvr>
+  <p:timing>
+    <p:tnLst>
+      <p:par>
+        <p:cTn id="1" dur="indefinite" restart="never" nodeType="tmRoot"/>
+      </p:par>
+    </p:tnLst>
+  </p:timing>
 </p:sld>
 </file>
 

</xml_diff>

<commit_message>
last minute changes to powerpoint DM
</commit_message>
<xml_diff>
--- a/asparagus.pptx
+++ b/asparagus.pptx
@@ -137,7 +137,7 @@
   </p:defaultTextStyle>
   <p:extLst>
     <p:ext uri="{EFAFB233-063F-42B5-8137-9DF3F51BA10A}">
-      <p15:sldGuideLst xmlns:p15="http://schemas.microsoft.com/office/powerpoint/2012/main" xmlns="">
+      <p15:sldGuideLst xmlns:p15="http://schemas.microsoft.com/office/powerpoint/2012/main">
         <p15:guide id="1" orient="horz" pos="2160">
           <p15:clr>
             <a:srgbClr val="A4A3A4"/>
@@ -3704,10 +3704,6 @@
             <a:rPr lang="en-US" sz="1600" b="0" i="0" dirty="0"/>
             <a:t> 259909</a:t>
           </a:r>
-          <a:r>
-            <a:rPr lang="en-US" sz="1600" dirty="0"/>
-            <a:t/>
-          </a:r>
           <a:br>
             <a:rPr lang="en-US" sz="1600" dirty="0"/>
           </a:br>
@@ -3888,13 +3884,6 @@
         </dgm:presLayoutVars>
       </dgm:prSet>
       <dgm:spPr/>
-      <dgm:t>
-        <a:bodyPr/>
-        <a:lstStyle/>
-        <a:p>
-          <a:endParaRPr lang="en-US"/>
-        </a:p>
-      </dgm:t>
     </dgm:pt>
     <dgm:pt modelId="{BDAA6788-3D12-47BC-9E42-7D38FDE7F399}" type="pres">
       <dgm:prSet presAssocID="{0446C03C-E073-45AB-A9C8-06443FEA1350}" presName="node" presStyleLbl="node1" presStyleIdx="0" presStyleCnt="3">
@@ -3903,35 +3892,14 @@
         </dgm:presLayoutVars>
       </dgm:prSet>
       <dgm:spPr/>
-      <dgm:t>
-        <a:bodyPr/>
-        <a:lstStyle/>
-        <a:p>
-          <a:endParaRPr lang="en-US"/>
-        </a:p>
-      </dgm:t>
     </dgm:pt>
     <dgm:pt modelId="{1F338E8C-445B-4795-9DFA-DDBCD4CD0223}" type="pres">
       <dgm:prSet presAssocID="{DD3773AC-ED19-47CD-9A5C-21D0582A545B}" presName="sibTrans" presStyleLbl="sibTrans2D1" presStyleIdx="0" presStyleCnt="2"/>
       <dgm:spPr/>
-      <dgm:t>
-        <a:bodyPr/>
-        <a:lstStyle/>
-        <a:p>
-          <a:endParaRPr lang="en-US"/>
-        </a:p>
-      </dgm:t>
     </dgm:pt>
     <dgm:pt modelId="{34DEC8FB-8A5E-47CA-96DE-B987907461FF}" type="pres">
       <dgm:prSet presAssocID="{DD3773AC-ED19-47CD-9A5C-21D0582A545B}" presName="connectorText" presStyleLbl="sibTrans2D1" presStyleIdx="0" presStyleCnt="2"/>
       <dgm:spPr/>
-      <dgm:t>
-        <a:bodyPr/>
-        <a:lstStyle/>
-        <a:p>
-          <a:endParaRPr lang="en-US"/>
-        </a:p>
-      </dgm:t>
     </dgm:pt>
     <dgm:pt modelId="{E1C175A5-344B-46C4-A31A-B19B85FB8577}" type="pres">
       <dgm:prSet presAssocID="{DD9D1A19-C042-4241-AC1E-CBC58119E3B1}" presName="node" presStyleLbl="node1" presStyleIdx="1" presStyleCnt="3">
@@ -3940,35 +3908,14 @@
         </dgm:presLayoutVars>
       </dgm:prSet>
       <dgm:spPr/>
-      <dgm:t>
-        <a:bodyPr/>
-        <a:lstStyle/>
-        <a:p>
-          <a:endParaRPr lang="en-US"/>
-        </a:p>
-      </dgm:t>
     </dgm:pt>
     <dgm:pt modelId="{F461BE5B-401D-414A-9175-B95B6C23DC9D}" type="pres">
       <dgm:prSet presAssocID="{2F1FB023-A283-4CF2-AD92-547252EFD921}" presName="sibTrans" presStyleLbl="sibTrans2D1" presStyleIdx="1" presStyleCnt="2"/>
       <dgm:spPr/>
-      <dgm:t>
-        <a:bodyPr/>
-        <a:lstStyle/>
-        <a:p>
-          <a:endParaRPr lang="en-US"/>
-        </a:p>
-      </dgm:t>
     </dgm:pt>
     <dgm:pt modelId="{82CB2603-4A55-4B49-A6E8-B125ED9C9E48}" type="pres">
       <dgm:prSet presAssocID="{2F1FB023-A283-4CF2-AD92-547252EFD921}" presName="connectorText" presStyleLbl="sibTrans2D1" presStyleIdx="1" presStyleCnt="2"/>
       <dgm:spPr/>
-      <dgm:t>
-        <a:bodyPr/>
-        <a:lstStyle/>
-        <a:p>
-          <a:endParaRPr lang="en-US"/>
-        </a:p>
-      </dgm:t>
     </dgm:pt>
     <dgm:pt modelId="{1886C3BF-2DFE-4372-93A8-70DF5AE5B7BB}" type="pres">
       <dgm:prSet presAssocID="{91A65AEF-6A15-4A27-BEF4-E1F29341CAE7}" presName="node" presStyleLbl="node1" presStyleIdx="2" presStyleCnt="3">
@@ -3977,47 +3924,40 @@
         </dgm:presLayoutVars>
       </dgm:prSet>
       <dgm:spPr/>
-      <dgm:t>
-        <a:bodyPr/>
-        <a:lstStyle/>
-        <a:p>
-          <a:endParaRPr lang="en-US"/>
-        </a:p>
-      </dgm:t>
     </dgm:pt>
   </dgm:ptLst>
   <dgm:cxnLst>
+    <dgm:cxn modelId="{B4F95DF4-F8F0-49E1-8506-908FAFE11139}" srcId="{7F00E8CE-6E56-4F4D-88C9-C0473C61FC8D}" destId="{DD9D1A19-C042-4241-AC1E-CBC58119E3B1}" srcOrd="1" destOrd="0" parTransId="{777BD4C7-AAA8-4A81-829D-A0D2FF6AA15F}" sibTransId="{2F1FB023-A283-4CF2-AD92-547252EFD921}"/>
+    <dgm:cxn modelId="{C1D70DC3-BB6F-4772-8D52-C73C49E18F26}" type="presOf" srcId="{2F1FB023-A283-4CF2-AD92-547252EFD921}" destId="{82CB2603-4A55-4B49-A6E8-B125ED9C9E48}" srcOrd="1" destOrd="0" presId="urn:microsoft.com/office/officeart/2005/8/layout/process1"/>
+    <dgm:cxn modelId="{79AE3E36-3F6D-4B29-A511-5D0B9A6434B9}" type="presOf" srcId="{C466413A-A54D-4592-9067-4A7632047ADD}" destId="{BDAA6788-3D12-47BC-9E42-7D38FDE7F399}" srcOrd="0" destOrd="1" presId="urn:microsoft.com/office/officeart/2005/8/layout/process1"/>
+    <dgm:cxn modelId="{00CE3C1E-BC5E-4AEE-B410-7750B957FC84}" type="presOf" srcId="{F5351295-5A7B-4686-BA6C-AAD51831210B}" destId="{BDAA6788-3D12-47BC-9E42-7D38FDE7F399}" srcOrd="0" destOrd="2" presId="urn:microsoft.com/office/officeart/2005/8/layout/process1"/>
     <dgm:cxn modelId="{E4780FAE-1D30-42E7-AC51-8BA88C8C3936}" srcId="{0446C03C-E073-45AB-A9C8-06443FEA1350}" destId="{C466413A-A54D-4592-9067-4A7632047ADD}" srcOrd="0" destOrd="0" parTransId="{168F6043-1350-4D89-84A3-126F1B46C4D8}" sibTransId="{BBEBD048-CE75-4AEB-8E49-5458336C8650}"/>
+    <dgm:cxn modelId="{64F483B0-D56E-4E51-A12A-C615B4470DED}" srcId="{0446C03C-E073-45AB-A9C8-06443FEA1350}" destId="{99DDACEB-7AC2-405D-8C03-62809185729F}" srcOrd="2" destOrd="0" parTransId="{FE885667-BCFC-4070-85A3-7E7661061007}" sibTransId="{3060AE7B-8CF2-467E-AFA3-68FF2185B41A}"/>
+    <dgm:cxn modelId="{0B7C5417-96E9-4D4D-89AC-6F8D69992060}" type="presOf" srcId="{99DDACEB-7AC2-405D-8C03-62809185729F}" destId="{BDAA6788-3D12-47BC-9E42-7D38FDE7F399}" srcOrd="0" destOrd="3" presId="urn:microsoft.com/office/officeart/2005/8/layout/process1"/>
+    <dgm:cxn modelId="{BCA9A3D5-D437-4983-9C4A-142C813CBF20}" srcId="{DD9D1A19-C042-4241-AC1E-CBC58119E3B1}" destId="{AE78AC46-7E52-44F4-B2B2-7CE10099D6ED}" srcOrd="3" destOrd="0" parTransId="{F3154323-2D0F-4AA8-BDA6-3039AF34A32D}" sibTransId="{38B06FD4-3BA9-4425-90CA-E27CB0EB86EA}"/>
+    <dgm:cxn modelId="{2E825B25-6EA5-4063-A79B-66B8818EDD05}" type="presOf" srcId="{7F00E8CE-6E56-4F4D-88C9-C0473C61FC8D}" destId="{962DDC3C-372C-41E5-98AF-1BC41210AB0A}" srcOrd="0" destOrd="0" presId="urn:microsoft.com/office/officeart/2005/8/layout/process1"/>
+    <dgm:cxn modelId="{8F4B5199-D290-4C54-BFDB-FAFDE984C92C}" type="presOf" srcId="{942CFC1C-AA12-4264-A826-2D247FC95085}" destId="{E1C175A5-344B-46C4-A31A-B19B85FB8577}" srcOrd="0" destOrd="3" presId="urn:microsoft.com/office/officeart/2005/8/layout/process1"/>
+    <dgm:cxn modelId="{2B471167-3011-4249-B4E4-797FE711F9F1}" srcId="{DD9D1A19-C042-4241-AC1E-CBC58119E3B1}" destId="{169D612B-DA50-42B2-A089-0CD33404C833}" srcOrd="1" destOrd="0" parTransId="{3DBDD095-BAC6-4E38-BFDA-31C50CC1291F}" sibTransId="{D8E076AF-17A9-4432-91BD-D6211BC0EA7C}"/>
+    <dgm:cxn modelId="{46EEA246-DA9F-4BBB-89F1-BFFE8CD15378}" srcId="{7F00E8CE-6E56-4F4D-88C9-C0473C61FC8D}" destId="{0446C03C-E073-45AB-A9C8-06443FEA1350}" srcOrd="0" destOrd="0" parTransId="{166EBAF9-EA67-41C7-9543-4E7B353618A0}" sibTransId="{DD3773AC-ED19-47CD-9A5C-21D0582A545B}"/>
+    <dgm:cxn modelId="{DC9946B6-D564-4A8F-8A08-9E5A6CD74436}" srcId="{91A65AEF-6A15-4A27-BEF4-E1F29341CAE7}" destId="{F1C2D6F1-7C50-4518-AF30-C62830E34870}" srcOrd="0" destOrd="0" parTransId="{00864D43-7BE9-45DA-BAE4-E75E36C45913}" sibTransId="{7AA76297-BF81-4187-8BAD-57F1348D4BB5}"/>
+    <dgm:cxn modelId="{6CA895F7-DC0B-4666-938A-B116866643B2}" type="presOf" srcId="{7305E311-BA18-4725-86B1-D9DF66556862}" destId="{1886C3BF-2DFE-4372-93A8-70DF5AE5B7BB}" srcOrd="0" destOrd="3" presId="urn:microsoft.com/office/officeart/2005/8/layout/process1"/>
+    <dgm:cxn modelId="{70398382-2953-4312-9820-0DB9982CAEDB}" type="presOf" srcId="{2F1FB023-A283-4CF2-AD92-547252EFD921}" destId="{F461BE5B-401D-414A-9175-B95B6C23DC9D}" srcOrd="0" destOrd="0" presId="urn:microsoft.com/office/officeart/2005/8/layout/process1"/>
+    <dgm:cxn modelId="{22FC1ECA-E709-46D6-9263-3055451A2D92}" srcId="{DD9D1A19-C042-4241-AC1E-CBC58119E3B1}" destId="{942CFC1C-AA12-4264-A826-2D247FC95085}" srcOrd="2" destOrd="0" parTransId="{7CB0AD2C-A735-4A10-B9FB-A1061338BA5B}" sibTransId="{F0159CE7-914F-482D-8628-34B12113E511}"/>
+    <dgm:cxn modelId="{1C94B997-07FB-4D8B-B2E8-FF341A774F9B}" type="presOf" srcId="{169D612B-DA50-42B2-A089-0CD33404C833}" destId="{E1C175A5-344B-46C4-A31A-B19B85FB8577}" srcOrd="0" destOrd="2" presId="urn:microsoft.com/office/officeart/2005/8/layout/process1"/>
+    <dgm:cxn modelId="{57DFCDEE-5952-43CC-BCE2-536517B17C25}" type="presOf" srcId="{5E3E51B3-C034-40DA-8D6B-12A51F79F84F}" destId="{1886C3BF-2DFE-4372-93A8-70DF5AE5B7BB}" srcOrd="0" destOrd="2" presId="urn:microsoft.com/office/officeart/2005/8/layout/process1"/>
+    <dgm:cxn modelId="{7D477BAE-EA9F-4D3C-AE9E-B69332CB574A}" type="presOf" srcId="{DD3773AC-ED19-47CD-9A5C-21D0582A545B}" destId="{1F338E8C-445B-4795-9DFA-DDBCD4CD0223}" srcOrd="0" destOrd="0" presId="urn:microsoft.com/office/officeart/2005/8/layout/process1"/>
+    <dgm:cxn modelId="{97963869-47A2-410C-957F-FA9E0ABBA8EA}" type="presOf" srcId="{81A854F5-D3EB-49EB-AF5F-B56F6C8F5EC5}" destId="{E1C175A5-344B-46C4-A31A-B19B85FB8577}" srcOrd="0" destOrd="1" presId="urn:microsoft.com/office/officeart/2005/8/layout/process1"/>
+    <dgm:cxn modelId="{932179C8-46BB-4EBA-B01E-CFBCCFA4DC21}" type="presOf" srcId="{AE78AC46-7E52-44F4-B2B2-7CE10099D6ED}" destId="{E1C175A5-344B-46C4-A31A-B19B85FB8577}" srcOrd="0" destOrd="4" presId="urn:microsoft.com/office/officeart/2005/8/layout/process1"/>
+    <dgm:cxn modelId="{7F065C32-943E-4B45-992C-FEEA645ADE92}" type="presOf" srcId="{0446C03C-E073-45AB-A9C8-06443FEA1350}" destId="{BDAA6788-3D12-47BC-9E42-7D38FDE7F399}" srcOrd="0" destOrd="0" presId="urn:microsoft.com/office/officeart/2005/8/layout/process1"/>
+    <dgm:cxn modelId="{A35BA005-231A-4DF5-ACF3-C891B914081F}" type="presOf" srcId="{F1C2D6F1-7C50-4518-AF30-C62830E34870}" destId="{1886C3BF-2DFE-4372-93A8-70DF5AE5B7BB}" srcOrd="0" destOrd="1" presId="urn:microsoft.com/office/officeart/2005/8/layout/process1"/>
+    <dgm:cxn modelId="{C21346BE-6B39-4AD3-9F67-10CFC4398D3C}" type="presOf" srcId="{91A65AEF-6A15-4A27-BEF4-E1F29341CAE7}" destId="{1886C3BF-2DFE-4372-93A8-70DF5AE5B7BB}" srcOrd="0" destOrd="0" presId="urn:microsoft.com/office/officeart/2005/8/layout/process1"/>
+    <dgm:cxn modelId="{00F6D34C-34A9-4267-BA6D-2341A482C667}" type="presOf" srcId="{DD3773AC-ED19-47CD-9A5C-21D0582A545B}" destId="{34DEC8FB-8A5E-47CA-96DE-B987907461FF}" srcOrd="1" destOrd="0" presId="urn:microsoft.com/office/officeart/2005/8/layout/process1"/>
+    <dgm:cxn modelId="{089EAF4D-0718-4A95-82BC-C9DC79A61562}" srcId="{DD9D1A19-C042-4241-AC1E-CBC58119E3B1}" destId="{81A854F5-D3EB-49EB-AF5F-B56F6C8F5EC5}" srcOrd="0" destOrd="0" parTransId="{56C0F259-9B7E-421E-8F8E-530B0F5CE873}" sibTransId="{9F016FBE-B21A-4F9E-B770-AF7EB9058F08}"/>
+    <dgm:cxn modelId="{E52E4512-9B52-4829-8292-891CD1605CFA}" type="presOf" srcId="{DD9D1A19-C042-4241-AC1E-CBC58119E3B1}" destId="{E1C175A5-344B-46C4-A31A-B19B85FB8577}" srcOrd="0" destOrd="0" presId="urn:microsoft.com/office/officeart/2005/8/layout/process1"/>
+    <dgm:cxn modelId="{274EF8EA-833F-4500-9EC7-213330933E55}" srcId="{91A65AEF-6A15-4A27-BEF4-E1F29341CAE7}" destId="{5E3E51B3-C034-40DA-8D6B-12A51F79F84F}" srcOrd="1" destOrd="0" parTransId="{655E7F96-779F-49AD-864A-E6F2A6C31883}" sibTransId="{D2A9912C-C23B-4036-9067-0181019705BF}"/>
     <dgm:cxn modelId="{79EC4E32-DBFE-4EC9-87D3-E83007DEB976}" srcId="{7F00E8CE-6E56-4F4D-88C9-C0473C61FC8D}" destId="{91A65AEF-6A15-4A27-BEF4-E1F29341CAE7}" srcOrd="2" destOrd="0" parTransId="{73FB7926-F3DC-4072-892E-5CDBC32AC16D}" sibTransId="{26F79743-5592-4A48-AD2F-903A4A3C64B0}"/>
-    <dgm:cxn modelId="{274EF8EA-833F-4500-9EC7-213330933E55}" srcId="{91A65AEF-6A15-4A27-BEF4-E1F29341CAE7}" destId="{5E3E51B3-C034-40DA-8D6B-12A51F79F84F}" srcOrd="1" destOrd="0" parTransId="{655E7F96-779F-49AD-864A-E6F2A6C31883}" sibTransId="{D2A9912C-C23B-4036-9067-0181019705BF}"/>
-    <dgm:cxn modelId="{79AE3E36-3F6D-4B29-A511-5D0B9A6434B9}" type="presOf" srcId="{C466413A-A54D-4592-9067-4A7632047ADD}" destId="{BDAA6788-3D12-47BC-9E42-7D38FDE7F399}" srcOrd="0" destOrd="1" presId="urn:microsoft.com/office/officeart/2005/8/layout/process1"/>
-    <dgm:cxn modelId="{E52E4512-9B52-4829-8292-891CD1605CFA}" type="presOf" srcId="{DD9D1A19-C042-4241-AC1E-CBC58119E3B1}" destId="{E1C175A5-344B-46C4-A31A-B19B85FB8577}" srcOrd="0" destOrd="0" presId="urn:microsoft.com/office/officeart/2005/8/layout/process1"/>
-    <dgm:cxn modelId="{2B471167-3011-4249-B4E4-797FE711F9F1}" srcId="{DD9D1A19-C042-4241-AC1E-CBC58119E3B1}" destId="{169D612B-DA50-42B2-A089-0CD33404C833}" srcOrd="1" destOrd="0" parTransId="{3DBDD095-BAC6-4E38-BFDA-31C50CC1291F}" sibTransId="{D8E076AF-17A9-4432-91BD-D6211BC0EA7C}"/>
-    <dgm:cxn modelId="{089EAF4D-0718-4A95-82BC-C9DC79A61562}" srcId="{DD9D1A19-C042-4241-AC1E-CBC58119E3B1}" destId="{81A854F5-D3EB-49EB-AF5F-B56F6C8F5EC5}" srcOrd="0" destOrd="0" parTransId="{56C0F259-9B7E-421E-8F8E-530B0F5CE873}" sibTransId="{9F016FBE-B21A-4F9E-B770-AF7EB9058F08}"/>
-    <dgm:cxn modelId="{22FC1ECA-E709-46D6-9263-3055451A2D92}" srcId="{DD9D1A19-C042-4241-AC1E-CBC58119E3B1}" destId="{942CFC1C-AA12-4264-A826-2D247FC95085}" srcOrd="2" destOrd="0" parTransId="{7CB0AD2C-A735-4A10-B9FB-A1061338BA5B}" sibTransId="{F0159CE7-914F-482D-8628-34B12113E511}"/>
-    <dgm:cxn modelId="{00CE3C1E-BC5E-4AEE-B410-7750B957FC84}" type="presOf" srcId="{F5351295-5A7B-4686-BA6C-AAD51831210B}" destId="{BDAA6788-3D12-47BC-9E42-7D38FDE7F399}" srcOrd="0" destOrd="2" presId="urn:microsoft.com/office/officeart/2005/8/layout/process1"/>
-    <dgm:cxn modelId="{2E825B25-6EA5-4063-A79B-66B8818EDD05}" type="presOf" srcId="{7F00E8CE-6E56-4F4D-88C9-C0473C61FC8D}" destId="{962DDC3C-372C-41E5-98AF-1BC41210AB0A}" srcOrd="0" destOrd="0" presId="urn:microsoft.com/office/officeart/2005/8/layout/process1"/>
-    <dgm:cxn modelId="{C21346BE-6B39-4AD3-9F67-10CFC4398D3C}" type="presOf" srcId="{91A65AEF-6A15-4A27-BEF4-E1F29341CAE7}" destId="{1886C3BF-2DFE-4372-93A8-70DF5AE5B7BB}" srcOrd="0" destOrd="0" presId="urn:microsoft.com/office/officeart/2005/8/layout/process1"/>
-    <dgm:cxn modelId="{DC9946B6-D564-4A8F-8A08-9E5A6CD74436}" srcId="{91A65AEF-6A15-4A27-BEF4-E1F29341CAE7}" destId="{F1C2D6F1-7C50-4518-AF30-C62830E34870}" srcOrd="0" destOrd="0" parTransId="{00864D43-7BE9-45DA-BAE4-E75E36C45913}" sibTransId="{7AA76297-BF81-4187-8BAD-57F1348D4BB5}"/>
-    <dgm:cxn modelId="{0B7C5417-96E9-4D4D-89AC-6F8D69992060}" type="presOf" srcId="{99DDACEB-7AC2-405D-8C03-62809185729F}" destId="{BDAA6788-3D12-47BC-9E42-7D38FDE7F399}" srcOrd="0" destOrd="3" presId="urn:microsoft.com/office/officeart/2005/8/layout/process1"/>
-    <dgm:cxn modelId="{C1D70DC3-BB6F-4772-8D52-C73C49E18F26}" type="presOf" srcId="{2F1FB023-A283-4CF2-AD92-547252EFD921}" destId="{82CB2603-4A55-4B49-A6E8-B125ED9C9E48}" srcOrd="1" destOrd="0" presId="urn:microsoft.com/office/officeart/2005/8/layout/process1"/>
-    <dgm:cxn modelId="{1C94B997-07FB-4D8B-B2E8-FF341A774F9B}" type="presOf" srcId="{169D612B-DA50-42B2-A089-0CD33404C833}" destId="{E1C175A5-344B-46C4-A31A-B19B85FB8577}" srcOrd="0" destOrd="2" presId="urn:microsoft.com/office/officeart/2005/8/layout/process1"/>
-    <dgm:cxn modelId="{B4F95DF4-F8F0-49E1-8506-908FAFE11139}" srcId="{7F00E8CE-6E56-4F4D-88C9-C0473C61FC8D}" destId="{DD9D1A19-C042-4241-AC1E-CBC58119E3B1}" srcOrd="1" destOrd="0" parTransId="{777BD4C7-AAA8-4A81-829D-A0D2FF6AA15F}" sibTransId="{2F1FB023-A283-4CF2-AD92-547252EFD921}"/>
-    <dgm:cxn modelId="{64F483B0-D56E-4E51-A12A-C615B4470DED}" srcId="{0446C03C-E073-45AB-A9C8-06443FEA1350}" destId="{99DDACEB-7AC2-405D-8C03-62809185729F}" srcOrd="2" destOrd="0" parTransId="{FE885667-BCFC-4070-85A3-7E7661061007}" sibTransId="{3060AE7B-8CF2-467E-AFA3-68FF2185B41A}"/>
-    <dgm:cxn modelId="{7D477BAE-EA9F-4D3C-AE9E-B69332CB574A}" type="presOf" srcId="{DD3773AC-ED19-47CD-9A5C-21D0582A545B}" destId="{1F338E8C-445B-4795-9DFA-DDBCD4CD0223}" srcOrd="0" destOrd="0" presId="urn:microsoft.com/office/officeart/2005/8/layout/process1"/>
-    <dgm:cxn modelId="{00F6D34C-34A9-4267-BA6D-2341A482C667}" type="presOf" srcId="{DD3773AC-ED19-47CD-9A5C-21D0582A545B}" destId="{34DEC8FB-8A5E-47CA-96DE-B987907461FF}" srcOrd="1" destOrd="0" presId="urn:microsoft.com/office/officeart/2005/8/layout/process1"/>
-    <dgm:cxn modelId="{6CA895F7-DC0B-4666-938A-B116866643B2}" type="presOf" srcId="{7305E311-BA18-4725-86B1-D9DF66556862}" destId="{1886C3BF-2DFE-4372-93A8-70DF5AE5B7BB}" srcOrd="0" destOrd="3" presId="urn:microsoft.com/office/officeart/2005/8/layout/process1"/>
-    <dgm:cxn modelId="{7F065C32-943E-4B45-992C-FEEA645ADE92}" type="presOf" srcId="{0446C03C-E073-45AB-A9C8-06443FEA1350}" destId="{BDAA6788-3D12-47BC-9E42-7D38FDE7F399}" srcOrd="0" destOrd="0" presId="urn:microsoft.com/office/officeart/2005/8/layout/process1"/>
-    <dgm:cxn modelId="{932179C8-46BB-4EBA-B01E-CFBCCFA4DC21}" type="presOf" srcId="{AE78AC46-7E52-44F4-B2B2-7CE10099D6ED}" destId="{E1C175A5-344B-46C4-A31A-B19B85FB8577}" srcOrd="0" destOrd="4" presId="urn:microsoft.com/office/officeart/2005/8/layout/process1"/>
-    <dgm:cxn modelId="{46EEA246-DA9F-4BBB-89F1-BFFE8CD15378}" srcId="{7F00E8CE-6E56-4F4D-88C9-C0473C61FC8D}" destId="{0446C03C-E073-45AB-A9C8-06443FEA1350}" srcOrd="0" destOrd="0" parTransId="{166EBAF9-EA67-41C7-9543-4E7B353618A0}" sibTransId="{DD3773AC-ED19-47CD-9A5C-21D0582A545B}"/>
-    <dgm:cxn modelId="{BCA9A3D5-D437-4983-9C4A-142C813CBF20}" srcId="{DD9D1A19-C042-4241-AC1E-CBC58119E3B1}" destId="{AE78AC46-7E52-44F4-B2B2-7CE10099D6ED}" srcOrd="3" destOrd="0" parTransId="{F3154323-2D0F-4AA8-BDA6-3039AF34A32D}" sibTransId="{38B06FD4-3BA9-4425-90CA-E27CB0EB86EA}"/>
-    <dgm:cxn modelId="{97963869-47A2-410C-957F-FA9E0ABBA8EA}" type="presOf" srcId="{81A854F5-D3EB-49EB-AF5F-B56F6C8F5EC5}" destId="{E1C175A5-344B-46C4-A31A-B19B85FB8577}" srcOrd="0" destOrd="1" presId="urn:microsoft.com/office/officeart/2005/8/layout/process1"/>
+    <dgm:cxn modelId="{AC0F4E34-1EE9-4B66-99B0-32ECCF3AFCEA}" srcId="{91A65AEF-6A15-4A27-BEF4-E1F29341CAE7}" destId="{7305E311-BA18-4725-86B1-D9DF66556862}" srcOrd="2" destOrd="0" parTransId="{35EE8319-C046-48CC-965F-761964A1A1D8}" sibTransId="{BAA32ABE-2C94-4499-B5F5-1BE81733AACE}"/>
     <dgm:cxn modelId="{FEE8B482-E279-4E5C-BE13-C7106536C100}" srcId="{0446C03C-E073-45AB-A9C8-06443FEA1350}" destId="{F5351295-5A7B-4686-BA6C-AAD51831210B}" srcOrd="1" destOrd="0" parTransId="{8DB328E6-5015-4445-94EC-9C99E54FD70D}" sibTransId="{C5A711CA-AA1A-4629-BB87-67B93CCD2D61}"/>
-    <dgm:cxn modelId="{70398382-2953-4312-9820-0DB9982CAEDB}" type="presOf" srcId="{2F1FB023-A283-4CF2-AD92-547252EFD921}" destId="{F461BE5B-401D-414A-9175-B95B6C23DC9D}" srcOrd="0" destOrd="0" presId="urn:microsoft.com/office/officeart/2005/8/layout/process1"/>
-    <dgm:cxn modelId="{57DFCDEE-5952-43CC-BCE2-536517B17C25}" type="presOf" srcId="{5E3E51B3-C034-40DA-8D6B-12A51F79F84F}" destId="{1886C3BF-2DFE-4372-93A8-70DF5AE5B7BB}" srcOrd="0" destOrd="2" presId="urn:microsoft.com/office/officeart/2005/8/layout/process1"/>
-    <dgm:cxn modelId="{8F4B5199-D290-4C54-BFDB-FAFDE984C92C}" type="presOf" srcId="{942CFC1C-AA12-4264-A826-2D247FC95085}" destId="{E1C175A5-344B-46C4-A31A-B19B85FB8577}" srcOrd="0" destOrd="3" presId="urn:microsoft.com/office/officeart/2005/8/layout/process1"/>
-    <dgm:cxn modelId="{AC0F4E34-1EE9-4B66-99B0-32ECCF3AFCEA}" srcId="{91A65AEF-6A15-4A27-BEF4-E1F29341CAE7}" destId="{7305E311-BA18-4725-86B1-D9DF66556862}" srcOrd="2" destOrd="0" parTransId="{35EE8319-C046-48CC-965F-761964A1A1D8}" sibTransId="{BAA32ABE-2C94-4499-B5F5-1BE81733AACE}"/>
-    <dgm:cxn modelId="{A35BA005-231A-4DF5-ACF3-C891B914081F}" type="presOf" srcId="{F1C2D6F1-7C50-4518-AF30-C62830E34870}" destId="{1886C3BF-2DFE-4372-93A8-70DF5AE5B7BB}" srcOrd="0" destOrd="1" presId="urn:microsoft.com/office/officeart/2005/8/layout/process1"/>
     <dgm:cxn modelId="{1384C4A0-1E04-4060-89DC-38ACFD604295}" type="presParOf" srcId="{962DDC3C-372C-41E5-98AF-1BC41210AB0A}" destId="{BDAA6788-3D12-47BC-9E42-7D38FDE7F399}" srcOrd="0" destOrd="0" presId="urn:microsoft.com/office/officeart/2005/8/layout/process1"/>
     <dgm:cxn modelId="{6914B89C-996B-4428-B6D6-4F300640B65E}" type="presParOf" srcId="{962DDC3C-372C-41E5-98AF-1BC41210AB0A}" destId="{1F338E8C-445B-4795-9DFA-DDBCD4CD0223}" srcOrd="1" destOrd="0" presId="urn:microsoft.com/office/officeart/2005/8/layout/process1"/>
     <dgm:cxn modelId="{09391D10-8263-4063-ACCB-80C26E2DCE68}" type="presParOf" srcId="{1F338E8C-445B-4795-9DFA-DDBCD4CD0223}" destId="{34DEC8FB-8A5E-47CA-96DE-B987907461FF}" srcOrd="0" destOrd="0" presId="urn:microsoft.com/office/officeart/2005/8/layout/process1"/>
@@ -4131,35 +4071,14 @@
         </dgm:presLayoutVars>
       </dgm:prSet>
       <dgm:spPr/>
-      <dgm:t>
-        <a:bodyPr/>
-        <a:lstStyle/>
-        <a:p>
-          <a:endParaRPr lang="en-US"/>
-        </a:p>
-      </dgm:t>
     </dgm:pt>
     <dgm:pt modelId="{88EDF64E-35BB-481B-B11A-F08915958068}" type="pres">
       <dgm:prSet presAssocID="{E892C2B4-4244-468D-917A-E776E4200961}" presName="sibTrans" presStyleLbl="sibTrans2D1" presStyleIdx="0" presStyleCnt="1"/>
       <dgm:spPr/>
-      <dgm:t>
-        <a:bodyPr/>
-        <a:lstStyle/>
-        <a:p>
-          <a:endParaRPr lang="en-US"/>
-        </a:p>
-      </dgm:t>
     </dgm:pt>
     <dgm:pt modelId="{F3C8F6A7-EE57-4CE9-92F3-C5249F31F420}" type="pres">
       <dgm:prSet presAssocID="{E892C2B4-4244-468D-917A-E776E4200961}" presName="connectorText" presStyleLbl="sibTrans2D1" presStyleIdx="0" presStyleCnt="1"/>
       <dgm:spPr/>
-      <dgm:t>
-        <a:bodyPr/>
-        <a:lstStyle/>
-        <a:p>
-          <a:endParaRPr lang="en-US"/>
-        </a:p>
-      </dgm:t>
     </dgm:pt>
     <dgm:pt modelId="{174F3DC6-92D1-46F3-BBD6-C834F6469487}" type="pres">
       <dgm:prSet presAssocID="{3E86D3FA-BD3A-4833-9766-85B4B2E840DF}" presName="node" presStyleLbl="node1" presStyleIdx="1" presStyleCnt="2">
@@ -4168,13 +4087,6 @@
         </dgm:presLayoutVars>
       </dgm:prSet>
       <dgm:spPr/>
-      <dgm:t>
-        <a:bodyPr/>
-        <a:lstStyle/>
-        <a:p>
-          <a:endParaRPr lang="en-US"/>
-        </a:p>
-      </dgm:t>
     </dgm:pt>
   </dgm:ptLst>
   <dgm:cxnLst>
@@ -4375,35 +4287,14 @@
         </dgm:presLayoutVars>
       </dgm:prSet>
       <dgm:spPr/>
-      <dgm:t>
-        <a:bodyPr/>
-        <a:lstStyle/>
-        <a:p>
-          <a:endParaRPr lang="en-US"/>
-        </a:p>
-      </dgm:t>
     </dgm:pt>
     <dgm:pt modelId="{F743BBA3-F85A-4955-B22D-74C8A453CDA2}" type="pres">
       <dgm:prSet presAssocID="{652A2CBE-7EEC-43CF-9E13-4590DEBC9582}" presName="sibTrans" presStyleLbl="sibTrans2D1" presStyleIdx="0" presStyleCnt="3"/>
       <dgm:spPr/>
-      <dgm:t>
-        <a:bodyPr/>
-        <a:lstStyle/>
-        <a:p>
-          <a:endParaRPr lang="en-US"/>
-        </a:p>
-      </dgm:t>
     </dgm:pt>
     <dgm:pt modelId="{8B8B4377-0697-45FC-A640-F2CE0A54A7DA}" type="pres">
       <dgm:prSet presAssocID="{652A2CBE-7EEC-43CF-9E13-4590DEBC9582}" presName="connectorText" presStyleLbl="sibTrans2D1" presStyleIdx="0" presStyleCnt="3"/>
       <dgm:spPr/>
-      <dgm:t>
-        <a:bodyPr/>
-        <a:lstStyle/>
-        <a:p>
-          <a:endParaRPr lang="en-US"/>
-        </a:p>
-      </dgm:t>
     </dgm:pt>
     <dgm:pt modelId="{34C7BCB3-04DB-45C7-9A42-320BFF7BC6DD}" type="pres">
       <dgm:prSet presAssocID="{BF1D83B5-B3DF-493F-A256-78F574499C76}" presName="node" presStyleLbl="node1" presStyleIdx="1" presStyleCnt="4">
@@ -4412,35 +4303,14 @@
         </dgm:presLayoutVars>
       </dgm:prSet>
       <dgm:spPr/>
-      <dgm:t>
-        <a:bodyPr/>
-        <a:lstStyle/>
-        <a:p>
-          <a:endParaRPr lang="en-US"/>
-        </a:p>
-      </dgm:t>
     </dgm:pt>
     <dgm:pt modelId="{9C101147-473E-42D2-A0E5-5ABF38B50C73}" type="pres">
       <dgm:prSet presAssocID="{C3C10AC9-1ADB-403C-A703-3E7E7FA57BF8}" presName="sibTrans" presStyleLbl="sibTrans2D1" presStyleIdx="1" presStyleCnt="3"/>
       <dgm:spPr/>
-      <dgm:t>
-        <a:bodyPr/>
-        <a:lstStyle/>
-        <a:p>
-          <a:endParaRPr lang="en-US"/>
-        </a:p>
-      </dgm:t>
     </dgm:pt>
     <dgm:pt modelId="{8DC65580-354A-49B6-A367-B6A9A3244483}" type="pres">
       <dgm:prSet presAssocID="{C3C10AC9-1ADB-403C-A703-3E7E7FA57BF8}" presName="connectorText" presStyleLbl="sibTrans2D1" presStyleIdx="1" presStyleCnt="3"/>
       <dgm:spPr/>
-      <dgm:t>
-        <a:bodyPr/>
-        <a:lstStyle/>
-        <a:p>
-          <a:endParaRPr lang="en-US"/>
-        </a:p>
-      </dgm:t>
     </dgm:pt>
     <dgm:pt modelId="{732646D0-614E-4567-8EB3-FE5BADE041C4}" type="pres">
       <dgm:prSet presAssocID="{9943014D-8C6E-463D-A613-48F23D4519B7}" presName="node" presStyleLbl="node1" presStyleIdx="2" presStyleCnt="4">
@@ -4449,35 +4319,14 @@
         </dgm:presLayoutVars>
       </dgm:prSet>
       <dgm:spPr/>
-      <dgm:t>
-        <a:bodyPr/>
-        <a:lstStyle/>
-        <a:p>
-          <a:endParaRPr lang="en-US"/>
-        </a:p>
-      </dgm:t>
     </dgm:pt>
     <dgm:pt modelId="{C450CEE9-1A94-4A67-8B6D-B4519DBA50F0}" type="pres">
       <dgm:prSet presAssocID="{E1FFF456-3F57-4AA5-801E-995CE96CAF64}" presName="sibTrans" presStyleLbl="sibTrans2D1" presStyleIdx="2" presStyleCnt="3"/>
       <dgm:spPr/>
-      <dgm:t>
-        <a:bodyPr/>
-        <a:lstStyle/>
-        <a:p>
-          <a:endParaRPr lang="en-US"/>
-        </a:p>
-      </dgm:t>
     </dgm:pt>
     <dgm:pt modelId="{42481493-BF49-4D21-914E-E49B566E00C1}" type="pres">
       <dgm:prSet presAssocID="{E1FFF456-3F57-4AA5-801E-995CE96CAF64}" presName="connectorText" presStyleLbl="sibTrans2D1" presStyleIdx="2" presStyleCnt="3"/>
       <dgm:spPr/>
-      <dgm:t>
-        <a:bodyPr/>
-        <a:lstStyle/>
-        <a:p>
-          <a:endParaRPr lang="en-US"/>
-        </a:p>
-      </dgm:t>
     </dgm:pt>
     <dgm:pt modelId="{E1A97CE5-89F8-4DCF-B4DC-A0ABABE32E9B}" type="pres">
       <dgm:prSet presAssocID="{727CD113-AE2A-4DE5-BC4F-9A72EB55259C}" presName="node" presStyleLbl="node1" presStyleIdx="3" presStyleCnt="4">
@@ -4486,13 +4335,6 @@
         </dgm:presLayoutVars>
       </dgm:prSet>
       <dgm:spPr/>
-      <dgm:t>
-        <a:bodyPr/>
-        <a:lstStyle/>
-        <a:p>
-          <a:endParaRPr lang="en-US"/>
-        </a:p>
-      </dgm:t>
     </dgm:pt>
   </dgm:ptLst>
   <dgm:cxnLst>
@@ -4998,13 +4840,6 @@
         </dgm:presLayoutVars>
       </dgm:prSet>
       <dgm:spPr/>
-      <dgm:t>
-        <a:bodyPr/>
-        <a:lstStyle/>
-        <a:p>
-          <a:endParaRPr lang="en-US"/>
-        </a:p>
-      </dgm:t>
     </dgm:pt>
     <dgm:pt modelId="{AB8C601B-4365-4E3A-9CA6-9D06E9BCDD70}" type="pres">
       <dgm:prSet presAssocID="{EC62BD84-3ADA-4D62-A238-5C25F36574A7}" presName="composite" presStyleCnt="0"/>
@@ -5023,13 +4858,6 @@
         </dgm:presLayoutVars>
       </dgm:prSet>
       <dgm:spPr/>
-      <dgm:t>
-        <a:bodyPr/>
-        <a:lstStyle/>
-        <a:p>
-          <a:endParaRPr lang="en-US"/>
-        </a:p>
-      </dgm:t>
     </dgm:pt>
     <dgm:pt modelId="{2B70D009-F13D-44C0-A7BC-54C205FE77FB}" type="pres">
       <dgm:prSet presAssocID="{EC62BD84-3ADA-4D62-A238-5C25F36574A7}" presName="ChildText" presStyleLbl="revTx" presStyleIdx="0" presStyleCnt="6">
@@ -5040,13 +4868,6 @@
         </dgm:presLayoutVars>
       </dgm:prSet>
       <dgm:spPr/>
-      <dgm:t>
-        <a:bodyPr/>
-        <a:lstStyle/>
-        <a:p>
-          <a:endParaRPr lang="en-US"/>
-        </a:p>
-      </dgm:t>
     </dgm:pt>
     <dgm:pt modelId="{281CFAFE-56FC-43A9-BB74-764EA455F547}" type="pres">
       <dgm:prSet presAssocID="{950750D0-60DF-4E9F-A820-AFB7EBB48E58}" presName="sibTrans" presStyleCnt="0"/>
@@ -5069,13 +4890,6 @@
         </dgm:presLayoutVars>
       </dgm:prSet>
       <dgm:spPr/>
-      <dgm:t>
-        <a:bodyPr/>
-        <a:lstStyle/>
-        <a:p>
-          <a:endParaRPr lang="en-US"/>
-        </a:p>
-      </dgm:t>
     </dgm:pt>
     <dgm:pt modelId="{2AAE7345-B9D4-4662-AC19-BCF06F8C49FD}" type="pres">
       <dgm:prSet presAssocID="{67594A18-8BF6-496C-A000-0D9DD1029B4F}" presName="ChildText" presStyleLbl="revTx" presStyleIdx="1" presStyleCnt="6">
@@ -5086,13 +4900,6 @@
         </dgm:presLayoutVars>
       </dgm:prSet>
       <dgm:spPr/>
-      <dgm:t>
-        <a:bodyPr/>
-        <a:lstStyle/>
-        <a:p>
-          <a:endParaRPr lang="en-US"/>
-        </a:p>
-      </dgm:t>
     </dgm:pt>
     <dgm:pt modelId="{77FB48DC-542B-47DA-8F3D-07CABFEA80C6}" type="pres">
       <dgm:prSet presAssocID="{84DB37C6-42F4-416A-B64E-7607627251ED}" presName="sibTrans" presStyleCnt="0"/>
@@ -5115,13 +4922,6 @@
         </dgm:presLayoutVars>
       </dgm:prSet>
       <dgm:spPr/>
-      <dgm:t>
-        <a:bodyPr/>
-        <a:lstStyle/>
-        <a:p>
-          <a:endParaRPr lang="en-US"/>
-        </a:p>
-      </dgm:t>
     </dgm:pt>
     <dgm:pt modelId="{1065B556-C4C5-451F-9E11-5643BF244E6D}" type="pres">
       <dgm:prSet presAssocID="{CB4D03F2-A463-483F-B6E9-E0DF88327D26}" presName="ChildText" presStyleLbl="revTx" presStyleIdx="2" presStyleCnt="6">
@@ -5132,13 +4932,6 @@
         </dgm:presLayoutVars>
       </dgm:prSet>
       <dgm:spPr/>
-      <dgm:t>
-        <a:bodyPr/>
-        <a:lstStyle/>
-        <a:p>
-          <a:endParaRPr lang="en-US"/>
-        </a:p>
-      </dgm:t>
     </dgm:pt>
     <dgm:pt modelId="{FE91066B-826B-4E8F-8F89-65D97E96FD3E}" type="pres">
       <dgm:prSet presAssocID="{45EA78CC-ED60-44A4-B35A-4F4D41AD9074}" presName="sibTrans" presStyleCnt="0"/>
@@ -5161,13 +4954,6 @@
         </dgm:presLayoutVars>
       </dgm:prSet>
       <dgm:spPr/>
-      <dgm:t>
-        <a:bodyPr/>
-        <a:lstStyle/>
-        <a:p>
-          <a:endParaRPr lang="en-US"/>
-        </a:p>
-      </dgm:t>
     </dgm:pt>
     <dgm:pt modelId="{87A88EA6-ADD6-41C7-99DF-6D5B6FCF6A5F}" type="pres">
       <dgm:prSet presAssocID="{92513214-5084-4272-9D93-357D7B9D089E}" presName="ChildText" presStyleLbl="revTx" presStyleIdx="3" presStyleCnt="6">
@@ -5200,13 +4986,6 @@
         </dgm:presLayoutVars>
       </dgm:prSet>
       <dgm:spPr/>
-      <dgm:t>
-        <a:bodyPr/>
-        <a:lstStyle/>
-        <a:p>
-          <a:endParaRPr lang="en-US"/>
-        </a:p>
-      </dgm:t>
     </dgm:pt>
     <dgm:pt modelId="{3B7E9670-7370-4317-AD00-E6DF1B3CDE86}" type="pres">
       <dgm:prSet presAssocID="{74F98B7C-30AE-4741-94A0-EDC036253585}" presName="ChildText" presStyleLbl="revTx" presStyleIdx="4" presStyleCnt="6">
@@ -5217,13 +4996,6 @@
         </dgm:presLayoutVars>
       </dgm:prSet>
       <dgm:spPr/>
-      <dgm:t>
-        <a:bodyPr/>
-        <a:lstStyle/>
-        <a:p>
-          <a:endParaRPr lang="en-US"/>
-        </a:p>
-      </dgm:t>
     </dgm:pt>
     <dgm:pt modelId="{B6AE8FF3-C372-4990-A87E-690E0742B0A0}" type="pres">
       <dgm:prSet presAssocID="{86E1F1B4-C851-4BFE-8C51-011F9845B2E8}" presName="sibTrans" presStyleCnt="0"/>
@@ -5246,13 +5018,6 @@
         </dgm:presLayoutVars>
       </dgm:prSet>
       <dgm:spPr/>
-      <dgm:t>
-        <a:bodyPr/>
-        <a:lstStyle/>
-        <a:p>
-          <a:endParaRPr lang="en-US"/>
-        </a:p>
-      </dgm:t>
     </dgm:pt>
     <dgm:pt modelId="{C428768A-2A30-487B-B09F-FE8B44DAB860}" type="pres">
       <dgm:prSet presAssocID="{B4C33871-7DA1-44A1-BE5E-9A939EA109E0}" presName="ChildText" presStyleLbl="revTx" presStyleIdx="5" presStyleCnt="6">
@@ -5263,13 +5028,6 @@
         </dgm:presLayoutVars>
       </dgm:prSet>
       <dgm:spPr/>
-      <dgm:t>
-        <a:bodyPr/>
-        <a:lstStyle/>
-        <a:p>
-          <a:endParaRPr lang="en-US"/>
-        </a:p>
-      </dgm:t>
     </dgm:pt>
     <dgm:pt modelId="{326EB8E6-AE2C-4F27-B35E-7CA6903149B3}" type="pres">
       <dgm:prSet presAssocID="{D37605B2-7AA9-4548-BD9D-1B13587547B0}" presName="sibTrans" presStyleCnt="0"/>
@@ -5288,13 +5046,6 @@
         </dgm:presLayoutVars>
       </dgm:prSet>
       <dgm:spPr/>
-      <dgm:t>
-        <a:bodyPr/>
-        <a:lstStyle/>
-        <a:p>
-          <a:endParaRPr lang="en-US"/>
-        </a:p>
-      </dgm:t>
     </dgm:pt>
   </dgm:ptLst>
   <dgm:cxnLst>
@@ -5431,7 +5182,7 @@
         </a:bodyPr>
         <a:lstStyle/>
         <a:p>
-          <a:pPr lvl="0" algn="l" defTabSz="889000">
+          <a:pPr marL="0" lvl="0" indent="0" algn="l" defTabSz="889000">
             <a:lnSpc>
               <a:spcPct val="90000"/>
             </a:lnSpc>
@@ -5441,6 +5192,7 @@
             <a:spcAft>
               <a:spcPct val="35000"/>
             </a:spcAft>
+            <a:buNone/>
           </a:pPr>
           <a:r>
             <a:rPr lang="es-ES" sz="2000" kern="1200" dirty="0"/>
@@ -5459,7 +5211,7 @@
             <a:spcAft>
               <a:spcPct val="15000"/>
             </a:spcAft>
-            <a:buChar char="••"/>
+            <a:buChar char="•"/>
           </a:pPr>
           <a:r>
             <a:rPr lang="es-ES" sz="1600" kern="1200" dirty="0"/>
@@ -5478,7 +5230,7 @@
             <a:spcAft>
               <a:spcPct val="15000"/>
             </a:spcAft>
-            <a:buChar char="••"/>
+            <a:buChar char="•"/>
           </a:pPr>
           <a:r>
             <a:rPr lang="es-ES" sz="1600" kern="1200" dirty="0"/>
@@ -5513,7 +5265,7 @@
             <a:spcAft>
               <a:spcPct val="15000"/>
             </a:spcAft>
-            <a:buChar char="••"/>
+            <a:buChar char="•"/>
           </a:pPr>
           <a:r>
             <a:rPr lang="en-US" sz="1600" b="0" i="0" kern="1200" dirty="0"/>
@@ -5526,10 +5278,6 @@
           <a:r>
             <a:rPr lang="en-US" sz="1600" b="0" i="0" kern="1200" dirty="0"/>
             <a:t> 259909</a:t>
-          </a:r>
-          <a:r>
-            <a:rPr lang="en-US" sz="1600" kern="1200" dirty="0"/>
-            <a:t/>
           </a:r>
           <a:br>
             <a:rPr lang="en-US" sz="1600" kern="1200" dirty="0"/>
@@ -5592,7 +5340,7 @@
         </a:bodyPr>
         <a:lstStyle/>
         <a:p>
-          <a:pPr lvl="0" algn="ctr" defTabSz="711200">
+          <a:pPr marL="0" lvl="0" indent="0" algn="ctr" defTabSz="711200">
             <a:lnSpc>
               <a:spcPct val="90000"/>
             </a:lnSpc>
@@ -5602,6 +5350,7 @@
             <a:spcAft>
               <a:spcPct val="35000"/>
             </a:spcAft>
+            <a:buNone/>
           </a:pPr>
           <a:endParaRPr lang="en-US" sz="1600" kern="1200"/>
         </a:p>
@@ -5668,7 +5417,7 @@
         </a:bodyPr>
         <a:lstStyle/>
         <a:p>
-          <a:pPr lvl="0" algn="l" defTabSz="889000">
+          <a:pPr marL="0" lvl="0" indent="0" algn="l" defTabSz="889000">
             <a:lnSpc>
               <a:spcPct val="90000"/>
             </a:lnSpc>
@@ -5678,6 +5427,7 @@
             <a:spcAft>
               <a:spcPct val="35000"/>
             </a:spcAft>
+            <a:buNone/>
           </a:pPr>
           <a:r>
             <a:rPr lang="es-ES" sz="2000" i="1" kern="1200" dirty="0"/>
@@ -5712,7 +5462,7 @@
             <a:spcAft>
               <a:spcPct val="15000"/>
             </a:spcAft>
-            <a:buChar char="••"/>
+            <a:buChar char="•"/>
           </a:pPr>
           <a:r>
             <a:rPr lang="es-ES" sz="1600" kern="1200" dirty="0" err="1"/>
@@ -5735,7 +5485,7 @@
             <a:spcAft>
               <a:spcPct val="15000"/>
             </a:spcAft>
-            <a:buChar char="••"/>
+            <a:buChar char="•"/>
           </a:pPr>
           <a:r>
             <a:rPr lang="es-ES" sz="1600" kern="1200" dirty="0" err="1"/>
@@ -5754,7 +5504,7 @@
             <a:spcAft>
               <a:spcPct val="15000"/>
             </a:spcAft>
-            <a:buChar char="••"/>
+            <a:buChar char="•"/>
           </a:pPr>
           <a:r>
             <a:rPr lang="es-ES" sz="1600" kern="1200" dirty="0" err="1"/>
@@ -5781,7 +5531,7 @@
             <a:spcAft>
               <a:spcPct val="15000"/>
             </a:spcAft>
-            <a:buChar char="••"/>
+            <a:buChar char="•"/>
           </a:pPr>
           <a:r>
             <a:rPr lang="es-ES" sz="1600" kern="1200" dirty="0" err="1"/>
@@ -5814,7 +5564,7 @@
         <a:solidFill>
           <a:schemeClr val="accent1">
             <a:shade val="90000"/>
-            <a:hueOff val="-31025"/>
+            <a:hueOff val="-31026"/>
             <a:satOff val="-361"/>
             <a:lumOff val="17617"/>
             <a:alphaOff val="0"/>
@@ -5845,7 +5595,7 @@
         </a:bodyPr>
         <a:lstStyle/>
         <a:p>
-          <a:pPr lvl="0" algn="ctr" defTabSz="711200">
+          <a:pPr marL="0" lvl="0" indent="0" algn="ctr" defTabSz="711200">
             <a:lnSpc>
               <a:spcPct val="90000"/>
             </a:lnSpc>
@@ -5855,6 +5605,7 @@
             <a:spcAft>
               <a:spcPct val="35000"/>
             </a:spcAft>
+            <a:buNone/>
           </a:pPr>
           <a:endParaRPr lang="en-US" sz="1600" kern="1200"/>
         </a:p>
@@ -5921,7 +5672,7 @@
         </a:bodyPr>
         <a:lstStyle/>
         <a:p>
-          <a:pPr lvl="0" algn="l" defTabSz="889000">
+          <a:pPr marL="0" lvl="0" indent="0" algn="l" defTabSz="889000">
             <a:lnSpc>
               <a:spcPct val="90000"/>
             </a:lnSpc>
@@ -5931,6 +5682,7 @@
             <a:spcAft>
               <a:spcPct val="35000"/>
             </a:spcAft>
+            <a:buNone/>
           </a:pPr>
           <a:r>
             <a:rPr lang="es-ES" sz="2000" kern="1200" dirty="0" err="1"/>
@@ -5965,7 +5717,7 @@
             <a:spcAft>
               <a:spcPct val="15000"/>
             </a:spcAft>
-            <a:buChar char="••"/>
+            <a:buChar char="•"/>
           </a:pPr>
           <a:r>
             <a:rPr lang="es-ES" sz="1600" kern="1200" dirty="0" err="1"/>
@@ -5984,7 +5736,7 @@
             <a:spcAft>
               <a:spcPct val="15000"/>
             </a:spcAft>
-            <a:buChar char="••"/>
+            <a:buChar char="•"/>
           </a:pPr>
           <a:r>
             <a:rPr lang="es-ES" sz="1600" kern="1200" dirty="0" err="1"/>
@@ -6019,7 +5771,7 @@
             <a:spcAft>
               <a:spcPct val="15000"/>
             </a:spcAft>
-            <a:buChar char="••"/>
+            <a:buChar char="•"/>
           </a:pPr>
           <a:r>
             <a:rPr lang="es-ES" sz="1600" kern="1200" dirty="0" err="1"/>
@@ -6125,7 +5877,7 @@
         </a:bodyPr>
         <a:lstStyle/>
         <a:p>
-          <a:pPr lvl="0" algn="ctr" defTabSz="1644650">
+          <a:pPr marL="0" lvl="0" indent="0" algn="ctr" defTabSz="1644650">
             <a:lnSpc>
               <a:spcPct val="90000"/>
             </a:lnSpc>
@@ -6135,6 +5887,7 @@
             <a:spcAft>
               <a:spcPct val="35000"/>
             </a:spcAft>
+            <a:buNone/>
           </a:pPr>
           <a:r>
             <a:rPr lang="en-US" sz="3700" kern="1200" dirty="0"/>
@@ -6197,7 +5950,7 @@
         </a:bodyPr>
         <a:lstStyle/>
         <a:p>
-          <a:pPr lvl="0" algn="ctr" defTabSz="1333500">
+          <a:pPr marL="0" lvl="0" indent="0" algn="ctr" defTabSz="1333500">
             <a:lnSpc>
               <a:spcPct val="90000"/>
             </a:lnSpc>
@@ -6207,6 +5960,7 @@
             <a:spcAft>
               <a:spcPct val="35000"/>
             </a:spcAft>
+            <a:buNone/>
           </a:pPr>
           <a:endParaRPr lang="en-US" sz="3000" kern="1200"/>
         </a:p>
@@ -6272,7 +6026,7 @@
         </a:bodyPr>
         <a:lstStyle/>
         <a:p>
-          <a:pPr lvl="0" algn="ctr" defTabSz="1644650">
+          <a:pPr marL="0" lvl="0" indent="0" algn="ctr" defTabSz="1644650">
             <a:lnSpc>
               <a:spcPct val="90000"/>
             </a:lnSpc>
@@ -6282,6 +6036,7 @@
             <a:spcAft>
               <a:spcPct val="35000"/>
             </a:spcAft>
+            <a:buNone/>
           </a:pPr>
           <a:r>
             <a:rPr lang="en-US" sz="3700" kern="1200" dirty="0"/>
@@ -6362,7 +6117,7 @@
         </a:bodyPr>
         <a:lstStyle/>
         <a:p>
-          <a:pPr lvl="0" algn="ctr" defTabSz="889000">
+          <a:pPr marL="0" lvl="0" indent="0" algn="ctr" defTabSz="889000">
             <a:lnSpc>
               <a:spcPct val="90000"/>
             </a:lnSpc>
@@ -6372,6 +6127,7 @@
             <a:spcAft>
               <a:spcPct val="35000"/>
             </a:spcAft>
+            <a:buNone/>
           </a:pPr>
           <a:r>
             <a:rPr lang="en-US" sz="2000" kern="1200" noProof="0" dirty="0"/>
@@ -6434,7 +6190,7 @@
         </a:bodyPr>
         <a:lstStyle/>
         <a:p>
-          <a:pPr lvl="0" algn="ctr" defTabSz="889000">
+          <a:pPr marL="0" lvl="0" indent="0" algn="ctr" defTabSz="889000">
             <a:lnSpc>
               <a:spcPct val="90000"/>
             </a:lnSpc>
@@ -6444,6 +6200,7 @@
             <a:spcAft>
               <a:spcPct val="35000"/>
             </a:spcAft>
+            <a:buNone/>
           </a:pPr>
           <a:endParaRPr lang="en-US" sz="2000" kern="1200" dirty="0"/>
         </a:p>
@@ -6509,7 +6266,7 @@
         </a:bodyPr>
         <a:lstStyle/>
         <a:p>
-          <a:pPr lvl="0" algn="ctr" defTabSz="889000">
+          <a:pPr marL="0" lvl="0" indent="0" algn="ctr" defTabSz="889000">
             <a:lnSpc>
               <a:spcPct val="90000"/>
             </a:lnSpc>
@@ -6519,6 +6276,7 @@
             <a:spcAft>
               <a:spcPct val="35000"/>
             </a:spcAft>
+            <a:buNone/>
           </a:pPr>
           <a:r>
             <a:rPr lang="en-US" sz="2000" kern="1200" noProof="0" dirty="0"/>
@@ -6581,7 +6339,7 @@
         </a:bodyPr>
         <a:lstStyle/>
         <a:p>
-          <a:pPr lvl="0" algn="ctr" defTabSz="889000">
+          <a:pPr marL="0" lvl="0" indent="0" algn="ctr" defTabSz="889000">
             <a:lnSpc>
               <a:spcPct val="90000"/>
             </a:lnSpc>
@@ -6591,6 +6349,7 @@
             <a:spcAft>
               <a:spcPct val="35000"/>
             </a:spcAft>
+            <a:buNone/>
           </a:pPr>
           <a:endParaRPr lang="en-US" sz="2000" kern="1200" dirty="0"/>
         </a:p>
@@ -6656,7 +6415,7 @@
         </a:bodyPr>
         <a:lstStyle/>
         <a:p>
-          <a:pPr lvl="0" algn="ctr" defTabSz="889000">
+          <a:pPr marL="0" lvl="0" indent="0" algn="ctr" defTabSz="889000">
             <a:lnSpc>
               <a:spcPct val="90000"/>
             </a:lnSpc>
@@ -6666,6 +6425,7 @@
             <a:spcAft>
               <a:spcPct val="35000"/>
             </a:spcAft>
+            <a:buNone/>
           </a:pPr>
           <a:r>
             <a:rPr lang="en-US" sz="2000" kern="1200" noProof="0" dirty="0"/>
@@ -6728,7 +6488,7 @@
         </a:bodyPr>
         <a:lstStyle/>
         <a:p>
-          <a:pPr lvl="0" algn="ctr" defTabSz="889000">
+          <a:pPr marL="0" lvl="0" indent="0" algn="ctr" defTabSz="889000">
             <a:lnSpc>
               <a:spcPct val="90000"/>
             </a:lnSpc>
@@ -6738,6 +6498,7 @@
             <a:spcAft>
               <a:spcPct val="35000"/>
             </a:spcAft>
+            <a:buNone/>
           </a:pPr>
           <a:endParaRPr lang="en-US" sz="2000" kern="1200" dirty="0"/>
         </a:p>
@@ -6803,7 +6564,7 @@
         </a:bodyPr>
         <a:lstStyle/>
         <a:p>
-          <a:pPr lvl="0" algn="ctr" defTabSz="889000">
+          <a:pPr marL="0" lvl="0" indent="0" algn="ctr" defTabSz="889000">
             <a:lnSpc>
               <a:spcPct val="90000"/>
             </a:lnSpc>
@@ -6813,6 +6574,7 @@
             <a:spcAft>
               <a:spcPct val="35000"/>
             </a:spcAft>
+            <a:buNone/>
           </a:pPr>
           <a:r>
             <a:rPr lang="en-US" sz="2000" kern="1200" noProof="0" dirty="0"/>
@@ -6953,7 +6715,7 @@
         </a:bodyPr>
         <a:lstStyle/>
         <a:p>
-          <a:pPr lvl="0" algn="ctr" defTabSz="488950">
+          <a:pPr marL="0" lvl="0" indent="0" algn="ctr" defTabSz="488950">
             <a:lnSpc>
               <a:spcPct val="90000"/>
             </a:lnSpc>
@@ -6963,6 +6725,7 @@
             <a:spcAft>
               <a:spcPct val="35000"/>
             </a:spcAft>
+            <a:buNone/>
           </a:pPr>
           <a:r>
             <a:rPr lang="en-US" sz="1100" kern="1200" dirty="0"/>
@@ -7022,7 +6785,7 @@
             <a:spcAft>
               <a:spcPct val="15000"/>
             </a:spcAft>
-            <a:buChar char="••"/>
+            <a:buChar char="•"/>
           </a:pPr>
           <a:r>
             <a:rPr lang="en-US" sz="1200" kern="1200" dirty="0" err="1"/>
@@ -7144,7 +6907,7 @@
         </a:bodyPr>
         <a:lstStyle/>
         <a:p>
-          <a:pPr lvl="0" algn="ctr" defTabSz="488950">
+          <a:pPr marL="0" lvl="0" indent="0" algn="ctr" defTabSz="488950">
             <a:lnSpc>
               <a:spcPct val="90000"/>
             </a:lnSpc>
@@ -7154,6 +6917,7 @@
             <a:spcAft>
               <a:spcPct val="35000"/>
             </a:spcAft>
+            <a:buNone/>
           </a:pPr>
           <a:r>
             <a:rPr lang="en-US" sz="1100" kern="1200" dirty="0"/>
@@ -7213,7 +6977,7 @@
             <a:spcAft>
               <a:spcPct val="15000"/>
             </a:spcAft>
-            <a:buChar char="••"/>
+            <a:buChar char="•"/>
           </a:pPr>
           <a:endParaRPr lang="en-US" sz="900" kern="1200" dirty="0"/>
         </a:p>
@@ -7331,7 +7095,7 @@
         </a:bodyPr>
         <a:lstStyle/>
         <a:p>
-          <a:pPr lvl="0" algn="ctr" defTabSz="488950">
+          <a:pPr marL="0" lvl="0" indent="0" algn="ctr" defTabSz="488950">
             <a:lnSpc>
               <a:spcPct val="90000"/>
             </a:lnSpc>
@@ -7341,6 +7105,7 @@
             <a:spcAft>
               <a:spcPct val="35000"/>
             </a:spcAft>
+            <a:buNone/>
           </a:pPr>
           <a:r>
             <a:rPr lang="en-US" sz="1100" kern="1200" dirty="0"/>
@@ -7400,7 +7165,7 @@
             <a:spcAft>
               <a:spcPct val="15000"/>
             </a:spcAft>
-            <a:buChar char="••"/>
+            <a:buChar char="•"/>
           </a:pPr>
           <a:r>
             <a:rPr lang="en-US" sz="1200" kern="1200" dirty="0"/>
@@ -7521,7 +7286,7 @@
         </a:bodyPr>
         <a:lstStyle/>
         <a:p>
-          <a:pPr lvl="0" algn="ctr" defTabSz="488950">
+          <a:pPr marL="0" lvl="0" indent="0" algn="ctr" defTabSz="488950">
             <a:lnSpc>
               <a:spcPct val="90000"/>
             </a:lnSpc>
@@ -7531,6 +7296,7 @@
             <a:spcAft>
               <a:spcPct val="35000"/>
             </a:spcAft>
+            <a:buNone/>
           </a:pPr>
           <a:r>
             <a:rPr lang="en-US" sz="1100" kern="1200" dirty="0"/>
@@ -7683,7 +7449,7 @@
         </a:bodyPr>
         <a:lstStyle/>
         <a:p>
-          <a:pPr lvl="0" algn="ctr" defTabSz="488950">
+          <a:pPr marL="0" lvl="0" indent="0" algn="ctr" defTabSz="488950">
             <a:lnSpc>
               <a:spcPct val="90000"/>
             </a:lnSpc>
@@ -7693,6 +7459,7 @@
             <a:spcAft>
               <a:spcPct val="35000"/>
             </a:spcAft>
+            <a:buNone/>
           </a:pPr>
           <a:r>
             <a:rPr lang="en-US" sz="1100" kern="1200" dirty="0"/>
@@ -7752,7 +7519,7 @@
             <a:spcAft>
               <a:spcPct val="15000"/>
             </a:spcAft>
-            <a:buChar char="••"/>
+            <a:buChar char="•"/>
           </a:pPr>
           <a:r>
             <a:rPr lang="en-US" sz="1200" kern="1200" dirty="0"/>
@@ -7881,7 +7648,7 @@
         </a:bodyPr>
         <a:lstStyle/>
         <a:p>
-          <a:pPr lvl="0" algn="ctr" defTabSz="488950">
+          <a:pPr marL="0" lvl="0" indent="0" algn="ctr" defTabSz="488950">
             <a:lnSpc>
               <a:spcPct val="90000"/>
             </a:lnSpc>
@@ -7891,6 +7658,7 @@
             <a:spcAft>
               <a:spcPct val="35000"/>
             </a:spcAft>
+            <a:buNone/>
           </a:pPr>
           <a:r>
             <a:rPr lang="en-US" sz="1100" kern="1200" dirty="0"/>
@@ -7950,7 +7718,7 @@
             <a:spcAft>
               <a:spcPct val="15000"/>
             </a:spcAft>
-            <a:buChar char="••"/>
+            <a:buChar char="•"/>
           </a:pPr>
           <a:r>
             <a:rPr lang="en-US" sz="1200" kern="1200" dirty="0" err="1"/>
@@ -8023,7 +7791,7 @@
         </a:bodyPr>
         <a:lstStyle/>
         <a:p>
-          <a:pPr lvl="0" algn="ctr" defTabSz="488950">
+          <a:pPr marL="0" lvl="0" indent="0" algn="ctr" defTabSz="488950">
             <a:lnSpc>
               <a:spcPct val="90000"/>
             </a:lnSpc>
@@ -8033,6 +7801,7 @@
             <a:spcAft>
               <a:spcPct val="35000"/>
             </a:spcAft>
+            <a:buNone/>
           </a:pPr>
           <a:r>
             <a:rPr lang="en-US" sz="1100" kern="1200" dirty="0"/>
@@ -13023,7 +12792,7 @@
           <a:p>
             <a:fld id="{146B6C00-59C7-4649-A05A-DC2738C2BE3E}" type="datetimeFigureOut">
               <a:rPr lang="en-US" smtClean="0"/>
-              <a:t>4/26/2017</a:t>
+              <a:t>4/27/2017</a:t>
             </a:fld>
             <a:endParaRPr lang="en-US"/>
           </a:p>
@@ -13943,7 +13712,7 @@
           <a:p>
             <a:fld id="{AC25CB34-BB08-4399-A2CA-3CAF79EA992F}" type="datetimeFigureOut">
               <a:rPr lang="en-US" smtClean="0"/>
-              <a:t>4/26/2017</a:t>
+              <a:t>4/27/2017</a:t>
             </a:fld>
             <a:endParaRPr lang="en-US"/>
           </a:p>
@@ -14141,7 +13910,7 @@
           <a:p>
             <a:fld id="{AC25CB34-BB08-4399-A2CA-3CAF79EA992F}" type="datetimeFigureOut">
               <a:rPr lang="en-US" smtClean="0"/>
-              <a:t>4/26/2017</a:t>
+              <a:t>4/27/2017</a:t>
             </a:fld>
             <a:endParaRPr lang="en-US"/>
           </a:p>
@@ -14316,7 +14085,7 @@
           <a:p>
             <a:fld id="{AC25CB34-BB08-4399-A2CA-3CAF79EA992F}" type="datetimeFigureOut">
               <a:rPr lang="en-US" smtClean="0"/>
-              <a:t>4/26/2017</a:t>
+              <a:t>4/27/2017</a:t>
             </a:fld>
             <a:endParaRPr lang="en-US"/>
           </a:p>
@@ -14479,7 +14248,7 @@
           <a:p>
             <a:fld id="{AC25CB34-BB08-4399-A2CA-3CAF79EA992F}" type="datetimeFigureOut">
               <a:rPr lang="en-US" smtClean="0"/>
-              <a:t>4/26/2017</a:t>
+              <a:t>4/27/2017</a:t>
             </a:fld>
             <a:endParaRPr lang="en-US"/>
           </a:p>
@@ -14727,7 +14496,7 @@
           <a:p>
             <a:fld id="{AC25CB34-BB08-4399-A2CA-3CAF79EA992F}" type="datetimeFigureOut">
               <a:rPr lang="en-US" smtClean="0"/>
-              <a:t>4/26/2017</a:t>
+              <a:t>4/27/2017</a:t>
             </a:fld>
             <a:endParaRPr lang="en-US"/>
           </a:p>
@@ -15044,7 +14813,7 @@
           <a:p>
             <a:fld id="{AC25CB34-BB08-4399-A2CA-3CAF79EA992F}" type="datetimeFigureOut">
               <a:rPr lang="en-US" smtClean="0"/>
-              <a:t>4/26/2017</a:t>
+              <a:t>4/27/2017</a:t>
             </a:fld>
             <a:endParaRPr lang="en-US"/>
           </a:p>
@@ -15510,7 +15279,7 @@
           <a:p>
             <a:fld id="{AC25CB34-BB08-4399-A2CA-3CAF79EA992F}" type="datetimeFigureOut">
               <a:rPr lang="en-US" smtClean="0"/>
-              <a:t>4/26/2017</a:t>
+              <a:t>4/27/2017</a:t>
             </a:fld>
             <a:endParaRPr lang="en-US"/>
           </a:p>
@@ -15657,7 +15426,7 @@
           <a:p>
             <a:fld id="{AC25CB34-BB08-4399-A2CA-3CAF79EA992F}" type="datetimeFigureOut">
               <a:rPr lang="en-US" smtClean="0"/>
-              <a:t>4/26/2017</a:t>
+              <a:t>4/27/2017</a:t>
             </a:fld>
             <a:endParaRPr lang="en-US"/>
           </a:p>
@@ -15747,7 +15516,7 @@
           <a:p>
             <a:fld id="{AC25CB34-BB08-4399-A2CA-3CAF79EA992F}" type="datetimeFigureOut">
               <a:rPr lang="en-US" smtClean="0"/>
-              <a:t>4/26/2017</a:t>
+              <a:t>4/27/2017</a:t>
             </a:fld>
             <a:endParaRPr lang="en-US"/>
           </a:p>
@@ -16021,7 +15790,7 @@
           <a:p>
             <a:fld id="{AC25CB34-BB08-4399-A2CA-3CAF79EA992F}" type="datetimeFigureOut">
               <a:rPr lang="en-US" smtClean="0"/>
-              <a:t>4/26/2017</a:t>
+              <a:t>4/27/2017</a:t>
             </a:fld>
             <a:endParaRPr lang="en-US"/>
           </a:p>
@@ -16326,7 +16095,7 @@
           <a:p>
             <a:fld id="{AC25CB34-BB08-4399-A2CA-3CAF79EA992F}" type="datetimeFigureOut">
               <a:rPr lang="en-US" smtClean="0"/>
-              <a:t>4/26/2017</a:t>
+              <a:t>4/27/2017</a:t>
             </a:fld>
             <a:endParaRPr lang="en-US"/>
           </a:p>
@@ -16624,7 +16393,7 @@
           <a:p>
             <a:fld id="{AC25CB34-BB08-4399-A2CA-3CAF79EA992F}" type="datetimeFigureOut">
               <a:rPr lang="en-US" smtClean="0"/>
-              <a:t>4/26/2017</a:t>
+              <a:t>4/27/2017</a:t>
             </a:fld>
             <a:endParaRPr lang="en-US"/>
           </a:p>
@@ -19257,13 +19026,13 @@
             <a:spLocks noGrp="1"/>
           </p:cNvSpPr>
           <p:nvPr>
-            <p:ph type="body" idx="1"/>
+            <p:ph type="body" idx="4294967295"/>
           </p:nvPr>
         </p:nvSpPr>
         <p:spPr>
           <a:xfrm>
-            <a:off x="457200" y="1828800"/>
-            <a:ext cx="3931920" cy="639762"/>
+            <a:off x="0" y="1828800"/>
+            <a:ext cx="3932238" cy="639763"/>
           </a:xfrm>
         </p:spPr>
         <p:txBody>
@@ -19272,6 +19041,9 @@
           </a:bodyPr>
           <a:lstStyle/>
           <a:p>
+            <a:pPr marL="0" indent="0" algn="ctr">
+              <a:buNone/>
+            </a:pPr>
             <a:r>
               <a:rPr lang="en-US" sz="2400" dirty="0"/>
               <a:t>Paper</a:t>
@@ -19286,13 +19058,13 @@
             <a:spLocks noGrp="1"/>
           </p:cNvSpPr>
           <p:nvPr>
-            <p:ph type="body" sz="quarter" idx="3"/>
+            <p:ph type="body" sz="quarter" idx="4294967295"/>
           </p:nvPr>
         </p:nvSpPr>
         <p:spPr>
           <a:xfrm>
-            <a:off x="4754880" y="1828800"/>
-            <a:ext cx="3931920" cy="639762"/>
+            <a:off x="4584128" y="1857133"/>
+            <a:ext cx="3932237" cy="639763"/>
           </a:xfrm>
         </p:spPr>
         <p:txBody>
@@ -19301,6 +19073,9 @@
           </a:bodyPr>
           <a:lstStyle/>
           <a:p>
+            <a:pPr marL="0" indent="0" algn="ctr">
+              <a:buNone/>
+            </a:pPr>
             <a:r>
               <a:rPr lang="en-US" sz="2400" dirty="0"/>
               <a:t>Our Analysis</a:t>
@@ -19324,8 +19099,8 @@
         </p:blipFill>
         <p:spPr>
           <a:xfrm>
-            <a:off x="381000" y="2441073"/>
-            <a:ext cx="3886200" cy="4340727"/>
+            <a:off x="450574" y="2468563"/>
+            <a:ext cx="2902226" cy="3241668"/>
           </a:xfrm>
           <a:prstGeom prst="rect">
             <a:avLst/>
@@ -19343,7 +19118,7 @@
           </p:cNvPicPr>
           <p:nvPr/>
         </p:nvPicPr>
-        <p:blipFill rotWithShape="1">
+        <p:blipFill>
           <a:blip r:embed="rId3">
             <a:extLst>
               <a:ext uri="{28A0092B-C50C-407E-A947-70E740481C1C}">
@@ -19351,13 +19126,14 @@
               </a:ext>
             </a:extLst>
           </a:blip>
-          <a:srcRect r="5287"/>
-          <a:stretch/>
+          <a:stretch>
+            <a:fillRect/>
+          </a:stretch>
         </p:blipFill>
         <p:spPr>
           <a:xfrm>
-            <a:off x="4724400" y="2739687"/>
-            <a:ext cx="4343400" cy="3661113"/>
+            <a:off x="3657600" y="2590677"/>
+            <a:ext cx="5333998" cy="3119554"/>
           </a:xfrm>
           <a:prstGeom prst="rect">
             <a:avLst/>
@@ -21602,8 +21378,8 @@
         </p:blipFill>
         <p:spPr>
           <a:xfrm>
-            <a:off x="5105400" y="3207684"/>
-            <a:ext cx="3345516" cy="3345516"/>
+            <a:off x="4724400" y="3324984"/>
+            <a:ext cx="3772092" cy="2923416"/>
           </a:xfrm>
           <a:prstGeom prst="rect">
             <a:avLst/>
@@ -21673,7 +21449,7 @@
             <p:ph idx="1"/>
             <p:extLst>
               <p:ext uri="{D42A27DB-BD31-4B8C-83A1-F6EECF244321}">
-                <p14:modId xmlns:p14="http://schemas.microsoft.com/office/powerpoint/2010/main" val="1254731173"/>
+                <p14:modId xmlns:p14="http://schemas.microsoft.com/office/powerpoint/2010/main" val="3182225208"/>
               </p:ext>
             </p:extLst>
           </p:nvPr>
@@ -21692,35 +21468,35 @@
                 <a:gridCol w="1645920">
                   <a:extLst>
                     <a:ext uri="{9D8B030D-6E8A-4147-A177-3AD203B41FA5}">
-                      <a16:colId xmlns:a16="http://schemas.microsoft.com/office/drawing/2014/main" xmlns="" val="20000"/>
+                      <a16:colId xmlns:a16="http://schemas.microsoft.com/office/drawing/2014/main" val="20000"/>
                     </a:ext>
                   </a:extLst>
                 </a:gridCol>
                 <a:gridCol w="1645920">
                   <a:extLst>
                     <a:ext uri="{9D8B030D-6E8A-4147-A177-3AD203B41FA5}">
-                      <a16:colId xmlns:a16="http://schemas.microsoft.com/office/drawing/2014/main" xmlns="" val="20001"/>
+                      <a16:colId xmlns:a16="http://schemas.microsoft.com/office/drawing/2014/main" val="20001"/>
                     </a:ext>
                   </a:extLst>
                 </a:gridCol>
                 <a:gridCol w="1645920">
                   <a:extLst>
                     <a:ext uri="{9D8B030D-6E8A-4147-A177-3AD203B41FA5}">
-                      <a16:colId xmlns:a16="http://schemas.microsoft.com/office/drawing/2014/main" xmlns="" val="20002"/>
+                      <a16:colId xmlns:a16="http://schemas.microsoft.com/office/drawing/2014/main" val="20002"/>
                     </a:ext>
                   </a:extLst>
                 </a:gridCol>
                 <a:gridCol w="1645920">
                   <a:extLst>
                     <a:ext uri="{9D8B030D-6E8A-4147-A177-3AD203B41FA5}">
-                      <a16:colId xmlns:a16="http://schemas.microsoft.com/office/drawing/2014/main" xmlns="" val="20003"/>
+                      <a16:colId xmlns:a16="http://schemas.microsoft.com/office/drawing/2014/main" val="20003"/>
                     </a:ext>
                   </a:extLst>
                 </a:gridCol>
                 <a:gridCol w="1645920">
                   <a:extLst>
                     <a:ext uri="{9D8B030D-6E8A-4147-A177-3AD203B41FA5}">
-                      <a16:colId xmlns:a16="http://schemas.microsoft.com/office/drawing/2014/main" xmlns="" val="20004"/>
+                      <a16:colId xmlns:a16="http://schemas.microsoft.com/office/drawing/2014/main" val="20004"/>
                     </a:ext>
                   </a:extLst>
                 </a:gridCol>
@@ -21795,7 +21571,7 @@
                 </a:tc>
                 <a:extLst>
                   <a:ext uri="{0D108BD9-81ED-4DB2-BD59-A6C34878D82A}">
-                    <a16:rowId xmlns:a16="http://schemas.microsoft.com/office/drawing/2014/main" xmlns="" val="10000"/>
+                    <a16:rowId xmlns:a16="http://schemas.microsoft.com/office/drawing/2014/main" val="10000"/>
                   </a:ext>
                 </a:extLst>
               </a:tr>
@@ -21867,7 +21643,7 @@
                 </a:tc>
                 <a:extLst>
                   <a:ext uri="{0D108BD9-81ED-4DB2-BD59-A6C34878D82A}">
-                    <a16:rowId xmlns:a16="http://schemas.microsoft.com/office/drawing/2014/main" xmlns="" val="10001"/>
+                    <a16:rowId xmlns:a16="http://schemas.microsoft.com/office/drawing/2014/main" val="10001"/>
                   </a:ext>
                 </a:extLst>
               </a:tr>
@@ -21905,7 +21681,7 @@
                     <a:p>
                       <a:r>
                         <a:rPr lang="en-US" dirty="0"/>
-                        <a:t>406*</a:t>
+                        <a:t>408*</a:t>
                       </a:r>
                     </a:p>
                   </a:txBody>
@@ -21918,7 +21694,7 @@
                     <a:p>
                       <a:r>
                         <a:rPr lang="en-US" dirty="0"/>
-                        <a:t>29*</a:t>
+                        <a:t>27*</a:t>
                       </a:r>
                     </a:p>
                   </a:txBody>
@@ -21931,7 +21707,7 @@
                     <a:p>
                       <a:r>
                         <a:rPr lang="en-US" dirty="0"/>
-                        <a:t>480*</a:t>
+                        <a:t>481*</a:t>
                       </a:r>
                     </a:p>
                   </a:txBody>
@@ -21939,7 +21715,7 @@
                 </a:tc>
                 <a:extLst>
                   <a:ext uri="{0D108BD9-81ED-4DB2-BD59-A6C34878D82A}">
-                    <a16:rowId xmlns:a16="http://schemas.microsoft.com/office/drawing/2014/main" xmlns="" val="10002"/>
+                    <a16:rowId xmlns:a16="http://schemas.microsoft.com/office/drawing/2014/main" val="10002"/>
                   </a:ext>
                 </a:extLst>
               </a:tr>
@@ -21977,7 +21753,7 @@
                     <a:p>
                       <a:r>
                         <a:rPr lang="en-US" dirty="0"/>
-                        <a:t>402*</a:t>
+                        <a:t>404*</a:t>
                       </a:r>
                     </a:p>
                   </a:txBody>
@@ -21990,7 +21766,7 @@
                     <a:p>
                       <a:r>
                         <a:rPr lang="en-US" dirty="0"/>
-                        <a:t>29*</a:t>
+                        <a:t>27*</a:t>
                       </a:r>
                     </a:p>
                   </a:txBody>
@@ -22003,7 +21779,7 @@
                     <a:p>
                       <a:r>
                         <a:rPr lang="en-US" dirty="0"/>
-                        <a:t>475*</a:t>
+                        <a:t>476*</a:t>
                       </a:r>
                     </a:p>
                   </a:txBody>
@@ -22011,7 +21787,7 @@
                 </a:tc>
                 <a:extLst>
                   <a:ext uri="{0D108BD9-81ED-4DB2-BD59-A6C34878D82A}">
-                    <a16:rowId xmlns:a16="http://schemas.microsoft.com/office/drawing/2014/main" xmlns="" val="10003"/>
+                    <a16:rowId xmlns:a16="http://schemas.microsoft.com/office/drawing/2014/main" val="10003"/>
                   </a:ext>
                 </a:extLst>
               </a:tr>
@@ -22131,39 +21907,15 @@
             </a:r>
             <a:r>
               <a:rPr lang="en-US" dirty="0"/>
-              <a:t> clustering of the </a:t>
-            </a:r>
-            <a:r>
-              <a:rPr lang="en-US" dirty="0" smtClean="0"/>
-              <a:t>fragments per </a:t>
-            </a:r>
-            <a:r>
-              <a:rPr lang="en-US" dirty="0" err="1" smtClean="0"/>
+              <a:t> clustering of the fragments per </a:t>
+            </a:r>
+            <a:r>
+              <a:rPr lang="en-US" dirty="0" err="1"/>
               <a:t>kilobase</a:t>
             </a:r>
             <a:r>
               <a:rPr lang="en-US" dirty="0"/>
-              <a:t> </a:t>
-            </a:r>
-            <a:r>
-              <a:rPr lang="en-US" dirty="0" smtClean="0"/>
-              <a:t>of transcript per million mapped reads (FPKM)values of the </a:t>
-            </a:r>
-            <a:r>
-              <a:rPr lang="en-US" dirty="0" smtClean="0"/>
-              <a:t>570 </a:t>
-            </a:r>
-            <a:r>
-              <a:rPr lang="en-US" dirty="0"/>
-              <a:t>differentially expressed </a:t>
-            </a:r>
-            <a:r>
-              <a:rPr lang="en-US" dirty="0" smtClean="0"/>
-              <a:t>(DE) garden </a:t>
-            </a:r>
-            <a:r>
-              <a:rPr lang="en-US" dirty="0"/>
-              <a:t>asparagus (</a:t>
+              <a:t> of transcript per million mapped reads (FPKM)values of the 570 differentially expressed (DE) garden asparagus (</a:t>
             </a:r>
             <a:r>
               <a:rPr lang="en-US" i="1" dirty="0"/>
@@ -22216,13 +21968,6 @@
   <p:clrMapOvr>
     <a:masterClrMapping/>
   </p:clrMapOvr>
-  <p:timing>
-    <p:tnLst>
-      <p:par>
-        <p:cTn id="1" dur="indefinite" restart="never" nodeType="tmRoot"/>
-      </p:par>
-    </p:tnLst>
-  </p:timing>
 </p:sld>
 </file>
 
@@ -22286,39 +22031,39 @@
           <a:lstStyle/>
           <a:p>
             <a:r>
-              <a:rPr lang="en-US" dirty="0" smtClean="0"/>
+              <a:rPr lang="en-US" dirty="0"/>
               <a:t>A </a:t>
             </a:r>
             <a:r>
-              <a:rPr lang="en-US" dirty="0" err="1" smtClean="0"/>
+              <a:rPr lang="en-US" dirty="0" err="1"/>
               <a:t>heatmap</a:t>
             </a:r>
             <a:r>
-              <a:rPr lang="en-US" dirty="0" smtClean="0"/>
+              <a:rPr lang="en-US" dirty="0"/>
               <a:t> tutorial for the 570 DE genes found in the paper is posted </a:t>
             </a:r>
             <a:r>
-              <a:rPr lang="en-US" dirty="0" smtClean="0">
+              <a:rPr lang="en-US" dirty="0">
                 <a:hlinkClick r:id="rId2"/>
               </a:rPr>
               <a:t>here</a:t>
             </a:r>
             <a:r>
-              <a:rPr lang="en-US" dirty="0" smtClean="0"/>
+              <a:rPr lang="en-US" dirty="0"/>
               <a:t>.</a:t>
             </a:r>
           </a:p>
           <a:p>
             <a:pPr lvl="1"/>
             <a:r>
-              <a:rPr lang="en-US" dirty="0" smtClean="0"/>
+              <a:rPr lang="en-US" dirty="0"/>
               <a:t>Only used 9 of the 11 lines</a:t>
             </a:r>
           </a:p>
           <a:p>
             <a:pPr lvl="1"/>
             <a:r>
-              <a:rPr lang="en-US" dirty="0" smtClean="0"/>
+              <a:rPr lang="en-US" dirty="0"/>
               <a:t>Clustering of libraries and genes similar to those in paper</a:t>
             </a:r>
           </a:p>
@@ -22363,13 +22108,6 @@
   <p:clrMapOvr>
     <a:masterClrMapping/>
   </p:clrMapOvr>
-  <p:timing>
-    <p:tnLst>
-      <p:par>
-        <p:cTn id="1" dur="indefinite" restart="never" nodeType="tmRoot"/>
-      </p:par>
-    </p:tnLst>
-  </p:timing>
 </p:sld>
 </file>
 
@@ -22433,14 +22171,13 @@
           <a:lstStyle/>
           <a:p>
             <a:r>
-              <a:rPr lang="en-US" dirty="0" err="1" smtClean="0"/>
+              <a:rPr lang="en-US" dirty="0" err="1"/>
               <a:t>Heatmap</a:t>
             </a:r>
             <a:r>
-              <a:rPr lang="en-US" dirty="0" smtClean="0"/>
+              <a:rPr lang="en-US" dirty="0"/>
               <a:t> of TMM-normalized counts data for the 480 genes we found to be DE</a:t>
             </a:r>
-            <a:endParaRPr lang="en-US" dirty="0"/>
           </a:p>
         </p:txBody>
       </p:sp>
@@ -22483,13 +22220,6 @@
   <p:clrMapOvr>
     <a:masterClrMapping/>
   </p:clrMapOvr>
-  <p:timing>
-    <p:tnLst>
-      <p:par>
-        <p:cTn id="1" dur="indefinite" restart="never" nodeType="tmRoot"/>
-      </p:par>
-    </p:tnLst>
-  </p:timing>
 </p:sld>
 </file>
 
@@ -22526,10 +22256,9 @@
           <a:lstStyle/>
           <a:p>
             <a:r>
-              <a:rPr lang="en-US" dirty="0" smtClean="0"/>
+              <a:rPr lang="en-US" dirty="0"/>
               <a:t>Figure 4</a:t>
             </a:r>
-            <a:endParaRPr lang="en-US" dirty="0"/>
           </a:p>
         </p:txBody>
       </p:sp>
@@ -22556,14 +22285,13 @@
           <a:lstStyle/>
           <a:p>
             <a:r>
-              <a:rPr lang="en-US" sz="2400" dirty="0" err="1" smtClean="0"/>
+              <a:rPr lang="en-US" sz="2400" dirty="0" err="1"/>
               <a:t>Heatmap</a:t>
             </a:r>
             <a:r>
-              <a:rPr lang="en-US" sz="2400" dirty="0" smtClean="0"/>
+              <a:rPr lang="en-US" sz="2400" dirty="0"/>
               <a:t> of the FPKM values from the 2 samples that went through the transcriptome profiling pipeline.</a:t>
             </a:r>
-            <a:endParaRPr lang="en-US" sz="2400" dirty="0"/>
           </a:p>
         </p:txBody>
       </p:sp>
@@ -22605,13 +22333,6 @@
   <p:clrMapOvr>
     <a:masterClrMapping/>
   </p:clrMapOvr>
-  <p:timing>
-    <p:tnLst>
-      <p:par>
-        <p:cTn id="1" dur="indefinite" restart="never" nodeType="tmRoot"/>
-      </p:par>
-    </p:tnLst>
-  </p:timing>
 </p:sld>
 </file>
 
@@ -23649,7 +23370,7 @@
         <p:spPr/>
         <p:txBody>
           <a:bodyPr>
-            <a:normAutofit fontScale="92500" lnSpcReduction="10000"/>
+            <a:normAutofit fontScale="85000" lnSpcReduction="20000"/>
           </a:bodyPr>
           <a:lstStyle/>
           <a:p>
@@ -23665,7 +23386,28 @@
           <a:p>
             <a:r>
               <a:rPr lang="en-US" dirty="0"/>
-              <a:t>Paper, Supplementary tables from paper</a:t>
+              <a:t>Paper Supplementary Folder</a:t>
+            </a:r>
+          </a:p>
+          <a:p>
+            <a:pPr lvl="1"/>
+            <a:r>
+              <a:rPr lang="en-US" dirty="0"/>
+              <a:t>README</a:t>
+            </a:r>
+          </a:p>
+          <a:p>
+            <a:pPr lvl="1"/>
+            <a:r>
+              <a:rPr lang="en-US" dirty="0"/>
+              <a:t>paper</a:t>
+            </a:r>
+          </a:p>
+          <a:p>
+            <a:pPr lvl="1"/>
+            <a:r>
+              <a:rPr lang="en-US" dirty="0"/>
+              <a:t>Supplementary tables and materials from paper</a:t>
             </a:r>
           </a:p>
           <a:p>
@@ -23756,15 +23498,19 @@
           <a:p>
             <a:pPr lvl="1"/>
             <a:r>
+              <a:rPr lang="en-US" dirty="0" err="1"/>
+              <a:t>Rmarkdown</a:t>
+            </a:r>
+            <a:r>
               <a:rPr lang="en-US" dirty="0"/>
-              <a:t>README file with the description of the notebooks for each figure</a:t>
+              <a:t> of expression analysis</a:t>
             </a:r>
           </a:p>
           <a:p>
             <a:pPr lvl="1"/>
             <a:r>
               <a:rPr lang="en-US" dirty="0"/>
-              <a:t>Input files </a:t>
+              <a:t>Input files and output figures</a:t>
             </a:r>
           </a:p>
           <a:p>
@@ -24561,7 +24307,7 @@
   <a:extraClrSchemeLst/>
   <a:extLst>
     <a:ext uri="{05A4C25C-085E-4340-85A3-A5531E510DB2}">
-      <thm15:themeFamily xmlns:thm15="http://schemas.microsoft.com/office/thememl/2012/main" xmlns="" name="Office Theme" id="{62F939B6-93AF-4DB8-9C6B-D6C7DFDC589F}" vid="{4A3C46E8-61CC-4603-A589-7422A47A8E4A}"/>
+      <thm15:themeFamily xmlns:thm15="http://schemas.microsoft.com/office/thememl/2012/main" name="Office Theme" id="{62F939B6-93AF-4DB8-9C6B-D6C7DFDC589F}" vid="{4A3C46E8-61CC-4603-A589-7422A47A8E4A}"/>
     </a:ext>
   </a:extLst>
 </a:theme>

</xml_diff>

<commit_message>
slight edits to ppt
</commit_message>
<xml_diff>
--- a/asparagus.pptx
+++ b/asparagus.pptx
@@ -137,7 +137,7 @@
   </p:defaultTextStyle>
   <p:extLst>
     <p:ext uri="{EFAFB233-063F-42B5-8137-9DF3F51BA10A}">
-      <p15:sldGuideLst xmlns:p15="http://schemas.microsoft.com/office/powerpoint/2012/main">
+      <p15:sldGuideLst xmlns:p15="http://schemas.microsoft.com/office/powerpoint/2012/main" xmlns="">
         <p15:guide id="1" orient="horz" pos="2160">
           <p15:clr>
             <a:srgbClr val="A4A3A4"/>
@@ -3704,6 +3704,10 @@
             <a:rPr lang="en-US" sz="1600" b="0" i="0" dirty="0"/>
             <a:t> 259909</a:t>
           </a:r>
+          <a:r>
+            <a:rPr lang="en-US" sz="1600" dirty="0"/>
+            <a:t/>
+          </a:r>
           <a:br>
             <a:rPr lang="en-US" sz="1600" dirty="0"/>
           </a:br>
@@ -3884,6 +3888,13 @@
         </dgm:presLayoutVars>
       </dgm:prSet>
       <dgm:spPr/>
+      <dgm:t>
+        <a:bodyPr/>
+        <a:lstStyle/>
+        <a:p>
+          <a:endParaRPr lang="en-US"/>
+        </a:p>
+      </dgm:t>
     </dgm:pt>
     <dgm:pt modelId="{BDAA6788-3D12-47BC-9E42-7D38FDE7F399}" type="pres">
       <dgm:prSet presAssocID="{0446C03C-E073-45AB-A9C8-06443FEA1350}" presName="node" presStyleLbl="node1" presStyleIdx="0" presStyleCnt="3">
@@ -3892,14 +3903,35 @@
         </dgm:presLayoutVars>
       </dgm:prSet>
       <dgm:spPr/>
+      <dgm:t>
+        <a:bodyPr/>
+        <a:lstStyle/>
+        <a:p>
+          <a:endParaRPr lang="en-US"/>
+        </a:p>
+      </dgm:t>
     </dgm:pt>
     <dgm:pt modelId="{1F338E8C-445B-4795-9DFA-DDBCD4CD0223}" type="pres">
       <dgm:prSet presAssocID="{DD3773AC-ED19-47CD-9A5C-21D0582A545B}" presName="sibTrans" presStyleLbl="sibTrans2D1" presStyleIdx="0" presStyleCnt="2"/>
       <dgm:spPr/>
+      <dgm:t>
+        <a:bodyPr/>
+        <a:lstStyle/>
+        <a:p>
+          <a:endParaRPr lang="en-US"/>
+        </a:p>
+      </dgm:t>
     </dgm:pt>
     <dgm:pt modelId="{34DEC8FB-8A5E-47CA-96DE-B987907461FF}" type="pres">
       <dgm:prSet presAssocID="{DD3773AC-ED19-47CD-9A5C-21D0582A545B}" presName="connectorText" presStyleLbl="sibTrans2D1" presStyleIdx="0" presStyleCnt="2"/>
       <dgm:spPr/>
+      <dgm:t>
+        <a:bodyPr/>
+        <a:lstStyle/>
+        <a:p>
+          <a:endParaRPr lang="en-US"/>
+        </a:p>
+      </dgm:t>
     </dgm:pt>
     <dgm:pt modelId="{E1C175A5-344B-46C4-A31A-B19B85FB8577}" type="pres">
       <dgm:prSet presAssocID="{DD9D1A19-C042-4241-AC1E-CBC58119E3B1}" presName="node" presStyleLbl="node1" presStyleIdx="1" presStyleCnt="3">
@@ -3908,14 +3940,35 @@
         </dgm:presLayoutVars>
       </dgm:prSet>
       <dgm:spPr/>
+      <dgm:t>
+        <a:bodyPr/>
+        <a:lstStyle/>
+        <a:p>
+          <a:endParaRPr lang="en-US"/>
+        </a:p>
+      </dgm:t>
     </dgm:pt>
     <dgm:pt modelId="{F461BE5B-401D-414A-9175-B95B6C23DC9D}" type="pres">
       <dgm:prSet presAssocID="{2F1FB023-A283-4CF2-AD92-547252EFD921}" presName="sibTrans" presStyleLbl="sibTrans2D1" presStyleIdx="1" presStyleCnt="2"/>
       <dgm:spPr/>
+      <dgm:t>
+        <a:bodyPr/>
+        <a:lstStyle/>
+        <a:p>
+          <a:endParaRPr lang="en-US"/>
+        </a:p>
+      </dgm:t>
     </dgm:pt>
     <dgm:pt modelId="{82CB2603-4A55-4B49-A6E8-B125ED9C9E48}" type="pres">
       <dgm:prSet presAssocID="{2F1FB023-A283-4CF2-AD92-547252EFD921}" presName="connectorText" presStyleLbl="sibTrans2D1" presStyleIdx="1" presStyleCnt="2"/>
       <dgm:spPr/>
+      <dgm:t>
+        <a:bodyPr/>
+        <a:lstStyle/>
+        <a:p>
+          <a:endParaRPr lang="en-US"/>
+        </a:p>
+      </dgm:t>
     </dgm:pt>
     <dgm:pt modelId="{1886C3BF-2DFE-4372-93A8-70DF5AE5B7BB}" type="pres">
       <dgm:prSet presAssocID="{91A65AEF-6A15-4A27-BEF4-E1F29341CAE7}" presName="node" presStyleLbl="node1" presStyleIdx="2" presStyleCnt="3">
@@ -3924,40 +3977,47 @@
         </dgm:presLayoutVars>
       </dgm:prSet>
       <dgm:spPr/>
+      <dgm:t>
+        <a:bodyPr/>
+        <a:lstStyle/>
+        <a:p>
+          <a:endParaRPr lang="en-US"/>
+        </a:p>
+      </dgm:t>
     </dgm:pt>
   </dgm:ptLst>
   <dgm:cxnLst>
+    <dgm:cxn modelId="{E4780FAE-1D30-42E7-AC51-8BA88C8C3936}" srcId="{0446C03C-E073-45AB-A9C8-06443FEA1350}" destId="{C466413A-A54D-4592-9067-4A7632047ADD}" srcOrd="0" destOrd="0" parTransId="{168F6043-1350-4D89-84A3-126F1B46C4D8}" sibTransId="{BBEBD048-CE75-4AEB-8E49-5458336C8650}"/>
+    <dgm:cxn modelId="{79EC4E32-DBFE-4EC9-87D3-E83007DEB976}" srcId="{7F00E8CE-6E56-4F4D-88C9-C0473C61FC8D}" destId="{91A65AEF-6A15-4A27-BEF4-E1F29341CAE7}" srcOrd="2" destOrd="0" parTransId="{73FB7926-F3DC-4072-892E-5CDBC32AC16D}" sibTransId="{26F79743-5592-4A48-AD2F-903A4A3C64B0}"/>
+    <dgm:cxn modelId="{274EF8EA-833F-4500-9EC7-213330933E55}" srcId="{91A65AEF-6A15-4A27-BEF4-E1F29341CAE7}" destId="{5E3E51B3-C034-40DA-8D6B-12A51F79F84F}" srcOrd="1" destOrd="0" parTransId="{655E7F96-779F-49AD-864A-E6F2A6C31883}" sibTransId="{D2A9912C-C23B-4036-9067-0181019705BF}"/>
+    <dgm:cxn modelId="{79AE3E36-3F6D-4B29-A511-5D0B9A6434B9}" type="presOf" srcId="{C466413A-A54D-4592-9067-4A7632047ADD}" destId="{BDAA6788-3D12-47BC-9E42-7D38FDE7F399}" srcOrd="0" destOrd="1" presId="urn:microsoft.com/office/officeart/2005/8/layout/process1"/>
+    <dgm:cxn modelId="{E52E4512-9B52-4829-8292-891CD1605CFA}" type="presOf" srcId="{DD9D1A19-C042-4241-AC1E-CBC58119E3B1}" destId="{E1C175A5-344B-46C4-A31A-B19B85FB8577}" srcOrd="0" destOrd="0" presId="urn:microsoft.com/office/officeart/2005/8/layout/process1"/>
+    <dgm:cxn modelId="{2B471167-3011-4249-B4E4-797FE711F9F1}" srcId="{DD9D1A19-C042-4241-AC1E-CBC58119E3B1}" destId="{169D612B-DA50-42B2-A089-0CD33404C833}" srcOrd="1" destOrd="0" parTransId="{3DBDD095-BAC6-4E38-BFDA-31C50CC1291F}" sibTransId="{D8E076AF-17A9-4432-91BD-D6211BC0EA7C}"/>
+    <dgm:cxn modelId="{089EAF4D-0718-4A95-82BC-C9DC79A61562}" srcId="{DD9D1A19-C042-4241-AC1E-CBC58119E3B1}" destId="{81A854F5-D3EB-49EB-AF5F-B56F6C8F5EC5}" srcOrd="0" destOrd="0" parTransId="{56C0F259-9B7E-421E-8F8E-530B0F5CE873}" sibTransId="{9F016FBE-B21A-4F9E-B770-AF7EB9058F08}"/>
+    <dgm:cxn modelId="{22FC1ECA-E709-46D6-9263-3055451A2D92}" srcId="{DD9D1A19-C042-4241-AC1E-CBC58119E3B1}" destId="{942CFC1C-AA12-4264-A826-2D247FC95085}" srcOrd="2" destOrd="0" parTransId="{7CB0AD2C-A735-4A10-B9FB-A1061338BA5B}" sibTransId="{F0159CE7-914F-482D-8628-34B12113E511}"/>
+    <dgm:cxn modelId="{00CE3C1E-BC5E-4AEE-B410-7750B957FC84}" type="presOf" srcId="{F5351295-5A7B-4686-BA6C-AAD51831210B}" destId="{BDAA6788-3D12-47BC-9E42-7D38FDE7F399}" srcOrd="0" destOrd="2" presId="urn:microsoft.com/office/officeart/2005/8/layout/process1"/>
+    <dgm:cxn modelId="{2E825B25-6EA5-4063-A79B-66B8818EDD05}" type="presOf" srcId="{7F00E8CE-6E56-4F4D-88C9-C0473C61FC8D}" destId="{962DDC3C-372C-41E5-98AF-1BC41210AB0A}" srcOrd="0" destOrd="0" presId="urn:microsoft.com/office/officeart/2005/8/layout/process1"/>
+    <dgm:cxn modelId="{C21346BE-6B39-4AD3-9F67-10CFC4398D3C}" type="presOf" srcId="{91A65AEF-6A15-4A27-BEF4-E1F29341CAE7}" destId="{1886C3BF-2DFE-4372-93A8-70DF5AE5B7BB}" srcOrd="0" destOrd="0" presId="urn:microsoft.com/office/officeart/2005/8/layout/process1"/>
+    <dgm:cxn modelId="{DC9946B6-D564-4A8F-8A08-9E5A6CD74436}" srcId="{91A65AEF-6A15-4A27-BEF4-E1F29341CAE7}" destId="{F1C2D6F1-7C50-4518-AF30-C62830E34870}" srcOrd="0" destOrd="0" parTransId="{00864D43-7BE9-45DA-BAE4-E75E36C45913}" sibTransId="{7AA76297-BF81-4187-8BAD-57F1348D4BB5}"/>
+    <dgm:cxn modelId="{0B7C5417-96E9-4D4D-89AC-6F8D69992060}" type="presOf" srcId="{99DDACEB-7AC2-405D-8C03-62809185729F}" destId="{BDAA6788-3D12-47BC-9E42-7D38FDE7F399}" srcOrd="0" destOrd="3" presId="urn:microsoft.com/office/officeart/2005/8/layout/process1"/>
+    <dgm:cxn modelId="{C1D70DC3-BB6F-4772-8D52-C73C49E18F26}" type="presOf" srcId="{2F1FB023-A283-4CF2-AD92-547252EFD921}" destId="{82CB2603-4A55-4B49-A6E8-B125ED9C9E48}" srcOrd="1" destOrd="0" presId="urn:microsoft.com/office/officeart/2005/8/layout/process1"/>
+    <dgm:cxn modelId="{1C94B997-07FB-4D8B-B2E8-FF341A774F9B}" type="presOf" srcId="{169D612B-DA50-42B2-A089-0CD33404C833}" destId="{E1C175A5-344B-46C4-A31A-B19B85FB8577}" srcOrd="0" destOrd="2" presId="urn:microsoft.com/office/officeart/2005/8/layout/process1"/>
     <dgm:cxn modelId="{B4F95DF4-F8F0-49E1-8506-908FAFE11139}" srcId="{7F00E8CE-6E56-4F4D-88C9-C0473C61FC8D}" destId="{DD9D1A19-C042-4241-AC1E-CBC58119E3B1}" srcOrd="1" destOrd="0" parTransId="{777BD4C7-AAA8-4A81-829D-A0D2FF6AA15F}" sibTransId="{2F1FB023-A283-4CF2-AD92-547252EFD921}"/>
-    <dgm:cxn modelId="{C1D70DC3-BB6F-4772-8D52-C73C49E18F26}" type="presOf" srcId="{2F1FB023-A283-4CF2-AD92-547252EFD921}" destId="{82CB2603-4A55-4B49-A6E8-B125ED9C9E48}" srcOrd="1" destOrd="0" presId="urn:microsoft.com/office/officeart/2005/8/layout/process1"/>
-    <dgm:cxn modelId="{79AE3E36-3F6D-4B29-A511-5D0B9A6434B9}" type="presOf" srcId="{C466413A-A54D-4592-9067-4A7632047ADD}" destId="{BDAA6788-3D12-47BC-9E42-7D38FDE7F399}" srcOrd="0" destOrd="1" presId="urn:microsoft.com/office/officeart/2005/8/layout/process1"/>
-    <dgm:cxn modelId="{00CE3C1E-BC5E-4AEE-B410-7750B957FC84}" type="presOf" srcId="{F5351295-5A7B-4686-BA6C-AAD51831210B}" destId="{BDAA6788-3D12-47BC-9E42-7D38FDE7F399}" srcOrd="0" destOrd="2" presId="urn:microsoft.com/office/officeart/2005/8/layout/process1"/>
-    <dgm:cxn modelId="{E4780FAE-1D30-42E7-AC51-8BA88C8C3936}" srcId="{0446C03C-E073-45AB-A9C8-06443FEA1350}" destId="{C466413A-A54D-4592-9067-4A7632047ADD}" srcOrd="0" destOrd="0" parTransId="{168F6043-1350-4D89-84A3-126F1B46C4D8}" sibTransId="{BBEBD048-CE75-4AEB-8E49-5458336C8650}"/>
     <dgm:cxn modelId="{64F483B0-D56E-4E51-A12A-C615B4470DED}" srcId="{0446C03C-E073-45AB-A9C8-06443FEA1350}" destId="{99DDACEB-7AC2-405D-8C03-62809185729F}" srcOrd="2" destOrd="0" parTransId="{FE885667-BCFC-4070-85A3-7E7661061007}" sibTransId="{3060AE7B-8CF2-467E-AFA3-68FF2185B41A}"/>
-    <dgm:cxn modelId="{0B7C5417-96E9-4D4D-89AC-6F8D69992060}" type="presOf" srcId="{99DDACEB-7AC2-405D-8C03-62809185729F}" destId="{BDAA6788-3D12-47BC-9E42-7D38FDE7F399}" srcOrd="0" destOrd="3" presId="urn:microsoft.com/office/officeart/2005/8/layout/process1"/>
+    <dgm:cxn modelId="{7D477BAE-EA9F-4D3C-AE9E-B69332CB574A}" type="presOf" srcId="{DD3773AC-ED19-47CD-9A5C-21D0582A545B}" destId="{1F338E8C-445B-4795-9DFA-DDBCD4CD0223}" srcOrd="0" destOrd="0" presId="urn:microsoft.com/office/officeart/2005/8/layout/process1"/>
+    <dgm:cxn modelId="{00F6D34C-34A9-4267-BA6D-2341A482C667}" type="presOf" srcId="{DD3773AC-ED19-47CD-9A5C-21D0582A545B}" destId="{34DEC8FB-8A5E-47CA-96DE-B987907461FF}" srcOrd="1" destOrd="0" presId="urn:microsoft.com/office/officeart/2005/8/layout/process1"/>
+    <dgm:cxn modelId="{6CA895F7-DC0B-4666-938A-B116866643B2}" type="presOf" srcId="{7305E311-BA18-4725-86B1-D9DF66556862}" destId="{1886C3BF-2DFE-4372-93A8-70DF5AE5B7BB}" srcOrd="0" destOrd="3" presId="urn:microsoft.com/office/officeart/2005/8/layout/process1"/>
+    <dgm:cxn modelId="{7F065C32-943E-4B45-992C-FEEA645ADE92}" type="presOf" srcId="{0446C03C-E073-45AB-A9C8-06443FEA1350}" destId="{BDAA6788-3D12-47BC-9E42-7D38FDE7F399}" srcOrd="0" destOrd="0" presId="urn:microsoft.com/office/officeart/2005/8/layout/process1"/>
+    <dgm:cxn modelId="{932179C8-46BB-4EBA-B01E-CFBCCFA4DC21}" type="presOf" srcId="{AE78AC46-7E52-44F4-B2B2-7CE10099D6ED}" destId="{E1C175A5-344B-46C4-A31A-B19B85FB8577}" srcOrd="0" destOrd="4" presId="urn:microsoft.com/office/officeart/2005/8/layout/process1"/>
+    <dgm:cxn modelId="{46EEA246-DA9F-4BBB-89F1-BFFE8CD15378}" srcId="{7F00E8CE-6E56-4F4D-88C9-C0473C61FC8D}" destId="{0446C03C-E073-45AB-A9C8-06443FEA1350}" srcOrd="0" destOrd="0" parTransId="{166EBAF9-EA67-41C7-9543-4E7B353618A0}" sibTransId="{DD3773AC-ED19-47CD-9A5C-21D0582A545B}"/>
     <dgm:cxn modelId="{BCA9A3D5-D437-4983-9C4A-142C813CBF20}" srcId="{DD9D1A19-C042-4241-AC1E-CBC58119E3B1}" destId="{AE78AC46-7E52-44F4-B2B2-7CE10099D6ED}" srcOrd="3" destOrd="0" parTransId="{F3154323-2D0F-4AA8-BDA6-3039AF34A32D}" sibTransId="{38B06FD4-3BA9-4425-90CA-E27CB0EB86EA}"/>
-    <dgm:cxn modelId="{2E825B25-6EA5-4063-A79B-66B8818EDD05}" type="presOf" srcId="{7F00E8CE-6E56-4F4D-88C9-C0473C61FC8D}" destId="{962DDC3C-372C-41E5-98AF-1BC41210AB0A}" srcOrd="0" destOrd="0" presId="urn:microsoft.com/office/officeart/2005/8/layout/process1"/>
+    <dgm:cxn modelId="{97963869-47A2-410C-957F-FA9E0ABBA8EA}" type="presOf" srcId="{81A854F5-D3EB-49EB-AF5F-B56F6C8F5EC5}" destId="{E1C175A5-344B-46C4-A31A-B19B85FB8577}" srcOrd="0" destOrd="1" presId="urn:microsoft.com/office/officeart/2005/8/layout/process1"/>
+    <dgm:cxn modelId="{FEE8B482-E279-4E5C-BE13-C7106536C100}" srcId="{0446C03C-E073-45AB-A9C8-06443FEA1350}" destId="{F5351295-5A7B-4686-BA6C-AAD51831210B}" srcOrd="1" destOrd="0" parTransId="{8DB328E6-5015-4445-94EC-9C99E54FD70D}" sibTransId="{C5A711CA-AA1A-4629-BB87-67B93CCD2D61}"/>
+    <dgm:cxn modelId="{70398382-2953-4312-9820-0DB9982CAEDB}" type="presOf" srcId="{2F1FB023-A283-4CF2-AD92-547252EFD921}" destId="{F461BE5B-401D-414A-9175-B95B6C23DC9D}" srcOrd="0" destOrd="0" presId="urn:microsoft.com/office/officeart/2005/8/layout/process1"/>
+    <dgm:cxn modelId="{57DFCDEE-5952-43CC-BCE2-536517B17C25}" type="presOf" srcId="{5E3E51B3-C034-40DA-8D6B-12A51F79F84F}" destId="{1886C3BF-2DFE-4372-93A8-70DF5AE5B7BB}" srcOrd="0" destOrd="2" presId="urn:microsoft.com/office/officeart/2005/8/layout/process1"/>
     <dgm:cxn modelId="{8F4B5199-D290-4C54-BFDB-FAFDE984C92C}" type="presOf" srcId="{942CFC1C-AA12-4264-A826-2D247FC95085}" destId="{E1C175A5-344B-46C4-A31A-B19B85FB8577}" srcOrd="0" destOrd="3" presId="urn:microsoft.com/office/officeart/2005/8/layout/process1"/>
-    <dgm:cxn modelId="{2B471167-3011-4249-B4E4-797FE711F9F1}" srcId="{DD9D1A19-C042-4241-AC1E-CBC58119E3B1}" destId="{169D612B-DA50-42B2-A089-0CD33404C833}" srcOrd="1" destOrd="0" parTransId="{3DBDD095-BAC6-4E38-BFDA-31C50CC1291F}" sibTransId="{D8E076AF-17A9-4432-91BD-D6211BC0EA7C}"/>
-    <dgm:cxn modelId="{46EEA246-DA9F-4BBB-89F1-BFFE8CD15378}" srcId="{7F00E8CE-6E56-4F4D-88C9-C0473C61FC8D}" destId="{0446C03C-E073-45AB-A9C8-06443FEA1350}" srcOrd="0" destOrd="0" parTransId="{166EBAF9-EA67-41C7-9543-4E7B353618A0}" sibTransId="{DD3773AC-ED19-47CD-9A5C-21D0582A545B}"/>
-    <dgm:cxn modelId="{DC9946B6-D564-4A8F-8A08-9E5A6CD74436}" srcId="{91A65AEF-6A15-4A27-BEF4-E1F29341CAE7}" destId="{F1C2D6F1-7C50-4518-AF30-C62830E34870}" srcOrd="0" destOrd="0" parTransId="{00864D43-7BE9-45DA-BAE4-E75E36C45913}" sibTransId="{7AA76297-BF81-4187-8BAD-57F1348D4BB5}"/>
-    <dgm:cxn modelId="{6CA895F7-DC0B-4666-938A-B116866643B2}" type="presOf" srcId="{7305E311-BA18-4725-86B1-D9DF66556862}" destId="{1886C3BF-2DFE-4372-93A8-70DF5AE5B7BB}" srcOrd="0" destOrd="3" presId="urn:microsoft.com/office/officeart/2005/8/layout/process1"/>
-    <dgm:cxn modelId="{70398382-2953-4312-9820-0DB9982CAEDB}" type="presOf" srcId="{2F1FB023-A283-4CF2-AD92-547252EFD921}" destId="{F461BE5B-401D-414A-9175-B95B6C23DC9D}" srcOrd="0" destOrd="0" presId="urn:microsoft.com/office/officeart/2005/8/layout/process1"/>
-    <dgm:cxn modelId="{22FC1ECA-E709-46D6-9263-3055451A2D92}" srcId="{DD9D1A19-C042-4241-AC1E-CBC58119E3B1}" destId="{942CFC1C-AA12-4264-A826-2D247FC95085}" srcOrd="2" destOrd="0" parTransId="{7CB0AD2C-A735-4A10-B9FB-A1061338BA5B}" sibTransId="{F0159CE7-914F-482D-8628-34B12113E511}"/>
-    <dgm:cxn modelId="{1C94B997-07FB-4D8B-B2E8-FF341A774F9B}" type="presOf" srcId="{169D612B-DA50-42B2-A089-0CD33404C833}" destId="{E1C175A5-344B-46C4-A31A-B19B85FB8577}" srcOrd="0" destOrd="2" presId="urn:microsoft.com/office/officeart/2005/8/layout/process1"/>
-    <dgm:cxn modelId="{57DFCDEE-5952-43CC-BCE2-536517B17C25}" type="presOf" srcId="{5E3E51B3-C034-40DA-8D6B-12A51F79F84F}" destId="{1886C3BF-2DFE-4372-93A8-70DF5AE5B7BB}" srcOrd="0" destOrd="2" presId="urn:microsoft.com/office/officeart/2005/8/layout/process1"/>
-    <dgm:cxn modelId="{7D477BAE-EA9F-4D3C-AE9E-B69332CB574A}" type="presOf" srcId="{DD3773AC-ED19-47CD-9A5C-21D0582A545B}" destId="{1F338E8C-445B-4795-9DFA-DDBCD4CD0223}" srcOrd="0" destOrd="0" presId="urn:microsoft.com/office/officeart/2005/8/layout/process1"/>
-    <dgm:cxn modelId="{97963869-47A2-410C-957F-FA9E0ABBA8EA}" type="presOf" srcId="{81A854F5-D3EB-49EB-AF5F-B56F6C8F5EC5}" destId="{E1C175A5-344B-46C4-A31A-B19B85FB8577}" srcOrd="0" destOrd="1" presId="urn:microsoft.com/office/officeart/2005/8/layout/process1"/>
-    <dgm:cxn modelId="{932179C8-46BB-4EBA-B01E-CFBCCFA4DC21}" type="presOf" srcId="{AE78AC46-7E52-44F4-B2B2-7CE10099D6ED}" destId="{E1C175A5-344B-46C4-A31A-B19B85FB8577}" srcOrd="0" destOrd="4" presId="urn:microsoft.com/office/officeart/2005/8/layout/process1"/>
-    <dgm:cxn modelId="{7F065C32-943E-4B45-992C-FEEA645ADE92}" type="presOf" srcId="{0446C03C-E073-45AB-A9C8-06443FEA1350}" destId="{BDAA6788-3D12-47BC-9E42-7D38FDE7F399}" srcOrd="0" destOrd="0" presId="urn:microsoft.com/office/officeart/2005/8/layout/process1"/>
+    <dgm:cxn modelId="{AC0F4E34-1EE9-4B66-99B0-32ECCF3AFCEA}" srcId="{91A65AEF-6A15-4A27-BEF4-E1F29341CAE7}" destId="{7305E311-BA18-4725-86B1-D9DF66556862}" srcOrd="2" destOrd="0" parTransId="{35EE8319-C046-48CC-965F-761964A1A1D8}" sibTransId="{BAA32ABE-2C94-4499-B5F5-1BE81733AACE}"/>
     <dgm:cxn modelId="{A35BA005-231A-4DF5-ACF3-C891B914081F}" type="presOf" srcId="{F1C2D6F1-7C50-4518-AF30-C62830E34870}" destId="{1886C3BF-2DFE-4372-93A8-70DF5AE5B7BB}" srcOrd="0" destOrd="1" presId="urn:microsoft.com/office/officeart/2005/8/layout/process1"/>
-    <dgm:cxn modelId="{C21346BE-6B39-4AD3-9F67-10CFC4398D3C}" type="presOf" srcId="{91A65AEF-6A15-4A27-BEF4-E1F29341CAE7}" destId="{1886C3BF-2DFE-4372-93A8-70DF5AE5B7BB}" srcOrd="0" destOrd="0" presId="urn:microsoft.com/office/officeart/2005/8/layout/process1"/>
-    <dgm:cxn modelId="{00F6D34C-34A9-4267-BA6D-2341A482C667}" type="presOf" srcId="{DD3773AC-ED19-47CD-9A5C-21D0582A545B}" destId="{34DEC8FB-8A5E-47CA-96DE-B987907461FF}" srcOrd="1" destOrd="0" presId="urn:microsoft.com/office/officeart/2005/8/layout/process1"/>
-    <dgm:cxn modelId="{089EAF4D-0718-4A95-82BC-C9DC79A61562}" srcId="{DD9D1A19-C042-4241-AC1E-CBC58119E3B1}" destId="{81A854F5-D3EB-49EB-AF5F-B56F6C8F5EC5}" srcOrd="0" destOrd="0" parTransId="{56C0F259-9B7E-421E-8F8E-530B0F5CE873}" sibTransId="{9F016FBE-B21A-4F9E-B770-AF7EB9058F08}"/>
-    <dgm:cxn modelId="{E52E4512-9B52-4829-8292-891CD1605CFA}" type="presOf" srcId="{DD9D1A19-C042-4241-AC1E-CBC58119E3B1}" destId="{E1C175A5-344B-46C4-A31A-B19B85FB8577}" srcOrd="0" destOrd="0" presId="urn:microsoft.com/office/officeart/2005/8/layout/process1"/>
-    <dgm:cxn modelId="{274EF8EA-833F-4500-9EC7-213330933E55}" srcId="{91A65AEF-6A15-4A27-BEF4-E1F29341CAE7}" destId="{5E3E51B3-C034-40DA-8D6B-12A51F79F84F}" srcOrd="1" destOrd="0" parTransId="{655E7F96-779F-49AD-864A-E6F2A6C31883}" sibTransId="{D2A9912C-C23B-4036-9067-0181019705BF}"/>
-    <dgm:cxn modelId="{79EC4E32-DBFE-4EC9-87D3-E83007DEB976}" srcId="{7F00E8CE-6E56-4F4D-88C9-C0473C61FC8D}" destId="{91A65AEF-6A15-4A27-BEF4-E1F29341CAE7}" srcOrd="2" destOrd="0" parTransId="{73FB7926-F3DC-4072-892E-5CDBC32AC16D}" sibTransId="{26F79743-5592-4A48-AD2F-903A4A3C64B0}"/>
-    <dgm:cxn modelId="{AC0F4E34-1EE9-4B66-99B0-32ECCF3AFCEA}" srcId="{91A65AEF-6A15-4A27-BEF4-E1F29341CAE7}" destId="{7305E311-BA18-4725-86B1-D9DF66556862}" srcOrd="2" destOrd="0" parTransId="{35EE8319-C046-48CC-965F-761964A1A1D8}" sibTransId="{BAA32ABE-2C94-4499-B5F5-1BE81733AACE}"/>
-    <dgm:cxn modelId="{FEE8B482-E279-4E5C-BE13-C7106536C100}" srcId="{0446C03C-E073-45AB-A9C8-06443FEA1350}" destId="{F5351295-5A7B-4686-BA6C-AAD51831210B}" srcOrd="1" destOrd="0" parTransId="{8DB328E6-5015-4445-94EC-9C99E54FD70D}" sibTransId="{C5A711CA-AA1A-4629-BB87-67B93CCD2D61}"/>
     <dgm:cxn modelId="{1384C4A0-1E04-4060-89DC-38ACFD604295}" type="presParOf" srcId="{962DDC3C-372C-41E5-98AF-1BC41210AB0A}" destId="{BDAA6788-3D12-47BC-9E42-7D38FDE7F399}" srcOrd="0" destOrd="0" presId="urn:microsoft.com/office/officeart/2005/8/layout/process1"/>
     <dgm:cxn modelId="{6914B89C-996B-4428-B6D6-4F300640B65E}" type="presParOf" srcId="{962DDC3C-372C-41E5-98AF-1BC41210AB0A}" destId="{1F338E8C-445B-4795-9DFA-DDBCD4CD0223}" srcOrd="1" destOrd="0" presId="urn:microsoft.com/office/officeart/2005/8/layout/process1"/>
     <dgm:cxn modelId="{09391D10-8263-4063-ACCB-80C26E2DCE68}" type="presParOf" srcId="{1F338E8C-445B-4795-9DFA-DDBCD4CD0223}" destId="{34DEC8FB-8A5E-47CA-96DE-B987907461FF}" srcOrd="0" destOrd="0" presId="urn:microsoft.com/office/officeart/2005/8/layout/process1"/>
@@ -4071,14 +4131,35 @@
         </dgm:presLayoutVars>
       </dgm:prSet>
       <dgm:spPr/>
+      <dgm:t>
+        <a:bodyPr/>
+        <a:lstStyle/>
+        <a:p>
+          <a:endParaRPr lang="en-US"/>
+        </a:p>
+      </dgm:t>
     </dgm:pt>
     <dgm:pt modelId="{88EDF64E-35BB-481B-B11A-F08915958068}" type="pres">
       <dgm:prSet presAssocID="{E892C2B4-4244-468D-917A-E776E4200961}" presName="sibTrans" presStyleLbl="sibTrans2D1" presStyleIdx="0" presStyleCnt="1"/>
       <dgm:spPr/>
+      <dgm:t>
+        <a:bodyPr/>
+        <a:lstStyle/>
+        <a:p>
+          <a:endParaRPr lang="en-US"/>
+        </a:p>
+      </dgm:t>
     </dgm:pt>
     <dgm:pt modelId="{F3C8F6A7-EE57-4CE9-92F3-C5249F31F420}" type="pres">
       <dgm:prSet presAssocID="{E892C2B4-4244-468D-917A-E776E4200961}" presName="connectorText" presStyleLbl="sibTrans2D1" presStyleIdx="0" presStyleCnt="1"/>
       <dgm:spPr/>
+      <dgm:t>
+        <a:bodyPr/>
+        <a:lstStyle/>
+        <a:p>
+          <a:endParaRPr lang="en-US"/>
+        </a:p>
+      </dgm:t>
     </dgm:pt>
     <dgm:pt modelId="{174F3DC6-92D1-46F3-BBD6-C834F6469487}" type="pres">
       <dgm:prSet presAssocID="{3E86D3FA-BD3A-4833-9766-85B4B2E840DF}" presName="node" presStyleLbl="node1" presStyleIdx="1" presStyleCnt="2">
@@ -4087,6 +4168,13 @@
         </dgm:presLayoutVars>
       </dgm:prSet>
       <dgm:spPr/>
+      <dgm:t>
+        <a:bodyPr/>
+        <a:lstStyle/>
+        <a:p>
+          <a:endParaRPr lang="en-US"/>
+        </a:p>
+      </dgm:t>
     </dgm:pt>
   </dgm:ptLst>
   <dgm:cxnLst>
@@ -4287,14 +4375,35 @@
         </dgm:presLayoutVars>
       </dgm:prSet>
       <dgm:spPr/>
+      <dgm:t>
+        <a:bodyPr/>
+        <a:lstStyle/>
+        <a:p>
+          <a:endParaRPr lang="en-US"/>
+        </a:p>
+      </dgm:t>
     </dgm:pt>
     <dgm:pt modelId="{F743BBA3-F85A-4955-B22D-74C8A453CDA2}" type="pres">
       <dgm:prSet presAssocID="{652A2CBE-7EEC-43CF-9E13-4590DEBC9582}" presName="sibTrans" presStyleLbl="sibTrans2D1" presStyleIdx="0" presStyleCnt="3"/>
       <dgm:spPr/>
+      <dgm:t>
+        <a:bodyPr/>
+        <a:lstStyle/>
+        <a:p>
+          <a:endParaRPr lang="en-US"/>
+        </a:p>
+      </dgm:t>
     </dgm:pt>
     <dgm:pt modelId="{8B8B4377-0697-45FC-A640-F2CE0A54A7DA}" type="pres">
       <dgm:prSet presAssocID="{652A2CBE-7EEC-43CF-9E13-4590DEBC9582}" presName="connectorText" presStyleLbl="sibTrans2D1" presStyleIdx="0" presStyleCnt="3"/>
       <dgm:spPr/>
+      <dgm:t>
+        <a:bodyPr/>
+        <a:lstStyle/>
+        <a:p>
+          <a:endParaRPr lang="en-US"/>
+        </a:p>
+      </dgm:t>
     </dgm:pt>
     <dgm:pt modelId="{34C7BCB3-04DB-45C7-9A42-320BFF7BC6DD}" type="pres">
       <dgm:prSet presAssocID="{BF1D83B5-B3DF-493F-A256-78F574499C76}" presName="node" presStyleLbl="node1" presStyleIdx="1" presStyleCnt="4">
@@ -4303,14 +4412,35 @@
         </dgm:presLayoutVars>
       </dgm:prSet>
       <dgm:spPr/>
+      <dgm:t>
+        <a:bodyPr/>
+        <a:lstStyle/>
+        <a:p>
+          <a:endParaRPr lang="en-US"/>
+        </a:p>
+      </dgm:t>
     </dgm:pt>
     <dgm:pt modelId="{9C101147-473E-42D2-A0E5-5ABF38B50C73}" type="pres">
       <dgm:prSet presAssocID="{C3C10AC9-1ADB-403C-A703-3E7E7FA57BF8}" presName="sibTrans" presStyleLbl="sibTrans2D1" presStyleIdx="1" presStyleCnt="3"/>
       <dgm:spPr/>
+      <dgm:t>
+        <a:bodyPr/>
+        <a:lstStyle/>
+        <a:p>
+          <a:endParaRPr lang="en-US"/>
+        </a:p>
+      </dgm:t>
     </dgm:pt>
     <dgm:pt modelId="{8DC65580-354A-49B6-A367-B6A9A3244483}" type="pres">
       <dgm:prSet presAssocID="{C3C10AC9-1ADB-403C-A703-3E7E7FA57BF8}" presName="connectorText" presStyleLbl="sibTrans2D1" presStyleIdx="1" presStyleCnt="3"/>
       <dgm:spPr/>
+      <dgm:t>
+        <a:bodyPr/>
+        <a:lstStyle/>
+        <a:p>
+          <a:endParaRPr lang="en-US"/>
+        </a:p>
+      </dgm:t>
     </dgm:pt>
     <dgm:pt modelId="{732646D0-614E-4567-8EB3-FE5BADE041C4}" type="pres">
       <dgm:prSet presAssocID="{9943014D-8C6E-463D-A613-48F23D4519B7}" presName="node" presStyleLbl="node1" presStyleIdx="2" presStyleCnt="4">
@@ -4319,14 +4449,35 @@
         </dgm:presLayoutVars>
       </dgm:prSet>
       <dgm:spPr/>
+      <dgm:t>
+        <a:bodyPr/>
+        <a:lstStyle/>
+        <a:p>
+          <a:endParaRPr lang="en-US"/>
+        </a:p>
+      </dgm:t>
     </dgm:pt>
     <dgm:pt modelId="{C450CEE9-1A94-4A67-8B6D-B4519DBA50F0}" type="pres">
       <dgm:prSet presAssocID="{E1FFF456-3F57-4AA5-801E-995CE96CAF64}" presName="sibTrans" presStyleLbl="sibTrans2D1" presStyleIdx="2" presStyleCnt="3"/>
       <dgm:spPr/>
+      <dgm:t>
+        <a:bodyPr/>
+        <a:lstStyle/>
+        <a:p>
+          <a:endParaRPr lang="en-US"/>
+        </a:p>
+      </dgm:t>
     </dgm:pt>
     <dgm:pt modelId="{42481493-BF49-4D21-914E-E49B566E00C1}" type="pres">
       <dgm:prSet presAssocID="{E1FFF456-3F57-4AA5-801E-995CE96CAF64}" presName="connectorText" presStyleLbl="sibTrans2D1" presStyleIdx="2" presStyleCnt="3"/>
       <dgm:spPr/>
+      <dgm:t>
+        <a:bodyPr/>
+        <a:lstStyle/>
+        <a:p>
+          <a:endParaRPr lang="en-US"/>
+        </a:p>
+      </dgm:t>
     </dgm:pt>
     <dgm:pt modelId="{E1A97CE5-89F8-4DCF-B4DC-A0ABABE32E9B}" type="pres">
       <dgm:prSet presAssocID="{727CD113-AE2A-4DE5-BC4F-9A72EB55259C}" presName="node" presStyleLbl="node1" presStyleIdx="3" presStyleCnt="4">
@@ -4335,6 +4486,13 @@
         </dgm:presLayoutVars>
       </dgm:prSet>
       <dgm:spPr/>
+      <dgm:t>
+        <a:bodyPr/>
+        <a:lstStyle/>
+        <a:p>
+          <a:endParaRPr lang="en-US"/>
+        </a:p>
+      </dgm:t>
     </dgm:pt>
   </dgm:ptLst>
   <dgm:cxnLst>
@@ -4840,6 +4998,13 @@
         </dgm:presLayoutVars>
       </dgm:prSet>
       <dgm:spPr/>
+      <dgm:t>
+        <a:bodyPr/>
+        <a:lstStyle/>
+        <a:p>
+          <a:endParaRPr lang="en-US"/>
+        </a:p>
+      </dgm:t>
     </dgm:pt>
     <dgm:pt modelId="{AB8C601B-4365-4E3A-9CA6-9D06E9BCDD70}" type="pres">
       <dgm:prSet presAssocID="{EC62BD84-3ADA-4D62-A238-5C25F36574A7}" presName="composite" presStyleCnt="0"/>
@@ -4858,6 +5023,13 @@
         </dgm:presLayoutVars>
       </dgm:prSet>
       <dgm:spPr/>
+      <dgm:t>
+        <a:bodyPr/>
+        <a:lstStyle/>
+        <a:p>
+          <a:endParaRPr lang="en-US"/>
+        </a:p>
+      </dgm:t>
     </dgm:pt>
     <dgm:pt modelId="{2B70D009-F13D-44C0-A7BC-54C205FE77FB}" type="pres">
       <dgm:prSet presAssocID="{EC62BD84-3ADA-4D62-A238-5C25F36574A7}" presName="ChildText" presStyleLbl="revTx" presStyleIdx="0" presStyleCnt="6">
@@ -4868,6 +5040,13 @@
         </dgm:presLayoutVars>
       </dgm:prSet>
       <dgm:spPr/>
+      <dgm:t>
+        <a:bodyPr/>
+        <a:lstStyle/>
+        <a:p>
+          <a:endParaRPr lang="en-US"/>
+        </a:p>
+      </dgm:t>
     </dgm:pt>
     <dgm:pt modelId="{281CFAFE-56FC-43A9-BB74-764EA455F547}" type="pres">
       <dgm:prSet presAssocID="{950750D0-60DF-4E9F-A820-AFB7EBB48E58}" presName="sibTrans" presStyleCnt="0"/>
@@ -4890,6 +5069,13 @@
         </dgm:presLayoutVars>
       </dgm:prSet>
       <dgm:spPr/>
+      <dgm:t>
+        <a:bodyPr/>
+        <a:lstStyle/>
+        <a:p>
+          <a:endParaRPr lang="en-US"/>
+        </a:p>
+      </dgm:t>
     </dgm:pt>
     <dgm:pt modelId="{2AAE7345-B9D4-4662-AC19-BCF06F8C49FD}" type="pres">
       <dgm:prSet presAssocID="{67594A18-8BF6-496C-A000-0D9DD1029B4F}" presName="ChildText" presStyleLbl="revTx" presStyleIdx="1" presStyleCnt="6">
@@ -4900,6 +5086,13 @@
         </dgm:presLayoutVars>
       </dgm:prSet>
       <dgm:spPr/>
+      <dgm:t>
+        <a:bodyPr/>
+        <a:lstStyle/>
+        <a:p>
+          <a:endParaRPr lang="en-US"/>
+        </a:p>
+      </dgm:t>
     </dgm:pt>
     <dgm:pt modelId="{77FB48DC-542B-47DA-8F3D-07CABFEA80C6}" type="pres">
       <dgm:prSet presAssocID="{84DB37C6-42F4-416A-B64E-7607627251ED}" presName="sibTrans" presStyleCnt="0"/>
@@ -4922,6 +5115,13 @@
         </dgm:presLayoutVars>
       </dgm:prSet>
       <dgm:spPr/>
+      <dgm:t>
+        <a:bodyPr/>
+        <a:lstStyle/>
+        <a:p>
+          <a:endParaRPr lang="en-US"/>
+        </a:p>
+      </dgm:t>
     </dgm:pt>
     <dgm:pt modelId="{1065B556-C4C5-451F-9E11-5643BF244E6D}" type="pres">
       <dgm:prSet presAssocID="{CB4D03F2-A463-483F-B6E9-E0DF88327D26}" presName="ChildText" presStyleLbl="revTx" presStyleIdx="2" presStyleCnt="6">
@@ -4932,6 +5132,13 @@
         </dgm:presLayoutVars>
       </dgm:prSet>
       <dgm:spPr/>
+      <dgm:t>
+        <a:bodyPr/>
+        <a:lstStyle/>
+        <a:p>
+          <a:endParaRPr lang="en-US"/>
+        </a:p>
+      </dgm:t>
     </dgm:pt>
     <dgm:pt modelId="{FE91066B-826B-4E8F-8F89-65D97E96FD3E}" type="pres">
       <dgm:prSet presAssocID="{45EA78CC-ED60-44A4-B35A-4F4D41AD9074}" presName="sibTrans" presStyleCnt="0"/>
@@ -4954,6 +5161,13 @@
         </dgm:presLayoutVars>
       </dgm:prSet>
       <dgm:spPr/>
+      <dgm:t>
+        <a:bodyPr/>
+        <a:lstStyle/>
+        <a:p>
+          <a:endParaRPr lang="en-US"/>
+        </a:p>
+      </dgm:t>
     </dgm:pt>
     <dgm:pt modelId="{87A88EA6-ADD6-41C7-99DF-6D5B6FCF6A5F}" type="pres">
       <dgm:prSet presAssocID="{92513214-5084-4272-9D93-357D7B9D089E}" presName="ChildText" presStyleLbl="revTx" presStyleIdx="3" presStyleCnt="6">
@@ -4986,6 +5200,13 @@
         </dgm:presLayoutVars>
       </dgm:prSet>
       <dgm:spPr/>
+      <dgm:t>
+        <a:bodyPr/>
+        <a:lstStyle/>
+        <a:p>
+          <a:endParaRPr lang="en-US"/>
+        </a:p>
+      </dgm:t>
     </dgm:pt>
     <dgm:pt modelId="{3B7E9670-7370-4317-AD00-E6DF1B3CDE86}" type="pres">
       <dgm:prSet presAssocID="{74F98B7C-30AE-4741-94A0-EDC036253585}" presName="ChildText" presStyleLbl="revTx" presStyleIdx="4" presStyleCnt="6">
@@ -4996,6 +5217,13 @@
         </dgm:presLayoutVars>
       </dgm:prSet>
       <dgm:spPr/>
+      <dgm:t>
+        <a:bodyPr/>
+        <a:lstStyle/>
+        <a:p>
+          <a:endParaRPr lang="en-US"/>
+        </a:p>
+      </dgm:t>
     </dgm:pt>
     <dgm:pt modelId="{B6AE8FF3-C372-4990-A87E-690E0742B0A0}" type="pres">
       <dgm:prSet presAssocID="{86E1F1B4-C851-4BFE-8C51-011F9845B2E8}" presName="sibTrans" presStyleCnt="0"/>
@@ -5018,6 +5246,13 @@
         </dgm:presLayoutVars>
       </dgm:prSet>
       <dgm:spPr/>
+      <dgm:t>
+        <a:bodyPr/>
+        <a:lstStyle/>
+        <a:p>
+          <a:endParaRPr lang="en-US"/>
+        </a:p>
+      </dgm:t>
     </dgm:pt>
     <dgm:pt modelId="{C428768A-2A30-487B-B09F-FE8B44DAB860}" type="pres">
       <dgm:prSet presAssocID="{B4C33871-7DA1-44A1-BE5E-9A939EA109E0}" presName="ChildText" presStyleLbl="revTx" presStyleIdx="5" presStyleCnt="6">
@@ -5028,6 +5263,13 @@
         </dgm:presLayoutVars>
       </dgm:prSet>
       <dgm:spPr/>
+      <dgm:t>
+        <a:bodyPr/>
+        <a:lstStyle/>
+        <a:p>
+          <a:endParaRPr lang="en-US"/>
+        </a:p>
+      </dgm:t>
     </dgm:pt>
     <dgm:pt modelId="{326EB8E6-AE2C-4F27-B35E-7CA6903149B3}" type="pres">
       <dgm:prSet presAssocID="{D37605B2-7AA9-4548-BD9D-1B13587547B0}" presName="sibTrans" presStyleCnt="0"/>
@@ -5046,6 +5288,13 @@
         </dgm:presLayoutVars>
       </dgm:prSet>
       <dgm:spPr/>
+      <dgm:t>
+        <a:bodyPr/>
+        <a:lstStyle/>
+        <a:p>
+          <a:endParaRPr lang="en-US"/>
+        </a:p>
+      </dgm:t>
     </dgm:pt>
   </dgm:ptLst>
   <dgm:cxnLst>
@@ -5182,7 +5431,7 @@
         </a:bodyPr>
         <a:lstStyle/>
         <a:p>
-          <a:pPr marL="0" lvl="0" indent="0" algn="l" defTabSz="889000">
+          <a:pPr lvl="0" algn="l" defTabSz="889000">
             <a:lnSpc>
               <a:spcPct val="90000"/>
             </a:lnSpc>
@@ -5192,7 +5441,6 @@
             <a:spcAft>
               <a:spcPct val="35000"/>
             </a:spcAft>
-            <a:buNone/>
           </a:pPr>
           <a:r>
             <a:rPr lang="es-ES" sz="2000" kern="1200" dirty="0"/>
@@ -5211,7 +5459,7 @@
             <a:spcAft>
               <a:spcPct val="15000"/>
             </a:spcAft>
-            <a:buChar char="•"/>
+            <a:buChar char="••"/>
           </a:pPr>
           <a:r>
             <a:rPr lang="es-ES" sz="1600" kern="1200" dirty="0"/>
@@ -5230,7 +5478,7 @@
             <a:spcAft>
               <a:spcPct val="15000"/>
             </a:spcAft>
-            <a:buChar char="•"/>
+            <a:buChar char="••"/>
           </a:pPr>
           <a:r>
             <a:rPr lang="es-ES" sz="1600" kern="1200" dirty="0"/>
@@ -5265,7 +5513,7 @@
             <a:spcAft>
               <a:spcPct val="15000"/>
             </a:spcAft>
-            <a:buChar char="•"/>
+            <a:buChar char="••"/>
           </a:pPr>
           <a:r>
             <a:rPr lang="en-US" sz="1600" b="0" i="0" kern="1200" dirty="0"/>
@@ -5278,6 +5526,10 @@
           <a:r>
             <a:rPr lang="en-US" sz="1600" b="0" i="0" kern="1200" dirty="0"/>
             <a:t> 259909</a:t>
+          </a:r>
+          <a:r>
+            <a:rPr lang="en-US" sz="1600" kern="1200" dirty="0"/>
+            <a:t/>
           </a:r>
           <a:br>
             <a:rPr lang="en-US" sz="1600" kern="1200" dirty="0"/>
@@ -5340,7 +5592,7 @@
         </a:bodyPr>
         <a:lstStyle/>
         <a:p>
-          <a:pPr marL="0" lvl="0" indent="0" algn="ctr" defTabSz="711200">
+          <a:pPr lvl="0" algn="ctr" defTabSz="711200">
             <a:lnSpc>
               <a:spcPct val="90000"/>
             </a:lnSpc>
@@ -5350,7 +5602,6 @@
             <a:spcAft>
               <a:spcPct val="35000"/>
             </a:spcAft>
-            <a:buNone/>
           </a:pPr>
           <a:endParaRPr lang="en-US" sz="1600" kern="1200"/>
         </a:p>
@@ -5417,7 +5668,7 @@
         </a:bodyPr>
         <a:lstStyle/>
         <a:p>
-          <a:pPr marL="0" lvl="0" indent="0" algn="l" defTabSz="889000">
+          <a:pPr lvl="0" algn="l" defTabSz="889000">
             <a:lnSpc>
               <a:spcPct val="90000"/>
             </a:lnSpc>
@@ -5427,7 +5678,6 @@
             <a:spcAft>
               <a:spcPct val="35000"/>
             </a:spcAft>
-            <a:buNone/>
           </a:pPr>
           <a:r>
             <a:rPr lang="es-ES" sz="2000" i="1" kern="1200" dirty="0"/>
@@ -5462,7 +5712,7 @@
             <a:spcAft>
               <a:spcPct val="15000"/>
             </a:spcAft>
-            <a:buChar char="•"/>
+            <a:buChar char="••"/>
           </a:pPr>
           <a:r>
             <a:rPr lang="es-ES" sz="1600" kern="1200" dirty="0" err="1"/>
@@ -5485,7 +5735,7 @@
             <a:spcAft>
               <a:spcPct val="15000"/>
             </a:spcAft>
-            <a:buChar char="•"/>
+            <a:buChar char="••"/>
           </a:pPr>
           <a:r>
             <a:rPr lang="es-ES" sz="1600" kern="1200" dirty="0" err="1"/>
@@ -5504,7 +5754,7 @@
             <a:spcAft>
               <a:spcPct val="15000"/>
             </a:spcAft>
-            <a:buChar char="•"/>
+            <a:buChar char="••"/>
           </a:pPr>
           <a:r>
             <a:rPr lang="es-ES" sz="1600" kern="1200" dirty="0" err="1"/>
@@ -5531,7 +5781,7 @@
             <a:spcAft>
               <a:spcPct val="15000"/>
             </a:spcAft>
-            <a:buChar char="•"/>
+            <a:buChar char="••"/>
           </a:pPr>
           <a:r>
             <a:rPr lang="es-ES" sz="1600" kern="1200" dirty="0" err="1"/>
@@ -5564,7 +5814,7 @@
         <a:solidFill>
           <a:schemeClr val="accent1">
             <a:shade val="90000"/>
-            <a:hueOff val="-31026"/>
+            <a:hueOff val="-31025"/>
             <a:satOff val="-361"/>
             <a:lumOff val="17617"/>
             <a:alphaOff val="0"/>
@@ -5595,7 +5845,7 @@
         </a:bodyPr>
         <a:lstStyle/>
         <a:p>
-          <a:pPr marL="0" lvl="0" indent="0" algn="ctr" defTabSz="711200">
+          <a:pPr lvl="0" algn="ctr" defTabSz="711200">
             <a:lnSpc>
               <a:spcPct val="90000"/>
             </a:lnSpc>
@@ -5605,7 +5855,6 @@
             <a:spcAft>
               <a:spcPct val="35000"/>
             </a:spcAft>
-            <a:buNone/>
           </a:pPr>
           <a:endParaRPr lang="en-US" sz="1600" kern="1200"/>
         </a:p>
@@ -5672,7 +5921,7 @@
         </a:bodyPr>
         <a:lstStyle/>
         <a:p>
-          <a:pPr marL="0" lvl="0" indent="0" algn="l" defTabSz="889000">
+          <a:pPr lvl="0" algn="l" defTabSz="889000">
             <a:lnSpc>
               <a:spcPct val="90000"/>
             </a:lnSpc>
@@ -5682,7 +5931,6 @@
             <a:spcAft>
               <a:spcPct val="35000"/>
             </a:spcAft>
-            <a:buNone/>
           </a:pPr>
           <a:r>
             <a:rPr lang="es-ES" sz="2000" kern="1200" dirty="0" err="1"/>
@@ -5717,7 +5965,7 @@
             <a:spcAft>
               <a:spcPct val="15000"/>
             </a:spcAft>
-            <a:buChar char="•"/>
+            <a:buChar char="••"/>
           </a:pPr>
           <a:r>
             <a:rPr lang="es-ES" sz="1600" kern="1200" dirty="0" err="1"/>
@@ -5736,7 +5984,7 @@
             <a:spcAft>
               <a:spcPct val="15000"/>
             </a:spcAft>
-            <a:buChar char="•"/>
+            <a:buChar char="••"/>
           </a:pPr>
           <a:r>
             <a:rPr lang="es-ES" sz="1600" kern="1200" dirty="0" err="1"/>
@@ -5771,7 +6019,7 @@
             <a:spcAft>
               <a:spcPct val="15000"/>
             </a:spcAft>
-            <a:buChar char="•"/>
+            <a:buChar char="••"/>
           </a:pPr>
           <a:r>
             <a:rPr lang="es-ES" sz="1600" kern="1200" dirty="0" err="1"/>
@@ -5877,7 +6125,7 @@
         </a:bodyPr>
         <a:lstStyle/>
         <a:p>
-          <a:pPr marL="0" lvl="0" indent="0" algn="ctr" defTabSz="1644650">
+          <a:pPr lvl="0" algn="ctr" defTabSz="1644650">
             <a:lnSpc>
               <a:spcPct val="90000"/>
             </a:lnSpc>
@@ -5887,7 +6135,6 @@
             <a:spcAft>
               <a:spcPct val="35000"/>
             </a:spcAft>
-            <a:buNone/>
           </a:pPr>
           <a:r>
             <a:rPr lang="en-US" sz="3700" kern="1200" dirty="0"/>
@@ -5950,7 +6197,7 @@
         </a:bodyPr>
         <a:lstStyle/>
         <a:p>
-          <a:pPr marL="0" lvl="0" indent="0" algn="ctr" defTabSz="1333500">
+          <a:pPr lvl="0" algn="ctr" defTabSz="1333500">
             <a:lnSpc>
               <a:spcPct val="90000"/>
             </a:lnSpc>
@@ -5960,7 +6207,6 @@
             <a:spcAft>
               <a:spcPct val="35000"/>
             </a:spcAft>
-            <a:buNone/>
           </a:pPr>
           <a:endParaRPr lang="en-US" sz="3000" kern="1200"/>
         </a:p>
@@ -6026,7 +6272,7 @@
         </a:bodyPr>
         <a:lstStyle/>
         <a:p>
-          <a:pPr marL="0" lvl="0" indent="0" algn="ctr" defTabSz="1644650">
+          <a:pPr lvl="0" algn="ctr" defTabSz="1644650">
             <a:lnSpc>
               <a:spcPct val="90000"/>
             </a:lnSpc>
@@ -6036,7 +6282,6 @@
             <a:spcAft>
               <a:spcPct val="35000"/>
             </a:spcAft>
-            <a:buNone/>
           </a:pPr>
           <a:r>
             <a:rPr lang="en-US" sz="3700" kern="1200" dirty="0"/>
@@ -6117,7 +6362,7 @@
         </a:bodyPr>
         <a:lstStyle/>
         <a:p>
-          <a:pPr marL="0" lvl="0" indent="0" algn="ctr" defTabSz="889000">
+          <a:pPr lvl="0" algn="ctr" defTabSz="889000">
             <a:lnSpc>
               <a:spcPct val="90000"/>
             </a:lnSpc>
@@ -6127,7 +6372,6 @@
             <a:spcAft>
               <a:spcPct val="35000"/>
             </a:spcAft>
-            <a:buNone/>
           </a:pPr>
           <a:r>
             <a:rPr lang="en-US" sz="2000" kern="1200" noProof="0" dirty="0"/>
@@ -6190,7 +6434,7 @@
         </a:bodyPr>
         <a:lstStyle/>
         <a:p>
-          <a:pPr marL="0" lvl="0" indent="0" algn="ctr" defTabSz="889000">
+          <a:pPr lvl="0" algn="ctr" defTabSz="889000">
             <a:lnSpc>
               <a:spcPct val="90000"/>
             </a:lnSpc>
@@ -6200,7 +6444,6 @@
             <a:spcAft>
               <a:spcPct val="35000"/>
             </a:spcAft>
-            <a:buNone/>
           </a:pPr>
           <a:endParaRPr lang="en-US" sz="2000" kern="1200" dirty="0"/>
         </a:p>
@@ -6266,7 +6509,7 @@
         </a:bodyPr>
         <a:lstStyle/>
         <a:p>
-          <a:pPr marL="0" lvl="0" indent="0" algn="ctr" defTabSz="889000">
+          <a:pPr lvl="0" algn="ctr" defTabSz="889000">
             <a:lnSpc>
               <a:spcPct val="90000"/>
             </a:lnSpc>
@@ -6276,7 +6519,6 @@
             <a:spcAft>
               <a:spcPct val="35000"/>
             </a:spcAft>
-            <a:buNone/>
           </a:pPr>
           <a:r>
             <a:rPr lang="en-US" sz="2000" kern="1200" noProof="0" dirty="0"/>
@@ -6339,7 +6581,7 @@
         </a:bodyPr>
         <a:lstStyle/>
         <a:p>
-          <a:pPr marL="0" lvl="0" indent="0" algn="ctr" defTabSz="889000">
+          <a:pPr lvl="0" algn="ctr" defTabSz="889000">
             <a:lnSpc>
               <a:spcPct val="90000"/>
             </a:lnSpc>
@@ -6349,7 +6591,6 @@
             <a:spcAft>
               <a:spcPct val="35000"/>
             </a:spcAft>
-            <a:buNone/>
           </a:pPr>
           <a:endParaRPr lang="en-US" sz="2000" kern="1200" dirty="0"/>
         </a:p>
@@ -6415,7 +6656,7 @@
         </a:bodyPr>
         <a:lstStyle/>
         <a:p>
-          <a:pPr marL="0" lvl="0" indent="0" algn="ctr" defTabSz="889000">
+          <a:pPr lvl="0" algn="ctr" defTabSz="889000">
             <a:lnSpc>
               <a:spcPct val="90000"/>
             </a:lnSpc>
@@ -6425,7 +6666,6 @@
             <a:spcAft>
               <a:spcPct val="35000"/>
             </a:spcAft>
-            <a:buNone/>
           </a:pPr>
           <a:r>
             <a:rPr lang="en-US" sz="2000" kern="1200" noProof="0" dirty="0"/>
@@ -6488,7 +6728,7 @@
         </a:bodyPr>
         <a:lstStyle/>
         <a:p>
-          <a:pPr marL="0" lvl="0" indent="0" algn="ctr" defTabSz="889000">
+          <a:pPr lvl="0" algn="ctr" defTabSz="889000">
             <a:lnSpc>
               <a:spcPct val="90000"/>
             </a:lnSpc>
@@ -6498,7 +6738,6 @@
             <a:spcAft>
               <a:spcPct val="35000"/>
             </a:spcAft>
-            <a:buNone/>
           </a:pPr>
           <a:endParaRPr lang="en-US" sz="2000" kern="1200" dirty="0"/>
         </a:p>
@@ -6564,7 +6803,7 @@
         </a:bodyPr>
         <a:lstStyle/>
         <a:p>
-          <a:pPr marL="0" lvl="0" indent="0" algn="ctr" defTabSz="889000">
+          <a:pPr lvl="0" algn="ctr" defTabSz="889000">
             <a:lnSpc>
               <a:spcPct val="90000"/>
             </a:lnSpc>
@@ -6574,7 +6813,6 @@
             <a:spcAft>
               <a:spcPct val="35000"/>
             </a:spcAft>
-            <a:buNone/>
           </a:pPr>
           <a:r>
             <a:rPr lang="en-US" sz="2000" kern="1200" noProof="0" dirty="0"/>
@@ -6715,7 +6953,7 @@
         </a:bodyPr>
         <a:lstStyle/>
         <a:p>
-          <a:pPr marL="0" lvl="0" indent="0" algn="ctr" defTabSz="488950">
+          <a:pPr lvl="0" algn="ctr" defTabSz="488950">
             <a:lnSpc>
               <a:spcPct val="90000"/>
             </a:lnSpc>
@@ -6725,7 +6963,6 @@
             <a:spcAft>
               <a:spcPct val="35000"/>
             </a:spcAft>
-            <a:buNone/>
           </a:pPr>
           <a:r>
             <a:rPr lang="en-US" sz="1100" kern="1200" dirty="0"/>
@@ -6785,7 +7022,7 @@
             <a:spcAft>
               <a:spcPct val="15000"/>
             </a:spcAft>
-            <a:buChar char="•"/>
+            <a:buChar char="••"/>
           </a:pPr>
           <a:r>
             <a:rPr lang="en-US" sz="1200" kern="1200" dirty="0" err="1"/>
@@ -6907,7 +7144,7 @@
         </a:bodyPr>
         <a:lstStyle/>
         <a:p>
-          <a:pPr marL="0" lvl="0" indent="0" algn="ctr" defTabSz="488950">
+          <a:pPr lvl="0" algn="ctr" defTabSz="488950">
             <a:lnSpc>
               <a:spcPct val="90000"/>
             </a:lnSpc>
@@ -6917,7 +7154,6 @@
             <a:spcAft>
               <a:spcPct val="35000"/>
             </a:spcAft>
-            <a:buNone/>
           </a:pPr>
           <a:r>
             <a:rPr lang="en-US" sz="1100" kern="1200" dirty="0"/>
@@ -6977,7 +7213,7 @@
             <a:spcAft>
               <a:spcPct val="15000"/>
             </a:spcAft>
-            <a:buChar char="•"/>
+            <a:buChar char="••"/>
           </a:pPr>
           <a:endParaRPr lang="en-US" sz="900" kern="1200" dirty="0"/>
         </a:p>
@@ -7095,7 +7331,7 @@
         </a:bodyPr>
         <a:lstStyle/>
         <a:p>
-          <a:pPr marL="0" lvl="0" indent="0" algn="ctr" defTabSz="488950">
+          <a:pPr lvl="0" algn="ctr" defTabSz="488950">
             <a:lnSpc>
               <a:spcPct val="90000"/>
             </a:lnSpc>
@@ -7105,7 +7341,6 @@
             <a:spcAft>
               <a:spcPct val="35000"/>
             </a:spcAft>
-            <a:buNone/>
           </a:pPr>
           <a:r>
             <a:rPr lang="en-US" sz="1100" kern="1200" dirty="0"/>
@@ -7165,7 +7400,7 @@
             <a:spcAft>
               <a:spcPct val="15000"/>
             </a:spcAft>
-            <a:buChar char="•"/>
+            <a:buChar char="••"/>
           </a:pPr>
           <a:r>
             <a:rPr lang="en-US" sz="1200" kern="1200" dirty="0"/>
@@ -7286,7 +7521,7 @@
         </a:bodyPr>
         <a:lstStyle/>
         <a:p>
-          <a:pPr marL="0" lvl="0" indent="0" algn="ctr" defTabSz="488950">
+          <a:pPr lvl="0" algn="ctr" defTabSz="488950">
             <a:lnSpc>
               <a:spcPct val="90000"/>
             </a:lnSpc>
@@ -7296,7 +7531,6 @@
             <a:spcAft>
               <a:spcPct val="35000"/>
             </a:spcAft>
-            <a:buNone/>
           </a:pPr>
           <a:r>
             <a:rPr lang="en-US" sz="1100" kern="1200" dirty="0"/>
@@ -7449,7 +7683,7 @@
         </a:bodyPr>
         <a:lstStyle/>
         <a:p>
-          <a:pPr marL="0" lvl="0" indent="0" algn="ctr" defTabSz="488950">
+          <a:pPr lvl="0" algn="ctr" defTabSz="488950">
             <a:lnSpc>
               <a:spcPct val="90000"/>
             </a:lnSpc>
@@ -7459,7 +7693,6 @@
             <a:spcAft>
               <a:spcPct val="35000"/>
             </a:spcAft>
-            <a:buNone/>
           </a:pPr>
           <a:r>
             <a:rPr lang="en-US" sz="1100" kern="1200" dirty="0"/>
@@ -7519,7 +7752,7 @@
             <a:spcAft>
               <a:spcPct val="15000"/>
             </a:spcAft>
-            <a:buChar char="•"/>
+            <a:buChar char="••"/>
           </a:pPr>
           <a:r>
             <a:rPr lang="en-US" sz="1200" kern="1200" dirty="0"/>
@@ -7648,7 +7881,7 @@
         </a:bodyPr>
         <a:lstStyle/>
         <a:p>
-          <a:pPr marL="0" lvl="0" indent="0" algn="ctr" defTabSz="488950">
+          <a:pPr lvl="0" algn="ctr" defTabSz="488950">
             <a:lnSpc>
               <a:spcPct val="90000"/>
             </a:lnSpc>
@@ -7658,7 +7891,6 @@
             <a:spcAft>
               <a:spcPct val="35000"/>
             </a:spcAft>
-            <a:buNone/>
           </a:pPr>
           <a:r>
             <a:rPr lang="en-US" sz="1100" kern="1200" dirty="0"/>
@@ -7718,7 +7950,7 @@
             <a:spcAft>
               <a:spcPct val="15000"/>
             </a:spcAft>
-            <a:buChar char="•"/>
+            <a:buChar char="••"/>
           </a:pPr>
           <a:r>
             <a:rPr lang="en-US" sz="1200" kern="1200" dirty="0" err="1"/>
@@ -7791,7 +8023,7 @@
         </a:bodyPr>
         <a:lstStyle/>
         <a:p>
-          <a:pPr marL="0" lvl="0" indent="0" algn="ctr" defTabSz="488950">
+          <a:pPr lvl="0" algn="ctr" defTabSz="488950">
             <a:lnSpc>
               <a:spcPct val="90000"/>
             </a:lnSpc>
@@ -7801,7 +8033,6 @@
             <a:spcAft>
               <a:spcPct val="35000"/>
             </a:spcAft>
-            <a:buNone/>
           </a:pPr>
           <a:r>
             <a:rPr lang="en-US" sz="1100" kern="1200" dirty="0"/>
@@ -19734,16 +19965,16 @@
       </p:sp>
       <p:grpSp>
         <p:nvGrpSpPr>
-          <p:cNvPr id="13" name="Group 12"/>
+          <p:cNvPr id="3" name="Group 2"/>
           <p:cNvGrpSpPr/>
           <p:nvPr/>
         </p:nvGrpSpPr>
         <p:grpSpPr>
           <a:xfrm>
             <a:off x="138947" y="2057400"/>
-            <a:ext cx="2879873" cy="3840480"/>
-            <a:chOff x="76200" y="2018033"/>
-            <a:chExt cx="2879873" cy="3840480"/>
+            <a:ext cx="2879873" cy="3886200"/>
+            <a:chOff x="138947" y="2057400"/>
+            <a:chExt cx="2879873" cy="3886200"/>
           </a:xfrm>
         </p:grpSpPr>
         <p:pic>
@@ -19767,7 +19998,7 @@
           </p:blipFill>
           <p:spPr bwMode="auto">
             <a:xfrm>
-              <a:off x="76200" y="2018033"/>
+              <a:off x="138947" y="2057400"/>
               <a:ext cx="2879873" cy="3840480"/>
             </a:xfrm>
             <a:prstGeom prst="rect">
@@ -19819,7 +20050,7 @@
           </p:blipFill>
           <p:spPr bwMode="auto">
             <a:xfrm>
-              <a:off x="685800" y="5181600"/>
+              <a:off x="748547" y="5410200"/>
               <a:ext cx="2147053" cy="533400"/>
             </a:xfrm>
             <a:prstGeom prst="rect">
@@ -20154,7 +20385,19 @@
           <a:p>
             <a:r>
               <a:rPr lang="en-US" dirty="0"/>
-              <a:t>Although most plants have hermaphroditic flowers, some have developed other means of mating, including:</a:t>
+              <a:t>Although most </a:t>
+            </a:r>
+            <a:r>
+              <a:rPr lang="en-US" dirty="0" smtClean="0"/>
+              <a:t>angiosperms</a:t>
+            </a:r>
+            <a:r>
+              <a:rPr lang="en-US" dirty="0" smtClean="0"/>
+              <a:t> </a:t>
+            </a:r>
+            <a:r>
+              <a:rPr lang="en-US" dirty="0"/>
+              <a:t>have hermaphroditic flowers, some have developed other means of mating, including:</a:t>
             </a:r>
           </a:p>
           <a:p>
@@ -21468,35 +21711,35 @@
                 <a:gridCol w="1645920">
                   <a:extLst>
                     <a:ext uri="{9D8B030D-6E8A-4147-A177-3AD203B41FA5}">
-                      <a16:colId xmlns:a16="http://schemas.microsoft.com/office/drawing/2014/main" val="20000"/>
+                      <a16:colId xmlns:a16="http://schemas.microsoft.com/office/drawing/2014/main" xmlns="" val="20000"/>
                     </a:ext>
                   </a:extLst>
                 </a:gridCol>
                 <a:gridCol w="1645920">
                   <a:extLst>
                     <a:ext uri="{9D8B030D-6E8A-4147-A177-3AD203B41FA5}">
-                      <a16:colId xmlns:a16="http://schemas.microsoft.com/office/drawing/2014/main" val="20001"/>
+                      <a16:colId xmlns:a16="http://schemas.microsoft.com/office/drawing/2014/main" xmlns="" val="20001"/>
                     </a:ext>
                   </a:extLst>
                 </a:gridCol>
                 <a:gridCol w="1645920">
                   <a:extLst>
                     <a:ext uri="{9D8B030D-6E8A-4147-A177-3AD203B41FA5}">
-                      <a16:colId xmlns:a16="http://schemas.microsoft.com/office/drawing/2014/main" val="20002"/>
+                      <a16:colId xmlns:a16="http://schemas.microsoft.com/office/drawing/2014/main" xmlns="" val="20002"/>
                     </a:ext>
                   </a:extLst>
                 </a:gridCol>
                 <a:gridCol w="1645920">
                   <a:extLst>
                     <a:ext uri="{9D8B030D-6E8A-4147-A177-3AD203B41FA5}">
-                      <a16:colId xmlns:a16="http://schemas.microsoft.com/office/drawing/2014/main" val="20003"/>
+                      <a16:colId xmlns:a16="http://schemas.microsoft.com/office/drawing/2014/main" xmlns="" val="20003"/>
                     </a:ext>
                   </a:extLst>
                 </a:gridCol>
                 <a:gridCol w="1645920">
                   <a:extLst>
                     <a:ext uri="{9D8B030D-6E8A-4147-A177-3AD203B41FA5}">
-                      <a16:colId xmlns:a16="http://schemas.microsoft.com/office/drawing/2014/main" val="20004"/>
+                      <a16:colId xmlns:a16="http://schemas.microsoft.com/office/drawing/2014/main" xmlns="" val="20004"/>
                     </a:ext>
                   </a:extLst>
                 </a:gridCol>
@@ -21571,7 +21814,7 @@
                 </a:tc>
                 <a:extLst>
                   <a:ext uri="{0D108BD9-81ED-4DB2-BD59-A6C34878D82A}">
-                    <a16:rowId xmlns:a16="http://schemas.microsoft.com/office/drawing/2014/main" val="10000"/>
+                    <a16:rowId xmlns:a16="http://schemas.microsoft.com/office/drawing/2014/main" xmlns="" val="10000"/>
                   </a:ext>
                 </a:extLst>
               </a:tr>
@@ -21643,7 +21886,7 @@
                 </a:tc>
                 <a:extLst>
                   <a:ext uri="{0D108BD9-81ED-4DB2-BD59-A6C34878D82A}">
-                    <a16:rowId xmlns:a16="http://schemas.microsoft.com/office/drawing/2014/main" val="10001"/>
+                    <a16:rowId xmlns:a16="http://schemas.microsoft.com/office/drawing/2014/main" xmlns="" val="10001"/>
                   </a:ext>
                 </a:extLst>
               </a:tr>
@@ -21715,7 +21958,7 @@
                 </a:tc>
                 <a:extLst>
                   <a:ext uri="{0D108BD9-81ED-4DB2-BD59-A6C34878D82A}">
-                    <a16:rowId xmlns:a16="http://schemas.microsoft.com/office/drawing/2014/main" val="10002"/>
+                    <a16:rowId xmlns:a16="http://schemas.microsoft.com/office/drawing/2014/main" xmlns="" val="10002"/>
                   </a:ext>
                 </a:extLst>
               </a:tr>
@@ -21787,7 +22030,7 @@
                 </a:tc>
                 <a:extLst>
                   <a:ext uri="{0D108BD9-81ED-4DB2-BD59-A6C34878D82A}">
-                    <a16:rowId xmlns:a16="http://schemas.microsoft.com/office/drawing/2014/main" val="10003"/>
+                    <a16:rowId xmlns:a16="http://schemas.microsoft.com/office/drawing/2014/main" xmlns="" val="10003"/>
                   </a:ext>
                 </a:extLst>
               </a:tr>
@@ -22419,8 +22662,13 @@
             <a:pPr lvl="1"/>
             <a:r>
               <a:rPr lang="en-US" dirty="0"/>
-              <a:t>Include versions of packages</a:t>
-            </a:r>
+              <a:t>Include versions of </a:t>
+            </a:r>
+            <a:r>
+              <a:rPr lang="en-US" dirty="0" smtClean="0"/>
+              <a:t>packages, languages</a:t>
+            </a:r>
+            <a:endParaRPr lang="en-US" dirty="0"/>
           </a:p>
         </p:txBody>
       </p:sp>
@@ -22694,8 +22942,13 @@
           <a:p>
             <a:r>
               <a:rPr lang="en-US" dirty="0"/>
-              <a:t>Linkage between dominant genes that </a:t>
-            </a:r>
+              <a:t>Linkage between dominant </a:t>
+            </a:r>
+            <a:r>
+              <a:rPr lang="en-US" dirty="0" smtClean="0"/>
+              <a:t>genes </a:t>
+            </a:r>
+            <a:endParaRPr lang="en-US" dirty="0"/>
           </a:p>
           <a:p>
             <a:pPr lvl="1"/>
@@ -22714,8 +22967,13 @@
           <a:p>
             <a:r>
               <a:rPr lang="en-US" dirty="0"/>
-              <a:t>Difficult Identification </a:t>
-            </a:r>
+              <a:t>Difficult </a:t>
+            </a:r>
+            <a:r>
+              <a:rPr lang="en-US" dirty="0" smtClean="0"/>
+              <a:t>identification </a:t>
+            </a:r>
+            <a:endParaRPr lang="en-US" dirty="0"/>
           </a:p>
           <a:p>
             <a:pPr lvl="1"/>
@@ -24307,7 +24565,7 @@
   <a:extraClrSchemeLst/>
   <a:extLst>
     <a:ext uri="{05A4C25C-085E-4340-85A3-A5531E510DB2}">
-      <thm15:themeFamily xmlns:thm15="http://schemas.microsoft.com/office/thememl/2012/main" name="Office Theme" id="{62F939B6-93AF-4DB8-9C6B-D6C7DFDC589F}" vid="{4A3C46E8-61CC-4603-A589-7422A47A8E4A}"/>
+      <thm15:themeFamily xmlns:thm15="http://schemas.microsoft.com/office/thememl/2012/main" xmlns="" name="Office Theme" id="{62F939B6-93AF-4DB8-9C6B-D6C7DFDC589F}" vid="{4A3C46E8-61CC-4603-A589-7422A47A8E4A}"/>
     </a:ext>
   </a:extLst>
 </a:theme>

</xml_diff>